<commit_message>
updates to presentations c(1, 3:4, 6)
</commit_message>
<xml_diff>
--- a/presentations/1 - Welcome and motivation.pptx
+++ b/presentations/1 - Welcome and motivation.pptx
@@ -209,7 +209,7 @@
           <a:p>
             <a:fld id="{EC387D8F-AD3F-4F1D-953F-F6D09F384E03}" type="datetimeFigureOut">
               <a:rPr lang="en-US" smtClean="0"/>
-              <a:t>10/26/2023</a:t>
+              <a:t>11/8/2023</a:t>
             </a:fld>
             <a:endParaRPr lang="en-US"/>
           </a:p>
@@ -1399,7 +1399,7 @@
           <a:p>
             <a:fld id="{9A69187F-33B1-48D6-A8D1-B3CDAB36B405}" type="datetimeFigureOut">
               <a:rPr lang="en-US" smtClean="0"/>
-              <a:t>10/26/2023</a:t>
+              <a:t>11/8/2023</a:t>
             </a:fld>
             <a:endParaRPr lang="en-US"/>
           </a:p>
@@ -1597,7 +1597,7 @@
           <a:p>
             <a:fld id="{9A69187F-33B1-48D6-A8D1-B3CDAB36B405}" type="datetimeFigureOut">
               <a:rPr lang="en-US" smtClean="0"/>
-              <a:t>10/26/2023</a:t>
+              <a:t>11/8/2023</a:t>
             </a:fld>
             <a:endParaRPr lang="en-US"/>
           </a:p>
@@ -1805,7 +1805,7 @@
           <a:p>
             <a:fld id="{9A69187F-33B1-48D6-A8D1-B3CDAB36B405}" type="datetimeFigureOut">
               <a:rPr lang="en-US" smtClean="0"/>
-              <a:t>10/26/2023</a:t>
+              <a:t>11/8/2023</a:t>
             </a:fld>
             <a:endParaRPr lang="en-US"/>
           </a:p>
@@ -2003,7 +2003,7 @@
           <a:p>
             <a:fld id="{9A69187F-33B1-48D6-A8D1-B3CDAB36B405}" type="datetimeFigureOut">
               <a:rPr lang="en-US" smtClean="0"/>
-              <a:t>10/26/2023</a:t>
+              <a:t>11/8/2023</a:t>
             </a:fld>
             <a:endParaRPr lang="en-US"/>
           </a:p>
@@ -2278,7 +2278,7 @@
           <a:p>
             <a:fld id="{9A69187F-33B1-48D6-A8D1-B3CDAB36B405}" type="datetimeFigureOut">
               <a:rPr lang="en-US" smtClean="0"/>
-              <a:t>10/26/2023</a:t>
+              <a:t>11/8/2023</a:t>
             </a:fld>
             <a:endParaRPr lang="en-US"/>
           </a:p>
@@ -2543,7 +2543,7 @@
           <a:p>
             <a:fld id="{9A69187F-33B1-48D6-A8D1-B3CDAB36B405}" type="datetimeFigureOut">
               <a:rPr lang="en-US" smtClean="0"/>
-              <a:t>10/26/2023</a:t>
+              <a:t>11/8/2023</a:t>
             </a:fld>
             <a:endParaRPr lang="en-US"/>
           </a:p>
@@ -2955,7 +2955,7 @@
           <a:p>
             <a:fld id="{9A69187F-33B1-48D6-A8D1-B3CDAB36B405}" type="datetimeFigureOut">
               <a:rPr lang="en-US" smtClean="0"/>
-              <a:t>10/26/2023</a:t>
+              <a:t>11/8/2023</a:t>
             </a:fld>
             <a:endParaRPr lang="en-US"/>
           </a:p>
@@ -3096,7 +3096,7 @@
           <a:p>
             <a:fld id="{9A69187F-33B1-48D6-A8D1-B3CDAB36B405}" type="datetimeFigureOut">
               <a:rPr lang="en-US" smtClean="0"/>
-              <a:t>10/26/2023</a:t>
+              <a:t>11/8/2023</a:t>
             </a:fld>
             <a:endParaRPr lang="en-US"/>
           </a:p>
@@ -3209,7 +3209,7 @@
           <a:p>
             <a:fld id="{9A69187F-33B1-48D6-A8D1-B3CDAB36B405}" type="datetimeFigureOut">
               <a:rPr lang="en-US" smtClean="0"/>
-              <a:t>10/26/2023</a:t>
+              <a:t>11/8/2023</a:t>
             </a:fld>
             <a:endParaRPr lang="en-US"/>
           </a:p>
@@ -3520,7 +3520,7 @@
           <a:p>
             <a:fld id="{9A69187F-33B1-48D6-A8D1-B3CDAB36B405}" type="datetimeFigureOut">
               <a:rPr lang="en-US" smtClean="0"/>
-              <a:t>10/26/2023</a:t>
+              <a:t>11/8/2023</a:t>
             </a:fld>
             <a:endParaRPr lang="en-US"/>
           </a:p>
@@ -3808,7 +3808,7 @@
           <a:p>
             <a:fld id="{9A69187F-33B1-48D6-A8D1-B3CDAB36B405}" type="datetimeFigureOut">
               <a:rPr lang="en-US" smtClean="0"/>
-              <a:t>10/26/2023</a:t>
+              <a:t>11/8/2023</a:t>
             </a:fld>
             <a:endParaRPr lang="en-US"/>
           </a:p>
@@ -4049,7 +4049,7 @@
           <a:p>
             <a:fld id="{9A69187F-33B1-48D6-A8D1-B3CDAB36B405}" type="datetimeFigureOut">
               <a:rPr lang="en-US" smtClean="0"/>
-              <a:t>10/26/2023</a:t>
+              <a:t>11/8/2023</a:t>
             </a:fld>
             <a:endParaRPr lang="en-US"/>
           </a:p>
@@ -8059,192 +8059,6 @@
       </p:grpSpPr>
       <p:sp>
         <p:nvSpPr>
-          <p:cNvPr id="5" name="TextBox 4">
-            <a:extLst>
-              <a:ext uri="{FF2B5EF4-FFF2-40B4-BE49-F238E27FC236}">
-                <a16:creationId xmlns:a16="http://schemas.microsoft.com/office/drawing/2014/main" id="{BFE368F2-1B64-47D8-8738-9C30079055F0}"/>
-              </a:ext>
-            </a:extLst>
-          </p:cNvPr>
-          <p:cNvSpPr txBox="1"/>
-          <p:nvPr/>
-        </p:nvSpPr>
-        <p:spPr>
-          <a:xfrm>
-            <a:off x="7589000" y="152301"/>
-            <a:ext cx="4600403" cy="2677656"/>
-          </a:xfrm>
-          <a:prstGeom prst="rect">
-            <a:avLst/>
-          </a:prstGeom>
-          <a:solidFill>
-            <a:schemeClr val="bg1">
-              <a:alpha val="60000"/>
-            </a:schemeClr>
-          </a:solidFill>
-        </p:spPr>
-        <p:txBody>
-          <a:bodyPr wrap="square" rtlCol="0">
-            <a:spAutoFit/>
-          </a:bodyPr>
-          <a:lstStyle/>
-          <a:p>
-            <a:r>
-              <a:rPr lang="en-US" sz="1400" dirty="0"/>
-              <a:t>library(leaflet)</a:t>
-            </a:r>
-          </a:p>
-          <a:p>
-            <a:endParaRPr lang="en-US" sz="1400" dirty="0"/>
-          </a:p>
-          <a:p>
-            <a:r>
-              <a:rPr lang="en-US" sz="1400" dirty="0"/>
-              <a:t>df &lt;- </a:t>
-            </a:r>
-            <a:r>
-              <a:rPr lang="en-US" sz="1400" dirty="0" err="1"/>
-              <a:t>data.frame</a:t>
-            </a:r>
-            <a:r>
-              <a:rPr lang="en-US" sz="1400" dirty="0"/>
-              <a:t>(cities = c("Juneau", "Sitka", "Petersburg", "Ketchikan"), </a:t>
-            </a:r>
-          </a:p>
-          <a:p>
-            <a:r>
-              <a:rPr lang="en-US" sz="1400" dirty="0"/>
-              <a:t>                 </a:t>
-            </a:r>
-            <a:r>
-              <a:rPr lang="en-US" sz="1400" dirty="0" err="1"/>
-              <a:t>lat</a:t>
-            </a:r>
-            <a:r>
-              <a:rPr lang="en-US" sz="1400" dirty="0"/>
-              <a:t> = c(58.2758, 57.0529, 56.8122, 55.349), </a:t>
-            </a:r>
-          </a:p>
-          <a:p>
-            <a:r>
-              <a:rPr lang="en-US" sz="1400" dirty="0"/>
-              <a:t>                 </a:t>
-            </a:r>
-            <a:r>
-              <a:rPr lang="en-US" sz="1400" dirty="0" err="1"/>
-              <a:t>lng</a:t>
-            </a:r>
-            <a:r>
-              <a:rPr lang="en-US" sz="1400" dirty="0"/>
-              <a:t> = c(-134.3913, -135.3324, -132.9554, -131.670))</a:t>
-            </a:r>
-          </a:p>
-          <a:p>
-            <a:endParaRPr lang="en-US" sz="1400" dirty="0"/>
-          </a:p>
-          <a:p>
-            <a:r>
-              <a:rPr lang="en-US" sz="1400" dirty="0"/>
-              <a:t>leaflet(df) %&gt;%</a:t>
-            </a:r>
-          </a:p>
-          <a:p>
-            <a:r>
-              <a:rPr lang="en-US" sz="1400" dirty="0"/>
-              <a:t>   </a:t>
-            </a:r>
-            <a:r>
-              <a:rPr lang="en-US" sz="1400" dirty="0" err="1"/>
-              <a:t>addTiles</a:t>
-            </a:r>
-            <a:r>
-              <a:rPr lang="en-US" sz="1400" dirty="0"/>
-              <a:t>() %&gt;%  # Add default OpenStreetMap map tiles</a:t>
-            </a:r>
-          </a:p>
-          <a:p>
-            <a:r>
-              <a:rPr lang="en-US" sz="1400" dirty="0"/>
-              <a:t>   </a:t>
-            </a:r>
-            <a:r>
-              <a:rPr lang="en-US" sz="1400" dirty="0" err="1"/>
-              <a:t>addMarkers</a:t>
-            </a:r>
-            <a:r>
-              <a:rPr lang="en-US" sz="1400" dirty="0"/>
-              <a:t>(popup = ~cities, </a:t>
-            </a:r>
-          </a:p>
-          <a:p>
-            <a:r>
-              <a:rPr lang="en-US" sz="1400" dirty="0"/>
-              <a:t>              label = ~cities,</a:t>
-            </a:r>
-          </a:p>
-          <a:p>
-            <a:r>
-              <a:rPr lang="en-US" sz="1400" dirty="0"/>
-              <a:t>              </a:t>
-            </a:r>
-            <a:r>
-              <a:rPr lang="en-US" sz="1400" dirty="0" err="1"/>
-              <a:t>labelOptions</a:t>
-            </a:r>
-            <a:r>
-              <a:rPr lang="en-US" sz="1400" dirty="0"/>
-              <a:t> = </a:t>
-            </a:r>
-            <a:r>
-              <a:rPr lang="en-US" sz="1400" dirty="0" err="1"/>
-              <a:t>labelOptions</a:t>
-            </a:r>
-            <a:r>
-              <a:rPr lang="en-US" sz="1400" dirty="0"/>
-              <a:t>(</a:t>
-            </a:r>
-            <a:r>
-              <a:rPr lang="en-US" sz="1400" dirty="0" err="1"/>
-              <a:t>noHide</a:t>
-            </a:r>
-            <a:r>
-              <a:rPr lang="en-US" sz="1400" dirty="0"/>
-              <a:t> = T))</a:t>
-            </a:r>
-          </a:p>
-        </p:txBody>
-      </p:sp>
-      <p:pic>
-        <p:nvPicPr>
-          <p:cNvPr id="8" name="Picture 7">
-            <a:extLst>
-              <a:ext uri="{FF2B5EF4-FFF2-40B4-BE49-F238E27FC236}">
-                <a16:creationId xmlns:a16="http://schemas.microsoft.com/office/drawing/2014/main" id="{12FECE0E-E55E-474B-A5A6-0DD42862F15D}"/>
-              </a:ext>
-            </a:extLst>
-          </p:cNvPr>
-          <p:cNvPicPr>
-            <a:picLocks noChangeAspect="1"/>
-          </p:cNvPicPr>
-          <p:nvPr/>
-        </p:nvPicPr>
-        <p:blipFill rotWithShape="1">
-          <a:blip r:embed="rId3"/>
-          <a:srcRect t="6673"/>
-          <a:stretch/>
-        </p:blipFill>
-        <p:spPr>
-          <a:xfrm>
-            <a:off x="2584222" y="0"/>
-            <a:ext cx="9607779" cy="6858000"/>
-          </a:xfrm>
-          <a:prstGeom prst="rect">
-            <a:avLst/>
-          </a:prstGeom>
-        </p:spPr>
-      </p:pic>
-      <p:sp>
-        <p:nvSpPr>
           <p:cNvPr id="2" name="Title 1">
             <a:extLst>
               <a:ext uri="{FF2B5EF4-FFF2-40B4-BE49-F238E27FC236}">
@@ -8262,26 +8076,18 @@
         <p:spPr>
           <a:xfrm>
             <a:off x="371093" y="1161288"/>
-            <a:ext cx="7045339" cy="1124712"/>
+            <a:ext cx="3955715" cy="1124712"/>
           </a:xfrm>
         </p:spPr>
         <p:txBody>
           <a:bodyPr anchor="b">
-            <a:normAutofit fontScale="90000"/>
+            <a:normAutofit/>
           </a:bodyPr>
           <a:lstStyle/>
           <a:p>
             <a:r>
               <a:rPr lang="en-US" sz="4400" dirty="0"/>
-              <a:t>Introductions – </a:t>
-            </a:r>
-            <a:r>
-              <a:rPr lang="en-US" sz="4400" dirty="0">
-                <a:highlight>
-                  <a:srgbClr val="FFFF00"/>
-                </a:highlight>
-              </a:rPr>
-              <a:t>this is a placeholder!</a:t>
+              <a:t>Introductions!</a:t>
             </a:r>
             <a:endParaRPr lang="en-US" sz="3600" dirty="0">
               <a:highlight>
@@ -8420,40 +8226,2075 @@
           </a:p>
         </p:txBody>
       </p:sp>
-      <p:pic>
-        <p:nvPicPr>
-          <p:cNvPr id="10" name="Picture 9">
+      <p:grpSp>
+        <p:nvGrpSpPr>
+          <p:cNvPr id="18" name="Group 17">
             <a:extLst>
               <a:ext uri="{FF2B5EF4-FFF2-40B4-BE49-F238E27FC236}">
-                <a16:creationId xmlns:a16="http://schemas.microsoft.com/office/drawing/2014/main" id="{D5EA154C-4DC3-419A-BC38-CF09FB7CE48F}"/>
+                <a16:creationId xmlns:a16="http://schemas.microsoft.com/office/drawing/2014/main" id="{DDB16C2C-3AB6-BD57-DFC4-D0E7FC987619}"/>
               </a:ext>
             </a:extLst>
           </p:cNvPr>
-          <p:cNvPicPr>
-            <a:picLocks noChangeAspect="1"/>
-          </p:cNvPicPr>
+          <p:cNvGrpSpPr/>
           <p:nvPr/>
-        </p:nvPicPr>
-        <p:blipFill rotWithShape="1">
-          <a:blip r:embed="rId4"/>
-          <a:srcRect t="31170" r="22795"/>
-          <a:stretch/>
-        </p:blipFill>
-        <p:spPr>
+        </p:nvGrpSpPr>
+        <p:grpSpPr>
           <a:xfrm>
-            <a:off x="9113143" y="336510"/>
-            <a:ext cx="2903693" cy="2106970"/>
+            <a:off x="7416432" y="417106"/>
+            <a:ext cx="4268094" cy="3989953"/>
+            <a:chOff x="7120196" y="1889771"/>
+            <a:chExt cx="4268094" cy="3989953"/>
           </a:xfrm>
-          <a:prstGeom prst="rect">
-            <a:avLst/>
-          </a:prstGeom>
-          <a:ln w="57150">
-            <a:solidFill>
-              <a:schemeClr val="tx1"/>
-            </a:solidFill>
-          </a:ln>
-        </p:spPr>
-      </p:pic>
+        </p:grpSpPr>
+        <p:grpSp>
+          <p:nvGrpSpPr>
+            <p:cNvPr id="6" name="Group 5">
+              <a:extLst>
+                <a:ext uri="{FF2B5EF4-FFF2-40B4-BE49-F238E27FC236}">
+                  <a16:creationId xmlns:a16="http://schemas.microsoft.com/office/drawing/2014/main" id="{68F0FB18-4279-0E07-3178-16140414A226}"/>
+                </a:ext>
+              </a:extLst>
+            </p:cNvPr>
+            <p:cNvGrpSpPr/>
+            <p:nvPr/>
+          </p:nvGrpSpPr>
+          <p:grpSpPr>
+            <a:xfrm>
+              <a:off x="7120196" y="1889771"/>
+              <a:ext cx="4268094" cy="3989953"/>
+              <a:chOff x="6758377" y="1910333"/>
+              <a:chExt cx="3852765" cy="3671441"/>
+            </a:xfrm>
+          </p:grpSpPr>
+          <p:sp>
+            <p:nvSpPr>
+              <p:cNvPr id="7" name="Freeform: Shape 6">
+                <a:extLst>
+                  <a:ext uri="{FF2B5EF4-FFF2-40B4-BE49-F238E27FC236}">
+                    <a16:creationId xmlns:a16="http://schemas.microsoft.com/office/drawing/2014/main" id="{F4B0A05C-137C-7B4C-B765-12E9C67193A1}"/>
+                  </a:ext>
+                </a:extLst>
+              </p:cNvPr>
+              <p:cNvSpPr/>
+              <p:nvPr/>
+            </p:nvSpPr>
+            <p:spPr>
+              <a:xfrm>
+                <a:off x="8143078" y="2409432"/>
+                <a:ext cx="1299410" cy="1357162"/>
+              </a:xfrm>
+              <a:custGeom>
+                <a:avLst/>
+                <a:gdLst>
+                  <a:gd name="connsiteX0" fmla="*/ 19250 w 1299410"/>
+                  <a:gd name="connsiteY0" fmla="*/ 154004 h 1357162"/>
+                  <a:gd name="connsiteX1" fmla="*/ 211755 w 1299410"/>
+                  <a:gd name="connsiteY1" fmla="*/ 67376 h 1357162"/>
+                  <a:gd name="connsiteX2" fmla="*/ 577515 w 1299410"/>
+                  <a:gd name="connsiteY2" fmla="*/ 0 h 1357162"/>
+                  <a:gd name="connsiteX3" fmla="*/ 808522 w 1299410"/>
+                  <a:gd name="connsiteY3" fmla="*/ 0 h 1357162"/>
+                  <a:gd name="connsiteX4" fmla="*/ 1106905 w 1299410"/>
+                  <a:gd name="connsiteY4" fmla="*/ 67376 h 1357162"/>
+                  <a:gd name="connsiteX5" fmla="*/ 1299410 w 1299410"/>
+                  <a:gd name="connsiteY5" fmla="*/ 173254 h 1357162"/>
+                  <a:gd name="connsiteX6" fmla="*/ 1280160 w 1299410"/>
+                  <a:gd name="connsiteY6" fmla="*/ 798896 h 1357162"/>
+                  <a:gd name="connsiteX7" fmla="*/ 1193532 w 1299410"/>
+                  <a:gd name="connsiteY7" fmla="*/ 1039528 h 1357162"/>
+                  <a:gd name="connsiteX8" fmla="*/ 1049153 w 1299410"/>
+                  <a:gd name="connsiteY8" fmla="*/ 1241658 h 1357162"/>
+                  <a:gd name="connsiteX9" fmla="*/ 789271 w 1299410"/>
+                  <a:gd name="connsiteY9" fmla="*/ 1357162 h 1357162"/>
+                  <a:gd name="connsiteX10" fmla="*/ 442762 w 1299410"/>
+                  <a:gd name="connsiteY10" fmla="*/ 1318661 h 1357162"/>
+                  <a:gd name="connsiteX11" fmla="*/ 211755 w 1299410"/>
+                  <a:gd name="connsiteY11" fmla="*/ 1183907 h 1357162"/>
+                  <a:gd name="connsiteX12" fmla="*/ 77002 w 1299410"/>
+                  <a:gd name="connsiteY12" fmla="*/ 1010652 h 1357162"/>
+                  <a:gd name="connsiteX13" fmla="*/ 19250 w 1299410"/>
+                  <a:gd name="connsiteY13" fmla="*/ 837397 h 1357162"/>
+                  <a:gd name="connsiteX14" fmla="*/ 19250 w 1299410"/>
+                  <a:gd name="connsiteY14" fmla="*/ 664143 h 1357162"/>
+                  <a:gd name="connsiteX15" fmla="*/ 0 w 1299410"/>
+                  <a:gd name="connsiteY15" fmla="*/ 375385 h 1357162"/>
+                  <a:gd name="connsiteX16" fmla="*/ 19250 w 1299410"/>
+                  <a:gd name="connsiteY16" fmla="*/ 154004 h 1357162"/>
+                </a:gdLst>
+                <a:ahLst/>
+                <a:cxnLst>
+                  <a:cxn ang="0">
+                    <a:pos x="connsiteX0" y="connsiteY0"/>
+                  </a:cxn>
+                  <a:cxn ang="0">
+                    <a:pos x="connsiteX1" y="connsiteY1"/>
+                  </a:cxn>
+                  <a:cxn ang="0">
+                    <a:pos x="connsiteX2" y="connsiteY2"/>
+                  </a:cxn>
+                  <a:cxn ang="0">
+                    <a:pos x="connsiteX3" y="connsiteY3"/>
+                  </a:cxn>
+                  <a:cxn ang="0">
+                    <a:pos x="connsiteX4" y="connsiteY4"/>
+                  </a:cxn>
+                  <a:cxn ang="0">
+                    <a:pos x="connsiteX5" y="connsiteY5"/>
+                  </a:cxn>
+                  <a:cxn ang="0">
+                    <a:pos x="connsiteX6" y="connsiteY6"/>
+                  </a:cxn>
+                  <a:cxn ang="0">
+                    <a:pos x="connsiteX7" y="connsiteY7"/>
+                  </a:cxn>
+                  <a:cxn ang="0">
+                    <a:pos x="connsiteX8" y="connsiteY8"/>
+                  </a:cxn>
+                  <a:cxn ang="0">
+                    <a:pos x="connsiteX9" y="connsiteY9"/>
+                  </a:cxn>
+                  <a:cxn ang="0">
+                    <a:pos x="connsiteX10" y="connsiteY10"/>
+                  </a:cxn>
+                  <a:cxn ang="0">
+                    <a:pos x="connsiteX11" y="connsiteY11"/>
+                  </a:cxn>
+                  <a:cxn ang="0">
+                    <a:pos x="connsiteX12" y="connsiteY12"/>
+                  </a:cxn>
+                  <a:cxn ang="0">
+                    <a:pos x="connsiteX13" y="connsiteY13"/>
+                  </a:cxn>
+                  <a:cxn ang="0">
+                    <a:pos x="connsiteX14" y="connsiteY14"/>
+                  </a:cxn>
+                  <a:cxn ang="0">
+                    <a:pos x="connsiteX15" y="connsiteY15"/>
+                  </a:cxn>
+                  <a:cxn ang="0">
+                    <a:pos x="connsiteX16" y="connsiteY16"/>
+                  </a:cxn>
+                </a:cxnLst>
+                <a:rect l="l" t="t" r="r" b="b"/>
+                <a:pathLst>
+                  <a:path w="1299410" h="1357162">
+                    <a:moveTo>
+                      <a:pt x="19250" y="154004"/>
+                    </a:moveTo>
+                    <a:lnTo>
+                      <a:pt x="211755" y="67376"/>
+                    </a:lnTo>
+                    <a:lnTo>
+                      <a:pt x="577515" y="0"/>
+                    </a:lnTo>
+                    <a:lnTo>
+                      <a:pt x="808522" y="0"/>
+                    </a:lnTo>
+                    <a:lnTo>
+                      <a:pt x="1106905" y="67376"/>
+                    </a:lnTo>
+                    <a:lnTo>
+                      <a:pt x="1299410" y="173254"/>
+                    </a:lnTo>
+                    <a:lnTo>
+                      <a:pt x="1280160" y="798896"/>
+                    </a:lnTo>
+                    <a:lnTo>
+                      <a:pt x="1193532" y="1039528"/>
+                    </a:lnTo>
+                    <a:lnTo>
+                      <a:pt x="1049153" y="1241658"/>
+                    </a:lnTo>
+                    <a:lnTo>
+                      <a:pt x="789271" y="1357162"/>
+                    </a:lnTo>
+                    <a:lnTo>
+                      <a:pt x="442762" y="1318661"/>
+                    </a:lnTo>
+                    <a:lnTo>
+                      <a:pt x="211755" y="1183907"/>
+                    </a:lnTo>
+                    <a:lnTo>
+                      <a:pt x="77002" y="1010652"/>
+                    </a:lnTo>
+                    <a:lnTo>
+                      <a:pt x="19250" y="837397"/>
+                    </a:lnTo>
+                    <a:lnTo>
+                      <a:pt x="19250" y="664143"/>
+                    </a:lnTo>
+                    <a:lnTo>
+                      <a:pt x="0" y="375385"/>
+                    </a:lnTo>
+                    <a:lnTo>
+                      <a:pt x="19250" y="154004"/>
+                    </a:lnTo>
+                    <a:close/>
+                  </a:path>
+                </a:pathLst>
+              </a:custGeom>
+              <a:solidFill>
+                <a:srgbClr val="75AADB"/>
+              </a:solidFill>
+              <a:ln>
+                <a:noFill/>
+              </a:ln>
+            </p:spPr>
+            <p:style>
+              <a:lnRef idx="2">
+                <a:schemeClr val="accent1">
+                  <a:shade val="50000"/>
+                </a:schemeClr>
+              </a:lnRef>
+              <a:fillRef idx="1">
+                <a:schemeClr val="accent1"/>
+              </a:fillRef>
+              <a:effectRef idx="0">
+                <a:schemeClr val="accent1"/>
+              </a:effectRef>
+              <a:fontRef idx="minor">
+                <a:schemeClr val="lt1"/>
+              </a:fontRef>
+            </p:style>
+            <p:txBody>
+              <a:bodyPr rtlCol="0" anchor="ctr"/>
+              <a:lstStyle/>
+              <a:p>
+                <a:pPr algn="ctr"/>
+                <a:endParaRPr lang="en-US"/>
+              </a:p>
+            </p:txBody>
+          </p:sp>
+          <p:pic>
+            <p:nvPicPr>
+              <p:cNvPr id="9" name="Picture 8" descr="A close up of a sign&#10;&#10;Description automatically generated">
+                <a:extLst>
+                  <a:ext uri="{FF2B5EF4-FFF2-40B4-BE49-F238E27FC236}">
+                    <a16:creationId xmlns:a16="http://schemas.microsoft.com/office/drawing/2014/main" id="{C04E11AF-577E-1468-7FD6-4C926E478AD1}"/>
+                  </a:ext>
+                </a:extLst>
+              </p:cNvPr>
+              <p:cNvPicPr>
+                <a:picLocks noChangeAspect="1"/>
+              </p:cNvPicPr>
+              <p:nvPr/>
+            </p:nvPicPr>
+            <p:blipFill rotWithShape="1">
+              <a:blip r:embed="rId3">
+                <a:extLst>
+                  <a:ext uri="{28A0092B-C50C-407E-A947-70E740481C1C}">
+                    <a14:useLocalDpi xmlns:a14="http://schemas.microsoft.com/office/drawing/2010/main" val="0"/>
+                  </a:ext>
+                </a:extLst>
+              </a:blip>
+              <a:srcRect l="9699" t="21804" r="72779" b="28032"/>
+              <a:stretch/>
+            </p:blipFill>
+            <p:spPr>
+              <a:xfrm>
+                <a:off x="8428416" y="2577963"/>
+                <a:ext cx="724694" cy="728586"/>
+              </a:xfrm>
+              <a:prstGeom prst="rect">
+                <a:avLst/>
+              </a:prstGeom>
+            </p:spPr>
+          </p:pic>
+          <p:grpSp>
+            <p:nvGrpSpPr>
+              <p:cNvPr id="11" name="Graphic 5" descr="Astronaut male outline">
+                <a:extLst>
+                  <a:ext uri="{FF2B5EF4-FFF2-40B4-BE49-F238E27FC236}">
+                    <a16:creationId xmlns:a16="http://schemas.microsoft.com/office/drawing/2014/main" id="{96220629-C877-E5C1-AD4D-30F7E327A5DD}"/>
+                  </a:ext>
+                </a:extLst>
+              </p:cNvPr>
+              <p:cNvGrpSpPr/>
+              <p:nvPr/>
+            </p:nvGrpSpPr>
+            <p:grpSpPr>
+              <a:xfrm>
+                <a:off x="6758377" y="1910333"/>
+                <a:ext cx="3852765" cy="3671441"/>
+                <a:chOff x="6758377" y="1910333"/>
+                <a:chExt cx="3852765" cy="3671441"/>
+              </a:xfrm>
+              <a:solidFill>
+                <a:srgbClr val="000000"/>
+              </a:solidFill>
+            </p:grpSpPr>
+            <p:sp>
+              <p:nvSpPr>
+                <p:cNvPr id="12" name="Freeform: Shape 11">
+                  <a:extLst>
+                    <a:ext uri="{FF2B5EF4-FFF2-40B4-BE49-F238E27FC236}">
+                      <a16:creationId xmlns:a16="http://schemas.microsoft.com/office/drawing/2014/main" id="{0196A79C-06F8-C576-369D-96F2E375062B}"/>
+                    </a:ext>
+                  </a:extLst>
+                </p:cNvPr>
+                <p:cNvSpPr/>
+                <p:nvPr/>
+              </p:nvSpPr>
+              <p:spPr>
+                <a:xfrm>
+                  <a:off x="8299476" y="4448568"/>
+                  <a:ext cx="997136" cy="634570"/>
+                </a:xfrm>
+                <a:custGeom>
+                  <a:avLst/>
+                  <a:gdLst>
+                    <a:gd name="connsiteX0" fmla="*/ 861157 w 997136"/>
+                    <a:gd name="connsiteY0" fmla="*/ 0 h 634570"/>
+                    <a:gd name="connsiteX1" fmla="*/ 135979 w 997136"/>
+                    <a:gd name="connsiteY1" fmla="*/ 0 h 634570"/>
+                    <a:gd name="connsiteX2" fmla="*/ 0 w 997136"/>
+                    <a:gd name="connsiteY2" fmla="*/ 135979 h 634570"/>
+                    <a:gd name="connsiteX3" fmla="*/ 0 w 997136"/>
+                    <a:gd name="connsiteY3" fmla="*/ 498591 h 634570"/>
+                    <a:gd name="connsiteX4" fmla="*/ 135979 w 997136"/>
+                    <a:gd name="connsiteY4" fmla="*/ 634570 h 634570"/>
+                    <a:gd name="connsiteX5" fmla="*/ 861157 w 997136"/>
+                    <a:gd name="connsiteY5" fmla="*/ 634570 h 634570"/>
+                    <a:gd name="connsiteX6" fmla="*/ 997136 w 997136"/>
+                    <a:gd name="connsiteY6" fmla="*/ 498591 h 634570"/>
+                    <a:gd name="connsiteX7" fmla="*/ 997136 w 997136"/>
+                    <a:gd name="connsiteY7" fmla="*/ 135979 h 634570"/>
+                    <a:gd name="connsiteX8" fmla="*/ 861157 w 997136"/>
+                    <a:gd name="connsiteY8" fmla="*/ 0 h 634570"/>
+                    <a:gd name="connsiteX9" fmla="*/ 906483 w 997136"/>
+                    <a:gd name="connsiteY9" fmla="*/ 498591 h 634570"/>
+                    <a:gd name="connsiteX10" fmla="*/ 861157 w 997136"/>
+                    <a:gd name="connsiteY10" fmla="*/ 543917 h 634570"/>
+                    <a:gd name="connsiteX11" fmla="*/ 135979 w 997136"/>
+                    <a:gd name="connsiteY11" fmla="*/ 543917 h 634570"/>
+                    <a:gd name="connsiteX12" fmla="*/ 90653 w 997136"/>
+                    <a:gd name="connsiteY12" fmla="*/ 498591 h 634570"/>
+                    <a:gd name="connsiteX13" fmla="*/ 90653 w 997136"/>
+                    <a:gd name="connsiteY13" fmla="*/ 135979 h 634570"/>
+                    <a:gd name="connsiteX14" fmla="*/ 135979 w 997136"/>
+                    <a:gd name="connsiteY14" fmla="*/ 90653 h 634570"/>
+                    <a:gd name="connsiteX15" fmla="*/ 861157 w 997136"/>
+                    <a:gd name="connsiteY15" fmla="*/ 90653 h 634570"/>
+                    <a:gd name="connsiteX16" fmla="*/ 906483 w 997136"/>
+                    <a:gd name="connsiteY16" fmla="*/ 135979 h 634570"/>
+                  </a:gdLst>
+                  <a:ahLst/>
+                  <a:cxnLst>
+                    <a:cxn ang="0">
+                      <a:pos x="connsiteX0" y="connsiteY0"/>
+                    </a:cxn>
+                    <a:cxn ang="0">
+                      <a:pos x="connsiteX1" y="connsiteY1"/>
+                    </a:cxn>
+                    <a:cxn ang="0">
+                      <a:pos x="connsiteX2" y="connsiteY2"/>
+                    </a:cxn>
+                    <a:cxn ang="0">
+                      <a:pos x="connsiteX3" y="connsiteY3"/>
+                    </a:cxn>
+                    <a:cxn ang="0">
+                      <a:pos x="connsiteX4" y="connsiteY4"/>
+                    </a:cxn>
+                    <a:cxn ang="0">
+                      <a:pos x="connsiteX5" y="connsiteY5"/>
+                    </a:cxn>
+                    <a:cxn ang="0">
+                      <a:pos x="connsiteX6" y="connsiteY6"/>
+                    </a:cxn>
+                    <a:cxn ang="0">
+                      <a:pos x="connsiteX7" y="connsiteY7"/>
+                    </a:cxn>
+                    <a:cxn ang="0">
+                      <a:pos x="connsiteX8" y="connsiteY8"/>
+                    </a:cxn>
+                    <a:cxn ang="0">
+                      <a:pos x="connsiteX9" y="connsiteY9"/>
+                    </a:cxn>
+                    <a:cxn ang="0">
+                      <a:pos x="connsiteX10" y="connsiteY10"/>
+                    </a:cxn>
+                    <a:cxn ang="0">
+                      <a:pos x="connsiteX11" y="connsiteY11"/>
+                    </a:cxn>
+                    <a:cxn ang="0">
+                      <a:pos x="connsiteX12" y="connsiteY12"/>
+                    </a:cxn>
+                    <a:cxn ang="0">
+                      <a:pos x="connsiteX13" y="connsiteY13"/>
+                    </a:cxn>
+                    <a:cxn ang="0">
+                      <a:pos x="connsiteX14" y="connsiteY14"/>
+                    </a:cxn>
+                    <a:cxn ang="0">
+                      <a:pos x="connsiteX15" y="connsiteY15"/>
+                    </a:cxn>
+                    <a:cxn ang="0">
+                      <a:pos x="connsiteX16" y="connsiteY16"/>
+                    </a:cxn>
+                  </a:cxnLst>
+                  <a:rect l="l" t="t" r="r" b="b"/>
+                  <a:pathLst>
+                    <a:path w="997136" h="634570">
+                      <a:moveTo>
+                        <a:pt x="861157" y="0"/>
+                      </a:moveTo>
+                      <a:lnTo>
+                        <a:pt x="135979" y="0"/>
+                      </a:lnTo>
+                      <a:cubicBezTo>
+                        <a:pt x="60914" y="82"/>
+                        <a:pt x="82" y="60914"/>
+                        <a:pt x="0" y="135979"/>
+                      </a:cubicBezTo>
+                      <a:lnTo>
+                        <a:pt x="0" y="498591"/>
+                      </a:lnTo>
+                      <a:cubicBezTo>
+                        <a:pt x="82" y="573656"/>
+                        <a:pt x="60914" y="634489"/>
+                        <a:pt x="135979" y="634570"/>
+                      </a:cubicBezTo>
+                      <a:lnTo>
+                        <a:pt x="861157" y="634570"/>
+                      </a:lnTo>
+                      <a:cubicBezTo>
+                        <a:pt x="936222" y="634489"/>
+                        <a:pt x="997055" y="573656"/>
+                        <a:pt x="997136" y="498591"/>
+                      </a:cubicBezTo>
+                      <a:lnTo>
+                        <a:pt x="997136" y="135979"/>
+                      </a:lnTo>
+                      <a:cubicBezTo>
+                        <a:pt x="997055" y="60914"/>
+                        <a:pt x="936222" y="82"/>
+                        <a:pt x="861157" y="0"/>
+                      </a:cubicBezTo>
+                      <a:close/>
+                      <a:moveTo>
+                        <a:pt x="906483" y="498591"/>
+                      </a:moveTo>
+                      <a:cubicBezTo>
+                        <a:pt x="906452" y="523611"/>
+                        <a:pt x="886177" y="543885"/>
+                        <a:pt x="861157" y="543917"/>
+                      </a:cubicBezTo>
+                      <a:lnTo>
+                        <a:pt x="135979" y="543917"/>
+                      </a:lnTo>
+                      <a:cubicBezTo>
+                        <a:pt x="110959" y="543885"/>
+                        <a:pt x="90685" y="523611"/>
+                        <a:pt x="90653" y="498591"/>
+                      </a:cubicBezTo>
+                      <a:lnTo>
+                        <a:pt x="90653" y="135979"/>
+                      </a:lnTo>
+                      <a:cubicBezTo>
+                        <a:pt x="90685" y="110959"/>
+                        <a:pt x="110959" y="90685"/>
+                        <a:pt x="135979" y="90653"/>
+                      </a:cubicBezTo>
+                      <a:lnTo>
+                        <a:pt x="861157" y="90653"/>
+                      </a:lnTo>
+                      <a:cubicBezTo>
+                        <a:pt x="886177" y="90685"/>
+                        <a:pt x="906452" y="110959"/>
+                        <a:pt x="906483" y="135979"/>
+                      </a:cubicBezTo>
+                      <a:close/>
+                    </a:path>
+                  </a:pathLst>
+                </a:custGeom>
+                <a:solidFill>
+                  <a:srgbClr val="000000"/>
+                </a:solidFill>
+                <a:ln w="45244" cap="flat">
+                  <a:noFill/>
+                  <a:prstDash val="solid"/>
+                  <a:miter/>
+                </a:ln>
+              </p:spPr>
+              <p:txBody>
+                <a:bodyPr rtlCol="0" anchor="ctr"/>
+                <a:lstStyle/>
+                <a:p>
+                  <a:endParaRPr lang="en-US"/>
+                </a:p>
+              </p:txBody>
+            </p:sp>
+            <p:sp>
+              <p:nvSpPr>
+                <p:cNvPr id="13" name="Freeform: Shape 12">
+                  <a:extLst>
+                    <a:ext uri="{FF2B5EF4-FFF2-40B4-BE49-F238E27FC236}">
+                      <a16:creationId xmlns:a16="http://schemas.microsoft.com/office/drawing/2014/main" id="{16532F22-C3C1-6CDC-1608-CE1D7B7C724A}"/>
+                    </a:ext>
+                  </a:extLst>
+                </p:cNvPr>
+                <p:cNvSpPr/>
+                <p:nvPr/>
+              </p:nvSpPr>
+              <p:spPr>
+                <a:xfrm>
+                  <a:off x="7163469" y="1910333"/>
+                  <a:ext cx="3269160" cy="3671441"/>
+                </a:xfrm>
+                <a:custGeom>
+                  <a:avLst/>
+                  <a:gdLst>
+                    <a:gd name="connsiteX0" fmla="*/ 2606030 w 3269160"/>
+                    <a:gd name="connsiteY0" fmla="*/ 1035478 h 3671441"/>
+                    <a:gd name="connsiteX1" fmla="*/ 2609117 w 3269160"/>
+                    <a:gd name="connsiteY1" fmla="*/ 974518 h 3671441"/>
+                    <a:gd name="connsiteX2" fmla="*/ 1634598 w 3269160"/>
+                    <a:gd name="connsiteY2" fmla="*/ 0 h 3671441"/>
+                    <a:gd name="connsiteX3" fmla="*/ 660080 w 3269160"/>
+                    <a:gd name="connsiteY3" fmla="*/ 974518 h 3671441"/>
+                    <a:gd name="connsiteX4" fmla="*/ 662845 w 3269160"/>
+                    <a:gd name="connsiteY4" fmla="*/ 1029055 h 3671441"/>
+                    <a:gd name="connsiteX5" fmla="*/ 663525 w 3269160"/>
+                    <a:gd name="connsiteY5" fmla="*/ 1042508 h 3671441"/>
+                    <a:gd name="connsiteX6" fmla="*/ 883127 w 3269160"/>
+                    <a:gd name="connsiteY6" fmla="*/ 1594294 h 3671441"/>
+                    <a:gd name="connsiteX7" fmla="*/ 713125 w 3269160"/>
+                    <a:gd name="connsiteY7" fmla="*/ 1881500 h 3671441"/>
+                    <a:gd name="connsiteX8" fmla="*/ 741309 w 3269160"/>
+                    <a:gd name="connsiteY8" fmla="*/ 1947505 h 3671441"/>
+                    <a:gd name="connsiteX9" fmla="*/ 266619 w 3269160"/>
+                    <a:gd name="connsiteY9" fmla="*/ 2205634 h 3671441"/>
+                    <a:gd name="connsiteX10" fmla="*/ 77155 w 3269160"/>
+                    <a:gd name="connsiteY10" fmla="*/ 2528254 h 3671441"/>
+                    <a:gd name="connsiteX11" fmla="*/ 0 w 3269160"/>
+                    <a:gd name="connsiteY11" fmla="*/ 3477843 h 3671441"/>
+                    <a:gd name="connsiteX12" fmla="*/ 35300 w 3269160"/>
+                    <a:gd name="connsiteY12" fmla="*/ 3488291 h 3671441"/>
+                    <a:gd name="connsiteX13" fmla="*/ 1634113 w 3269160"/>
+                    <a:gd name="connsiteY13" fmla="*/ 3671442 h 3671441"/>
+                    <a:gd name="connsiteX14" fmla="*/ 3233860 w 3269160"/>
+                    <a:gd name="connsiteY14" fmla="*/ 3488277 h 3671441"/>
+                    <a:gd name="connsiteX15" fmla="*/ 3269160 w 3269160"/>
+                    <a:gd name="connsiteY15" fmla="*/ 3477852 h 3671441"/>
+                    <a:gd name="connsiteX16" fmla="*/ 3192318 w 3269160"/>
+                    <a:gd name="connsiteY16" fmla="*/ 2523917 h 3671441"/>
+                    <a:gd name="connsiteX17" fmla="*/ 3004418 w 3269160"/>
+                    <a:gd name="connsiteY17" fmla="*/ 2206364 h 3671441"/>
+                    <a:gd name="connsiteX18" fmla="*/ 2530271 w 3269160"/>
+                    <a:gd name="connsiteY18" fmla="*/ 1943471 h 3671441"/>
+                    <a:gd name="connsiteX19" fmla="*/ 2448176 w 3269160"/>
+                    <a:gd name="connsiteY19" fmla="*/ 1620135 h 3671441"/>
+                    <a:gd name="connsiteX20" fmla="*/ 2386056 w 3269160"/>
+                    <a:gd name="connsiteY20" fmla="*/ 1594330 h 3671441"/>
+                    <a:gd name="connsiteX21" fmla="*/ 2605672 w 3269160"/>
+                    <a:gd name="connsiteY21" fmla="*/ 1042508 h 3671441"/>
+                    <a:gd name="connsiteX22" fmla="*/ 3004649 w 3269160"/>
+                    <a:gd name="connsiteY22" fmla="*/ 2331547 h 3671441"/>
+                    <a:gd name="connsiteX23" fmla="*/ 2770506 w 3269160"/>
+                    <a:gd name="connsiteY23" fmla="*/ 2532239 h 3671441"/>
+                    <a:gd name="connsiteX24" fmla="*/ 2652539 w 3269160"/>
+                    <a:gd name="connsiteY24" fmla="*/ 2394596 h 3671441"/>
+                    <a:gd name="connsiteX25" fmla="*/ 2862038 w 3269160"/>
+                    <a:gd name="connsiteY25" fmla="*/ 2215012 h 3671441"/>
+                    <a:gd name="connsiteX26" fmla="*/ 2948113 w 3269160"/>
+                    <a:gd name="connsiteY26" fmla="*/ 2277450 h 3671441"/>
+                    <a:gd name="connsiteX27" fmla="*/ 3004649 w 3269160"/>
+                    <a:gd name="connsiteY27" fmla="*/ 2331547 h 3671441"/>
+                    <a:gd name="connsiteX28" fmla="*/ 753543 w 3269160"/>
+                    <a:gd name="connsiteY28" fmla="*/ 1029912 h 3671441"/>
+                    <a:gd name="connsiteX29" fmla="*/ 954570 w 3269160"/>
+                    <a:gd name="connsiteY29" fmla="*/ 729112 h 3671441"/>
+                    <a:gd name="connsiteX30" fmla="*/ 954570 w 3269160"/>
+                    <a:gd name="connsiteY30" fmla="*/ 1223814 h 3671441"/>
+                    <a:gd name="connsiteX31" fmla="*/ 1190127 w 3269160"/>
+                    <a:gd name="connsiteY31" fmla="*/ 1737254 h 3671441"/>
+                    <a:gd name="connsiteX32" fmla="*/ 753543 w 3269160"/>
+                    <a:gd name="connsiteY32" fmla="*/ 1029912 h 3671441"/>
+                    <a:gd name="connsiteX33" fmla="*/ 2223711 w 3269160"/>
+                    <a:gd name="connsiteY33" fmla="*/ 1223814 h 3671441"/>
+                    <a:gd name="connsiteX34" fmla="*/ 2194878 w 3269160"/>
+                    <a:gd name="connsiteY34" fmla="*/ 1405120 h 3671441"/>
+                    <a:gd name="connsiteX35" fmla="*/ 1946943 w 3269160"/>
+                    <a:gd name="connsiteY35" fmla="*/ 1405120 h 3671441"/>
+                    <a:gd name="connsiteX36" fmla="*/ 1868981 w 3269160"/>
+                    <a:gd name="connsiteY36" fmla="*/ 1359793 h 3671441"/>
+                    <a:gd name="connsiteX37" fmla="*/ 1778328 w 3269160"/>
+                    <a:gd name="connsiteY37" fmla="*/ 1359793 h 3671441"/>
+                    <a:gd name="connsiteX38" fmla="*/ 1687676 w 3269160"/>
+                    <a:gd name="connsiteY38" fmla="*/ 1450446 h 3671441"/>
+                    <a:gd name="connsiteX39" fmla="*/ 1778328 w 3269160"/>
+                    <a:gd name="connsiteY39" fmla="*/ 1541099 h 3671441"/>
+                    <a:gd name="connsiteX40" fmla="*/ 1868981 w 3269160"/>
+                    <a:gd name="connsiteY40" fmla="*/ 1541099 h 3671441"/>
+                    <a:gd name="connsiteX41" fmla="*/ 1946943 w 3269160"/>
+                    <a:gd name="connsiteY41" fmla="*/ 1495773 h 3671441"/>
+                    <a:gd name="connsiteX42" fmla="*/ 2156686 w 3269160"/>
+                    <a:gd name="connsiteY42" fmla="*/ 1495773 h 3671441"/>
+                    <a:gd name="connsiteX43" fmla="*/ 1362517 w 3269160"/>
+                    <a:gd name="connsiteY43" fmla="*/ 1746677 h 3671441"/>
+                    <a:gd name="connsiteX44" fmla="*/ 1045228 w 3269160"/>
+                    <a:gd name="connsiteY44" fmla="*/ 1223814 h 3671441"/>
+                    <a:gd name="connsiteX45" fmla="*/ 1045228 w 3269160"/>
+                    <a:gd name="connsiteY45" fmla="*/ 675872 h 3671441"/>
+                    <a:gd name="connsiteX46" fmla="*/ 1634598 w 3269160"/>
+                    <a:gd name="connsiteY46" fmla="*/ 543917 h 3671441"/>
+                    <a:gd name="connsiteX47" fmla="*/ 2223711 w 3269160"/>
+                    <a:gd name="connsiteY47" fmla="*/ 676030 h 3671441"/>
+                    <a:gd name="connsiteX48" fmla="*/ 2314363 w 3269160"/>
+                    <a:gd name="connsiteY48" fmla="*/ 1223814 h 3671441"/>
+                    <a:gd name="connsiteX49" fmla="*/ 2314363 w 3269160"/>
+                    <a:gd name="connsiteY49" fmla="*/ 729411 h 3671441"/>
+                    <a:gd name="connsiteX50" fmla="*/ 2515355 w 3269160"/>
+                    <a:gd name="connsiteY50" fmla="*/ 1035922 h 3671441"/>
+                    <a:gd name="connsiteX51" fmla="*/ 2078267 w 3269160"/>
+                    <a:gd name="connsiteY51" fmla="*/ 1737743 h 3671441"/>
+                    <a:gd name="connsiteX52" fmla="*/ 2314363 w 3269160"/>
+                    <a:gd name="connsiteY52" fmla="*/ 1223814 h 3671441"/>
+                    <a:gd name="connsiteX53" fmla="*/ 1634598 w 3269160"/>
+                    <a:gd name="connsiteY53" fmla="*/ 90653 h 3671441"/>
+                    <a:gd name="connsiteX54" fmla="*/ 2492669 w 3269160"/>
+                    <a:gd name="connsiteY54" fmla="*/ 766316 h 3671441"/>
+                    <a:gd name="connsiteX55" fmla="*/ 1634598 w 3269160"/>
+                    <a:gd name="connsiteY55" fmla="*/ 453264 h 3671441"/>
+                    <a:gd name="connsiteX56" fmla="*/ 776895 w 3269160"/>
+                    <a:gd name="connsiteY56" fmla="*/ 764897 h 3671441"/>
+                    <a:gd name="connsiteX57" fmla="*/ 1634598 w 3269160"/>
+                    <a:gd name="connsiteY57" fmla="*/ 90653 h 3671441"/>
+                    <a:gd name="connsiteX58" fmla="*/ 816955 w 3269160"/>
+                    <a:gd name="connsiteY58" fmla="*/ 1748368 h 3671441"/>
+                    <a:gd name="connsiteX59" fmla="*/ 907231 w 3269160"/>
+                    <a:gd name="connsiteY59" fmla="*/ 1681484 h 3671441"/>
+                    <a:gd name="connsiteX60" fmla="*/ 943062 w 3269160"/>
+                    <a:gd name="connsiteY60" fmla="*/ 1677078 h 3671441"/>
+                    <a:gd name="connsiteX61" fmla="*/ 962434 w 3269160"/>
+                    <a:gd name="connsiteY61" fmla="*/ 1678393 h 3671441"/>
+                    <a:gd name="connsiteX62" fmla="*/ 2306554 w 3269160"/>
+                    <a:gd name="connsiteY62" fmla="*/ 1678588 h 3671441"/>
+                    <a:gd name="connsiteX63" fmla="*/ 2471873 w 3269160"/>
+                    <a:gd name="connsiteY63" fmla="*/ 1804088 h 3671441"/>
+                    <a:gd name="connsiteX64" fmla="*/ 2401961 w 3269160"/>
+                    <a:gd name="connsiteY64" fmla="*/ 1949857 h 3671441"/>
+                    <a:gd name="connsiteX65" fmla="*/ 1634598 w 3269160"/>
+                    <a:gd name="connsiteY65" fmla="*/ 2130343 h 3671441"/>
+                    <a:gd name="connsiteX66" fmla="*/ 867222 w 3269160"/>
+                    <a:gd name="connsiteY66" fmla="*/ 1949835 h 3671441"/>
+                    <a:gd name="connsiteX67" fmla="*/ 816955 w 3269160"/>
+                    <a:gd name="connsiteY67" fmla="*/ 1748368 h 3671441"/>
+                    <a:gd name="connsiteX68" fmla="*/ 319755 w 3269160"/>
+                    <a:gd name="connsiteY68" fmla="*/ 2279050 h 3671441"/>
+                    <a:gd name="connsiteX69" fmla="*/ 412004 w 3269160"/>
+                    <a:gd name="connsiteY69" fmla="*/ 2219146 h 3671441"/>
+                    <a:gd name="connsiteX70" fmla="*/ 616657 w 3269160"/>
+                    <a:gd name="connsiteY70" fmla="*/ 2394560 h 3671441"/>
+                    <a:gd name="connsiteX71" fmla="*/ 498695 w 3269160"/>
+                    <a:gd name="connsiteY71" fmla="*/ 2532220 h 3671441"/>
+                    <a:gd name="connsiteX72" fmla="*/ 263940 w 3269160"/>
+                    <a:gd name="connsiteY72" fmla="*/ 2331007 h 3671441"/>
+                    <a:gd name="connsiteX73" fmla="*/ 319755 w 3269160"/>
+                    <a:gd name="connsiteY73" fmla="*/ 2279050 h 3671441"/>
+                    <a:gd name="connsiteX74" fmla="*/ 2584899 w 3269160"/>
+                    <a:gd name="connsiteY74" fmla="*/ 3519847 h 3671441"/>
+                    <a:gd name="connsiteX75" fmla="*/ 2540819 w 3269160"/>
+                    <a:gd name="connsiteY75" fmla="*/ 3167185 h 3671441"/>
+                    <a:gd name="connsiteX76" fmla="*/ 2489722 w 3269160"/>
+                    <a:gd name="connsiteY76" fmla="*/ 3128481 h 3671441"/>
+                    <a:gd name="connsiteX77" fmla="*/ 2450873 w 3269160"/>
+                    <a:gd name="connsiteY77" fmla="*/ 3178426 h 3671441"/>
+                    <a:gd name="connsiteX78" fmla="*/ 2494949 w 3269160"/>
+                    <a:gd name="connsiteY78" fmla="*/ 3531007 h 3671441"/>
+                    <a:gd name="connsiteX79" fmla="*/ 1634113 w 3269160"/>
+                    <a:gd name="connsiteY79" fmla="*/ 3580789 h 3671441"/>
+                    <a:gd name="connsiteX80" fmla="*/ 774248 w 3269160"/>
+                    <a:gd name="connsiteY80" fmla="*/ 3531029 h 3671441"/>
+                    <a:gd name="connsiteX81" fmla="*/ 818324 w 3269160"/>
+                    <a:gd name="connsiteY81" fmla="*/ 3178426 h 3671441"/>
+                    <a:gd name="connsiteX82" fmla="*/ 779792 w 3269160"/>
+                    <a:gd name="connsiteY82" fmla="*/ 3127198 h 3671441"/>
+                    <a:gd name="connsiteX83" fmla="*/ 728564 w 3269160"/>
+                    <a:gd name="connsiteY83" fmla="*/ 3165730 h 3671441"/>
+                    <a:gd name="connsiteX84" fmla="*/ 728382 w 3269160"/>
+                    <a:gd name="connsiteY84" fmla="*/ 3167185 h 3671441"/>
+                    <a:gd name="connsiteX85" fmla="*/ 684298 w 3269160"/>
+                    <a:gd name="connsiteY85" fmla="*/ 3519861 h 3671441"/>
+                    <a:gd name="connsiteX86" fmla="*/ 96414 w 3269160"/>
+                    <a:gd name="connsiteY86" fmla="*/ 3410905 h 3671441"/>
+                    <a:gd name="connsiteX87" fmla="*/ 167123 w 3269160"/>
+                    <a:gd name="connsiteY87" fmla="*/ 2538988 h 3671441"/>
+                    <a:gd name="connsiteX88" fmla="*/ 212350 w 3269160"/>
+                    <a:gd name="connsiteY88" fmla="*/ 2406181 h 3671441"/>
+                    <a:gd name="connsiteX89" fmla="*/ 474119 w 3269160"/>
+                    <a:gd name="connsiteY89" fmla="*/ 2630547 h 3671441"/>
+                    <a:gd name="connsiteX90" fmla="*/ 503622 w 3269160"/>
+                    <a:gd name="connsiteY90" fmla="*/ 2641462 h 3671441"/>
+                    <a:gd name="connsiteX91" fmla="*/ 507094 w 3269160"/>
+                    <a:gd name="connsiteY91" fmla="*/ 2641326 h 3671441"/>
+                    <a:gd name="connsiteX92" fmla="*/ 538034 w 3269160"/>
+                    <a:gd name="connsiteY92" fmla="*/ 2625634 h 3671441"/>
+                    <a:gd name="connsiteX93" fmla="*/ 715002 w 3269160"/>
+                    <a:gd name="connsiteY93" fmla="*/ 2419145 h 3671441"/>
+                    <a:gd name="connsiteX94" fmla="*/ 710089 w 3269160"/>
+                    <a:gd name="connsiteY94" fmla="*/ 2355234 h 3671441"/>
+                    <a:gd name="connsiteX95" fmla="*/ 493909 w 3269160"/>
+                    <a:gd name="connsiteY95" fmla="*/ 2169922 h 3671441"/>
+                    <a:gd name="connsiteX96" fmla="*/ 808538 w 3269160"/>
+                    <a:gd name="connsiteY96" fmla="*/ 2018531 h 3671441"/>
+                    <a:gd name="connsiteX97" fmla="*/ 820594 w 3269160"/>
+                    <a:gd name="connsiteY97" fmla="*/ 2027533 h 3671441"/>
+                    <a:gd name="connsiteX98" fmla="*/ 1634598 w 3269160"/>
+                    <a:gd name="connsiteY98" fmla="*/ 2220996 h 3671441"/>
+                    <a:gd name="connsiteX99" fmla="*/ 2448616 w 3269160"/>
+                    <a:gd name="connsiteY99" fmla="*/ 2027560 h 3671441"/>
+                    <a:gd name="connsiteX100" fmla="*/ 2464480 w 3269160"/>
+                    <a:gd name="connsiteY100" fmla="*/ 2015717 h 3671441"/>
+                    <a:gd name="connsiteX101" fmla="*/ 2781874 w 3269160"/>
+                    <a:gd name="connsiteY101" fmla="*/ 2164306 h 3671441"/>
+                    <a:gd name="connsiteX102" fmla="*/ 2559122 w 3269160"/>
+                    <a:gd name="connsiteY102" fmla="*/ 2355248 h 3671441"/>
+                    <a:gd name="connsiteX103" fmla="*/ 2554208 w 3269160"/>
+                    <a:gd name="connsiteY103" fmla="*/ 2419158 h 3671441"/>
+                    <a:gd name="connsiteX104" fmla="*/ 2731176 w 3269160"/>
+                    <a:gd name="connsiteY104" fmla="*/ 2625647 h 3671441"/>
+                    <a:gd name="connsiteX105" fmla="*/ 2762116 w 3269160"/>
+                    <a:gd name="connsiteY105" fmla="*/ 2641339 h 3671441"/>
+                    <a:gd name="connsiteX106" fmla="*/ 2765593 w 3269160"/>
+                    <a:gd name="connsiteY106" fmla="*/ 2641475 h 3671441"/>
+                    <a:gd name="connsiteX107" fmla="*/ 2795091 w 3269160"/>
+                    <a:gd name="connsiteY107" fmla="*/ 2630561 h 3671441"/>
+                    <a:gd name="connsiteX108" fmla="*/ 3056357 w 3269160"/>
+                    <a:gd name="connsiteY108" fmla="*/ 2406621 h 3671441"/>
+                    <a:gd name="connsiteX109" fmla="*/ 3102531 w 3269160"/>
+                    <a:gd name="connsiteY109" fmla="*/ 2535561 h 3671441"/>
+                    <a:gd name="connsiteX110" fmla="*/ 3172819 w 3269160"/>
+                    <a:gd name="connsiteY110" fmla="*/ 3410905 h 3671441"/>
+                    <a:gd name="connsiteX111" fmla="*/ 2584899 w 3269160"/>
+                    <a:gd name="connsiteY111" fmla="*/ 3519847 h 3671441"/>
+                  </a:gdLst>
+                  <a:ahLst/>
+                  <a:cxnLst>
+                    <a:cxn ang="0">
+                      <a:pos x="connsiteX0" y="connsiteY0"/>
+                    </a:cxn>
+                    <a:cxn ang="0">
+                      <a:pos x="connsiteX1" y="connsiteY1"/>
+                    </a:cxn>
+                    <a:cxn ang="0">
+                      <a:pos x="connsiteX2" y="connsiteY2"/>
+                    </a:cxn>
+                    <a:cxn ang="0">
+                      <a:pos x="connsiteX3" y="connsiteY3"/>
+                    </a:cxn>
+                    <a:cxn ang="0">
+                      <a:pos x="connsiteX4" y="connsiteY4"/>
+                    </a:cxn>
+                    <a:cxn ang="0">
+                      <a:pos x="connsiteX5" y="connsiteY5"/>
+                    </a:cxn>
+                    <a:cxn ang="0">
+                      <a:pos x="connsiteX6" y="connsiteY6"/>
+                    </a:cxn>
+                    <a:cxn ang="0">
+                      <a:pos x="connsiteX7" y="connsiteY7"/>
+                    </a:cxn>
+                    <a:cxn ang="0">
+                      <a:pos x="connsiteX8" y="connsiteY8"/>
+                    </a:cxn>
+                    <a:cxn ang="0">
+                      <a:pos x="connsiteX9" y="connsiteY9"/>
+                    </a:cxn>
+                    <a:cxn ang="0">
+                      <a:pos x="connsiteX10" y="connsiteY10"/>
+                    </a:cxn>
+                    <a:cxn ang="0">
+                      <a:pos x="connsiteX11" y="connsiteY11"/>
+                    </a:cxn>
+                    <a:cxn ang="0">
+                      <a:pos x="connsiteX12" y="connsiteY12"/>
+                    </a:cxn>
+                    <a:cxn ang="0">
+                      <a:pos x="connsiteX13" y="connsiteY13"/>
+                    </a:cxn>
+                    <a:cxn ang="0">
+                      <a:pos x="connsiteX14" y="connsiteY14"/>
+                    </a:cxn>
+                    <a:cxn ang="0">
+                      <a:pos x="connsiteX15" y="connsiteY15"/>
+                    </a:cxn>
+                    <a:cxn ang="0">
+                      <a:pos x="connsiteX16" y="connsiteY16"/>
+                    </a:cxn>
+                    <a:cxn ang="0">
+                      <a:pos x="connsiteX17" y="connsiteY17"/>
+                    </a:cxn>
+                    <a:cxn ang="0">
+                      <a:pos x="connsiteX18" y="connsiteY18"/>
+                    </a:cxn>
+                    <a:cxn ang="0">
+                      <a:pos x="connsiteX19" y="connsiteY19"/>
+                    </a:cxn>
+                    <a:cxn ang="0">
+                      <a:pos x="connsiteX20" y="connsiteY20"/>
+                    </a:cxn>
+                    <a:cxn ang="0">
+                      <a:pos x="connsiteX21" y="connsiteY21"/>
+                    </a:cxn>
+                    <a:cxn ang="0">
+                      <a:pos x="connsiteX22" y="connsiteY22"/>
+                    </a:cxn>
+                    <a:cxn ang="0">
+                      <a:pos x="connsiteX23" y="connsiteY23"/>
+                    </a:cxn>
+                    <a:cxn ang="0">
+                      <a:pos x="connsiteX24" y="connsiteY24"/>
+                    </a:cxn>
+                    <a:cxn ang="0">
+                      <a:pos x="connsiteX25" y="connsiteY25"/>
+                    </a:cxn>
+                    <a:cxn ang="0">
+                      <a:pos x="connsiteX26" y="connsiteY26"/>
+                    </a:cxn>
+                    <a:cxn ang="0">
+                      <a:pos x="connsiteX27" y="connsiteY27"/>
+                    </a:cxn>
+                    <a:cxn ang="0">
+                      <a:pos x="connsiteX28" y="connsiteY28"/>
+                    </a:cxn>
+                    <a:cxn ang="0">
+                      <a:pos x="connsiteX29" y="connsiteY29"/>
+                    </a:cxn>
+                    <a:cxn ang="0">
+                      <a:pos x="connsiteX30" y="connsiteY30"/>
+                    </a:cxn>
+                    <a:cxn ang="0">
+                      <a:pos x="connsiteX31" y="connsiteY31"/>
+                    </a:cxn>
+                    <a:cxn ang="0">
+                      <a:pos x="connsiteX32" y="connsiteY32"/>
+                    </a:cxn>
+                    <a:cxn ang="0">
+                      <a:pos x="connsiteX33" y="connsiteY33"/>
+                    </a:cxn>
+                    <a:cxn ang="0">
+                      <a:pos x="connsiteX34" y="connsiteY34"/>
+                    </a:cxn>
+                    <a:cxn ang="0">
+                      <a:pos x="connsiteX35" y="connsiteY35"/>
+                    </a:cxn>
+                    <a:cxn ang="0">
+                      <a:pos x="connsiteX36" y="connsiteY36"/>
+                    </a:cxn>
+                    <a:cxn ang="0">
+                      <a:pos x="connsiteX37" y="connsiteY37"/>
+                    </a:cxn>
+                    <a:cxn ang="0">
+                      <a:pos x="connsiteX38" y="connsiteY38"/>
+                    </a:cxn>
+                    <a:cxn ang="0">
+                      <a:pos x="connsiteX39" y="connsiteY39"/>
+                    </a:cxn>
+                    <a:cxn ang="0">
+                      <a:pos x="connsiteX40" y="connsiteY40"/>
+                    </a:cxn>
+                    <a:cxn ang="0">
+                      <a:pos x="connsiteX41" y="connsiteY41"/>
+                    </a:cxn>
+                    <a:cxn ang="0">
+                      <a:pos x="connsiteX42" y="connsiteY42"/>
+                    </a:cxn>
+                    <a:cxn ang="0">
+                      <a:pos x="connsiteX43" y="connsiteY43"/>
+                    </a:cxn>
+                    <a:cxn ang="0">
+                      <a:pos x="connsiteX44" y="connsiteY44"/>
+                    </a:cxn>
+                    <a:cxn ang="0">
+                      <a:pos x="connsiteX45" y="connsiteY45"/>
+                    </a:cxn>
+                    <a:cxn ang="0">
+                      <a:pos x="connsiteX46" y="connsiteY46"/>
+                    </a:cxn>
+                    <a:cxn ang="0">
+                      <a:pos x="connsiteX47" y="connsiteY47"/>
+                    </a:cxn>
+                    <a:cxn ang="0">
+                      <a:pos x="connsiteX48" y="connsiteY48"/>
+                    </a:cxn>
+                    <a:cxn ang="0">
+                      <a:pos x="connsiteX49" y="connsiteY49"/>
+                    </a:cxn>
+                    <a:cxn ang="0">
+                      <a:pos x="connsiteX50" y="connsiteY50"/>
+                    </a:cxn>
+                    <a:cxn ang="0">
+                      <a:pos x="connsiteX51" y="connsiteY51"/>
+                    </a:cxn>
+                    <a:cxn ang="0">
+                      <a:pos x="connsiteX52" y="connsiteY52"/>
+                    </a:cxn>
+                    <a:cxn ang="0">
+                      <a:pos x="connsiteX53" y="connsiteY53"/>
+                    </a:cxn>
+                    <a:cxn ang="0">
+                      <a:pos x="connsiteX54" y="connsiteY54"/>
+                    </a:cxn>
+                    <a:cxn ang="0">
+                      <a:pos x="connsiteX55" y="connsiteY55"/>
+                    </a:cxn>
+                    <a:cxn ang="0">
+                      <a:pos x="connsiteX56" y="connsiteY56"/>
+                    </a:cxn>
+                    <a:cxn ang="0">
+                      <a:pos x="connsiteX57" y="connsiteY57"/>
+                    </a:cxn>
+                    <a:cxn ang="0">
+                      <a:pos x="connsiteX58" y="connsiteY58"/>
+                    </a:cxn>
+                    <a:cxn ang="0">
+                      <a:pos x="connsiteX59" y="connsiteY59"/>
+                    </a:cxn>
+                    <a:cxn ang="0">
+                      <a:pos x="connsiteX60" y="connsiteY60"/>
+                    </a:cxn>
+                    <a:cxn ang="0">
+                      <a:pos x="connsiteX61" y="connsiteY61"/>
+                    </a:cxn>
+                    <a:cxn ang="0">
+                      <a:pos x="connsiteX62" y="connsiteY62"/>
+                    </a:cxn>
+                    <a:cxn ang="0">
+                      <a:pos x="connsiteX63" y="connsiteY63"/>
+                    </a:cxn>
+                    <a:cxn ang="0">
+                      <a:pos x="connsiteX64" y="connsiteY64"/>
+                    </a:cxn>
+                    <a:cxn ang="0">
+                      <a:pos x="connsiteX65" y="connsiteY65"/>
+                    </a:cxn>
+                    <a:cxn ang="0">
+                      <a:pos x="connsiteX66" y="connsiteY66"/>
+                    </a:cxn>
+                    <a:cxn ang="0">
+                      <a:pos x="connsiteX67" y="connsiteY67"/>
+                    </a:cxn>
+                    <a:cxn ang="0">
+                      <a:pos x="connsiteX68" y="connsiteY68"/>
+                    </a:cxn>
+                    <a:cxn ang="0">
+                      <a:pos x="connsiteX69" y="connsiteY69"/>
+                    </a:cxn>
+                    <a:cxn ang="0">
+                      <a:pos x="connsiteX70" y="connsiteY70"/>
+                    </a:cxn>
+                    <a:cxn ang="0">
+                      <a:pos x="connsiteX71" y="connsiteY71"/>
+                    </a:cxn>
+                    <a:cxn ang="0">
+                      <a:pos x="connsiteX72" y="connsiteY72"/>
+                    </a:cxn>
+                    <a:cxn ang="0">
+                      <a:pos x="connsiteX73" y="connsiteY73"/>
+                    </a:cxn>
+                    <a:cxn ang="0">
+                      <a:pos x="connsiteX74" y="connsiteY74"/>
+                    </a:cxn>
+                    <a:cxn ang="0">
+                      <a:pos x="connsiteX75" y="connsiteY75"/>
+                    </a:cxn>
+                    <a:cxn ang="0">
+                      <a:pos x="connsiteX76" y="connsiteY76"/>
+                    </a:cxn>
+                    <a:cxn ang="0">
+                      <a:pos x="connsiteX77" y="connsiteY77"/>
+                    </a:cxn>
+                    <a:cxn ang="0">
+                      <a:pos x="connsiteX78" y="connsiteY78"/>
+                    </a:cxn>
+                    <a:cxn ang="0">
+                      <a:pos x="connsiteX79" y="connsiteY79"/>
+                    </a:cxn>
+                    <a:cxn ang="0">
+                      <a:pos x="connsiteX80" y="connsiteY80"/>
+                    </a:cxn>
+                    <a:cxn ang="0">
+                      <a:pos x="connsiteX81" y="connsiteY81"/>
+                    </a:cxn>
+                    <a:cxn ang="0">
+                      <a:pos x="connsiteX82" y="connsiteY82"/>
+                    </a:cxn>
+                    <a:cxn ang="0">
+                      <a:pos x="connsiteX83" y="connsiteY83"/>
+                    </a:cxn>
+                    <a:cxn ang="0">
+                      <a:pos x="connsiteX84" y="connsiteY84"/>
+                    </a:cxn>
+                    <a:cxn ang="0">
+                      <a:pos x="connsiteX85" y="connsiteY85"/>
+                    </a:cxn>
+                    <a:cxn ang="0">
+                      <a:pos x="connsiteX86" y="connsiteY86"/>
+                    </a:cxn>
+                    <a:cxn ang="0">
+                      <a:pos x="connsiteX87" y="connsiteY87"/>
+                    </a:cxn>
+                    <a:cxn ang="0">
+                      <a:pos x="connsiteX88" y="connsiteY88"/>
+                    </a:cxn>
+                    <a:cxn ang="0">
+                      <a:pos x="connsiteX89" y="connsiteY89"/>
+                    </a:cxn>
+                    <a:cxn ang="0">
+                      <a:pos x="connsiteX90" y="connsiteY90"/>
+                    </a:cxn>
+                    <a:cxn ang="0">
+                      <a:pos x="connsiteX91" y="connsiteY91"/>
+                    </a:cxn>
+                    <a:cxn ang="0">
+                      <a:pos x="connsiteX92" y="connsiteY92"/>
+                    </a:cxn>
+                    <a:cxn ang="0">
+                      <a:pos x="connsiteX93" y="connsiteY93"/>
+                    </a:cxn>
+                    <a:cxn ang="0">
+                      <a:pos x="connsiteX94" y="connsiteY94"/>
+                    </a:cxn>
+                    <a:cxn ang="0">
+                      <a:pos x="connsiteX95" y="connsiteY95"/>
+                    </a:cxn>
+                    <a:cxn ang="0">
+                      <a:pos x="connsiteX96" y="connsiteY96"/>
+                    </a:cxn>
+                    <a:cxn ang="0">
+                      <a:pos x="connsiteX97" y="connsiteY97"/>
+                    </a:cxn>
+                    <a:cxn ang="0">
+                      <a:pos x="connsiteX98" y="connsiteY98"/>
+                    </a:cxn>
+                    <a:cxn ang="0">
+                      <a:pos x="connsiteX99" y="connsiteY99"/>
+                    </a:cxn>
+                    <a:cxn ang="0">
+                      <a:pos x="connsiteX100" y="connsiteY100"/>
+                    </a:cxn>
+                    <a:cxn ang="0">
+                      <a:pos x="connsiteX101" y="connsiteY101"/>
+                    </a:cxn>
+                    <a:cxn ang="0">
+                      <a:pos x="connsiteX102" y="connsiteY102"/>
+                    </a:cxn>
+                    <a:cxn ang="0">
+                      <a:pos x="connsiteX103" y="connsiteY103"/>
+                    </a:cxn>
+                    <a:cxn ang="0">
+                      <a:pos x="connsiteX104" y="connsiteY104"/>
+                    </a:cxn>
+                    <a:cxn ang="0">
+                      <a:pos x="connsiteX105" y="connsiteY105"/>
+                    </a:cxn>
+                    <a:cxn ang="0">
+                      <a:pos x="connsiteX106" y="connsiteY106"/>
+                    </a:cxn>
+                    <a:cxn ang="0">
+                      <a:pos x="connsiteX107" y="connsiteY107"/>
+                    </a:cxn>
+                    <a:cxn ang="0">
+                      <a:pos x="connsiteX108" y="connsiteY108"/>
+                    </a:cxn>
+                    <a:cxn ang="0">
+                      <a:pos x="connsiteX109" y="connsiteY109"/>
+                    </a:cxn>
+                    <a:cxn ang="0">
+                      <a:pos x="connsiteX110" y="connsiteY110"/>
+                    </a:cxn>
+                    <a:cxn ang="0">
+                      <a:pos x="connsiteX111" y="connsiteY111"/>
+                    </a:cxn>
+                  </a:cxnLst>
+                  <a:rect l="l" t="t" r="r" b="b"/>
+                  <a:pathLst>
+                    <a:path w="3269160" h="3671441">
+                      <a:moveTo>
+                        <a:pt x="2606030" y="1035478"/>
+                      </a:moveTo>
+                      <a:cubicBezTo>
+                        <a:pt x="2607295" y="1015213"/>
+                        <a:pt x="2609117" y="995097"/>
+                        <a:pt x="2609117" y="974518"/>
+                      </a:cubicBezTo>
+                      <a:cubicBezTo>
+                        <a:pt x="2609117" y="436308"/>
+                        <a:pt x="2172809" y="0"/>
+                        <a:pt x="1634598" y="0"/>
+                      </a:cubicBezTo>
+                      <a:cubicBezTo>
+                        <a:pt x="1096388" y="0"/>
+                        <a:pt x="660080" y="436308"/>
+                        <a:pt x="660080" y="974518"/>
+                      </a:cubicBezTo>
+                      <a:cubicBezTo>
+                        <a:pt x="660080" y="992925"/>
+                        <a:pt x="661834" y="1010897"/>
+                        <a:pt x="662845" y="1029055"/>
+                      </a:cubicBezTo>
+                      <a:lnTo>
+                        <a:pt x="663525" y="1042508"/>
+                      </a:lnTo>
+                      <a:cubicBezTo>
+                        <a:pt x="677218" y="1244877"/>
+                        <a:pt x="754019" y="1437859"/>
+                        <a:pt x="883127" y="1594294"/>
+                      </a:cubicBezTo>
+                      <a:cubicBezTo>
+                        <a:pt x="756870" y="1626657"/>
+                        <a:pt x="680758" y="1755244"/>
+                        <a:pt x="713125" y="1881500"/>
+                      </a:cubicBezTo>
+                      <a:cubicBezTo>
+                        <a:pt x="719099" y="1904812"/>
+                        <a:pt x="728604" y="1927067"/>
+                        <a:pt x="741309" y="1947505"/>
+                      </a:cubicBezTo>
+                      <a:cubicBezTo>
+                        <a:pt x="574155" y="2016011"/>
+                        <a:pt x="414982" y="2102571"/>
+                        <a:pt x="266619" y="2205634"/>
+                      </a:cubicBezTo>
+                      <a:cubicBezTo>
+                        <a:pt x="163560" y="2284131"/>
+                        <a:pt x="95507" y="2400012"/>
+                        <a:pt x="77155" y="2528254"/>
+                      </a:cubicBezTo>
+                      <a:lnTo>
+                        <a:pt x="0" y="3477843"/>
+                      </a:lnTo>
+                      <a:lnTo>
+                        <a:pt x="35300" y="3488291"/>
+                      </a:lnTo>
+                      <a:cubicBezTo>
+                        <a:pt x="41510" y="3490136"/>
+                        <a:pt x="666122" y="3671442"/>
+                        <a:pt x="1634113" y="3671442"/>
+                      </a:cubicBezTo>
+                      <a:cubicBezTo>
+                        <a:pt x="2602105" y="3671442"/>
+                        <a:pt x="3227641" y="3490136"/>
+                        <a:pt x="3233860" y="3488277"/>
+                      </a:cubicBezTo>
+                      <a:lnTo>
+                        <a:pt x="3269160" y="3477852"/>
+                      </a:lnTo>
+                      <a:lnTo>
+                        <a:pt x="3192318" y="2523917"/>
+                      </a:lnTo>
+                      <a:cubicBezTo>
+                        <a:pt x="3170603" y="2398657"/>
+                        <a:pt x="3103760" y="2285690"/>
+                        <a:pt x="3004418" y="2206364"/>
+                      </a:cubicBezTo>
+                      <a:cubicBezTo>
+                        <a:pt x="2860334" y="2095623"/>
+                        <a:pt x="2700527" y="2007014"/>
+                        <a:pt x="2530271" y="1943471"/>
+                      </a:cubicBezTo>
+                      <a:cubicBezTo>
+                        <a:pt x="2596888" y="1831514"/>
+                        <a:pt x="2560133" y="1686751"/>
+                        <a:pt x="2448176" y="1620135"/>
+                      </a:cubicBezTo>
+                      <a:cubicBezTo>
+                        <a:pt x="2428808" y="1608608"/>
+                        <a:pt x="2407890" y="1599919"/>
+                        <a:pt x="2386056" y="1594330"/>
+                      </a:cubicBezTo>
+                      <a:cubicBezTo>
+                        <a:pt x="2515173" y="1437886"/>
+                        <a:pt x="2591983" y="1244891"/>
+                        <a:pt x="2605672" y="1042508"/>
+                      </a:cubicBezTo>
+                      <a:close/>
+                      <a:moveTo>
+                        <a:pt x="3004649" y="2331547"/>
+                      </a:moveTo>
+                      <a:lnTo>
+                        <a:pt x="2770506" y="2532239"/>
+                      </a:lnTo>
+                      <a:lnTo>
+                        <a:pt x="2652539" y="2394596"/>
+                      </a:lnTo>
+                      <a:lnTo>
+                        <a:pt x="2862038" y="2215012"/>
+                      </a:lnTo>
+                      <a:cubicBezTo>
+                        <a:pt x="2892031" y="2235228"/>
+                        <a:pt x="2921035" y="2255901"/>
+                        <a:pt x="2948113" y="2277450"/>
+                      </a:cubicBezTo>
+                      <a:cubicBezTo>
+                        <a:pt x="2968619" y="2293663"/>
+                        <a:pt x="2987552" y="2311775"/>
+                        <a:pt x="3004649" y="2331547"/>
+                      </a:cubicBezTo>
+                      <a:close/>
+                      <a:moveTo>
+                        <a:pt x="753543" y="1029912"/>
+                      </a:moveTo>
+                      <a:cubicBezTo>
+                        <a:pt x="758824" y="917203"/>
+                        <a:pt x="833435" y="812345"/>
+                        <a:pt x="954570" y="729112"/>
+                      </a:cubicBezTo>
+                      <a:lnTo>
+                        <a:pt x="954570" y="1223814"/>
+                      </a:lnTo>
+                      <a:cubicBezTo>
+                        <a:pt x="954661" y="1421079"/>
+                        <a:pt x="1040654" y="1608522"/>
+                        <a:pt x="1190127" y="1737254"/>
+                      </a:cubicBezTo>
+                      <a:cubicBezTo>
+                        <a:pt x="935841" y="1588936"/>
+                        <a:pt x="772136" y="1323704"/>
+                        <a:pt x="753543" y="1029912"/>
+                      </a:cubicBezTo>
+                      <a:close/>
+                      <a:moveTo>
+                        <a:pt x="2223711" y="1223814"/>
+                      </a:moveTo>
+                      <a:cubicBezTo>
+                        <a:pt x="2223679" y="1285390"/>
+                        <a:pt x="2213947" y="1346572"/>
+                        <a:pt x="2194878" y="1405120"/>
+                      </a:cubicBezTo>
+                      <a:lnTo>
+                        <a:pt x="1946943" y="1405120"/>
+                      </a:lnTo>
+                      <a:cubicBezTo>
+                        <a:pt x="1930847" y="1377239"/>
+                        <a:pt x="1901172" y="1359988"/>
+                        <a:pt x="1868981" y="1359793"/>
+                      </a:cubicBezTo>
+                      <a:lnTo>
+                        <a:pt x="1778328" y="1359793"/>
+                      </a:lnTo>
+                      <a:cubicBezTo>
+                        <a:pt x="1728261" y="1359793"/>
+                        <a:pt x="1687676" y="1400379"/>
+                        <a:pt x="1687676" y="1450446"/>
+                      </a:cubicBezTo>
+                      <a:cubicBezTo>
+                        <a:pt x="1687676" y="1500514"/>
+                        <a:pt x="1728261" y="1541099"/>
+                        <a:pt x="1778328" y="1541099"/>
+                      </a:cubicBezTo>
+                      <a:lnTo>
+                        <a:pt x="1868981" y="1541099"/>
+                      </a:lnTo>
+                      <a:cubicBezTo>
+                        <a:pt x="1901172" y="1540904"/>
+                        <a:pt x="1930847" y="1523653"/>
+                        <a:pt x="1946943" y="1495773"/>
+                      </a:cubicBezTo>
+                      <a:lnTo>
+                        <a:pt x="2156686" y="1495773"/>
+                      </a:lnTo>
+                      <a:cubicBezTo>
+                        <a:pt x="2006669" y="1784361"/>
+                        <a:pt x="1651106" y="1896694"/>
+                        <a:pt x="1362517" y="1746677"/>
+                      </a:cubicBezTo>
+                      <a:cubicBezTo>
+                        <a:pt x="1167451" y="1645273"/>
+                        <a:pt x="1045105" y="1443661"/>
+                        <a:pt x="1045228" y="1223814"/>
+                      </a:cubicBezTo>
+                      <a:lnTo>
+                        <a:pt x="1045228" y="675872"/>
+                      </a:lnTo>
+                      <a:cubicBezTo>
+                        <a:pt x="1228705" y="586520"/>
+                        <a:pt x="1430539" y="541329"/>
+                        <a:pt x="1634598" y="543917"/>
+                      </a:cubicBezTo>
+                      <a:cubicBezTo>
+                        <a:pt x="1838595" y="541329"/>
+                        <a:pt x="2040356" y="586579"/>
+                        <a:pt x="2223711" y="676030"/>
+                      </a:cubicBezTo>
+                      <a:close/>
+                      <a:moveTo>
+                        <a:pt x="2314363" y="1223814"/>
+                      </a:moveTo>
+                      <a:lnTo>
+                        <a:pt x="2314363" y="729411"/>
+                      </a:lnTo>
+                      <a:cubicBezTo>
+                        <a:pt x="2437293" y="814076"/>
+                        <a:pt x="2512540" y="921051"/>
+                        <a:pt x="2515355" y="1035922"/>
+                      </a:cubicBezTo>
+                      <a:cubicBezTo>
+                        <a:pt x="2494844" y="1327802"/>
+                        <a:pt x="2331175" y="1590600"/>
+                        <a:pt x="2078267" y="1737743"/>
+                      </a:cubicBezTo>
+                      <a:cubicBezTo>
+                        <a:pt x="2228066" y="1609002"/>
+                        <a:pt x="2314282" y="1421337"/>
+                        <a:pt x="2314363" y="1223814"/>
+                      </a:cubicBezTo>
+                      <a:close/>
+                      <a:moveTo>
+                        <a:pt x="1634598" y="90653"/>
+                      </a:moveTo>
+                      <a:cubicBezTo>
+                        <a:pt x="2042096" y="91375"/>
+                        <a:pt x="2396391" y="370353"/>
+                        <a:pt x="2492669" y="766316"/>
+                      </a:cubicBezTo>
+                      <a:cubicBezTo>
+                        <a:pt x="2329063" y="580278"/>
+                        <a:pt x="2005976" y="453264"/>
+                        <a:pt x="1634598" y="453264"/>
+                      </a:cubicBezTo>
+                      <a:cubicBezTo>
+                        <a:pt x="1263828" y="453264"/>
+                        <a:pt x="941031" y="579616"/>
+                        <a:pt x="776895" y="764897"/>
+                      </a:cubicBezTo>
+                      <a:cubicBezTo>
+                        <a:pt x="873694" y="369628"/>
+                        <a:pt x="1227653" y="91381"/>
+                        <a:pt x="1634598" y="90653"/>
+                      </a:cubicBezTo>
+                      <a:close/>
+                      <a:moveTo>
+                        <a:pt x="816955" y="1748368"/>
+                      </a:moveTo>
+                      <a:cubicBezTo>
+                        <a:pt x="836907" y="1714912"/>
+                        <a:pt x="869415" y="1690830"/>
+                        <a:pt x="907231" y="1681484"/>
+                      </a:cubicBezTo>
+                      <a:cubicBezTo>
+                        <a:pt x="918948" y="1678556"/>
+                        <a:pt x="930982" y="1677078"/>
+                        <a:pt x="943062" y="1677078"/>
+                      </a:cubicBezTo>
+                      <a:cubicBezTo>
+                        <a:pt x="949539" y="1677083"/>
+                        <a:pt x="956012" y="1677522"/>
+                        <a:pt x="962434" y="1678393"/>
+                      </a:cubicBezTo>
+                      <a:cubicBezTo>
+                        <a:pt x="1337801" y="2039205"/>
+                        <a:pt x="1931083" y="2039291"/>
+                        <a:pt x="2306554" y="1678588"/>
+                      </a:cubicBezTo>
+                      <a:cubicBezTo>
+                        <a:pt x="2386863" y="1667591"/>
+                        <a:pt x="2460877" y="1723783"/>
+                        <a:pt x="2471873" y="1804088"/>
+                      </a:cubicBezTo>
+                      <a:cubicBezTo>
+                        <a:pt x="2479841" y="1862291"/>
+                        <a:pt x="2452337" y="1919638"/>
+                        <a:pt x="2401961" y="1949857"/>
+                      </a:cubicBezTo>
+                      <a:cubicBezTo>
+                        <a:pt x="2210933" y="2064542"/>
+                        <a:pt x="1931237" y="2130343"/>
+                        <a:pt x="1634598" y="2130343"/>
+                      </a:cubicBezTo>
+                      <a:cubicBezTo>
+                        <a:pt x="1337959" y="2130343"/>
+                        <a:pt x="1058282" y="2064542"/>
+                        <a:pt x="867222" y="1949835"/>
+                      </a:cubicBezTo>
+                      <a:cubicBezTo>
+                        <a:pt x="797791" y="1908021"/>
+                        <a:pt x="775304" y="1817898"/>
+                        <a:pt x="816955" y="1748368"/>
+                      </a:cubicBezTo>
+                      <a:close/>
+                      <a:moveTo>
+                        <a:pt x="319755" y="2279050"/>
+                      </a:moveTo>
+                      <a:cubicBezTo>
+                        <a:pt x="349961" y="2258027"/>
+                        <a:pt x="381019" y="2238659"/>
+                        <a:pt x="412004" y="2219146"/>
+                      </a:cubicBezTo>
+                      <a:lnTo>
+                        <a:pt x="616657" y="2394560"/>
+                      </a:lnTo>
+                      <a:lnTo>
+                        <a:pt x="498695" y="2532220"/>
+                      </a:lnTo>
+                      <a:lnTo>
+                        <a:pt x="263940" y="2331007"/>
+                      </a:lnTo>
+                      <a:cubicBezTo>
+                        <a:pt x="280720" y="2311825"/>
+                        <a:pt x="299422" y="2294415"/>
+                        <a:pt x="319755" y="2279050"/>
+                      </a:cubicBezTo>
+                      <a:close/>
+                      <a:moveTo>
+                        <a:pt x="2584899" y="3519847"/>
+                      </a:moveTo>
+                      <a:lnTo>
+                        <a:pt x="2540819" y="3167185"/>
+                      </a:lnTo>
+                      <a:cubicBezTo>
+                        <a:pt x="2537397" y="3142387"/>
+                        <a:pt x="2514521" y="3125059"/>
+                        <a:pt x="2489722" y="3128481"/>
+                      </a:cubicBezTo>
+                      <a:cubicBezTo>
+                        <a:pt x="2465373" y="3131839"/>
+                        <a:pt x="2448135" y="3153995"/>
+                        <a:pt x="2450873" y="3178426"/>
+                      </a:cubicBezTo>
+                      <a:lnTo>
+                        <a:pt x="2494949" y="3531007"/>
+                      </a:lnTo>
+                      <a:cubicBezTo>
+                        <a:pt x="2209224" y="3564426"/>
+                        <a:pt x="1921787" y="3581052"/>
+                        <a:pt x="1634113" y="3580789"/>
+                      </a:cubicBezTo>
+                      <a:cubicBezTo>
+                        <a:pt x="1346766" y="3581047"/>
+                        <a:pt x="1059651" y="3564430"/>
+                        <a:pt x="774248" y="3531029"/>
+                      </a:cubicBezTo>
+                      <a:lnTo>
+                        <a:pt x="818324" y="3178426"/>
+                      </a:lnTo>
+                      <a:cubicBezTo>
+                        <a:pt x="821832" y="3153642"/>
+                        <a:pt x="804581" y="3130702"/>
+                        <a:pt x="779792" y="3127198"/>
+                      </a:cubicBezTo>
+                      <a:cubicBezTo>
+                        <a:pt x="755007" y="3123690"/>
+                        <a:pt x="732072" y="3140941"/>
+                        <a:pt x="728564" y="3165730"/>
+                      </a:cubicBezTo>
+                      <a:cubicBezTo>
+                        <a:pt x="728496" y="3166215"/>
+                        <a:pt x="728437" y="3166700"/>
+                        <a:pt x="728382" y="3167185"/>
+                      </a:cubicBezTo>
+                      <a:lnTo>
+                        <a:pt x="684298" y="3519861"/>
+                      </a:lnTo>
+                      <a:cubicBezTo>
+                        <a:pt x="486362" y="3495149"/>
+                        <a:pt x="290057" y="3458765"/>
+                        <a:pt x="96414" y="3410905"/>
+                      </a:cubicBezTo>
+                      <a:lnTo>
+                        <a:pt x="167123" y="2538988"/>
+                      </a:lnTo>
+                      <a:cubicBezTo>
+                        <a:pt x="174611" y="2492487"/>
+                        <a:pt x="189904" y="2447587"/>
+                        <a:pt x="212350" y="2406181"/>
+                      </a:cubicBezTo>
+                      <a:lnTo>
+                        <a:pt x="474119" y="2630547"/>
+                      </a:lnTo>
+                      <a:cubicBezTo>
+                        <a:pt x="482337" y="2637586"/>
+                        <a:pt x="492803" y="2641457"/>
+                        <a:pt x="503622" y="2641462"/>
+                      </a:cubicBezTo>
+                      <a:cubicBezTo>
+                        <a:pt x="504773" y="2641462"/>
+                        <a:pt x="505943" y="2641416"/>
+                        <a:pt x="507094" y="2641326"/>
+                      </a:cubicBezTo>
+                      <a:cubicBezTo>
+                        <a:pt x="519078" y="2640406"/>
+                        <a:pt x="530211" y="2634763"/>
+                        <a:pt x="538034" y="2625634"/>
+                      </a:cubicBezTo>
+                      <a:lnTo>
+                        <a:pt x="715002" y="2419145"/>
+                      </a:lnTo>
+                      <a:cubicBezTo>
+                        <a:pt x="731292" y="2400139"/>
+                        <a:pt x="729094" y="2371525"/>
+                        <a:pt x="710089" y="2355234"/>
+                      </a:cubicBezTo>
+                      <a:lnTo>
+                        <a:pt x="493909" y="2169922"/>
+                      </a:lnTo>
+                      <a:cubicBezTo>
+                        <a:pt x="594932" y="2111813"/>
+                        <a:pt x="700094" y="2061215"/>
+                        <a:pt x="808538" y="2018531"/>
+                      </a:cubicBezTo>
+                      <a:cubicBezTo>
+                        <a:pt x="812699" y="2021405"/>
+                        <a:pt x="816198" y="2024877"/>
+                        <a:pt x="820594" y="2027533"/>
+                      </a:cubicBezTo>
+                      <a:cubicBezTo>
+                        <a:pt x="1025302" y="2150481"/>
+                        <a:pt x="1322004" y="2220996"/>
+                        <a:pt x="1634598" y="2220996"/>
+                      </a:cubicBezTo>
+                      <a:cubicBezTo>
+                        <a:pt x="1947192" y="2220996"/>
+                        <a:pt x="2243894" y="2150481"/>
+                        <a:pt x="2448616" y="2027560"/>
+                      </a:cubicBezTo>
+                      <a:cubicBezTo>
+                        <a:pt x="2454400" y="2024088"/>
+                        <a:pt x="2459100" y="2019587"/>
+                        <a:pt x="2464480" y="2015717"/>
+                      </a:cubicBezTo>
+                      <a:cubicBezTo>
+                        <a:pt x="2574365" y="2055998"/>
+                        <a:pt x="2680560" y="2105717"/>
+                        <a:pt x="2781874" y="2164306"/>
+                      </a:cubicBezTo>
+                      <a:lnTo>
+                        <a:pt x="2559122" y="2355248"/>
+                      </a:lnTo>
+                      <a:cubicBezTo>
+                        <a:pt x="2540116" y="2371538"/>
+                        <a:pt x="2537918" y="2400153"/>
+                        <a:pt x="2554208" y="2419158"/>
+                      </a:cubicBezTo>
+                      <a:lnTo>
+                        <a:pt x="2731176" y="2625647"/>
+                      </a:lnTo>
+                      <a:cubicBezTo>
+                        <a:pt x="2739004" y="2634772"/>
+                        <a:pt x="2750132" y="2640415"/>
+                        <a:pt x="2762116" y="2641339"/>
+                      </a:cubicBezTo>
+                      <a:cubicBezTo>
+                        <a:pt x="2763267" y="2641430"/>
+                        <a:pt x="2764442" y="2641475"/>
+                        <a:pt x="2765593" y="2641475"/>
+                      </a:cubicBezTo>
+                      <a:cubicBezTo>
+                        <a:pt x="2776412" y="2641471"/>
+                        <a:pt x="2786873" y="2637600"/>
+                        <a:pt x="2795091" y="2630561"/>
+                      </a:cubicBezTo>
+                      <a:lnTo>
+                        <a:pt x="3056357" y="2406621"/>
+                      </a:lnTo>
+                      <a:cubicBezTo>
+                        <a:pt x="3078549" y="2446853"/>
+                        <a:pt x="3094141" y="2490389"/>
+                        <a:pt x="3102531" y="2535561"/>
+                      </a:cubicBezTo>
+                      <a:lnTo>
+                        <a:pt x="3172819" y="3410905"/>
+                      </a:lnTo>
+                      <a:cubicBezTo>
+                        <a:pt x="2979162" y="3458770"/>
+                        <a:pt x="2782848" y="3495144"/>
+                        <a:pt x="2584899" y="3519847"/>
+                      </a:cubicBezTo>
+                      <a:close/>
+                    </a:path>
+                  </a:pathLst>
+                </a:custGeom>
+                <a:solidFill>
+                  <a:srgbClr val="000000"/>
+                </a:solidFill>
+                <a:ln w="45244" cap="flat">
+                  <a:noFill/>
+                  <a:prstDash val="solid"/>
+                  <a:miter/>
+                </a:ln>
+              </p:spPr>
+              <p:txBody>
+                <a:bodyPr rtlCol="0" anchor="ctr"/>
+                <a:lstStyle/>
+                <a:p>
+                  <a:endParaRPr lang="en-US" dirty="0"/>
+                </a:p>
+              </p:txBody>
+            </p:sp>
+            <p:sp>
+              <p:nvSpPr>
+                <p:cNvPr id="14" name="Freeform: Shape 13">
+                  <a:extLst>
+                    <a:ext uri="{FF2B5EF4-FFF2-40B4-BE49-F238E27FC236}">
+                      <a16:creationId xmlns:a16="http://schemas.microsoft.com/office/drawing/2014/main" id="{831A9704-2285-C063-DB4C-748FEB377A36}"/>
+                    </a:ext>
+                  </a:extLst>
+                </p:cNvPr>
+                <p:cNvSpPr/>
+                <p:nvPr/>
+              </p:nvSpPr>
+              <p:spPr>
+                <a:xfrm>
+                  <a:off x="7239527" y="2046258"/>
+                  <a:ext cx="380071" cy="450032"/>
+                </a:xfrm>
+                <a:custGeom>
+                  <a:avLst/>
+                  <a:gdLst>
+                    <a:gd name="connsiteX0" fmla="*/ 190018 w 380071"/>
+                    <a:gd name="connsiteY0" fmla="*/ 189555 h 450032"/>
+                    <a:gd name="connsiteX1" fmla="*/ 222249 w 380071"/>
+                    <a:gd name="connsiteY1" fmla="*/ 225014 h 450032"/>
+                    <a:gd name="connsiteX2" fmla="*/ 190018 w 380071"/>
+                    <a:gd name="connsiteY2" fmla="*/ 260477 h 450032"/>
+                    <a:gd name="connsiteX3" fmla="*/ 157781 w 380071"/>
+                    <a:gd name="connsiteY3" fmla="*/ 225014 h 450032"/>
+                    <a:gd name="connsiteX4" fmla="*/ 190018 w 380071"/>
+                    <a:gd name="connsiteY4" fmla="*/ 189555 h 450032"/>
+                    <a:gd name="connsiteX5" fmla="*/ 190018 w 380071"/>
+                    <a:gd name="connsiteY5" fmla="*/ 0 h 450032"/>
+                    <a:gd name="connsiteX6" fmla="*/ 0 w 380071"/>
+                    <a:gd name="connsiteY6" fmla="*/ 225014 h 450032"/>
+                    <a:gd name="connsiteX7" fmla="*/ 190036 w 380071"/>
+                    <a:gd name="connsiteY7" fmla="*/ 450033 h 450032"/>
+                    <a:gd name="connsiteX8" fmla="*/ 380071 w 380071"/>
+                    <a:gd name="connsiteY8" fmla="*/ 225014 h 450032"/>
+                    <a:gd name="connsiteX9" fmla="*/ 190018 w 380071"/>
+                    <a:gd name="connsiteY9" fmla="*/ 0 h 450032"/>
+                  </a:gdLst>
+                  <a:ahLst/>
+                  <a:cxnLst>
+                    <a:cxn ang="0">
+                      <a:pos x="connsiteX0" y="connsiteY0"/>
+                    </a:cxn>
+                    <a:cxn ang="0">
+                      <a:pos x="connsiteX1" y="connsiteY1"/>
+                    </a:cxn>
+                    <a:cxn ang="0">
+                      <a:pos x="connsiteX2" y="connsiteY2"/>
+                    </a:cxn>
+                    <a:cxn ang="0">
+                      <a:pos x="connsiteX3" y="connsiteY3"/>
+                    </a:cxn>
+                    <a:cxn ang="0">
+                      <a:pos x="connsiteX4" y="connsiteY4"/>
+                    </a:cxn>
+                    <a:cxn ang="0">
+                      <a:pos x="connsiteX5" y="connsiteY5"/>
+                    </a:cxn>
+                    <a:cxn ang="0">
+                      <a:pos x="connsiteX6" y="connsiteY6"/>
+                    </a:cxn>
+                    <a:cxn ang="0">
+                      <a:pos x="connsiteX7" y="connsiteY7"/>
+                    </a:cxn>
+                    <a:cxn ang="0">
+                      <a:pos x="connsiteX8" y="connsiteY8"/>
+                    </a:cxn>
+                    <a:cxn ang="0">
+                      <a:pos x="connsiteX9" y="connsiteY9"/>
+                    </a:cxn>
+                  </a:cxnLst>
+                  <a:rect l="l" t="t" r="r" b="b"/>
+                  <a:pathLst>
+                    <a:path w="380071" h="450032">
+                      <a:moveTo>
+                        <a:pt x="190018" y="189555"/>
+                      </a:moveTo>
+                      <a:cubicBezTo>
+                        <a:pt x="200112" y="201947"/>
+                        <a:pt x="210872" y="213787"/>
+                        <a:pt x="222249" y="225014"/>
+                      </a:cubicBezTo>
+                      <a:cubicBezTo>
+                        <a:pt x="210872" y="236246"/>
+                        <a:pt x="200112" y="248081"/>
+                        <a:pt x="190018" y="260477"/>
+                      </a:cubicBezTo>
+                      <a:cubicBezTo>
+                        <a:pt x="179919" y="248081"/>
+                        <a:pt x="169158" y="236246"/>
+                        <a:pt x="157781" y="225014"/>
+                      </a:cubicBezTo>
+                      <a:cubicBezTo>
+                        <a:pt x="169158" y="213787"/>
+                        <a:pt x="179919" y="201947"/>
+                        <a:pt x="190018" y="189555"/>
+                      </a:cubicBezTo>
+                      <a:close/>
+                      <a:moveTo>
+                        <a:pt x="190018" y="0"/>
+                      </a:moveTo>
+                      <a:cubicBezTo>
+                        <a:pt x="161969" y="98834"/>
+                        <a:pt x="92742" y="180812"/>
+                        <a:pt x="0" y="225014"/>
+                      </a:cubicBezTo>
+                      <a:cubicBezTo>
+                        <a:pt x="92747" y="269212"/>
+                        <a:pt x="161983" y="351194"/>
+                        <a:pt x="190036" y="450033"/>
+                      </a:cubicBezTo>
+                      <a:cubicBezTo>
+                        <a:pt x="218088" y="351194"/>
+                        <a:pt x="287324" y="269212"/>
+                        <a:pt x="380071" y="225014"/>
+                      </a:cubicBezTo>
+                      <a:cubicBezTo>
+                        <a:pt x="287315" y="180821"/>
+                        <a:pt x="218075" y="98839"/>
+                        <a:pt x="190018" y="0"/>
+                      </a:cubicBezTo>
+                      <a:close/>
+                    </a:path>
+                  </a:pathLst>
+                </a:custGeom>
+                <a:solidFill>
+                  <a:srgbClr val="000000"/>
+                </a:solidFill>
+                <a:ln w="45244" cap="flat">
+                  <a:noFill/>
+                  <a:prstDash val="solid"/>
+                  <a:miter/>
+                </a:ln>
+              </p:spPr>
+              <p:txBody>
+                <a:bodyPr rtlCol="0" anchor="ctr"/>
+                <a:lstStyle/>
+                <a:p>
+                  <a:endParaRPr lang="en-US"/>
+                </a:p>
+              </p:txBody>
+            </p:sp>
+            <p:sp>
+              <p:nvSpPr>
+                <p:cNvPr id="15" name="Freeform: Shape 14">
+                  <a:extLst>
+                    <a:ext uri="{FF2B5EF4-FFF2-40B4-BE49-F238E27FC236}">
+                      <a16:creationId xmlns:a16="http://schemas.microsoft.com/office/drawing/2014/main" id="{00F53130-64A7-35F7-9FCB-B139D9954C6F}"/>
+                    </a:ext>
+                  </a:extLst>
+                </p:cNvPr>
+                <p:cNvSpPr/>
+                <p:nvPr/>
+              </p:nvSpPr>
+              <p:spPr>
+                <a:xfrm>
+                  <a:off x="6758377" y="3270072"/>
+                  <a:ext cx="380071" cy="450032"/>
+                </a:xfrm>
+                <a:custGeom>
+                  <a:avLst/>
+                  <a:gdLst>
+                    <a:gd name="connsiteX0" fmla="*/ 190036 w 380071"/>
+                    <a:gd name="connsiteY0" fmla="*/ 189555 h 450032"/>
+                    <a:gd name="connsiteX1" fmla="*/ 222272 w 380071"/>
+                    <a:gd name="connsiteY1" fmla="*/ 225014 h 450032"/>
+                    <a:gd name="connsiteX2" fmla="*/ 190036 w 380071"/>
+                    <a:gd name="connsiteY2" fmla="*/ 260477 h 450032"/>
+                    <a:gd name="connsiteX3" fmla="*/ 157804 w 380071"/>
+                    <a:gd name="connsiteY3" fmla="*/ 225014 h 450032"/>
+                    <a:gd name="connsiteX4" fmla="*/ 190036 w 380071"/>
+                    <a:gd name="connsiteY4" fmla="*/ 189555 h 450032"/>
+                    <a:gd name="connsiteX5" fmla="*/ 190036 w 380071"/>
+                    <a:gd name="connsiteY5" fmla="*/ 0 h 450032"/>
+                    <a:gd name="connsiteX6" fmla="*/ 0 w 380071"/>
+                    <a:gd name="connsiteY6" fmla="*/ 225014 h 450032"/>
+                    <a:gd name="connsiteX7" fmla="*/ 190036 w 380071"/>
+                    <a:gd name="connsiteY7" fmla="*/ 450033 h 450032"/>
+                    <a:gd name="connsiteX8" fmla="*/ 380071 w 380071"/>
+                    <a:gd name="connsiteY8" fmla="*/ 225014 h 450032"/>
+                    <a:gd name="connsiteX9" fmla="*/ 190036 w 380071"/>
+                    <a:gd name="connsiteY9" fmla="*/ 0 h 450032"/>
+                  </a:gdLst>
+                  <a:ahLst/>
+                  <a:cxnLst>
+                    <a:cxn ang="0">
+                      <a:pos x="connsiteX0" y="connsiteY0"/>
+                    </a:cxn>
+                    <a:cxn ang="0">
+                      <a:pos x="connsiteX1" y="connsiteY1"/>
+                    </a:cxn>
+                    <a:cxn ang="0">
+                      <a:pos x="connsiteX2" y="connsiteY2"/>
+                    </a:cxn>
+                    <a:cxn ang="0">
+                      <a:pos x="connsiteX3" y="connsiteY3"/>
+                    </a:cxn>
+                    <a:cxn ang="0">
+                      <a:pos x="connsiteX4" y="connsiteY4"/>
+                    </a:cxn>
+                    <a:cxn ang="0">
+                      <a:pos x="connsiteX5" y="connsiteY5"/>
+                    </a:cxn>
+                    <a:cxn ang="0">
+                      <a:pos x="connsiteX6" y="connsiteY6"/>
+                    </a:cxn>
+                    <a:cxn ang="0">
+                      <a:pos x="connsiteX7" y="connsiteY7"/>
+                    </a:cxn>
+                    <a:cxn ang="0">
+                      <a:pos x="connsiteX8" y="connsiteY8"/>
+                    </a:cxn>
+                    <a:cxn ang="0">
+                      <a:pos x="connsiteX9" y="connsiteY9"/>
+                    </a:cxn>
+                  </a:cxnLst>
+                  <a:rect l="l" t="t" r="r" b="b"/>
+                  <a:pathLst>
+                    <a:path w="380071" h="450032">
+                      <a:moveTo>
+                        <a:pt x="190036" y="189555"/>
+                      </a:moveTo>
+                      <a:cubicBezTo>
+                        <a:pt x="200132" y="201948"/>
+                        <a:pt x="210893" y="213787"/>
+                        <a:pt x="222272" y="225014"/>
+                      </a:cubicBezTo>
+                      <a:cubicBezTo>
+                        <a:pt x="210892" y="236241"/>
+                        <a:pt x="200131" y="248081"/>
+                        <a:pt x="190036" y="260477"/>
+                      </a:cubicBezTo>
+                      <a:cubicBezTo>
+                        <a:pt x="179941" y="248081"/>
+                        <a:pt x="169181" y="236246"/>
+                        <a:pt x="157804" y="225014"/>
+                      </a:cubicBezTo>
+                      <a:cubicBezTo>
+                        <a:pt x="169181" y="213787"/>
+                        <a:pt x="179941" y="201948"/>
+                        <a:pt x="190036" y="189555"/>
+                      </a:cubicBezTo>
+                      <a:close/>
+                      <a:moveTo>
+                        <a:pt x="190036" y="0"/>
+                      </a:moveTo>
+                      <a:cubicBezTo>
+                        <a:pt x="161985" y="98839"/>
+                        <a:pt x="92748" y="180816"/>
+                        <a:pt x="0" y="225014"/>
+                      </a:cubicBezTo>
+                      <a:cubicBezTo>
+                        <a:pt x="92747" y="269212"/>
+                        <a:pt x="161984" y="351194"/>
+                        <a:pt x="190036" y="450033"/>
+                      </a:cubicBezTo>
+                      <a:cubicBezTo>
+                        <a:pt x="218088" y="351194"/>
+                        <a:pt x="287324" y="269212"/>
+                        <a:pt x="380071" y="225014"/>
+                      </a:cubicBezTo>
+                      <a:cubicBezTo>
+                        <a:pt x="287323" y="180816"/>
+                        <a:pt x="218087" y="98839"/>
+                        <a:pt x="190036" y="0"/>
+                      </a:cubicBezTo>
+                      <a:close/>
+                    </a:path>
+                  </a:pathLst>
+                </a:custGeom>
+                <a:solidFill>
+                  <a:srgbClr val="000000"/>
+                </a:solidFill>
+                <a:ln w="45244" cap="flat">
+                  <a:noFill/>
+                  <a:prstDash val="solid"/>
+                  <a:miter/>
+                </a:ln>
+              </p:spPr>
+              <p:txBody>
+                <a:bodyPr rtlCol="0" anchor="ctr"/>
+                <a:lstStyle/>
+                <a:p>
+                  <a:endParaRPr lang="en-US"/>
+                </a:p>
+              </p:txBody>
+            </p:sp>
+            <p:sp>
+              <p:nvSpPr>
+                <p:cNvPr id="16" name="Freeform: Shape 15">
+                  <a:extLst>
+                    <a:ext uri="{FF2B5EF4-FFF2-40B4-BE49-F238E27FC236}">
+                      <a16:creationId xmlns:a16="http://schemas.microsoft.com/office/drawing/2014/main" id="{C4A97114-8603-9420-6154-25A08D45CDBD}"/>
+                    </a:ext>
+                  </a:extLst>
+                </p:cNvPr>
+                <p:cNvSpPr/>
+                <p:nvPr/>
+              </p:nvSpPr>
+              <p:spPr>
+                <a:xfrm>
+                  <a:off x="10231072" y="3045058"/>
+                  <a:ext cx="380071" cy="450028"/>
+                </a:xfrm>
+                <a:custGeom>
+                  <a:avLst/>
+                  <a:gdLst>
+                    <a:gd name="connsiteX0" fmla="*/ 190017 w 380071"/>
+                    <a:gd name="connsiteY0" fmla="*/ 189551 h 450028"/>
+                    <a:gd name="connsiteX1" fmla="*/ 222254 w 380071"/>
+                    <a:gd name="connsiteY1" fmla="*/ 225014 h 450028"/>
+                    <a:gd name="connsiteX2" fmla="*/ 190017 w 380071"/>
+                    <a:gd name="connsiteY2" fmla="*/ 260477 h 450028"/>
+                    <a:gd name="connsiteX3" fmla="*/ 157786 w 380071"/>
+                    <a:gd name="connsiteY3" fmla="*/ 225014 h 450028"/>
+                    <a:gd name="connsiteX4" fmla="*/ 190017 w 380071"/>
+                    <a:gd name="connsiteY4" fmla="*/ 189551 h 450028"/>
+                    <a:gd name="connsiteX5" fmla="*/ 190017 w 380071"/>
+                    <a:gd name="connsiteY5" fmla="*/ 0 h 450028"/>
+                    <a:gd name="connsiteX6" fmla="*/ 0 w 380071"/>
+                    <a:gd name="connsiteY6" fmla="*/ 225014 h 450028"/>
+                    <a:gd name="connsiteX7" fmla="*/ 190035 w 380071"/>
+                    <a:gd name="connsiteY7" fmla="*/ 450028 h 450028"/>
+                    <a:gd name="connsiteX8" fmla="*/ 380071 w 380071"/>
+                    <a:gd name="connsiteY8" fmla="*/ 225014 h 450028"/>
+                    <a:gd name="connsiteX9" fmla="*/ 190017 w 380071"/>
+                    <a:gd name="connsiteY9" fmla="*/ 0 h 450028"/>
+                  </a:gdLst>
+                  <a:ahLst/>
+                  <a:cxnLst>
+                    <a:cxn ang="0">
+                      <a:pos x="connsiteX0" y="connsiteY0"/>
+                    </a:cxn>
+                    <a:cxn ang="0">
+                      <a:pos x="connsiteX1" y="connsiteY1"/>
+                    </a:cxn>
+                    <a:cxn ang="0">
+                      <a:pos x="connsiteX2" y="connsiteY2"/>
+                    </a:cxn>
+                    <a:cxn ang="0">
+                      <a:pos x="connsiteX3" y="connsiteY3"/>
+                    </a:cxn>
+                    <a:cxn ang="0">
+                      <a:pos x="connsiteX4" y="connsiteY4"/>
+                    </a:cxn>
+                    <a:cxn ang="0">
+                      <a:pos x="connsiteX5" y="connsiteY5"/>
+                    </a:cxn>
+                    <a:cxn ang="0">
+                      <a:pos x="connsiteX6" y="connsiteY6"/>
+                    </a:cxn>
+                    <a:cxn ang="0">
+                      <a:pos x="connsiteX7" y="connsiteY7"/>
+                    </a:cxn>
+                    <a:cxn ang="0">
+                      <a:pos x="connsiteX8" y="connsiteY8"/>
+                    </a:cxn>
+                    <a:cxn ang="0">
+                      <a:pos x="connsiteX9" y="connsiteY9"/>
+                    </a:cxn>
+                  </a:cxnLst>
+                  <a:rect l="l" t="t" r="r" b="b"/>
+                  <a:pathLst>
+                    <a:path w="380071" h="450028">
+                      <a:moveTo>
+                        <a:pt x="190017" y="189551"/>
+                      </a:moveTo>
+                      <a:cubicBezTo>
+                        <a:pt x="200111" y="201947"/>
+                        <a:pt x="210872" y="213787"/>
+                        <a:pt x="222254" y="225014"/>
+                      </a:cubicBezTo>
+                      <a:cubicBezTo>
+                        <a:pt x="210872" y="236241"/>
+                        <a:pt x="200111" y="248081"/>
+                        <a:pt x="190017" y="260477"/>
+                      </a:cubicBezTo>
+                      <a:cubicBezTo>
+                        <a:pt x="179923" y="248085"/>
+                        <a:pt x="169163" y="236246"/>
+                        <a:pt x="157786" y="225014"/>
+                      </a:cubicBezTo>
+                      <a:cubicBezTo>
+                        <a:pt x="169163" y="213782"/>
+                        <a:pt x="179923" y="201947"/>
+                        <a:pt x="190017" y="189551"/>
+                      </a:cubicBezTo>
+                      <a:close/>
+                      <a:moveTo>
+                        <a:pt x="190017" y="0"/>
+                      </a:moveTo>
+                      <a:cubicBezTo>
+                        <a:pt x="161969" y="98834"/>
+                        <a:pt x="92742" y="180812"/>
+                        <a:pt x="0" y="225014"/>
+                      </a:cubicBezTo>
+                      <a:cubicBezTo>
+                        <a:pt x="92747" y="269212"/>
+                        <a:pt x="161983" y="351194"/>
+                        <a:pt x="190035" y="450028"/>
+                      </a:cubicBezTo>
+                      <a:cubicBezTo>
+                        <a:pt x="218088" y="351194"/>
+                        <a:pt x="287324" y="269212"/>
+                        <a:pt x="380071" y="225014"/>
+                      </a:cubicBezTo>
+                      <a:cubicBezTo>
+                        <a:pt x="287315" y="180821"/>
+                        <a:pt x="218074" y="98839"/>
+                        <a:pt x="190017" y="0"/>
+                      </a:cubicBezTo>
+                      <a:close/>
+                    </a:path>
+                  </a:pathLst>
+                </a:custGeom>
+                <a:solidFill>
+                  <a:srgbClr val="000000"/>
+                </a:solidFill>
+                <a:ln w="45244" cap="flat">
+                  <a:noFill/>
+                  <a:prstDash val="solid"/>
+                  <a:miter/>
+                </a:ln>
+              </p:spPr>
+              <p:txBody>
+                <a:bodyPr rtlCol="0" anchor="ctr"/>
+                <a:lstStyle/>
+                <a:p>
+                  <a:endParaRPr lang="en-US"/>
+                </a:p>
+              </p:txBody>
+            </p:sp>
+          </p:grpSp>
+        </p:grpSp>
+        <p:pic>
+          <p:nvPicPr>
+            <p:cNvPr id="17" name="Picture 16" descr="A close up of a sign&#10;&#10;Description automatically generated">
+              <a:extLst>
+                <a:ext uri="{FF2B5EF4-FFF2-40B4-BE49-F238E27FC236}">
+                  <a16:creationId xmlns:a16="http://schemas.microsoft.com/office/drawing/2014/main" id="{33233867-63E3-ECE2-489A-4F2019C38D37}"/>
+                </a:ext>
+              </a:extLst>
+            </p:cNvPr>
+            <p:cNvPicPr>
+              <a:picLocks noChangeAspect="1"/>
+            </p:cNvPicPr>
+            <p:nvPr/>
+          </p:nvPicPr>
+          <p:blipFill rotWithShape="1">
+            <a:blip r:embed="rId3">
+              <a:extLst>
+                <a:ext uri="{28A0092B-C50C-407E-A947-70E740481C1C}">
+                  <a14:useLocalDpi xmlns:a14="http://schemas.microsoft.com/office/drawing/2010/main" val="0"/>
+                </a:ext>
+              </a:extLst>
+            </a:blip>
+            <a:srcRect l="37013"/>
+            <a:stretch/>
+          </p:blipFill>
+          <p:spPr>
+            <a:xfrm>
+              <a:off x="8941391" y="4860758"/>
+              <a:ext cx="876378" cy="451805"/>
+            </a:xfrm>
+            <a:prstGeom prst="rect">
+              <a:avLst/>
+            </a:prstGeom>
+          </p:spPr>
+        </p:pic>
+      </p:grpSp>
     </p:spTree>
     <p:extLst>
       <p:ext uri="{BB962C8B-B14F-4D97-AF65-F5344CB8AC3E}">
@@ -10051,196 +11892,6 @@
           <a:chExt cx="0" cy="0"/>
         </a:xfrm>
       </p:grpSpPr>
-      <p:sp>
-        <p:nvSpPr>
-          <p:cNvPr id="2" name="Title 1">
-            <a:extLst>
-              <a:ext uri="{FF2B5EF4-FFF2-40B4-BE49-F238E27FC236}">
-                <a16:creationId xmlns:a16="http://schemas.microsoft.com/office/drawing/2014/main" id="{781DD71E-6149-4BEB-A0F9-39C6685119B0}"/>
-              </a:ext>
-            </a:extLst>
-          </p:cNvPr>
-          <p:cNvSpPr>
-            <a:spLocks noGrp="1"/>
-          </p:cNvSpPr>
-          <p:nvPr>
-            <p:ph type="title"/>
-          </p:nvPr>
-        </p:nvSpPr>
-        <p:spPr/>
-        <p:txBody>
-          <a:bodyPr/>
-          <a:lstStyle/>
-          <a:p>
-            <a:r>
-              <a:rPr lang="en-US" dirty="0"/>
-              <a:t>About Your Instructor</a:t>
-            </a:r>
-          </a:p>
-        </p:txBody>
-      </p:sp>
-      <p:sp>
-        <p:nvSpPr>
-          <p:cNvPr id="4" name="Slide Number Placeholder 3">
-            <a:extLst>
-              <a:ext uri="{FF2B5EF4-FFF2-40B4-BE49-F238E27FC236}">
-                <a16:creationId xmlns:a16="http://schemas.microsoft.com/office/drawing/2014/main" id="{E2FBF6B4-F10C-4781-AE21-B980DCE6B61B}"/>
-              </a:ext>
-            </a:extLst>
-          </p:cNvPr>
-          <p:cNvSpPr>
-            <a:spLocks noGrp="1"/>
-          </p:cNvSpPr>
-          <p:nvPr>
-            <p:ph type="sldNum" sz="quarter" idx="12"/>
-          </p:nvPr>
-        </p:nvSpPr>
-        <p:spPr/>
-        <p:txBody>
-          <a:bodyPr/>
-          <a:lstStyle/>
-          <a:p>
-            <a:fld id="{6D95AE55-B5F4-483D-AEFF-E8059F5502F5}" type="slidenum">
-              <a:rPr lang="en-US" smtClean="0"/>
-              <a:t>4</a:t>
-            </a:fld>
-            <a:endParaRPr lang="en-US"/>
-          </a:p>
-        </p:txBody>
-      </p:sp>
-      <p:pic>
-        <p:nvPicPr>
-          <p:cNvPr id="5" name="Content Placeholder 6" descr="A close up of a sign&#10;&#10;Description automatically generated">
-            <a:extLst>
-              <a:ext uri="{FF2B5EF4-FFF2-40B4-BE49-F238E27FC236}">
-                <a16:creationId xmlns:a16="http://schemas.microsoft.com/office/drawing/2014/main" id="{1070C901-7B80-4964-BAB9-9990630CD6D0}"/>
-              </a:ext>
-            </a:extLst>
-          </p:cNvPr>
-          <p:cNvPicPr>
-            <a:picLocks noChangeAspect="1"/>
-          </p:cNvPicPr>
-          <p:nvPr/>
-        </p:nvPicPr>
-        <p:blipFill>
-          <a:blip r:embed="rId2">
-            <a:extLst>
-              <a:ext uri="{28A0092B-C50C-407E-A947-70E740481C1C}">
-                <a14:useLocalDpi xmlns:a14="http://schemas.microsoft.com/office/drawing/2010/main" val="0"/>
-              </a:ext>
-            </a:extLst>
-          </a:blip>
-          <a:stretch>
-            <a:fillRect/>
-          </a:stretch>
-        </p:blipFill>
-        <p:spPr>
-          <a:xfrm>
-            <a:off x="1807588" y="4874568"/>
-            <a:ext cx="3598071" cy="2075809"/>
-          </a:xfrm>
-          <a:prstGeom prst="rect">
-            <a:avLst/>
-          </a:prstGeom>
-        </p:spPr>
-      </p:pic>
-      <p:sp>
-        <p:nvSpPr>
-          <p:cNvPr id="6" name="TextBox 5">
-            <a:extLst>
-              <a:ext uri="{FF2B5EF4-FFF2-40B4-BE49-F238E27FC236}">
-                <a16:creationId xmlns:a16="http://schemas.microsoft.com/office/drawing/2014/main" id="{1FAE114B-20EE-4498-B490-B559E10EDAE0}"/>
-              </a:ext>
-            </a:extLst>
-          </p:cNvPr>
-          <p:cNvSpPr txBox="1"/>
-          <p:nvPr/>
-        </p:nvSpPr>
-        <p:spPr>
-          <a:xfrm>
-            <a:off x="308008" y="1916057"/>
-            <a:ext cx="6422635" cy="3025886"/>
-          </a:xfrm>
-          <a:prstGeom prst="rect">
-            <a:avLst/>
-          </a:prstGeom>
-        </p:spPr>
-        <p:txBody>
-          <a:bodyPr vert="horz" lIns="91440" tIns="45720" rIns="91440" bIns="45720" rtlCol="0">
-            <a:normAutofit/>
-          </a:bodyPr>
-          <a:lstStyle/>
-          <a:p>
-            <a:pPr algn="ctr">
-              <a:lnSpc>
-                <a:spcPct val="90000"/>
-              </a:lnSpc>
-              <a:spcAft>
-                <a:spcPts val="3000"/>
-              </a:spcAft>
-            </a:pPr>
-            <a:r>
-              <a:rPr lang="en-US" sz="4300" b="1" dirty="0">
-                <a:latin typeface="+mj-lt"/>
-              </a:rPr>
-              <a:t>Justin Priest</a:t>
-            </a:r>
-          </a:p>
-          <a:p>
-            <a:pPr algn="ctr">
-              <a:lnSpc>
-                <a:spcPct val="90000"/>
-              </a:lnSpc>
-              <a:spcAft>
-                <a:spcPts val="1800"/>
-              </a:spcAft>
-            </a:pPr>
-            <a:r>
-              <a:rPr lang="en-US" sz="2400" dirty="0"/>
-              <a:t>2020 UAF CFOS Graduate</a:t>
-            </a:r>
-          </a:p>
-          <a:p>
-            <a:pPr algn="ctr">
-              <a:lnSpc>
-                <a:spcPct val="90000"/>
-              </a:lnSpc>
-            </a:pPr>
-            <a:r>
-              <a:rPr lang="en-US" sz="2400" dirty="0"/>
-              <a:t>Learned R tools at CFOS (easy way) &amp; </a:t>
-            </a:r>
-          </a:p>
-          <a:p>
-            <a:pPr algn="ctr">
-              <a:lnSpc>
-                <a:spcPct val="90000"/>
-              </a:lnSpc>
-              <a:spcAft>
-                <a:spcPts val="1800"/>
-              </a:spcAft>
-            </a:pPr>
-            <a:r>
-              <a:rPr lang="en-US" sz="2400" dirty="0"/>
-              <a:t>taught myself (hard but fun way)</a:t>
-            </a:r>
-          </a:p>
-          <a:p>
-            <a:pPr algn="ctr">
-              <a:lnSpc>
-                <a:spcPct val="90000"/>
-              </a:lnSpc>
-              <a:spcAft>
-                <a:spcPts val="1800"/>
-              </a:spcAft>
-            </a:pPr>
-            <a:r>
-              <a:rPr lang="en-US" sz="2400" dirty="0"/>
-              <a:t>ADF&amp;G Coho Salmon Researcher in Sitka &amp; Juneau</a:t>
-            </a:r>
-          </a:p>
-        </p:txBody>
-      </p:sp>
       <p:pic>
         <p:nvPicPr>
           <p:cNvPr id="7" name="Content Placeholder 4" descr="A person holding a fish&#10;&#10;Description automatically generated">
@@ -10256,7 +11907,7 @@
           <p:nvPr/>
         </p:nvPicPr>
         <p:blipFill rotWithShape="1">
-          <a:blip r:embed="rId3">
+          <a:blip r:embed="rId2">
             <a:extLst>
               <a:ext uri="{28A0092B-C50C-407E-A947-70E740481C1C}">
                 <a14:useLocalDpi xmlns:a14="http://schemas.microsoft.com/office/drawing/2010/main" val="0"/>
@@ -10268,8 +11919,8 @@
         </p:blipFill>
         <p:spPr>
           <a:xfrm>
-            <a:off x="6730643" y="1413145"/>
-            <a:ext cx="5461357" cy="5444855"/>
+            <a:off x="869074" y="3146682"/>
+            <a:ext cx="3567314" cy="3556535"/>
           </a:xfrm>
           <a:custGeom>
             <a:avLst/>
@@ -10388,6 +12039,173 @@
           </a:custGeom>
         </p:spPr>
       </p:pic>
+      <p:sp>
+        <p:nvSpPr>
+          <p:cNvPr id="4" name="Slide Number Placeholder 3">
+            <a:extLst>
+              <a:ext uri="{FF2B5EF4-FFF2-40B4-BE49-F238E27FC236}">
+                <a16:creationId xmlns:a16="http://schemas.microsoft.com/office/drawing/2014/main" id="{E2FBF6B4-F10C-4781-AE21-B980DCE6B61B}"/>
+              </a:ext>
+            </a:extLst>
+          </p:cNvPr>
+          <p:cNvSpPr>
+            <a:spLocks noGrp="1"/>
+          </p:cNvSpPr>
+          <p:nvPr>
+            <p:ph type="sldNum" sz="quarter" idx="12"/>
+          </p:nvPr>
+        </p:nvSpPr>
+        <p:spPr>
+          <a:xfrm>
+            <a:off x="8649101" y="6468033"/>
+            <a:ext cx="2743200" cy="365125"/>
+          </a:xfrm>
+        </p:spPr>
+        <p:txBody>
+          <a:bodyPr/>
+          <a:lstStyle/>
+          <a:p>
+            <a:fld id="{6D95AE55-B5F4-483D-AEFF-E8059F5502F5}" type="slidenum">
+              <a:rPr lang="en-US" smtClean="0"/>
+              <a:t>4</a:t>
+            </a:fld>
+            <a:endParaRPr lang="en-US" dirty="0"/>
+          </a:p>
+        </p:txBody>
+      </p:sp>
+      <p:pic>
+        <p:nvPicPr>
+          <p:cNvPr id="5" name="Content Placeholder 6" descr="A close up of a sign&#10;&#10;Description automatically generated">
+            <a:extLst>
+              <a:ext uri="{FF2B5EF4-FFF2-40B4-BE49-F238E27FC236}">
+                <a16:creationId xmlns:a16="http://schemas.microsoft.com/office/drawing/2014/main" id="{1070C901-7B80-4964-BAB9-9990630CD6D0}"/>
+              </a:ext>
+            </a:extLst>
+          </p:cNvPr>
+          <p:cNvPicPr>
+            <a:picLocks noChangeAspect="1"/>
+          </p:cNvPicPr>
+          <p:nvPr/>
+        </p:nvPicPr>
+        <p:blipFill>
+          <a:blip r:embed="rId3">
+            <a:extLst>
+              <a:ext uri="{28A0092B-C50C-407E-A947-70E740481C1C}">
+                <a14:useLocalDpi xmlns:a14="http://schemas.microsoft.com/office/drawing/2010/main" val="0"/>
+              </a:ext>
+            </a:extLst>
+          </a:blip>
+          <a:stretch>
+            <a:fillRect/>
+          </a:stretch>
+        </p:blipFill>
+        <p:spPr>
+          <a:xfrm>
+            <a:off x="4296964" y="2391095"/>
+            <a:ext cx="3598071" cy="2075809"/>
+          </a:xfrm>
+          <a:prstGeom prst="rect">
+            <a:avLst/>
+          </a:prstGeom>
+        </p:spPr>
+      </p:pic>
+      <p:sp>
+        <p:nvSpPr>
+          <p:cNvPr id="6" name="TextBox 5">
+            <a:extLst>
+              <a:ext uri="{FF2B5EF4-FFF2-40B4-BE49-F238E27FC236}">
+                <a16:creationId xmlns:a16="http://schemas.microsoft.com/office/drawing/2014/main" id="{1FAE114B-20EE-4498-B490-B559E10EDAE0}"/>
+              </a:ext>
+            </a:extLst>
+          </p:cNvPr>
+          <p:cNvSpPr txBox="1"/>
+          <p:nvPr/>
+        </p:nvSpPr>
+        <p:spPr>
+          <a:xfrm>
+            <a:off x="127016" y="321109"/>
+            <a:ext cx="4899087" cy="2646318"/>
+          </a:xfrm>
+          <a:prstGeom prst="rect">
+            <a:avLst/>
+          </a:prstGeom>
+        </p:spPr>
+        <p:txBody>
+          <a:bodyPr vert="horz" lIns="91440" tIns="45720" rIns="91440" bIns="45720" rtlCol="0">
+            <a:normAutofit/>
+          </a:bodyPr>
+          <a:lstStyle/>
+          <a:p>
+            <a:pPr algn="ctr">
+              <a:lnSpc>
+                <a:spcPct val="90000"/>
+              </a:lnSpc>
+              <a:spcAft>
+                <a:spcPts val="3000"/>
+              </a:spcAft>
+            </a:pPr>
+            <a:r>
+              <a:rPr lang="en-US" sz="3600" b="1" dirty="0">
+                <a:latin typeface="+mj-lt"/>
+              </a:rPr>
+              <a:t>Justin Priest</a:t>
+            </a:r>
+          </a:p>
+          <a:p>
+            <a:pPr algn="ctr">
+              <a:lnSpc>
+                <a:spcPct val="90000"/>
+              </a:lnSpc>
+              <a:spcAft>
+                <a:spcPts val="1800"/>
+              </a:spcAft>
+            </a:pPr>
+            <a:r>
+              <a:rPr lang="en-US" dirty="0"/>
+              <a:t>2020 UAF CFOS Graduate</a:t>
+            </a:r>
+          </a:p>
+          <a:p>
+            <a:pPr algn="ctr">
+              <a:lnSpc>
+                <a:spcPct val="90000"/>
+              </a:lnSpc>
+            </a:pPr>
+            <a:r>
+              <a:rPr lang="en-US" dirty="0"/>
+              <a:t>Learned R tools at CFOS (easy way) &amp; </a:t>
+            </a:r>
+          </a:p>
+          <a:p>
+            <a:pPr algn="ctr">
+              <a:lnSpc>
+                <a:spcPct val="90000"/>
+              </a:lnSpc>
+              <a:spcAft>
+                <a:spcPts val="1800"/>
+              </a:spcAft>
+            </a:pPr>
+            <a:r>
+              <a:rPr lang="en-US" dirty="0"/>
+              <a:t>taught myself (hard but fun way)</a:t>
+            </a:r>
+          </a:p>
+          <a:p>
+            <a:pPr algn="ctr">
+              <a:lnSpc>
+                <a:spcPct val="90000"/>
+              </a:lnSpc>
+              <a:spcAft>
+                <a:spcPts val="1800"/>
+              </a:spcAft>
+            </a:pPr>
+            <a:r>
+              <a:rPr lang="en-US" dirty="0"/>
+              <a:t>ADF&amp;G Coho Salmon Researcher in Sitka &amp; Juneau</a:t>
+            </a:r>
+          </a:p>
+        </p:txBody>
+      </p:sp>
       <p:pic>
         <p:nvPicPr>
           <p:cNvPr id="10" name="Picture 9">
@@ -10421,7 +12239,194 @@
         </p:blipFill>
         <p:spPr>
           <a:xfrm>
-            <a:off x="1586887" y="2478707"/>
+            <a:off x="585835" y="784661"/>
+            <a:ext cx="3981450" cy="352425"/>
+          </a:xfrm>
+          <a:prstGeom prst="rect">
+            <a:avLst/>
+          </a:prstGeom>
+        </p:spPr>
+      </p:pic>
+      <p:pic>
+        <p:nvPicPr>
+          <p:cNvPr id="8" name="Picture 7" descr="A person standing on a rock with a kite in the air&#10;&#10;Description automatically generated">
+            <a:extLst>
+              <a:ext uri="{FF2B5EF4-FFF2-40B4-BE49-F238E27FC236}">
+                <a16:creationId xmlns:a16="http://schemas.microsoft.com/office/drawing/2014/main" id="{C76CD833-D384-F0B8-FCCC-C65211198858}"/>
+              </a:ext>
+            </a:extLst>
+          </p:cNvPr>
+          <p:cNvPicPr>
+            <a:picLocks noChangeAspect="1"/>
+          </p:cNvPicPr>
+          <p:nvPr/>
+        </p:nvPicPr>
+        <p:blipFill>
+          <a:blip r:embed="rId5">
+            <a:extLst>
+              <a:ext uri="{28A0092B-C50C-407E-A947-70E740481C1C}">
+                <a14:useLocalDpi xmlns:a14="http://schemas.microsoft.com/office/drawing/2010/main" val="0"/>
+              </a:ext>
+            </a:extLst>
+          </a:blip>
+          <a:stretch>
+            <a:fillRect/>
+          </a:stretch>
+        </p:blipFill>
+        <p:spPr>
+          <a:xfrm>
+            <a:off x="7755614" y="206000"/>
+            <a:ext cx="3771896" cy="3769958"/>
+          </a:xfrm>
+          <a:prstGeom prst="rect">
+            <a:avLst/>
+          </a:prstGeom>
+        </p:spPr>
+      </p:pic>
+      <p:sp>
+        <p:nvSpPr>
+          <p:cNvPr id="9" name="TextBox 8">
+            <a:extLst>
+              <a:ext uri="{FF2B5EF4-FFF2-40B4-BE49-F238E27FC236}">
+                <a16:creationId xmlns:a16="http://schemas.microsoft.com/office/drawing/2014/main" id="{43A8A50F-89A1-7E10-5347-FD276C6A6FD6}"/>
+              </a:ext>
+            </a:extLst>
+          </p:cNvPr>
+          <p:cNvSpPr txBox="1"/>
+          <p:nvPr/>
+        </p:nvSpPr>
+        <p:spPr>
+          <a:xfrm>
+            <a:off x="7418926" y="4211682"/>
+            <a:ext cx="4445269" cy="2646318"/>
+          </a:xfrm>
+          <a:prstGeom prst="rect">
+            <a:avLst/>
+          </a:prstGeom>
+        </p:spPr>
+        <p:txBody>
+          <a:bodyPr vert="horz" lIns="91440" tIns="45720" rIns="91440" bIns="45720" rtlCol="0">
+            <a:normAutofit/>
+          </a:bodyPr>
+          <a:lstStyle/>
+          <a:p>
+            <a:pPr algn="ctr">
+              <a:lnSpc>
+                <a:spcPct val="90000"/>
+              </a:lnSpc>
+              <a:spcAft>
+                <a:spcPts val="3000"/>
+              </a:spcAft>
+            </a:pPr>
+            <a:r>
+              <a:rPr lang="en-US" sz="3600" b="1" dirty="0">
+                <a:latin typeface="+mj-lt"/>
+              </a:rPr>
+              <a:t>Matt Tyers</a:t>
+            </a:r>
+          </a:p>
+          <a:p>
+            <a:pPr algn="ctr">
+              <a:lnSpc>
+                <a:spcPct val="90000"/>
+              </a:lnSpc>
+              <a:spcAft>
+                <a:spcPts val="1800"/>
+              </a:spcAft>
+            </a:pPr>
+            <a:r>
+              <a:rPr lang="en-US" dirty="0"/>
+              <a:t>2014 Montana State Statistics Graduate</a:t>
+            </a:r>
+          </a:p>
+          <a:p>
+            <a:pPr algn="ctr">
+              <a:lnSpc>
+                <a:spcPct val="90000"/>
+              </a:lnSpc>
+            </a:pPr>
+            <a:r>
+              <a:rPr lang="en-US" dirty="0"/>
+              <a:t>Old-</a:t>
+            </a:r>
+            <a:r>
+              <a:rPr lang="en-US" dirty="0" err="1"/>
+              <a:t>skool</a:t>
+            </a:r>
+            <a:r>
+              <a:rPr lang="en-US" dirty="0"/>
+              <a:t> </a:t>
+            </a:r>
+            <a:r>
+              <a:rPr lang="en-US" dirty="0" err="1"/>
+              <a:t>syntaxer</a:t>
+            </a:r>
+            <a:endParaRPr lang="en-US" dirty="0"/>
+          </a:p>
+          <a:p>
+            <a:pPr algn="ctr">
+              <a:lnSpc>
+                <a:spcPct val="90000"/>
+              </a:lnSpc>
+              <a:spcAft>
+                <a:spcPts val="1800"/>
+              </a:spcAft>
+            </a:pPr>
+            <a:r>
+              <a:rPr lang="en-US" dirty="0"/>
+              <a:t>But I’m learning</a:t>
+            </a:r>
+          </a:p>
+          <a:p>
+            <a:pPr algn="ctr">
+              <a:lnSpc>
+                <a:spcPct val="90000"/>
+              </a:lnSpc>
+              <a:spcAft>
+                <a:spcPts val="1800"/>
+              </a:spcAft>
+            </a:pPr>
+            <a:r>
+              <a:rPr lang="en-US" dirty="0"/>
+              <a:t>ADF&amp;G Sport Fish Biometrician in Anchorage</a:t>
+            </a:r>
+          </a:p>
+        </p:txBody>
+      </p:sp>
+      <p:pic>
+        <p:nvPicPr>
+          <p:cNvPr id="11" name="Picture 10">
+            <a:extLst>
+              <a:ext uri="{FF2B5EF4-FFF2-40B4-BE49-F238E27FC236}">
+                <a16:creationId xmlns:a16="http://schemas.microsoft.com/office/drawing/2014/main" id="{BD6B9106-2282-53A3-CC0A-395B2762FCA6}"/>
+              </a:ext>
+            </a:extLst>
+          </p:cNvPr>
+          <p:cNvPicPr>
+            <a:picLocks noChangeAspect="1"/>
+          </p:cNvPicPr>
+          <p:nvPr/>
+        </p:nvPicPr>
+        <p:blipFill>
+          <a:blip r:embed="rId4">
+            <a:clrChange>
+              <a:clrFrom>
+                <a:srgbClr val="FFFFFF"/>
+              </a:clrFrom>
+              <a:clrTo>
+                <a:srgbClr val="FFFFFF">
+                  <a:alpha val="0"/>
+                </a:srgbClr>
+              </a:clrTo>
+            </a:clrChange>
+          </a:blip>
+          <a:stretch>
+            <a:fillRect/>
+          </a:stretch>
+        </p:blipFill>
+        <p:spPr>
+          <a:xfrm>
+            <a:off x="7650836" y="4702021"/>
             <a:ext cx="3981450" cy="352425"/>
           </a:xfrm>
           <a:prstGeom prst="rect">

</xml_diff>

<commit_message>
added a Virtual Meeting housekeeping slide
</commit_message>
<xml_diff>
--- a/presentations/1 - Welcome and motivation.pptx
+++ b/presentations/1 - Welcome and motivation.pptx
@@ -5,23 +5,24 @@
     <p:sldMasterId id="2147483648" r:id="rId1"/>
   </p:sldMasterIdLst>
   <p:notesMasterIdLst>
-    <p:notesMasterId r:id="rId16"/>
+    <p:notesMasterId r:id="rId17"/>
   </p:notesMasterIdLst>
   <p:sldIdLst>
     <p:sldId id="256" r:id="rId2"/>
-    <p:sldId id="405" r:id="rId3"/>
-    <p:sldId id="402" r:id="rId4"/>
-    <p:sldId id="411" r:id="rId5"/>
-    <p:sldId id="383" r:id="rId6"/>
-    <p:sldId id="401" r:id="rId7"/>
-    <p:sldId id="331" r:id="rId8"/>
-    <p:sldId id="431" r:id="rId9"/>
-    <p:sldId id="332" r:id="rId10"/>
-    <p:sldId id="412" r:id="rId11"/>
-    <p:sldId id="430" r:id="rId12"/>
-    <p:sldId id="297" r:id="rId13"/>
-    <p:sldId id="313" r:id="rId14"/>
-    <p:sldId id="429" r:id="rId15"/>
+    <p:sldId id="432" r:id="rId3"/>
+    <p:sldId id="405" r:id="rId4"/>
+    <p:sldId id="402" r:id="rId5"/>
+    <p:sldId id="411" r:id="rId6"/>
+    <p:sldId id="383" r:id="rId7"/>
+    <p:sldId id="401" r:id="rId8"/>
+    <p:sldId id="331" r:id="rId9"/>
+    <p:sldId id="431" r:id="rId10"/>
+    <p:sldId id="332" r:id="rId11"/>
+    <p:sldId id="412" r:id="rId12"/>
+    <p:sldId id="430" r:id="rId13"/>
+    <p:sldId id="297" r:id="rId14"/>
+    <p:sldId id="313" r:id="rId15"/>
+    <p:sldId id="429" r:id="rId16"/>
   </p:sldIdLst>
   <p:sldSz cx="12192000" cy="6858000"/>
   <p:notesSz cx="6858000" cy="9144000"/>
@@ -545,7 +546,7 @@
           <a:p>
             <a:fld id="{AD86E2D3-8F12-4CB7-B6F3-018CFC08298B}" type="slidenum">
               <a:rPr lang="en-US" smtClean="0"/>
-              <a:t>2</a:t>
+              <a:t>3</a:t>
             </a:fld>
             <a:endParaRPr lang="en-US"/>
           </a:p>
@@ -741,7 +742,7 @@
           <a:p>
             <a:fld id="{AD86E2D3-8F12-4CB7-B6F3-018CFC08298B}" type="slidenum">
               <a:rPr lang="en-US" smtClean="0"/>
-              <a:t>13</a:t>
+              <a:t>14</a:t>
             </a:fld>
             <a:endParaRPr lang="en-US"/>
           </a:p>
@@ -834,7 +835,7 @@
           <a:p>
             <a:fld id="{AD86E2D3-8F12-4CB7-B6F3-018CFC08298B}" type="slidenum">
               <a:rPr lang="en-US" smtClean="0"/>
-              <a:t>14</a:t>
+              <a:t>15</a:t>
             </a:fld>
             <a:endParaRPr lang="en-US"/>
           </a:p>
@@ -918,7 +919,7 @@
           <a:p>
             <a:fld id="{AD86E2D3-8F12-4CB7-B6F3-018CFC08298B}" type="slidenum">
               <a:rPr lang="en-US" smtClean="0"/>
-              <a:t>3</a:t>
+              <a:t>4</a:t>
             </a:fld>
             <a:endParaRPr lang="en-US"/>
           </a:p>
@@ -1019,7 +1020,7 @@
           <a:p>
             <a:fld id="{AD86E2D3-8F12-4CB7-B6F3-018CFC08298B}" type="slidenum">
               <a:rPr lang="en-US" smtClean="0"/>
-              <a:t>5</a:t>
+              <a:t>6</a:t>
             </a:fld>
             <a:endParaRPr lang="en-US"/>
           </a:p>
@@ -1112,7 +1113,7 @@
           <a:p>
             <a:fld id="{AD86E2D3-8F12-4CB7-B6F3-018CFC08298B}" type="slidenum">
               <a:rPr lang="en-US" smtClean="0"/>
-              <a:t>6</a:t>
+              <a:t>7</a:t>
             </a:fld>
             <a:endParaRPr lang="en-US"/>
           </a:p>
@@ -1196,7 +1197,7 @@
           <a:p>
             <a:fld id="{2D3618BD-5D63-447F-BEC2-3BD80D62BA09}" type="slidenum">
               <a:rPr lang="en-US" smtClean="0"/>
-              <a:t>7</a:t>
+              <a:t>8</a:t>
             </a:fld>
             <a:endParaRPr lang="en-US"/>
           </a:p>
@@ -1283,7 +1284,7 @@
           <a:p>
             <a:fld id="{2D3618BD-5D63-447F-BEC2-3BD80D62BA09}" type="slidenum">
               <a:rPr lang="en-US" smtClean="0"/>
-              <a:t>8</a:t>
+              <a:t>9</a:t>
             </a:fld>
             <a:endParaRPr lang="en-US"/>
           </a:p>
@@ -1378,7 +1379,7 @@
           <a:p>
             <a:fld id="{2D3618BD-5D63-447F-BEC2-3BD80D62BA09}" type="slidenum">
               <a:rPr lang="en-US" smtClean="0"/>
-              <a:t>9</a:t>
+              <a:t>10</a:t>
             </a:fld>
             <a:endParaRPr lang="en-US"/>
           </a:p>
@@ -1474,7 +1475,7 @@
           <a:p>
             <a:fld id="{2D3618BD-5D63-447F-BEC2-3BD80D62BA09}" type="slidenum">
               <a:rPr lang="en-US" smtClean="0"/>
-              <a:t>10</a:t>
+              <a:t>11</a:t>
             </a:fld>
             <a:endParaRPr lang="en-US"/>
           </a:p>
@@ -1596,7 +1597,7 @@
           <a:p>
             <a:fld id="{AD86E2D3-8F12-4CB7-B6F3-018CFC08298B}" type="slidenum">
               <a:rPr lang="en-US" smtClean="0"/>
-              <a:t>12</a:t>
+              <a:t>13</a:t>
             </a:fld>
             <a:endParaRPr lang="en-US"/>
           </a:p>
@@ -5254,6 +5255,993 @@
           <p:cNvPr id="2" name="Title 1">
             <a:extLst>
               <a:ext uri="{FF2B5EF4-FFF2-40B4-BE49-F238E27FC236}">
+                <a16:creationId xmlns:a16="http://schemas.microsoft.com/office/drawing/2014/main" id="{8115451F-211E-5062-3063-EEFCC622ABEA}"/>
+              </a:ext>
+            </a:extLst>
+          </p:cNvPr>
+          <p:cNvSpPr>
+            <a:spLocks noGrp="1"/>
+          </p:cNvSpPr>
+          <p:nvPr>
+            <p:ph type="title"/>
+          </p:nvPr>
+        </p:nvSpPr>
+        <p:spPr>
+          <a:xfrm>
+            <a:off x="741947" y="1"/>
+            <a:ext cx="10515600" cy="914400"/>
+          </a:xfrm>
+        </p:spPr>
+        <p:txBody>
+          <a:bodyPr>
+            <a:noAutofit/>
+          </a:bodyPr>
+          <a:lstStyle/>
+          <a:p>
+            <a:r>
+              <a:rPr lang="en-US" sz="3600" b="1" dirty="0"/>
+              <a:t>Ok, so why R?</a:t>
+            </a:r>
+          </a:p>
+        </p:txBody>
+      </p:sp>
+      <p:sp>
+        <p:nvSpPr>
+          <p:cNvPr id="19" name="Content Placeholder 2">
+            <a:extLst>
+              <a:ext uri="{FF2B5EF4-FFF2-40B4-BE49-F238E27FC236}">
+                <a16:creationId xmlns:a16="http://schemas.microsoft.com/office/drawing/2014/main" id="{1E59D450-1D15-06EF-3C95-D5BD186D82C4}"/>
+              </a:ext>
+            </a:extLst>
+          </p:cNvPr>
+          <p:cNvSpPr txBox="1">
+            <a:spLocks/>
+          </p:cNvSpPr>
+          <p:nvPr/>
+        </p:nvSpPr>
+        <p:spPr>
+          <a:xfrm>
+            <a:off x="741946" y="1165257"/>
+            <a:ext cx="8461047" cy="2649659"/>
+          </a:xfrm>
+          <a:prstGeom prst="rect">
+            <a:avLst/>
+          </a:prstGeom>
+        </p:spPr>
+        <p:txBody>
+          <a:bodyPr vert="horz" lIns="91440" tIns="45720" rIns="91440" bIns="45720" rtlCol="0">
+            <a:normAutofit/>
+          </a:bodyPr>
+          <a:lstStyle>
+            <a:lvl1pPr marL="228600" indent="-228600" algn="l" defTabSz="914400" rtl="0" eaLnBrk="1" latinLnBrk="0" hangingPunct="1">
+              <a:lnSpc>
+                <a:spcPct val="90000"/>
+              </a:lnSpc>
+              <a:spcBef>
+                <a:spcPts val="1000"/>
+              </a:spcBef>
+              <a:buFont typeface="Arial" panose="020B0604020202020204" pitchFamily="34" charset="0"/>
+              <a:buChar char="•"/>
+              <a:defRPr sz="2800" kern="1200">
+                <a:solidFill>
+                  <a:schemeClr val="tx1"/>
+                </a:solidFill>
+                <a:latin typeface="+mn-lt"/>
+                <a:ea typeface="+mn-ea"/>
+                <a:cs typeface="+mn-cs"/>
+              </a:defRPr>
+            </a:lvl1pPr>
+            <a:lvl2pPr marL="685800" indent="-228600" algn="l" defTabSz="914400" rtl="0" eaLnBrk="1" latinLnBrk="0" hangingPunct="1">
+              <a:lnSpc>
+                <a:spcPct val="90000"/>
+              </a:lnSpc>
+              <a:spcBef>
+                <a:spcPts val="500"/>
+              </a:spcBef>
+              <a:buFont typeface="Arial" panose="020B0604020202020204" pitchFamily="34" charset="0"/>
+              <a:buChar char="•"/>
+              <a:defRPr sz="2400" kern="1200">
+                <a:solidFill>
+                  <a:schemeClr val="tx1"/>
+                </a:solidFill>
+                <a:latin typeface="+mn-lt"/>
+                <a:ea typeface="+mn-ea"/>
+                <a:cs typeface="+mn-cs"/>
+              </a:defRPr>
+            </a:lvl2pPr>
+            <a:lvl3pPr marL="1143000" indent="-228600" algn="l" defTabSz="914400" rtl="0" eaLnBrk="1" latinLnBrk="0" hangingPunct="1">
+              <a:lnSpc>
+                <a:spcPct val="90000"/>
+              </a:lnSpc>
+              <a:spcBef>
+                <a:spcPts val="500"/>
+              </a:spcBef>
+              <a:buFont typeface="Arial" panose="020B0604020202020204" pitchFamily="34" charset="0"/>
+              <a:buChar char="•"/>
+              <a:defRPr sz="2000" kern="1200">
+                <a:solidFill>
+                  <a:schemeClr val="tx1"/>
+                </a:solidFill>
+                <a:latin typeface="+mn-lt"/>
+                <a:ea typeface="+mn-ea"/>
+                <a:cs typeface="+mn-cs"/>
+              </a:defRPr>
+            </a:lvl3pPr>
+            <a:lvl4pPr marL="1600200" indent="-228600" algn="l" defTabSz="914400" rtl="0" eaLnBrk="1" latinLnBrk="0" hangingPunct="1">
+              <a:lnSpc>
+                <a:spcPct val="90000"/>
+              </a:lnSpc>
+              <a:spcBef>
+                <a:spcPts val="500"/>
+              </a:spcBef>
+              <a:buFont typeface="Arial" panose="020B0604020202020204" pitchFamily="34" charset="0"/>
+              <a:buChar char="•"/>
+              <a:defRPr sz="1800" kern="1200">
+                <a:solidFill>
+                  <a:schemeClr val="tx1"/>
+                </a:solidFill>
+                <a:latin typeface="+mn-lt"/>
+                <a:ea typeface="+mn-ea"/>
+                <a:cs typeface="+mn-cs"/>
+              </a:defRPr>
+            </a:lvl4pPr>
+            <a:lvl5pPr marL="2057400" indent="-228600" algn="l" defTabSz="914400" rtl="0" eaLnBrk="1" latinLnBrk="0" hangingPunct="1">
+              <a:lnSpc>
+                <a:spcPct val="90000"/>
+              </a:lnSpc>
+              <a:spcBef>
+                <a:spcPts val="500"/>
+              </a:spcBef>
+              <a:buFont typeface="Arial" panose="020B0604020202020204" pitchFamily="34" charset="0"/>
+              <a:buChar char="•"/>
+              <a:defRPr sz="1800" kern="1200">
+                <a:solidFill>
+                  <a:schemeClr val="tx1"/>
+                </a:solidFill>
+                <a:latin typeface="+mn-lt"/>
+                <a:ea typeface="+mn-ea"/>
+                <a:cs typeface="+mn-cs"/>
+              </a:defRPr>
+            </a:lvl5pPr>
+            <a:lvl6pPr marL="2514600" indent="-228600" algn="l" defTabSz="914400" rtl="0" eaLnBrk="1" latinLnBrk="0" hangingPunct="1">
+              <a:lnSpc>
+                <a:spcPct val="90000"/>
+              </a:lnSpc>
+              <a:spcBef>
+                <a:spcPts val="500"/>
+              </a:spcBef>
+              <a:buFont typeface="Arial" panose="020B0604020202020204" pitchFamily="34" charset="0"/>
+              <a:buChar char="•"/>
+              <a:defRPr sz="1800" kern="1200">
+                <a:solidFill>
+                  <a:schemeClr val="tx1"/>
+                </a:solidFill>
+                <a:latin typeface="+mn-lt"/>
+                <a:ea typeface="+mn-ea"/>
+                <a:cs typeface="+mn-cs"/>
+              </a:defRPr>
+            </a:lvl6pPr>
+            <a:lvl7pPr marL="2971800" indent="-228600" algn="l" defTabSz="914400" rtl="0" eaLnBrk="1" latinLnBrk="0" hangingPunct="1">
+              <a:lnSpc>
+                <a:spcPct val="90000"/>
+              </a:lnSpc>
+              <a:spcBef>
+                <a:spcPts val="500"/>
+              </a:spcBef>
+              <a:buFont typeface="Arial" panose="020B0604020202020204" pitchFamily="34" charset="0"/>
+              <a:buChar char="•"/>
+              <a:defRPr sz="1800" kern="1200">
+                <a:solidFill>
+                  <a:schemeClr val="tx1"/>
+                </a:solidFill>
+                <a:latin typeface="+mn-lt"/>
+                <a:ea typeface="+mn-ea"/>
+                <a:cs typeface="+mn-cs"/>
+              </a:defRPr>
+            </a:lvl7pPr>
+            <a:lvl8pPr marL="3429000" indent="-228600" algn="l" defTabSz="914400" rtl="0" eaLnBrk="1" latinLnBrk="0" hangingPunct="1">
+              <a:lnSpc>
+                <a:spcPct val="90000"/>
+              </a:lnSpc>
+              <a:spcBef>
+                <a:spcPts val="500"/>
+              </a:spcBef>
+              <a:buFont typeface="Arial" panose="020B0604020202020204" pitchFamily="34" charset="0"/>
+              <a:buChar char="•"/>
+              <a:defRPr sz="1800" kern="1200">
+                <a:solidFill>
+                  <a:schemeClr val="tx1"/>
+                </a:solidFill>
+                <a:latin typeface="+mn-lt"/>
+                <a:ea typeface="+mn-ea"/>
+                <a:cs typeface="+mn-cs"/>
+              </a:defRPr>
+            </a:lvl8pPr>
+            <a:lvl9pPr marL="3886200" indent="-228600" algn="l" defTabSz="914400" rtl="0" eaLnBrk="1" latinLnBrk="0" hangingPunct="1">
+              <a:lnSpc>
+                <a:spcPct val="90000"/>
+              </a:lnSpc>
+              <a:spcBef>
+                <a:spcPts val="500"/>
+              </a:spcBef>
+              <a:buFont typeface="Arial" panose="020B0604020202020204" pitchFamily="34" charset="0"/>
+              <a:buChar char="•"/>
+              <a:defRPr sz="1800" kern="1200">
+                <a:solidFill>
+                  <a:schemeClr val="tx1"/>
+                </a:solidFill>
+                <a:latin typeface="+mn-lt"/>
+                <a:ea typeface="+mn-ea"/>
+                <a:cs typeface="+mn-cs"/>
+              </a:defRPr>
+            </a:lvl9pPr>
+          </a:lstStyle>
+          <a:p>
+            <a:endParaRPr lang="en-US" dirty="0"/>
+          </a:p>
+        </p:txBody>
+      </p:sp>
+      <p:sp>
+        <p:nvSpPr>
+          <p:cNvPr id="3" name="Content Placeholder 2">
+            <a:extLst>
+              <a:ext uri="{FF2B5EF4-FFF2-40B4-BE49-F238E27FC236}">
+                <a16:creationId xmlns:a16="http://schemas.microsoft.com/office/drawing/2014/main" id="{DB566984-E5C5-ECC5-287A-D44DCCBB65C8}"/>
+              </a:ext>
+            </a:extLst>
+          </p:cNvPr>
+          <p:cNvSpPr txBox="1">
+            <a:spLocks/>
+          </p:cNvSpPr>
+          <p:nvPr/>
+        </p:nvSpPr>
+        <p:spPr>
+          <a:xfrm>
+            <a:off x="741946" y="1165257"/>
+            <a:ext cx="11086260" cy="5134478"/>
+          </a:xfrm>
+          <a:prstGeom prst="rect">
+            <a:avLst/>
+          </a:prstGeom>
+        </p:spPr>
+        <p:txBody>
+          <a:bodyPr vert="horz" lIns="91440" tIns="45720" rIns="91440" bIns="45720" rtlCol="0">
+            <a:normAutofit/>
+          </a:bodyPr>
+          <a:lstStyle>
+            <a:lvl1pPr marL="228600" indent="-228600" algn="l" defTabSz="914400" rtl="0" eaLnBrk="1" latinLnBrk="0" hangingPunct="1">
+              <a:lnSpc>
+                <a:spcPct val="90000"/>
+              </a:lnSpc>
+              <a:spcBef>
+                <a:spcPts val="1000"/>
+              </a:spcBef>
+              <a:buFont typeface="Arial" panose="020B0604020202020204" pitchFamily="34" charset="0"/>
+              <a:buChar char="•"/>
+              <a:defRPr sz="2800" kern="1200">
+                <a:solidFill>
+                  <a:schemeClr val="tx1"/>
+                </a:solidFill>
+                <a:latin typeface="+mn-lt"/>
+                <a:ea typeface="+mn-ea"/>
+                <a:cs typeface="+mn-cs"/>
+              </a:defRPr>
+            </a:lvl1pPr>
+            <a:lvl2pPr marL="685800" indent="-228600" algn="l" defTabSz="914400" rtl="0" eaLnBrk="1" latinLnBrk="0" hangingPunct="1">
+              <a:lnSpc>
+                <a:spcPct val="90000"/>
+              </a:lnSpc>
+              <a:spcBef>
+                <a:spcPts val="500"/>
+              </a:spcBef>
+              <a:buFont typeface="Arial" panose="020B0604020202020204" pitchFamily="34" charset="0"/>
+              <a:buChar char="•"/>
+              <a:defRPr sz="2400" kern="1200">
+                <a:solidFill>
+                  <a:schemeClr val="tx1"/>
+                </a:solidFill>
+                <a:latin typeface="+mn-lt"/>
+                <a:ea typeface="+mn-ea"/>
+                <a:cs typeface="+mn-cs"/>
+              </a:defRPr>
+            </a:lvl2pPr>
+            <a:lvl3pPr marL="1143000" indent="-228600" algn="l" defTabSz="914400" rtl="0" eaLnBrk="1" latinLnBrk="0" hangingPunct="1">
+              <a:lnSpc>
+                <a:spcPct val="90000"/>
+              </a:lnSpc>
+              <a:spcBef>
+                <a:spcPts val="500"/>
+              </a:spcBef>
+              <a:buFont typeface="Arial" panose="020B0604020202020204" pitchFamily="34" charset="0"/>
+              <a:buChar char="•"/>
+              <a:defRPr sz="2000" kern="1200">
+                <a:solidFill>
+                  <a:schemeClr val="tx1"/>
+                </a:solidFill>
+                <a:latin typeface="+mn-lt"/>
+                <a:ea typeface="+mn-ea"/>
+                <a:cs typeface="+mn-cs"/>
+              </a:defRPr>
+            </a:lvl3pPr>
+            <a:lvl4pPr marL="1600200" indent="-228600" algn="l" defTabSz="914400" rtl="0" eaLnBrk="1" latinLnBrk="0" hangingPunct="1">
+              <a:lnSpc>
+                <a:spcPct val="90000"/>
+              </a:lnSpc>
+              <a:spcBef>
+                <a:spcPts val="500"/>
+              </a:spcBef>
+              <a:buFont typeface="Arial" panose="020B0604020202020204" pitchFamily="34" charset="0"/>
+              <a:buChar char="•"/>
+              <a:defRPr sz="1800" kern="1200">
+                <a:solidFill>
+                  <a:schemeClr val="tx1"/>
+                </a:solidFill>
+                <a:latin typeface="+mn-lt"/>
+                <a:ea typeface="+mn-ea"/>
+                <a:cs typeface="+mn-cs"/>
+              </a:defRPr>
+            </a:lvl4pPr>
+            <a:lvl5pPr marL="2057400" indent="-228600" algn="l" defTabSz="914400" rtl="0" eaLnBrk="1" latinLnBrk="0" hangingPunct="1">
+              <a:lnSpc>
+                <a:spcPct val="90000"/>
+              </a:lnSpc>
+              <a:spcBef>
+                <a:spcPts val="500"/>
+              </a:spcBef>
+              <a:buFont typeface="Arial" panose="020B0604020202020204" pitchFamily="34" charset="0"/>
+              <a:buChar char="•"/>
+              <a:defRPr sz="1800" kern="1200">
+                <a:solidFill>
+                  <a:schemeClr val="tx1"/>
+                </a:solidFill>
+                <a:latin typeface="+mn-lt"/>
+                <a:ea typeface="+mn-ea"/>
+                <a:cs typeface="+mn-cs"/>
+              </a:defRPr>
+            </a:lvl5pPr>
+            <a:lvl6pPr marL="2514600" indent="-228600" algn="l" defTabSz="914400" rtl="0" eaLnBrk="1" latinLnBrk="0" hangingPunct="1">
+              <a:lnSpc>
+                <a:spcPct val="90000"/>
+              </a:lnSpc>
+              <a:spcBef>
+                <a:spcPts val="500"/>
+              </a:spcBef>
+              <a:buFont typeface="Arial" panose="020B0604020202020204" pitchFamily="34" charset="0"/>
+              <a:buChar char="•"/>
+              <a:defRPr sz="1800" kern="1200">
+                <a:solidFill>
+                  <a:schemeClr val="tx1"/>
+                </a:solidFill>
+                <a:latin typeface="+mn-lt"/>
+                <a:ea typeface="+mn-ea"/>
+                <a:cs typeface="+mn-cs"/>
+              </a:defRPr>
+            </a:lvl6pPr>
+            <a:lvl7pPr marL="2971800" indent="-228600" algn="l" defTabSz="914400" rtl="0" eaLnBrk="1" latinLnBrk="0" hangingPunct="1">
+              <a:lnSpc>
+                <a:spcPct val="90000"/>
+              </a:lnSpc>
+              <a:spcBef>
+                <a:spcPts val="500"/>
+              </a:spcBef>
+              <a:buFont typeface="Arial" panose="020B0604020202020204" pitchFamily="34" charset="0"/>
+              <a:buChar char="•"/>
+              <a:defRPr sz="1800" kern="1200">
+                <a:solidFill>
+                  <a:schemeClr val="tx1"/>
+                </a:solidFill>
+                <a:latin typeface="+mn-lt"/>
+                <a:ea typeface="+mn-ea"/>
+                <a:cs typeface="+mn-cs"/>
+              </a:defRPr>
+            </a:lvl7pPr>
+            <a:lvl8pPr marL="3429000" indent="-228600" algn="l" defTabSz="914400" rtl="0" eaLnBrk="1" latinLnBrk="0" hangingPunct="1">
+              <a:lnSpc>
+                <a:spcPct val="90000"/>
+              </a:lnSpc>
+              <a:spcBef>
+                <a:spcPts val="500"/>
+              </a:spcBef>
+              <a:buFont typeface="Arial" panose="020B0604020202020204" pitchFamily="34" charset="0"/>
+              <a:buChar char="•"/>
+              <a:defRPr sz="1800" kern="1200">
+                <a:solidFill>
+                  <a:schemeClr val="tx1"/>
+                </a:solidFill>
+                <a:latin typeface="+mn-lt"/>
+                <a:ea typeface="+mn-ea"/>
+                <a:cs typeface="+mn-cs"/>
+              </a:defRPr>
+            </a:lvl8pPr>
+            <a:lvl9pPr marL="3886200" indent="-228600" algn="l" defTabSz="914400" rtl="0" eaLnBrk="1" latinLnBrk="0" hangingPunct="1">
+              <a:lnSpc>
+                <a:spcPct val="90000"/>
+              </a:lnSpc>
+              <a:spcBef>
+                <a:spcPts val="500"/>
+              </a:spcBef>
+              <a:buFont typeface="Arial" panose="020B0604020202020204" pitchFamily="34" charset="0"/>
+              <a:buChar char="•"/>
+              <a:defRPr sz="1800" kern="1200">
+                <a:solidFill>
+                  <a:schemeClr val="tx1"/>
+                </a:solidFill>
+                <a:latin typeface="+mn-lt"/>
+                <a:ea typeface="+mn-ea"/>
+                <a:cs typeface="+mn-cs"/>
+              </a:defRPr>
+            </a:lvl9pPr>
+          </a:lstStyle>
+          <a:p>
+            <a:r>
+              <a:rPr lang="en-US" dirty="0"/>
+              <a:t>It’s free!</a:t>
+            </a:r>
+          </a:p>
+          <a:p>
+            <a:r>
+              <a:rPr lang="en-US" dirty="0"/>
+              <a:t>It’s (relatively) simple to learn</a:t>
+            </a:r>
+          </a:p>
+          <a:p>
+            <a:pPr lvl="1"/>
+            <a:r>
+              <a:rPr lang="en-US" dirty="0"/>
+              <a:t>“high-level” language: you don’t have to be a computer scientist to write code</a:t>
+            </a:r>
+          </a:p>
+          <a:p>
+            <a:r>
+              <a:rPr lang="en-US" dirty="0"/>
+              <a:t>It’s powerful</a:t>
+            </a:r>
+          </a:p>
+          <a:p>
+            <a:pPr lvl="1"/>
+            <a:r>
+              <a:rPr lang="en-US" dirty="0"/>
+              <a:t>Many sophisticated tools are already included</a:t>
+            </a:r>
+          </a:p>
+          <a:p>
+            <a:pPr lvl="1"/>
+            <a:r>
+              <a:rPr lang="en-US" dirty="0"/>
+              <a:t>Easy to install packages that do even more!</a:t>
+            </a:r>
+          </a:p>
+          <a:p>
+            <a:r>
+              <a:rPr lang="en-US" dirty="0"/>
+              <a:t>It’s everywhere</a:t>
+            </a:r>
+          </a:p>
+          <a:p>
+            <a:pPr lvl="1"/>
+            <a:r>
+              <a:rPr lang="en-US" dirty="0"/>
+              <a:t>R is becoming standard for research &amp; academia</a:t>
+            </a:r>
+          </a:p>
+          <a:p>
+            <a:r>
+              <a:rPr lang="en-US" dirty="0"/>
+              <a:t>It’s growing</a:t>
+            </a:r>
+          </a:p>
+          <a:p>
+            <a:pPr lvl="1"/>
+            <a:r>
+              <a:rPr lang="en-US" dirty="0"/>
+              <a:t>The worldwide R community is friendly, helpful, and diverse</a:t>
+            </a:r>
+          </a:p>
+          <a:p>
+            <a:pPr lvl="1"/>
+            <a:r>
+              <a:rPr lang="en-US" dirty="0"/>
+              <a:t>Continued development &amp; extension of new tools!</a:t>
+            </a:r>
+          </a:p>
+        </p:txBody>
+      </p:sp>
+    </p:spTree>
+    <p:extLst>
+      <p:ext uri="{BB962C8B-B14F-4D97-AF65-F5344CB8AC3E}">
+        <p14:creationId xmlns:p14="http://schemas.microsoft.com/office/powerpoint/2010/main" val="2466062801"/>
+      </p:ext>
+    </p:extLst>
+  </p:cSld>
+  <p:clrMapOvr>
+    <a:masterClrMapping/>
+  </p:clrMapOvr>
+  <p:timing>
+    <p:tnLst>
+      <p:par>
+        <p:cTn id="1" dur="indefinite" restart="never" nodeType="tmRoot">
+          <p:childTnLst>
+            <p:seq concurrent="1" nextAc="seek">
+              <p:cTn id="2" dur="indefinite" nodeType="mainSeq">
+                <p:childTnLst>
+                  <p:par>
+                    <p:cTn id="3" fill="hold">
+                      <p:stCondLst>
+                        <p:cond delay="indefinite"/>
+                      </p:stCondLst>
+                      <p:childTnLst>
+                        <p:par>
+                          <p:cTn id="4" fill="hold">
+                            <p:stCondLst>
+                              <p:cond delay="0"/>
+                            </p:stCondLst>
+                            <p:childTnLst>
+                              <p:par>
+                                <p:cTn id="5" presetID="1" presetClass="entr" presetSubtype="0" fill="hold" nodeType="clickEffect">
+                                  <p:stCondLst>
+                                    <p:cond delay="0"/>
+                                  </p:stCondLst>
+                                  <p:childTnLst>
+                                    <p:set>
+                                      <p:cBhvr>
+                                        <p:cTn id="6" dur="1" fill="hold">
+                                          <p:stCondLst>
+                                            <p:cond delay="0"/>
+                                          </p:stCondLst>
+                                        </p:cTn>
+                                        <p:tgtEl>
+                                          <p:spTgt spid="3">
+                                            <p:txEl>
+                                              <p:pRg st="0" end="0"/>
+                                            </p:txEl>
+                                          </p:spTgt>
+                                        </p:tgtEl>
+                                        <p:attrNameLst>
+                                          <p:attrName>style.visibility</p:attrName>
+                                        </p:attrNameLst>
+                                      </p:cBhvr>
+                                      <p:to>
+                                        <p:strVal val="visible"/>
+                                      </p:to>
+                                    </p:set>
+                                  </p:childTnLst>
+                                </p:cTn>
+                              </p:par>
+                            </p:childTnLst>
+                          </p:cTn>
+                        </p:par>
+                      </p:childTnLst>
+                    </p:cTn>
+                  </p:par>
+                  <p:par>
+                    <p:cTn id="7" fill="hold">
+                      <p:stCondLst>
+                        <p:cond delay="indefinite"/>
+                      </p:stCondLst>
+                      <p:childTnLst>
+                        <p:par>
+                          <p:cTn id="8" fill="hold">
+                            <p:stCondLst>
+                              <p:cond delay="0"/>
+                            </p:stCondLst>
+                            <p:childTnLst>
+                              <p:par>
+                                <p:cTn id="9" presetID="1" presetClass="entr" presetSubtype="0" fill="hold" nodeType="clickEffect">
+                                  <p:stCondLst>
+                                    <p:cond delay="0"/>
+                                  </p:stCondLst>
+                                  <p:childTnLst>
+                                    <p:set>
+                                      <p:cBhvr>
+                                        <p:cTn id="10" dur="1" fill="hold">
+                                          <p:stCondLst>
+                                            <p:cond delay="0"/>
+                                          </p:stCondLst>
+                                        </p:cTn>
+                                        <p:tgtEl>
+                                          <p:spTgt spid="3">
+                                            <p:txEl>
+                                              <p:pRg st="1" end="1"/>
+                                            </p:txEl>
+                                          </p:spTgt>
+                                        </p:tgtEl>
+                                        <p:attrNameLst>
+                                          <p:attrName>style.visibility</p:attrName>
+                                        </p:attrNameLst>
+                                      </p:cBhvr>
+                                      <p:to>
+                                        <p:strVal val="visible"/>
+                                      </p:to>
+                                    </p:set>
+                                  </p:childTnLst>
+                                </p:cTn>
+                              </p:par>
+                              <p:par>
+                                <p:cTn id="11" presetID="1" presetClass="entr" presetSubtype="0" fill="hold" nodeType="withEffect">
+                                  <p:stCondLst>
+                                    <p:cond delay="0"/>
+                                  </p:stCondLst>
+                                  <p:childTnLst>
+                                    <p:set>
+                                      <p:cBhvr>
+                                        <p:cTn id="12" dur="1" fill="hold">
+                                          <p:stCondLst>
+                                            <p:cond delay="0"/>
+                                          </p:stCondLst>
+                                        </p:cTn>
+                                        <p:tgtEl>
+                                          <p:spTgt spid="3">
+                                            <p:txEl>
+                                              <p:pRg st="2" end="2"/>
+                                            </p:txEl>
+                                          </p:spTgt>
+                                        </p:tgtEl>
+                                        <p:attrNameLst>
+                                          <p:attrName>style.visibility</p:attrName>
+                                        </p:attrNameLst>
+                                      </p:cBhvr>
+                                      <p:to>
+                                        <p:strVal val="visible"/>
+                                      </p:to>
+                                    </p:set>
+                                  </p:childTnLst>
+                                </p:cTn>
+                              </p:par>
+                            </p:childTnLst>
+                          </p:cTn>
+                        </p:par>
+                      </p:childTnLst>
+                    </p:cTn>
+                  </p:par>
+                  <p:par>
+                    <p:cTn id="13" fill="hold">
+                      <p:stCondLst>
+                        <p:cond delay="indefinite"/>
+                      </p:stCondLst>
+                      <p:childTnLst>
+                        <p:par>
+                          <p:cTn id="14" fill="hold">
+                            <p:stCondLst>
+                              <p:cond delay="0"/>
+                            </p:stCondLst>
+                            <p:childTnLst>
+                              <p:par>
+                                <p:cTn id="15" presetID="1" presetClass="entr" presetSubtype="0" fill="hold" nodeType="clickEffect">
+                                  <p:stCondLst>
+                                    <p:cond delay="0"/>
+                                  </p:stCondLst>
+                                  <p:childTnLst>
+                                    <p:set>
+                                      <p:cBhvr>
+                                        <p:cTn id="16" dur="1" fill="hold">
+                                          <p:stCondLst>
+                                            <p:cond delay="0"/>
+                                          </p:stCondLst>
+                                        </p:cTn>
+                                        <p:tgtEl>
+                                          <p:spTgt spid="3">
+                                            <p:txEl>
+                                              <p:pRg st="3" end="3"/>
+                                            </p:txEl>
+                                          </p:spTgt>
+                                        </p:tgtEl>
+                                        <p:attrNameLst>
+                                          <p:attrName>style.visibility</p:attrName>
+                                        </p:attrNameLst>
+                                      </p:cBhvr>
+                                      <p:to>
+                                        <p:strVal val="visible"/>
+                                      </p:to>
+                                    </p:set>
+                                  </p:childTnLst>
+                                </p:cTn>
+                              </p:par>
+                              <p:par>
+                                <p:cTn id="17" presetID="1" presetClass="entr" presetSubtype="0" fill="hold" nodeType="withEffect">
+                                  <p:stCondLst>
+                                    <p:cond delay="0"/>
+                                  </p:stCondLst>
+                                  <p:childTnLst>
+                                    <p:set>
+                                      <p:cBhvr>
+                                        <p:cTn id="18" dur="1" fill="hold">
+                                          <p:stCondLst>
+                                            <p:cond delay="0"/>
+                                          </p:stCondLst>
+                                        </p:cTn>
+                                        <p:tgtEl>
+                                          <p:spTgt spid="3">
+                                            <p:txEl>
+                                              <p:pRg st="4" end="4"/>
+                                            </p:txEl>
+                                          </p:spTgt>
+                                        </p:tgtEl>
+                                        <p:attrNameLst>
+                                          <p:attrName>style.visibility</p:attrName>
+                                        </p:attrNameLst>
+                                      </p:cBhvr>
+                                      <p:to>
+                                        <p:strVal val="visible"/>
+                                      </p:to>
+                                    </p:set>
+                                  </p:childTnLst>
+                                </p:cTn>
+                              </p:par>
+                              <p:par>
+                                <p:cTn id="19" presetID="1" presetClass="entr" presetSubtype="0" fill="hold" nodeType="withEffect">
+                                  <p:stCondLst>
+                                    <p:cond delay="0"/>
+                                  </p:stCondLst>
+                                  <p:childTnLst>
+                                    <p:set>
+                                      <p:cBhvr>
+                                        <p:cTn id="20" dur="1" fill="hold">
+                                          <p:stCondLst>
+                                            <p:cond delay="0"/>
+                                          </p:stCondLst>
+                                        </p:cTn>
+                                        <p:tgtEl>
+                                          <p:spTgt spid="3">
+                                            <p:txEl>
+                                              <p:pRg st="5" end="5"/>
+                                            </p:txEl>
+                                          </p:spTgt>
+                                        </p:tgtEl>
+                                        <p:attrNameLst>
+                                          <p:attrName>style.visibility</p:attrName>
+                                        </p:attrNameLst>
+                                      </p:cBhvr>
+                                      <p:to>
+                                        <p:strVal val="visible"/>
+                                      </p:to>
+                                    </p:set>
+                                  </p:childTnLst>
+                                </p:cTn>
+                              </p:par>
+                            </p:childTnLst>
+                          </p:cTn>
+                        </p:par>
+                      </p:childTnLst>
+                    </p:cTn>
+                  </p:par>
+                  <p:par>
+                    <p:cTn id="21" fill="hold">
+                      <p:stCondLst>
+                        <p:cond delay="indefinite"/>
+                      </p:stCondLst>
+                      <p:childTnLst>
+                        <p:par>
+                          <p:cTn id="22" fill="hold">
+                            <p:stCondLst>
+                              <p:cond delay="0"/>
+                            </p:stCondLst>
+                            <p:childTnLst>
+                              <p:par>
+                                <p:cTn id="23" presetID="1" presetClass="entr" presetSubtype="0" fill="hold" nodeType="clickEffect">
+                                  <p:stCondLst>
+                                    <p:cond delay="0"/>
+                                  </p:stCondLst>
+                                  <p:childTnLst>
+                                    <p:set>
+                                      <p:cBhvr>
+                                        <p:cTn id="24" dur="1" fill="hold">
+                                          <p:stCondLst>
+                                            <p:cond delay="0"/>
+                                          </p:stCondLst>
+                                        </p:cTn>
+                                        <p:tgtEl>
+                                          <p:spTgt spid="3">
+                                            <p:txEl>
+                                              <p:pRg st="6" end="6"/>
+                                            </p:txEl>
+                                          </p:spTgt>
+                                        </p:tgtEl>
+                                        <p:attrNameLst>
+                                          <p:attrName>style.visibility</p:attrName>
+                                        </p:attrNameLst>
+                                      </p:cBhvr>
+                                      <p:to>
+                                        <p:strVal val="visible"/>
+                                      </p:to>
+                                    </p:set>
+                                  </p:childTnLst>
+                                </p:cTn>
+                              </p:par>
+                              <p:par>
+                                <p:cTn id="25" presetID="1" presetClass="entr" presetSubtype="0" fill="hold" nodeType="withEffect">
+                                  <p:stCondLst>
+                                    <p:cond delay="0"/>
+                                  </p:stCondLst>
+                                  <p:childTnLst>
+                                    <p:set>
+                                      <p:cBhvr>
+                                        <p:cTn id="26" dur="1" fill="hold">
+                                          <p:stCondLst>
+                                            <p:cond delay="0"/>
+                                          </p:stCondLst>
+                                        </p:cTn>
+                                        <p:tgtEl>
+                                          <p:spTgt spid="3">
+                                            <p:txEl>
+                                              <p:pRg st="7" end="7"/>
+                                            </p:txEl>
+                                          </p:spTgt>
+                                        </p:tgtEl>
+                                        <p:attrNameLst>
+                                          <p:attrName>style.visibility</p:attrName>
+                                        </p:attrNameLst>
+                                      </p:cBhvr>
+                                      <p:to>
+                                        <p:strVal val="visible"/>
+                                      </p:to>
+                                    </p:set>
+                                  </p:childTnLst>
+                                </p:cTn>
+                              </p:par>
+                            </p:childTnLst>
+                          </p:cTn>
+                        </p:par>
+                      </p:childTnLst>
+                    </p:cTn>
+                  </p:par>
+                  <p:par>
+                    <p:cTn id="27" fill="hold">
+                      <p:stCondLst>
+                        <p:cond delay="indefinite"/>
+                      </p:stCondLst>
+                      <p:childTnLst>
+                        <p:par>
+                          <p:cTn id="28" fill="hold">
+                            <p:stCondLst>
+                              <p:cond delay="0"/>
+                            </p:stCondLst>
+                            <p:childTnLst>
+                              <p:par>
+                                <p:cTn id="29" presetID="1" presetClass="entr" presetSubtype="0" fill="hold" nodeType="clickEffect">
+                                  <p:stCondLst>
+                                    <p:cond delay="0"/>
+                                  </p:stCondLst>
+                                  <p:childTnLst>
+                                    <p:set>
+                                      <p:cBhvr>
+                                        <p:cTn id="30" dur="1" fill="hold">
+                                          <p:stCondLst>
+                                            <p:cond delay="0"/>
+                                          </p:stCondLst>
+                                        </p:cTn>
+                                        <p:tgtEl>
+                                          <p:spTgt spid="3">
+                                            <p:txEl>
+                                              <p:pRg st="8" end="8"/>
+                                            </p:txEl>
+                                          </p:spTgt>
+                                        </p:tgtEl>
+                                        <p:attrNameLst>
+                                          <p:attrName>style.visibility</p:attrName>
+                                        </p:attrNameLst>
+                                      </p:cBhvr>
+                                      <p:to>
+                                        <p:strVal val="visible"/>
+                                      </p:to>
+                                    </p:set>
+                                  </p:childTnLst>
+                                </p:cTn>
+                              </p:par>
+                              <p:par>
+                                <p:cTn id="31" presetID="1" presetClass="entr" presetSubtype="0" fill="hold" nodeType="withEffect">
+                                  <p:stCondLst>
+                                    <p:cond delay="0"/>
+                                  </p:stCondLst>
+                                  <p:childTnLst>
+                                    <p:set>
+                                      <p:cBhvr>
+                                        <p:cTn id="32" dur="1" fill="hold">
+                                          <p:stCondLst>
+                                            <p:cond delay="0"/>
+                                          </p:stCondLst>
+                                        </p:cTn>
+                                        <p:tgtEl>
+                                          <p:spTgt spid="3">
+                                            <p:txEl>
+                                              <p:pRg st="9" end="9"/>
+                                            </p:txEl>
+                                          </p:spTgt>
+                                        </p:tgtEl>
+                                        <p:attrNameLst>
+                                          <p:attrName>style.visibility</p:attrName>
+                                        </p:attrNameLst>
+                                      </p:cBhvr>
+                                      <p:to>
+                                        <p:strVal val="visible"/>
+                                      </p:to>
+                                    </p:set>
+                                  </p:childTnLst>
+                                </p:cTn>
+                              </p:par>
+                              <p:par>
+                                <p:cTn id="33" presetID="1" presetClass="entr" presetSubtype="0" fill="hold" nodeType="withEffect">
+                                  <p:stCondLst>
+                                    <p:cond delay="0"/>
+                                  </p:stCondLst>
+                                  <p:childTnLst>
+                                    <p:set>
+                                      <p:cBhvr>
+                                        <p:cTn id="34" dur="1" fill="hold">
+                                          <p:stCondLst>
+                                            <p:cond delay="0"/>
+                                          </p:stCondLst>
+                                        </p:cTn>
+                                        <p:tgtEl>
+                                          <p:spTgt spid="3">
+                                            <p:txEl>
+                                              <p:pRg st="10" end="10"/>
+                                            </p:txEl>
+                                          </p:spTgt>
+                                        </p:tgtEl>
+                                        <p:attrNameLst>
+                                          <p:attrName>style.visibility</p:attrName>
+                                        </p:attrNameLst>
+                                      </p:cBhvr>
+                                      <p:to>
+                                        <p:strVal val="visible"/>
+                                      </p:to>
+                                    </p:set>
+                                  </p:childTnLst>
+                                </p:cTn>
+                              </p:par>
+                            </p:childTnLst>
+                          </p:cTn>
+                        </p:par>
+                      </p:childTnLst>
+                    </p:cTn>
+                  </p:par>
+                </p:childTnLst>
+              </p:cTn>
+              <p:prevCondLst>
+                <p:cond evt="onPrev" delay="0">
+                  <p:tgtEl>
+                    <p:sldTgt/>
+                  </p:tgtEl>
+                </p:cond>
+              </p:prevCondLst>
+              <p:nextCondLst>
+                <p:cond evt="onNext" delay="0">
+                  <p:tgtEl>
+                    <p:sldTgt/>
+                  </p:tgtEl>
+                </p:cond>
+              </p:nextCondLst>
+            </p:seq>
+          </p:childTnLst>
+        </p:cTn>
+      </p:par>
+    </p:tnLst>
+  </p:timing>
+</p:sld>
+</file>
+
+<file path=ppt/slides/slide11.xml><?xml version="1.0" encoding="utf-8"?>
+<p:sld xmlns:a="http://schemas.openxmlformats.org/drawingml/2006/main" xmlns:r="http://schemas.openxmlformats.org/officeDocument/2006/relationships" xmlns:p="http://schemas.openxmlformats.org/presentationml/2006/main">
+  <p:cSld>
+    <p:spTree>
+      <p:nvGrpSpPr>
+        <p:cNvPr id="1" name=""/>
+        <p:cNvGrpSpPr/>
+        <p:nvPr/>
+      </p:nvGrpSpPr>
+      <p:grpSpPr>
+        <a:xfrm>
+          <a:off x="0" y="0"/>
+          <a:ext cx="0" cy="0"/>
+          <a:chOff x="0" y="0"/>
+          <a:chExt cx="0" cy="0"/>
+        </a:xfrm>
+      </p:grpSpPr>
+      <p:sp>
+        <p:nvSpPr>
+          <p:cNvPr id="2" name="Title 1">
+            <a:extLst>
+              <a:ext uri="{FF2B5EF4-FFF2-40B4-BE49-F238E27FC236}">
                 <a16:creationId xmlns:a16="http://schemas.microsoft.com/office/drawing/2014/main" id="{8DC51687-C4F4-4E91-B3D5-7EE1E4FF9785}"/>
               </a:ext>
             </a:extLst>
@@ -5374,7 +6362,7 @@
           <a:p>
             <a:fld id="{6D95AE55-B5F4-483D-AEFF-E8059F5502F5}" type="slidenum">
               <a:rPr lang="en-US" smtClean="0"/>
-              <a:t>10</a:t>
+              <a:t>11</a:t>
             </a:fld>
             <a:endParaRPr lang="en-US"/>
           </a:p>
@@ -7723,7 +8711,7 @@
 </p:sld>
 </file>
 
-<file path=ppt/slides/slide11.xml><?xml version="1.0" encoding="utf-8"?>
+<file path=ppt/slides/slide12.xml><?xml version="1.0" encoding="utf-8"?>
 <p:sld xmlns:a="http://schemas.openxmlformats.org/drawingml/2006/main" xmlns:r="http://schemas.openxmlformats.org/officeDocument/2006/relationships" xmlns:p="http://schemas.openxmlformats.org/presentationml/2006/main">
   <p:cSld>
     <p:spTree>
@@ -7855,7 +8843,7 @@
           <a:p>
             <a:fld id="{6D95AE55-B5F4-483D-AEFF-E8059F5502F5}" type="slidenum">
               <a:rPr lang="en-US" smtClean="0"/>
-              <a:t>11</a:t>
+              <a:t>12</a:t>
             </a:fld>
             <a:endParaRPr lang="en-US"/>
           </a:p>
@@ -9922,7 +10910,7 @@
 </p:sld>
 </file>
 
-<file path=ppt/slides/slide12.xml><?xml version="1.0" encoding="utf-8"?>
+<file path=ppt/slides/slide13.xml><?xml version="1.0" encoding="utf-8"?>
 <p:sld xmlns:a="http://schemas.openxmlformats.org/drawingml/2006/main" xmlns:r="http://schemas.openxmlformats.org/officeDocument/2006/relationships" xmlns:p="http://schemas.openxmlformats.org/presentationml/2006/main">
   <p:cSld>
     <p:spTree>
@@ -10076,7 +11064,7 @@
           <a:p>
             <a:fld id="{6D95AE55-B5F4-483D-AEFF-E8059F5502F5}" type="slidenum">
               <a:rPr lang="en-US" smtClean="0"/>
-              <a:t>12</a:t>
+              <a:t>13</a:t>
             </a:fld>
             <a:endParaRPr lang="en-US"/>
           </a:p>
@@ -10417,7 +11405,7 @@
 </p:sld>
 </file>
 
-<file path=ppt/slides/slide13.xml><?xml version="1.0" encoding="utf-8"?>
+<file path=ppt/slides/slide14.xml><?xml version="1.0" encoding="utf-8"?>
 <p:sld xmlns:a="http://schemas.openxmlformats.org/drawingml/2006/main" xmlns:r="http://schemas.openxmlformats.org/officeDocument/2006/relationships" xmlns:p="http://schemas.openxmlformats.org/presentationml/2006/main">
   <p:cSld>
     <p:spTree>
@@ -10580,7 +11568,7 @@
           <a:p>
             <a:fld id="{6D95AE55-B5F4-483D-AEFF-E8059F5502F5}" type="slidenum">
               <a:rPr lang="en-US" smtClean="0"/>
-              <a:t>13</a:t>
+              <a:t>14</a:t>
             </a:fld>
             <a:endParaRPr lang="en-US"/>
           </a:p>
@@ -10776,7 +11764,7 @@
 </p:sld>
 </file>
 
-<file path=ppt/slides/slide14.xml><?xml version="1.0" encoding="utf-8"?>
+<file path=ppt/slides/slide15.xml><?xml version="1.0" encoding="utf-8"?>
 <p:sld xmlns:a="http://schemas.openxmlformats.org/drawingml/2006/main" xmlns:r="http://schemas.openxmlformats.org/officeDocument/2006/relationships" xmlns:p="http://schemas.openxmlformats.org/presentationml/2006/main">
   <p:cSld>
     <p:spTree>
@@ -10939,7 +11927,7 @@
           <a:p>
             <a:fld id="{6D95AE55-B5F4-483D-AEFF-E8059F5502F5}" type="slidenum">
               <a:rPr lang="en-US" smtClean="0"/>
-              <a:t>14</a:t>
+              <a:t>15</a:t>
             </a:fld>
             <a:endParaRPr lang="en-US"/>
           </a:p>
@@ -11208,6 +12196,480 @@
           <a:chExt cx="0" cy="0"/>
         </a:xfrm>
       </p:grpSpPr>
+      <p:pic>
+        <p:nvPicPr>
+          <p:cNvPr id="5" name="Picture 4" descr="A blue smoke on a white background&#10;&#10;Description automatically generated">
+            <a:extLst>
+              <a:ext uri="{FF2B5EF4-FFF2-40B4-BE49-F238E27FC236}">
+                <a16:creationId xmlns:a16="http://schemas.microsoft.com/office/drawing/2014/main" id="{3D7F8E17-74EF-97EE-B202-8E2F88043E52}"/>
+              </a:ext>
+            </a:extLst>
+          </p:cNvPr>
+          <p:cNvPicPr>
+            <a:picLocks noChangeAspect="1"/>
+          </p:cNvPicPr>
+          <p:nvPr/>
+        </p:nvPicPr>
+        <p:blipFill>
+          <a:blip r:embed="rId2">
+            <a:clrChange>
+              <a:clrFrom>
+                <a:srgbClr val="FAFAFA"/>
+              </a:clrFrom>
+              <a:clrTo>
+                <a:srgbClr val="FAFAFA">
+                  <a:alpha val="0"/>
+                </a:srgbClr>
+              </a:clrTo>
+            </a:clrChange>
+            <a:extLst>
+              <a:ext uri="{28A0092B-C50C-407E-A947-70E740481C1C}">
+                <a14:useLocalDpi xmlns:a14="http://schemas.microsoft.com/office/drawing/2010/main" val="0"/>
+              </a:ext>
+            </a:extLst>
+          </a:blip>
+          <a:stretch>
+            <a:fillRect/>
+          </a:stretch>
+        </p:blipFill>
+        <p:spPr>
+          <a:xfrm rot="21243389">
+            <a:off x="2492284" y="-271777"/>
+            <a:ext cx="10314939" cy="2719384"/>
+          </a:xfrm>
+          <a:prstGeom prst="rect">
+            <a:avLst/>
+          </a:prstGeom>
+        </p:spPr>
+      </p:pic>
+      <p:sp>
+        <p:nvSpPr>
+          <p:cNvPr id="2" name="Title 1">
+            <a:extLst>
+              <a:ext uri="{FF2B5EF4-FFF2-40B4-BE49-F238E27FC236}">
+                <a16:creationId xmlns:a16="http://schemas.microsoft.com/office/drawing/2014/main" id="{DFAC539F-2378-0F99-6485-9AB89ECE9174}"/>
+              </a:ext>
+            </a:extLst>
+          </p:cNvPr>
+          <p:cNvSpPr>
+            <a:spLocks noGrp="1"/>
+          </p:cNvSpPr>
+          <p:nvPr>
+            <p:ph type="ctrTitle"/>
+          </p:nvPr>
+        </p:nvSpPr>
+        <p:spPr>
+          <a:xfrm>
+            <a:off x="3040182" y="1728055"/>
+            <a:ext cx="9219141" cy="798986"/>
+          </a:xfrm>
+        </p:spPr>
+        <p:txBody>
+          <a:bodyPr>
+            <a:noAutofit/>
+          </a:bodyPr>
+          <a:lstStyle/>
+          <a:p>
+            <a:r>
+              <a:rPr lang="en-US" sz="4400" b="1" dirty="0"/>
+              <a:t>…coming to a Teams window near you!</a:t>
+            </a:r>
+          </a:p>
+        </p:txBody>
+      </p:sp>
+      <p:sp>
+        <p:nvSpPr>
+          <p:cNvPr id="3" name="Subtitle 2">
+            <a:extLst>
+              <a:ext uri="{FF2B5EF4-FFF2-40B4-BE49-F238E27FC236}">
+                <a16:creationId xmlns:a16="http://schemas.microsoft.com/office/drawing/2014/main" id="{C5328A8B-D655-CF24-B165-16CB5410C26E}"/>
+              </a:ext>
+            </a:extLst>
+          </p:cNvPr>
+          <p:cNvSpPr>
+            <a:spLocks noGrp="1"/>
+          </p:cNvSpPr>
+          <p:nvPr>
+            <p:ph type="subTitle" idx="1"/>
+          </p:nvPr>
+        </p:nvSpPr>
+        <p:spPr>
+          <a:xfrm>
+            <a:off x="1002455" y="3616601"/>
+            <a:ext cx="8514080" cy="2949786"/>
+          </a:xfrm>
+        </p:spPr>
+        <p:txBody>
+          <a:bodyPr/>
+          <a:lstStyle/>
+          <a:p>
+            <a:pPr algn="l"/>
+            <a:r>
+              <a:rPr lang="en-US" i="1" dirty="0"/>
+              <a:t>The Virtual Meeting Housekeeping </a:t>
+            </a:r>
+            <a:r>
+              <a:rPr lang="en-US" i="1" dirty="0" err="1"/>
+              <a:t>Slide</a:t>
+            </a:r>
+            <a:r>
+              <a:rPr lang="en-US" i="1" baseline="30000" dirty="0" err="1"/>
+              <a:t>TM</a:t>
+            </a:r>
+            <a:endParaRPr lang="en-US" i="1" baseline="30000" dirty="0"/>
+          </a:p>
+          <a:p>
+            <a:pPr marL="342900" indent="-342900" algn="l">
+              <a:buFont typeface="Arial" panose="020B0604020202020204" pitchFamily="34" charset="0"/>
+              <a:buChar char="•"/>
+            </a:pPr>
+            <a:r>
+              <a:rPr lang="en-US" dirty="0"/>
+              <a:t>Please mute your microphone when you aren’t talking, but</a:t>
+            </a:r>
+          </a:p>
+          <a:p>
+            <a:pPr marL="342900" indent="-342900" algn="l">
+              <a:buFont typeface="Arial" panose="020B0604020202020204" pitchFamily="34" charset="0"/>
+              <a:buChar char="•"/>
+            </a:pPr>
+            <a:r>
+              <a:rPr lang="en-US" dirty="0"/>
+              <a:t>Please keep your camera on, if you’re comfortable doing so!</a:t>
+            </a:r>
+          </a:p>
+          <a:p>
+            <a:pPr marL="342900" indent="-342900" algn="l">
+              <a:buFont typeface="Arial" panose="020B0604020202020204" pitchFamily="34" charset="0"/>
+              <a:buChar char="•"/>
+            </a:pPr>
+            <a:r>
+              <a:rPr lang="en-US" dirty="0"/>
+              <a:t>HELP US KEEP THIS THING INTERACTIVE</a:t>
+            </a:r>
+          </a:p>
+          <a:p>
+            <a:pPr marL="342900" indent="-342900" algn="l">
+              <a:buFont typeface="Arial" panose="020B0604020202020204" pitchFamily="34" charset="0"/>
+              <a:buChar char="•"/>
+            </a:pPr>
+            <a:r>
+              <a:rPr lang="en-US" dirty="0"/>
+              <a:t>We will be monitoring the meeting chat, if that’s better for you</a:t>
+            </a:r>
+          </a:p>
+          <a:p>
+            <a:pPr marL="342900" indent="-342900" algn="l">
+              <a:buFont typeface="Arial" panose="020B0604020202020204" pitchFamily="34" charset="0"/>
+              <a:buChar char="•"/>
+            </a:pPr>
+            <a:r>
+              <a:rPr lang="en-US" dirty="0"/>
+              <a:t>Please resist the temptation to multitask</a:t>
+            </a:r>
+          </a:p>
+        </p:txBody>
+      </p:sp>
+      <p:pic>
+        <p:nvPicPr>
+          <p:cNvPr id="4" name="Picture 3" descr="A close up of a sign&#10;&#10;Description automatically generated">
+            <a:extLst>
+              <a:ext uri="{FF2B5EF4-FFF2-40B4-BE49-F238E27FC236}">
+                <a16:creationId xmlns:a16="http://schemas.microsoft.com/office/drawing/2014/main" id="{F7FB462F-D73F-D264-9907-A23708A7E74F}"/>
+              </a:ext>
+            </a:extLst>
+          </p:cNvPr>
+          <p:cNvPicPr>
+            <a:picLocks noChangeAspect="1"/>
+          </p:cNvPicPr>
+          <p:nvPr/>
+        </p:nvPicPr>
+        <p:blipFill rotWithShape="1">
+          <a:blip r:embed="rId3">
+            <a:extLst>
+              <a:ext uri="{28A0092B-C50C-407E-A947-70E740481C1C}">
+                <a14:useLocalDpi xmlns:a14="http://schemas.microsoft.com/office/drawing/2010/main" val="0"/>
+              </a:ext>
+            </a:extLst>
+          </a:blip>
+          <a:srcRect l="7087" t="11647" r="63578"/>
+          <a:stretch/>
+        </p:blipFill>
+        <p:spPr>
+          <a:xfrm>
+            <a:off x="0" y="0"/>
+            <a:ext cx="3180080" cy="3363439"/>
+          </a:xfrm>
+          <a:prstGeom prst="rect">
+            <a:avLst/>
+          </a:prstGeom>
+        </p:spPr>
+      </p:pic>
+      <p:pic>
+        <p:nvPicPr>
+          <p:cNvPr id="6" name="Content Placeholder 6" descr="A close up of a sign&#10;&#10;Description automatically generated">
+            <a:extLst>
+              <a:ext uri="{FF2B5EF4-FFF2-40B4-BE49-F238E27FC236}">
+                <a16:creationId xmlns:a16="http://schemas.microsoft.com/office/drawing/2014/main" id="{3D93F3F6-D0E6-A406-6F8F-21819EBBA7A1}"/>
+              </a:ext>
+            </a:extLst>
+          </p:cNvPr>
+          <p:cNvPicPr>
+            <a:picLocks noChangeAspect="1"/>
+          </p:cNvPicPr>
+          <p:nvPr/>
+        </p:nvPicPr>
+        <p:blipFill>
+          <a:blip r:embed="rId4">
+            <a:extLst>
+              <a:ext uri="{28A0092B-C50C-407E-A947-70E740481C1C}">
+                <a14:useLocalDpi xmlns:a14="http://schemas.microsoft.com/office/drawing/2010/main" val="0"/>
+              </a:ext>
+            </a:extLst>
+          </a:blip>
+          <a:stretch>
+            <a:fillRect/>
+          </a:stretch>
+        </p:blipFill>
+        <p:spPr>
+          <a:xfrm>
+            <a:off x="8479827" y="4162189"/>
+            <a:ext cx="4821743" cy="2781773"/>
+          </a:xfrm>
+          <a:prstGeom prst="rect">
+            <a:avLst/>
+          </a:prstGeom>
+        </p:spPr>
+      </p:pic>
+      <p:sp>
+        <p:nvSpPr>
+          <p:cNvPr id="7" name="Subtitle 2">
+            <a:extLst>
+              <a:ext uri="{FF2B5EF4-FFF2-40B4-BE49-F238E27FC236}">
+                <a16:creationId xmlns:a16="http://schemas.microsoft.com/office/drawing/2014/main" id="{D1CBF6D2-E801-F105-E1C5-13025732F0C6}"/>
+              </a:ext>
+            </a:extLst>
+          </p:cNvPr>
+          <p:cNvSpPr txBox="1">
+            <a:spLocks/>
+          </p:cNvSpPr>
+          <p:nvPr/>
+        </p:nvSpPr>
+        <p:spPr>
+          <a:xfrm>
+            <a:off x="5559294" y="2475854"/>
+            <a:ext cx="6361773" cy="620473"/>
+          </a:xfrm>
+          <a:prstGeom prst="rect">
+            <a:avLst/>
+          </a:prstGeom>
+        </p:spPr>
+        <p:txBody>
+          <a:bodyPr vert="horz" lIns="91440" tIns="45720" rIns="91440" bIns="45720" rtlCol="0">
+            <a:normAutofit/>
+          </a:bodyPr>
+          <a:lstStyle>
+            <a:lvl1pPr marL="0" indent="0" algn="ctr" defTabSz="914400" rtl="0" eaLnBrk="1" latinLnBrk="0" hangingPunct="1">
+              <a:lnSpc>
+                <a:spcPct val="90000"/>
+              </a:lnSpc>
+              <a:spcBef>
+                <a:spcPts val="1000"/>
+              </a:spcBef>
+              <a:buFont typeface="Arial" panose="020B0604020202020204" pitchFamily="34" charset="0"/>
+              <a:buNone/>
+              <a:defRPr sz="2400" kern="1200">
+                <a:solidFill>
+                  <a:schemeClr val="tx1"/>
+                </a:solidFill>
+                <a:latin typeface="+mn-lt"/>
+                <a:ea typeface="+mn-ea"/>
+                <a:cs typeface="+mn-cs"/>
+              </a:defRPr>
+            </a:lvl1pPr>
+            <a:lvl2pPr marL="457200" indent="0" algn="ctr" defTabSz="914400" rtl="0" eaLnBrk="1" latinLnBrk="0" hangingPunct="1">
+              <a:lnSpc>
+                <a:spcPct val="90000"/>
+              </a:lnSpc>
+              <a:spcBef>
+                <a:spcPts val="500"/>
+              </a:spcBef>
+              <a:buFont typeface="Arial" panose="020B0604020202020204" pitchFamily="34" charset="0"/>
+              <a:buNone/>
+              <a:defRPr sz="2000" kern="1200">
+                <a:solidFill>
+                  <a:schemeClr val="tx1"/>
+                </a:solidFill>
+                <a:latin typeface="+mn-lt"/>
+                <a:ea typeface="+mn-ea"/>
+                <a:cs typeface="+mn-cs"/>
+              </a:defRPr>
+            </a:lvl2pPr>
+            <a:lvl3pPr marL="914400" indent="0" algn="ctr" defTabSz="914400" rtl="0" eaLnBrk="1" latinLnBrk="0" hangingPunct="1">
+              <a:lnSpc>
+                <a:spcPct val="90000"/>
+              </a:lnSpc>
+              <a:spcBef>
+                <a:spcPts val="500"/>
+              </a:spcBef>
+              <a:buFont typeface="Arial" panose="020B0604020202020204" pitchFamily="34" charset="0"/>
+              <a:buNone/>
+              <a:defRPr sz="1800" kern="1200">
+                <a:solidFill>
+                  <a:schemeClr val="tx1"/>
+                </a:solidFill>
+                <a:latin typeface="+mn-lt"/>
+                <a:ea typeface="+mn-ea"/>
+                <a:cs typeface="+mn-cs"/>
+              </a:defRPr>
+            </a:lvl3pPr>
+            <a:lvl4pPr marL="1371600" indent="0" algn="ctr" defTabSz="914400" rtl="0" eaLnBrk="1" latinLnBrk="0" hangingPunct="1">
+              <a:lnSpc>
+                <a:spcPct val="90000"/>
+              </a:lnSpc>
+              <a:spcBef>
+                <a:spcPts val="500"/>
+              </a:spcBef>
+              <a:buFont typeface="Arial" panose="020B0604020202020204" pitchFamily="34" charset="0"/>
+              <a:buNone/>
+              <a:defRPr sz="1600" kern="1200">
+                <a:solidFill>
+                  <a:schemeClr val="tx1"/>
+                </a:solidFill>
+                <a:latin typeface="+mn-lt"/>
+                <a:ea typeface="+mn-ea"/>
+                <a:cs typeface="+mn-cs"/>
+              </a:defRPr>
+            </a:lvl4pPr>
+            <a:lvl5pPr marL="1828800" indent="0" algn="ctr" defTabSz="914400" rtl="0" eaLnBrk="1" latinLnBrk="0" hangingPunct="1">
+              <a:lnSpc>
+                <a:spcPct val="90000"/>
+              </a:lnSpc>
+              <a:spcBef>
+                <a:spcPts val="500"/>
+              </a:spcBef>
+              <a:buFont typeface="Arial" panose="020B0604020202020204" pitchFamily="34" charset="0"/>
+              <a:buNone/>
+              <a:defRPr sz="1600" kern="1200">
+                <a:solidFill>
+                  <a:schemeClr val="tx1"/>
+                </a:solidFill>
+                <a:latin typeface="+mn-lt"/>
+                <a:ea typeface="+mn-ea"/>
+                <a:cs typeface="+mn-cs"/>
+              </a:defRPr>
+            </a:lvl5pPr>
+            <a:lvl6pPr marL="2286000" indent="0" algn="ctr" defTabSz="914400" rtl="0" eaLnBrk="1" latinLnBrk="0" hangingPunct="1">
+              <a:lnSpc>
+                <a:spcPct val="90000"/>
+              </a:lnSpc>
+              <a:spcBef>
+                <a:spcPts val="500"/>
+              </a:spcBef>
+              <a:buFont typeface="Arial" panose="020B0604020202020204" pitchFamily="34" charset="0"/>
+              <a:buNone/>
+              <a:defRPr sz="1600" kern="1200">
+                <a:solidFill>
+                  <a:schemeClr val="tx1"/>
+                </a:solidFill>
+                <a:latin typeface="+mn-lt"/>
+                <a:ea typeface="+mn-ea"/>
+                <a:cs typeface="+mn-cs"/>
+              </a:defRPr>
+            </a:lvl6pPr>
+            <a:lvl7pPr marL="2743200" indent="0" algn="ctr" defTabSz="914400" rtl="0" eaLnBrk="1" latinLnBrk="0" hangingPunct="1">
+              <a:lnSpc>
+                <a:spcPct val="90000"/>
+              </a:lnSpc>
+              <a:spcBef>
+                <a:spcPts val="500"/>
+              </a:spcBef>
+              <a:buFont typeface="Arial" panose="020B0604020202020204" pitchFamily="34" charset="0"/>
+              <a:buNone/>
+              <a:defRPr sz="1600" kern="1200">
+                <a:solidFill>
+                  <a:schemeClr val="tx1"/>
+                </a:solidFill>
+                <a:latin typeface="+mn-lt"/>
+                <a:ea typeface="+mn-ea"/>
+                <a:cs typeface="+mn-cs"/>
+              </a:defRPr>
+            </a:lvl7pPr>
+            <a:lvl8pPr marL="3200400" indent="0" algn="ctr" defTabSz="914400" rtl="0" eaLnBrk="1" latinLnBrk="0" hangingPunct="1">
+              <a:lnSpc>
+                <a:spcPct val="90000"/>
+              </a:lnSpc>
+              <a:spcBef>
+                <a:spcPts val="500"/>
+              </a:spcBef>
+              <a:buFont typeface="Arial" panose="020B0604020202020204" pitchFamily="34" charset="0"/>
+              <a:buNone/>
+              <a:defRPr sz="1600" kern="1200">
+                <a:solidFill>
+                  <a:schemeClr val="tx1"/>
+                </a:solidFill>
+                <a:latin typeface="+mn-lt"/>
+                <a:ea typeface="+mn-ea"/>
+                <a:cs typeface="+mn-cs"/>
+              </a:defRPr>
+            </a:lvl8pPr>
+            <a:lvl9pPr marL="3657600" indent="0" algn="ctr" defTabSz="914400" rtl="0" eaLnBrk="1" latinLnBrk="0" hangingPunct="1">
+              <a:lnSpc>
+                <a:spcPct val="90000"/>
+              </a:lnSpc>
+              <a:spcBef>
+                <a:spcPts val="500"/>
+              </a:spcBef>
+              <a:buFont typeface="Arial" panose="020B0604020202020204" pitchFamily="34" charset="0"/>
+              <a:buNone/>
+              <a:defRPr sz="1600" kern="1200">
+                <a:solidFill>
+                  <a:schemeClr val="tx1"/>
+                </a:solidFill>
+                <a:latin typeface="+mn-lt"/>
+                <a:ea typeface="+mn-ea"/>
+                <a:cs typeface="+mn-cs"/>
+              </a:defRPr>
+            </a:lvl9pPr>
+          </a:lstStyle>
+          <a:p>
+            <a:r>
+              <a:rPr lang="en-US" sz="2800" dirty="0"/>
+              <a:t>(thanks for your flexibility)</a:t>
+            </a:r>
+          </a:p>
+        </p:txBody>
+      </p:sp>
+    </p:spTree>
+    <p:extLst>
+      <p:ext uri="{BB962C8B-B14F-4D97-AF65-F5344CB8AC3E}">
+        <p14:creationId xmlns:p14="http://schemas.microsoft.com/office/powerpoint/2010/main" val="1955116907"/>
+      </p:ext>
+    </p:extLst>
+  </p:cSld>
+  <p:clrMapOvr>
+    <a:masterClrMapping/>
+  </p:clrMapOvr>
+</p:sld>
+</file>
+
+<file path=ppt/slides/slide3.xml><?xml version="1.0" encoding="utf-8"?>
+<p:sld xmlns:a="http://schemas.openxmlformats.org/drawingml/2006/main" xmlns:r="http://schemas.openxmlformats.org/officeDocument/2006/relationships" xmlns:p="http://schemas.openxmlformats.org/presentationml/2006/main">
+  <p:cSld>
+    <p:spTree>
+      <p:nvGrpSpPr>
+        <p:cNvPr id="1" name=""/>
+        <p:cNvGrpSpPr/>
+        <p:nvPr/>
+      </p:nvGrpSpPr>
+      <p:grpSpPr>
+        <a:xfrm>
+          <a:off x="0" y="0"/>
+          <a:ext cx="0" cy="0"/>
+          <a:chOff x="0" y="0"/>
+          <a:chExt cx="0" cy="0"/>
+        </a:xfrm>
+      </p:grpSpPr>
       <p:sp>
         <p:nvSpPr>
           <p:cNvPr id="2" name="Title 1">
@@ -11374,7 +12836,7 @@
                   <a:spcPts val="600"/>
                 </a:spcAft>
               </a:pPr>
-              <a:t>2</a:t>
+              <a:t>3</a:t>
             </a:fld>
             <a:endParaRPr lang="en-US">
               <a:solidFill>
@@ -13466,7 +14928,7 @@
 </p:sld>
 </file>
 
-<file path=ppt/slides/slide3.xml><?xml version="1.0" encoding="utf-8"?>
+<file path=ppt/slides/slide4.xml><?xml version="1.0" encoding="utf-8"?>
 <p:sld xmlns:a="http://schemas.openxmlformats.org/drawingml/2006/main" xmlns:r="http://schemas.openxmlformats.org/officeDocument/2006/relationships" xmlns:p="http://schemas.openxmlformats.org/presentationml/2006/main">
   <p:cSld>
     <p:spTree>
@@ -13610,7 +15072,7 @@
           <a:p>
             <a:fld id="{6D95AE55-B5F4-483D-AEFF-E8059F5502F5}" type="slidenum">
               <a:rPr lang="en-US" smtClean="0"/>
-              <a:t>3</a:t>
+              <a:t>4</a:t>
             </a:fld>
             <a:endParaRPr lang="en-US"/>
           </a:p>
@@ -15029,7 +16491,7 @@
 </p:sld>
 </file>
 
-<file path=ppt/slides/slide4.xml><?xml version="1.0" encoding="utf-8"?>
+<file path=ppt/slides/slide5.xml><?xml version="1.0" encoding="utf-8"?>
 <p:sld xmlns:a="http://schemas.openxmlformats.org/drawingml/2006/main" xmlns:r="http://schemas.openxmlformats.org/officeDocument/2006/relationships" xmlns:p="http://schemas.openxmlformats.org/presentationml/2006/main">
   <p:cSld>
     <p:spTree>
@@ -15221,7 +16683,7 @@
           <a:p>
             <a:fld id="{6D95AE55-B5F4-483D-AEFF-E8059F5502F5}" type="slidenum">
               <a:rPr lang="en-US" smtClean="0"/>
-              <a:t>4</a:t>
+              <a:t>5</a:t>
             </a:fld>
             <a:endParaRPr lang="en-US" dirty="0"/>
           </a:p>
@@ -15601,7 +17063,7 @@
 </p:sld>
 </file>
 
-<file path=ppt/slides/slide5.xml><?xml version="1.0" encoding="utf-8"?>
+<file path=ppt/slides/slide6.xml><?xml version="1.0" encoding="utf-8"?>
 <p:sld xmlns:a="http://schemas.openxmlformats.org/drawingml/2006/main" xmlns:r="http://schemas.openxmlformats.org/officeDocument/2006/relationships" xmlns:p="http://schemas.openxmlformats.org/presentationml/2006/main">
   <p:cSld>
     <p:spTree>
@@ -15758,7 +17220,7 @@
           <a:p>
             <a:fld id="{6D95AE55-B5F4-483D-AEFF-E8059F5502F5}" type="slidenum">
               <a:rPr lang="en-US" smtClean="0"/>
-              <a:t>5</a:t>
+              <a:t>6</a:t>
             </a:fld>
             <a:endParaRPr lang="en-US"/>
           </a:p>
@@ -16181,7 +17643,7 @@
 </p:sld>
 </file>
 
-<file path=ppt/slides/slide6.xml><?xml version="1.0" encoding="utf-8"?>
+<file path=ppt/slides/slide7.xml><?xml version="1.0" encoding="utf-8"?>
 <p:sld xmlns:a="http://schemas.openxmlformats.org/drawingml/2006/main" xmlns:r="http://schemas.openxmlformats.org/officeDocument/2006/relationships" xmlns:p="http://schemas.openxmlformats.org/presentationml/2006/main">
   <p:cSld>
     <p:spTree>
@@ -16249,7 +17711,7 @@
           <a:p>
             <a:fld id="{6D95AE55-B5F4-483D-AEFF-E8059F5502F5}" type="slidenum">
               <a:rPr lang="en-US" smtClean="0"/>
-              <a:t>6</a:t>
+              <a:t>7</a:t>
             </a:fld>
             <a:endParaRPr lang="en-US"/>
           </a:p>
@@ -16879,7 +18341,7 @@
 </p:sld>
 </file>
 
-<file path=ppt/slides/slide7.xml><?xml version="1.0" encoding="utf-8"?>
+<file path=ppt/slides/slide8.xml><?xml version="1.0" encoding="utf-8"?>
 <p:sld xmlns:a="http://schemas.openxmlformats.org/drawingml/2006/main" xmlns:r="http://schemas.openxmlformats.org/officeDocument/2006/relationships" xmlns:p="http://schemas.openxmlformats.org/presentationml/2006/main">
   <p:cSld>
     <p:spTree>
@@ -17894,7 +19356,7 @@
 </p:sld>
 </file>
 
-<file path=ppt/slides/slide8.xml><?xml version="1.0" encoding="utf-8"?>
+<file path=ppt/slides/slide9.xml><?xml version="1.0" encoding="utf-8"?>
 <p:sld xmlns:a="http://schemas.openxmlformats.org/drawingml/2006/main" xmlns:r="http://schemas.openxmlformats.org/officeDocument/2006/relationships" xmlns:p="http://schemas.openxmlformats.org/presentationml/2006/main">
   <p:cSld>
     <p:spTree>
@@ -17981,993 +19443,6 @@
   <p:clrMapOvr>
     <a:masterClrMapping/>
   </p:clrMapOvr>
-</p:sld>
-</file>
-
-<file path=ppt/slides/slide9.xml><?xml version="1.0" encoding="utf-8"?>
-<p:sld xmlns:a="http://schemas.openxmlformats.org/drawingml/2006/main" xmlns:r="http://schemas.openxmlformats.org/officeDocument/2006/relationships" xmlns:p="http://schemas.openxmlformats.org/presentationml/2006/main">
-  <p:cSld>
-    <p:spTree>
-      <p:nvGrpSpPr>
-        <p:cNvPr id="1" name=""/>
-        <p:cNvGrpSpPr/>
-        <p:nvPr/>
-      </p:nvGrpSpPr>
-      <p:grpSpPr>
-        <a:xfrm>
-          <a:off x="0" y="0"/>
-          <a:ext cx="0" cy="0"/>
-          <a:chOff x="0" y="0"/>
-          <a:chExt cx="0" cy="0"/>
-        </a:xfrm>
-      </p:grpSpPr>
-      <p:sp>
-        <p:nvSpPr>
-          <p:cNvPr id="2" name="Title 1">
-            <a:extLst>
-              <a:ext uri="{FF2B5EF4-FFF2-40B4-BE49-F238E27FC236}">
-                <a16:creationId xmlns:a16="http://schemas.microsoft.com/office/drawing/2014/main" id="{8115451F-211E-5062-3063-EEFCC622ABEA}"/>
-              </a:ext>
-            </a:extLst>
-          </p:cNvPr>
-          <p:cNvSpPr>
-            <a:spLocks noGrp="1"/>
-          </p:cNvSpPr>
-          <p:nvPr>
-            <p:ph type="title"/>
-          </p:nvPr>
-        </p:nvSpPr>
-        <p:spPr>
-          <a:xfrm>
-            <a:off x="741947" y="1"/>
-            <a:ext cx="10515600" cy="914400"/>
-          </a:xfrm>
-        </p:spPr>
-        <p:txBody>
-          <a:bodyPr>
-            <a:noAutofit/>
-          </a:bodyPr>
-          <a:lstStyle/>
-          <a:p>
-            <a:r>
-              <a:rPr lang="en-US" sz="3600" b="1" dirty="0"/>
-              <a:t>Ok, so why R?</a:t>
-            </a:r>
-          </a:p>
-        </p:txBody>
-      </p:sp>
-      <p:sp>
-        <p:nvSpPr>
-          <p:cNvPr id="19" name="Content Placeholder 2">
-            <a:extLst>
-              <a:ext uri="{FF2B5EF4-FFF2-40B4-BE49-F238E27FC236}">
-                <a16:creationId xmlns:a16="http://schemas.microsoft.com/office/drawing/2014/main" id="{1E59D450-1D15-06EF-3C95-D5BD186D82C4}"/>
-              </a:ext>
-            </a:extLst>
-          </p:cNvPr>
-          <p:cNvSpPr txBox="1">
-            <a:spLocks/>
-          </p:cNvSpPr>
-          <p:nvPr/>
-        </p:nvSpPr>
-        <p:spPr>
-          <a:xfrm>
-            <a:off x="741946" y="1165257"/>
-            <a:ext cx="8461047" cy="2649659"/>
-          </a:xfrm>
-          <a:prstGeom prst="rect">
-            <a:avLst/>
-          </a:prstGeom>
-        </p:spPr>
-        <p:txBody>
-          <a:bodyPr vert="horz" lIns="91440" tIns="45720" rIns="91440" bIns="45720" rtlCol="0">
-            <a:normAutofit/>
-          </a:bodyPr>
-          <a:lstStyle>
-            <a:lvl1pPr marL="228600" indent="-228600" algn="l" defTabSz="914400" rtl="0" eaLnBrk="1" latinLnBrk="0" hangingPunct="1">
-              <a:lnSpc>
-                <a:spcPct val="90000"/>
-              </a:lnSpc>
-              <a:spcBef>
-                <a:spcPts val="1000"/>
-              </a:spcBef>
-              <a:buFont typeface="Arial" panose="020B0604020202020204" pitchFamily="34" charset="0"/>
-              <a:buChar char="•"/>
-              <a:defRPr sz="2800" kern="1200">
-                <a:solidFill>
-                  <a:schemeClr val="tx1"/>
-                </a:solidFill>
-                <a:latin typeface="+mn-lt"/>
-                <a:ea typeface="+mn-ea"/>
-                <a:cs typeface="+mn-cs"/>
-              </a:defRPr>
-            </a:lvl1pPr>
-            <a:lvl2pPr marL="685800" indent="-228600" algn="l" defTabSz="914400" rtl="0" eaLnBrk="1" latinLnBrk="0" hangingPunct="1">
-              <a:lnSpc>
-                <a:spcPct val="90000"/>
-              </a:lnSpc>
-              <a:spcBef>
-                <a:spcPts val="500"/>
-              </a:spcBef>
-              <a:buFont typeface="Arial" panose="020B0604020202020204" pitchFamily="34" charset="0"/>
-              <a:buChar char="•"/>
-              <a:defRPr sz="2400" kern="1200">
-                <a:solidFill>
-                  <a:schemeClr val="tx1"/>
-                </a:solidFill>
-                <a:latin typeface="+mn-lt"/>
-                <a:ea typeface="+mn-ea"/>
-                <a:cs typeface="+mn-cs"/>
-              </a:defRPr>
-            </a:lvl2pPr>
-            <a:lvl3pPr marL="1143000" indent="-228600" algn="l" defTabSz="914400" rtl="0" eaLnBrk="1" latinLnBrk="0" hangingPunct="1">
-              <a:lnSpc>
-                <a:spcPct val="90000"/>
-              </a:lnSpc>
-              <a:spcBef>
-                <a:spcPts val="500"/>
-              </a:spcBef>
-              <a:buFont typeface="Arial" panose="020B0604020202020204" pitchFamily="34" charset="0"/>
-              <a:buChar char="•"/>
-              <a:defRPr sz="2000" kern="1200">
-                <a:solidFill>
-                  <a:schemeClr val="tx1"/>
-                </a:solidFill>
-                <a:latin typeface="+mn-lt"/>
-                <a:ea typeface="+mn-ea"/>
-                <a:cs typeface="+mn-cs"/>
-              </a:defRPr>
-            </a:lvl3pPr>
-            <a:lvl4pPr marL="1600200" indent="-228600" algn="l" defTabSz="914400" rtl="0" eaLnBrk="1" latinLnBrk="0" hangingPunct="1">
-              <a:lnSpc>
-                <a:spcPct val="90000"/>
-              </a:lnSpc>
-              <a:spcBef>
-                <a:spcPts val="500"/>
-              </a:spcBef>
-              <a:buFont typeface="Arial" panose="020B0604020202020204" pitchFamily="34" charset="0"/>
-              <a:buChar char="•"/>
-              <a:defRPr sz="1800" kern="1200">
-                <a:solidFill>
-                  <a:schemeClr val="tx1"/>
-                </a:solidFill>
-                <a:latin typeface="+mn-lt"/>
-                <a:ea typeface="+mn-ea"/>
-                <a:cs typeface="+mn-cs"/>
-              </a:defRPr>
-            </a:lvl4pPr>
-            <a:lvl5pPr marL="2057400" indent="-228600" algn="l" defTabSz="914400" rtl="0" eaLnBrk="1" latinLnBrk="0" hangingPunct="1">
-              <a:lnSpc>
-                <a:spcPct val="90000"/>
-              </a:lnSpc>
-              <a:spcBef>
-                <a:spcPts val="500"/>
-              </a:spcBef>
-              <a:buFont typeface="Arial" panose="020B0604020202020204" pitchFamily="34" charset="0"/>
-              <a:buChar char="•"/>
-              <a:defRPr sz="1800" kern="1200">
-                <a:solidFill>
-                  <a:schemeClr val="tx1"/>
-                </a:solidFill>
-                <a:latin typeface="+mn-lt"/>
-                <a:ea typeface="+mn-ea"/>
-                <a:cs typeface="+mn-cs"/>
-              </a:defRPr>
-            </a:lvl5pPr>
-            <a:lvl6pPr marL="2514600" indent="-228600" algn="l" defTabSz="914400" rtl="0" eaLnBrk="1" latinLnBrk="0" hangingPunct="1">
-              <a:lnSpc>
-                <a:spcPct val="90000"/>
-              </a:lnSpc>
-              <a:spcBef>
-                <a:spcPts val="500"/>
-              </a:spcBef>
-              <a:buFont typeface="Arial" panose="020B0604020202020204" pitchFamily="34" charset="0"/>
-              <a:buChar char="•"/>
-              <a:defRPr sz="1800" kern="1200">
-                <a:solidFill>
-                  <a:schemeClr val="tx1"/>
-                </a:solidFill>
-                <a:latin typeface="+mn-lt"/>
-                <a:ea typeface="+mn-ea"/>
-                <a:cs typeface="+mn-cs"/>
-              </a:defRPr>
-            </a:lvl6pPr>
-            <a:lvl7pPr marL="2971800" indent="-228600" algn="l" defTabSz="914400" rtl="0" eaLnBrk="1" latinLnBrk="0" hangingPunct="1">
-              <a:lnSpc>
-                <a:spcPct val="90000"/>
-              </a:lnSpc>
-              <a:spcBef>
-                <a:spcPts val="500"/>
-              </a:spcBef>
-              <a:buFont typeface="Arial" panose="020B0604020202020204" pitchFamily="34" charset="0"/>
-              <a:buChar char="•"/>
-              <a:defRPr sz="1800" kern="1200">
-                <a:solidFill>
-                  <a:schemeClr val="tx1"/>
-                </a:solidFill>
-                <a:latin typeface="+mn-lt"/>
-                <a:ea typeface="+mn-ea"/>
-                <a:cs typeface="+mn-cs"/>
-              </a:defRPr>
-            </a:lvl7pPr>
-            <a:lvl8pPr marL="3429000" indent="-228600" algn="l" defTabSz="914400" rtl="0" eaLnBrk="1" latinLnBrk="0" hangingPunct="1">
-              <a:lnSpc>
-                <a:spcPct val="90000"/>
-              </a:lnSpc>
-              <a:spcBef>
-                <a:spcPts val="500"/>
-              </a:spcBef>
-              <a:buFont typeface="Arial" panose="020B0604020202020204" pitchFamily="34" charset="0"/>
-              <a:buChar char="•"/>
-              <a:defRPr sz="1800" kern="1200">
-                <a:solidFill>
-                  <a:schemeClr val="tx1"/>
-                </a:solidFill>
-                <a:latin typeface="+mn-lt"/>
-                <a:ea typeface="+mn-ea"/>
-                <a:cs typeface="+mn-cs"/>
-              </a:defRPr>
-            </a:lvl8pPr>
-            <a:lvl9pPr marL="3886200" indent="-228600" algn="l" defTabSz="914400" rtl="0" eaLnBrk="1" latinLnBrk="0" hangingPunct="1">
-              <a:lnSpc>
-                <a:spcPct val="90000"/>
-              </a:lnSpc>
-              <a:spcBef>
-                <a:spcPts val="500"/>
-              </a:spcBef>
-              <a:buFont typeface="Arial" panose="020B0604020202020204" pitchFamily="34" charset="0"/>
-              <a:buChar char="•"/>
-              <a:defRPr sz="1800" kern="1200">
-                <a:solidFill>
-                  <a:schemeClr val="tx1"/>
-                </a:solidFill>
-                <a:latin typeface="+mn-lt"/>
-                <a:ea typeface="+mn-ea"/>
-                <a:cs typeface="+mn-cs"/>
-              </a:defRPr>
-            </a:lvl9pPr>
-          </a:lstStyle>
-          <a:p>
-            <a:endParaRPr lang="en-US" dirty="0"/>
-          </a:p>
-        </p:txBody>
-      </p:sp>
-      <p:sp>
-        <p:nvSpPr>
-          <p:cNvPr id="3" name="Content Placeholder 2">
-            <a:extLst>
-              <a:ext uri="{FF2B5EF4-FFF2-40B4-BE49-F238E27FC236}">
-                <a16:creationId xmlns:a16="http://schemas.microsoft.com/office/drawing/2014/main" id="{DB566984-E5C5-ECC5-287A-D44DCCBB65C8}"/>
-              </a:ext>
-            </a:extLst>
-          </p:cNvPr>
-          <p:cNvSpPr txBox="1">
-            <a:spLocks/>
-          </p:cNvSpPr>
-          <p:nvPr/>
-        </p:nvSpPr>
-        <p:spPr>
-          <a:xfrm>
-            <a:off x="741946" y="1165257"/>
-            <a:ext cx="11086260" cy="5134478"/>
-          </a:xfrm>
-          <a:prstGeom prst="rect">
-            <a:avLst/>
-          </a:prstGeom>
-        </p:spPr>
-        <p:txBody>
-          <a:bodyPr vert="horz" lIns="91440" tIns="45720" rIns="91440" bIns="45720" rtlCol="0">
-            <a:normAutofit/>
-          </a:bodyPr>
-          <a:lstStyle>
-            <a:lvl1pPr marL="228600" indent="-228600" algn="l" defTabSz="914400" rtl="0" eaLnBrk="1" latinLnBrk="0" hangingPunct="1">
-              <a:lnSpc>
-                <a:spcPct val="90000"/>
-              </a:lnSpc>
-              <a:spcBef>
-                <a:spcPts val="1000"/>
-              </a:spcBef>
-              <a:buFont typeface="Arial" panose="020B0604020202020204" pitchFamily="34" charset="0"/>
-              <a:buChar char="•"/>
-              <a:defRPr sz="2800" kern="1200">
-                <a:solidFill>
-                  <a:schemeClr val="tx1"/>
-                </a:solidFill>
-                <a:latin typeface="+mn-lt"/>
-                <a:ea typeface="+mn-ea"/>
-                <a:cs typeface="+mn-cs"/>
-              </a:defRPr>
-            </a:lvl1pPr>
-            <a:lvl2pPr marL="685800" indent="-228600" algn="l" defTabSz="914400" rtl="0" eaLnBrk="1" latinLnBrk="0" hangingPunct="1">
-              <a:lnSpc>
-                <a:spcPct val="90000"/>
-              </a:lnSpc>
-              <a:spcBef>
-                <a:spcPts val="500"/>
-              </a:spcBef>
-              <a:buFont typeface="Arial" panose="020B0604020202020204" pitchFamily="34" charset="0"/>
-              <a:buChar char="•"/>
-              <a:defRPr sz="2400" kern="1200">
-                <a:solidFill>
-                  <a:schemeClr val="tx1"/>
-                </a:solidFill>
-                <a:latin typeface="+mn-lt"/>
-                <a:ea typeface="+mn-ea"/>
-                <a:cs typeface="+mn-cs"/>
-              </a:defRPr>
-            </a:lvl2pPr>
-            <a:lvl3pPr marL="1143000" indent="-228600" algn="l" defTabSz="914400" rtl="0" eaLnBrk="1" latinLnBrk="0" hangingPunct="1">
-              <a:lnSpc>
-                <a:spcPct val="90000"/>
-              </a:lnSpc>
-              <a:spcBef>
-                <a:spcPts val="500"/>
-              </a:spcBef>
-              <a:buFont typeface="Arial" panose="020B0604020202020204" pitchFamily="34" charset="0"/>
-              <a:buChar char="•"/>
-              <a:defRPr sz="2000" kern="1200">
-                <a:solidFill>
-                  <a:schemeClr val="tx1"/>
-                </a:solidFill>
-                <a:latin typeface="+mn-lt"/>
-                <a:ea typeface="+mn-ea"/>
-                <a:cs typeface="+mn-cs"/>
-              </a:defRPr>
-            </a:lvl3pPr>
-            <a:lvl4pPr marL="1600200" indent="-228600" algn="l" defTabSz="914400" rtl="0" eaLnBrk="1" latinLnBrk="0" hangingPunct="1">
-              <a:lnSpc>
-                <a:spcPct val="90000"/>
-              </a:lnSpc>
-              <a:spcBef>
-                <a:spcPts val="500"/>
-              </a:spcBef>
-              <a:buFont typeface="Arial" panose="020B0604020202020204" pitchFamily="34" charset="0"/>
-              <a:buChar char="•"/>
-              <a:defRPr sz="1800" kern="1200">
-                <a:solidFill>
-                  <a:schemeClr val="tx1"/>
-                </a:solidFill>
-                <a:latin typeface="+mn-lt"/>
-                <a:ea typeface="+mn-ea"/>
-                <a:cs typeface="+mn-cs"/>
-              </a:defRPr>
-            </a:lvl4pPr>
-            <a:lvl5pPr marL="2057400" indent="-228600" algn="l" defTabSz="914400" rtl="0" eaLnBrk="1" latinLnBrk="0" hangingPunct="1">
-              <a:lnSpc>
-                <a:spcPct val="90000"/>
-              </a:lnSpc>
-              <a:spcBef>
-                <a:spcPts val="500"/>
-              </a:spcBef>
-              <a:buFont typeface="Arial" panose="020B0604020202020204" pitchFamily="34" charset="0"/>
-              <a:buChar char="•"/>
-              <a:defRPr sz="1800" kern="1200">
-                <a:solidFill>
-                  <a:schemeClr val="tx1"/>
-                </a:solidFill>
-                <a:latin typeface="+mn-lt"/>
-                <a:ea typeface="+mn-ea"/>
-                <a:cs typeface="+mn-cs"/>
-              </a:defRPr>
-            </a:lvl5pPr>
-            <a:lvl6pPr marL="2514600" indent="-228600" algn="l" defTabSz="914400" rtl="0" eaLnBrk="1" latinLnBrk="0" hangingPunct="1">
-              <a:lnSpc>
-                <a:spcPct val="90000"/>
-              </a:lnSpc>
-              <a:spcBef>
-                <a:spcPts val="500"/>
-              </a:spcBef>
-              <a:buFont typeface="Arial" panose="020B0604020202020204" pitchFamily="34" charset="0"/>
-              <a:buChar char="•"/>
-              <a:defRPr sz="1800" kern="1200">
-                <a:solidFill>
-                  <a:schemeClr val="tx1"/>
-                </a:solidFill>
-                <a:latin typeface="+mn-lt"/>
-                <a:ea typeface="+mn-ea"/>
-                <a:cs typeface="+mn-cs"/>
-              </a:defRPr>
-            </a:lvl6pPr>
-            <a:lvl7pPr marL="2971800" indent="-228600" algn="l" defTabSz="914400" rtl="0" eaLnBrk="1" latinLnBrk="0" hangingPunct="1">
-              <a:lnSpc>
-                <a:spcPct val="90000"/>
-              </a:lnSpc>
-              <a:spcBef>
-                <a:spcPts val="500"/>
-              </a:spcBef>
-              <a:buFont typeface="Arial" panose="020B0604020202020204" pitchFamily="34" charset="0"/>
-              <a:buChar char="•"/>
-              <a:defRPr sz="1800" kern="1200">
-                <a:solidFill>
-                  <a:schemeClr val="tx1"/>
-                </a:solidFill>
-                <a:latin typeface="+mn-lt"/>
-                <a:ea typeface="+mn-ea"/>
-                <a:cs typeface="+mn-cs"/>
-              </a:defRPr>
-            </a:lvl7pPr>
-            <a:lvl8pPr marL="3429000" indent="-228600" algn="l" defTabSz="914400" rtl="0" eaLnBrk="1" latinLnBrk="0" hangingPunct="1">
-              <a:lnSpc>
-                <a:spcPct val="90000"/>
-              </a:lnSpc>
-              <a:spcBef>
-                <a:spcPts val="500"/>
-              </a:spcBef>
-              <a:buFont typeface="Arial" panose="020B0604020202020204" pitchFamily="34" charset="0"/>
-              <a:buChar char="•"/>
-              <a:defRPr sz="1800" kern="1200">
-                <a:solidFill>
-                  <a:schemeClr val="tx1"/>
-                </a:solidFill>
-                <a:latin typeface="+mn-lt"/>
-                <a:ea typeface="+mn-ea"/>
-                <a:cs typeface="+mn-cs"/>
-              </a:defRPr>
-            </a:lvl8pPr>
-            <a:lvl9pPr marL="3886200" indent="-228600" algn="l" defTabSz="914400" rtl="0" eaLnBrk="1" latinLnBrk="0" hangingPunct="1">
-              <a:lnSpc>
-                <a:spcPct val="90000"/>
-              </a:lnSpc>
-              <a:spcBef>
-                <a:spcPts val="500"/>
-              </a:spcBef>
-              <a:buFont typeface="Arial" panose="020B0604020202020204" pitchFamily="34" charset="0"/>
-              <a:buChar char="•"/>
-              <a:defRPr sz="1800" kern="1200">
-                <a:solidFill>
-                  <a:schemeClr val="tx1"/>
-                </a:solidFill>
-                <a:latin typeface="+mn-lt"/>
-                <a:ea typeface="+mn-ea"/>
-                <a:cs typeface="+mn-cs"/>
-              </a:defRPr>
-            </a:lvl9pPr>
-          </a:lstStyle>
-          <a:p>
-            <a:r>
-              <a:rPr lang="en-US" dirty="0"/>
-              <a:t>It’s free!</a:t>
-            </a:r>
-          </a:p>
-          <a:p>
-            <a:r>
-              <a:rPr lang="en-US" dirty="0"/>
-              <a:t>It’s (relatively) simple to learn</a:t>
-            </a:r>
-          </a:p>
-          <a:p>
-            <a:pPr lvl="1"/>
-            <a:r>
-              <a:rPr lang="en-US" dirty="0"/>
-              <a:t>“high-level” language: you don’t have to be a computer scientist to write code</a:t>
-            </a:r>
-          </a:p>
-          <a:p>
-            <a:r>
-              <a:rPr lang="en-US" dirty="0"/>
-              <a:t>It’s powerful</a:t>
-            </a:r>
-          </a:p>
-          <a:p>
-            <a:pPr lvl="1"/>
-            <a:r>
-              <a:rPr lang="en-US" dirty="0"/>
-              <a:t>Many sophisticated tools are already included</a:t>
-            </a:r>
-          </a:p>
-          <a:p>
-            <a:pPr lvl="1"/>
-            <a:r>
-              <a:rPr lang="en-US" dirty="0"/>
-              <a:t>Easy to install packages that do even more!</a:t>
-            </a:r>
-          </a:p>
-          <a:p>
-            <a:r>
-              <a:rPr lang="en-US" dirty="0"/>
-              <a:t>It’s everywhere</a:t>
-            </a:r>
-          </a:p>
-          <a:p>
-            <a:pPr lvl="1"/>
-            <a:r>
-              <a:rPr lang="en-US" dirty="0"/>
-              <a:t>R is becoming standard for research &amp; academia</a:t>
-            </a:r>
-          </a:p>
-          <a:p>
-            <a:r>
-              <a:rPr lang="en-US" dirty="0"/>
-              <a:t>It’s growing</a:t>
-            </a:r>
-          </a:p>
-          <a:p>
-            <a:pPr lvl="1"/>
-            <a:r>
-              <a:rPr lang="en-US" dirty="0"/>
-              <a:t>The worldwide R community is friendly, helpful, and diverse</a:t>
-            </a:r>
-          </a:p>
-          <a:p>
-            <a:pPr lvl="1"/>
-            <a:r>
-              <a:rPr lang="en-US" dirty="0"/>
-              <a:t>Continued development &amp; extension of new tools!</a:t>
-            </a:r>
-          </a:p>
-        </p:txBody>
-      </p:sp>
-    </p:spTree>
-    <p:extLst>
-      <p:ext uri="{BB962C8B-B14F-4D97-AF65-F5344CB8AC3E}">
-        <p14:creationId xmlns:p14="http://schemas.microsoft.com/office/powerpoint/2010/main" val="2466062801"/>
-      </p:ext>
-    </p:extLst>
-  </p:cSld>
-  <p:clrMapOvr>
-    <a:masterClrMapping/>
-  </p:clrMapOvr>
-  <p:timing>
-    <p:tnLst>
-      <p:par>
-        <p:cTn id="1" dur="indefinite" restart="never" nodeType="tmRoot">
-          <p:childTnLst>
-            <p:seq concurrent="1" nextAc="seek">
-              <p:cTn id="2" dur="indefinite" nodeType="mainSeq">
-                <p:childTnLst>
-                  <p:par>
-                    <p:cTn id="3" fill="hold">
-                      <p:stCondLst>
-                        <p:cond delay="indefinite"/>
-                      </p:stCondLst>
-                      <p:childTnLst>
-                        <p:par>
-                          <p:cTn id="4" fill="hold">
-                            <p:stCondLst>
-                              <p:cond delay="0"/>
-                            </p:stCondLst>
-                            <p:childTnLst>
-                              <p:par>
-                                <p:cTn id="5" presetID="1" presetClass="entr" presetSubtype="0" fill="hold" nodeType="clickEffect">
-                                  <p:stCondLst>
-                                    <p:cond delay="0"/>
-                                  </p:stCondLst>
-                                  <p:childTnLst>
-                                    <p:set>
-                                      <p:cBhvr>
-                                        <p:cTn id="6" dur="1" fill="hold">
-                                          <p:stCondLst>
-                                            <p:cond delay="0"/>
-                                          </p:stCondLst>
-                                        </p:cTn>
-                                        <p:tgtEl>
-                                          <p:spTgt spid="3">
-                                            <p:txEl>
-                                              <p:pRg st="0" end="0"/>
-                                            </p:txEl>
-                                          </p:spTgt>
-                                        </p:tgtEl>
-                                        <p:attrNameLst>
-                                          <p:attrName>style.visibility</p:attrName>
-                                        </p:attrNameLst>
-                                      </p:cBhvr>
-                                      <p:to>
-                                        <p:strVal val="visible"/>
-                                      </p:to>
-                                    </p:set>
-                                  </p:childTnLst>
-                                </p:cTn>
-                              </p:par>
-                            </p:childTnLst>
-                          </p:cTn>
-                        </p:par>
-                      </p:childTnLst>
-                    </p:cTn>
-                  </p:par>
-                  <p:par>
-                    <p:cTn id="7" fill="hold">
-                      <p:stCondLst>
-                        <p:cond delay="indefinite"/>
-                      </p:stCondLst>
-                      <p:childTnLst>
-                        <p:par>
-                          <p:cTn id="8" fill="hold">
-                            <p:stCondLst>
-                              <p:cond delay="0"/>
-                            </p:stCondLst>
-                            <p:childTnLst>
-                              <p:par>
-                                <p:cTn id="9" presetID="1" presetClass="entr" presetSubtype="0" fill="hold" nodeType="clickEffect">
-                                  <p:stCondLst>
-                                    <p:cond delay="0"/>
-                                  </p:stCondLst>
-                                  <p:childTnLst>
-                                    <p:set>
-                                      <p:cBhvr>
-                                        <p:cTn id="10" dur="1" fill="hold">
-                                          <p:stCondLst>
-                                            <p:cond delay="0"/>
-                                          </p:stCondLst>
-                                        </p:cTn>
-                                        <p:tgtEl>
-                                          <p:spTgt spid="3">
-                                            <p:txEl>
-                                              <p:pRg st="1" end="1"/>
-                                            </p:txEl>
-                                          </p:spTgt>
-                                        </p:tgtEl>
-                                        <p:attrNameLst>
-                                          <p:attrName>style.visibility</p:attrName>
-                                        </p:attrNameLst>
-                                      </p:cBhvr>
-                                      <p:to>
-                                        <p:strVal val="visible"/>
-                                      </p:to>
-                                    </p:set>
-                                  </p:childTnLst>
-                                </p:cTn>
-                              </p:par>
-                              <p:par>
-                                <p:cTn id="11" presetID="1" presetClass="entr" presetSubtype="0" fill="hold" nodeType="withEffect">
-                                  <p:stCondLst>
-                                    <p:cond delay="0"/>
-                                  </p:stCondLst>
-                                  <p:childTnLst>
-                                    <p:set>
-                                      <p:cBhvr>
-                                        <p:cTn id="12" dur="1" fill="hold">
-                                          <p:stCondLst>
-                                            <p:cond delay="0"/>
-                                          </p:stCondLst>
-                                        </p:cTn>
-                                        <p:tgtEl>
-                                          <p:spTgt spid="3">
-                                            <p:txEl>
-                                              <p:pRg st="2" end="2"/>
-                                            </p:txEl>
-                                          </p:spTgt>
-                                        </p:tgtEl>
-                                        <p:attrNameLst>
-                                          <p:attrName>style.visibility</p:attrName>
-                                        </p:attrNameLst>
-                                      </p:cBhvr>
-                                      <p:to>
-                                        <p:strVal val="visible"/>
-                                      </p:to>
-                                    </p:set>
-                                  </p:childTnLst>
-                                </p:cTn>
-                              </p:par>
-                            </p:childTnLst>
-                          </p:cTn>
-                        </p:par>
-                      </p:childTnLst>
-                    </p:cTn>
-                  </p:par>
-                  <p:par>
-                    <p:cTn id="13" fill="hold">
-                      <p:stCondLst>
-                        <p:cond delay="indefinite"/>
-                      </p:stCondLst>
-                      <p:childTnLst>
-                        <p:par>
-                          <p:cTn id="14" fill="hold">
-                            <p:stCondLst>
-                              <p:cond delay="0"/>
-                            </p:stCondLst>
-                            <p:childTnLst>
-                              <p:par>
-                                <p:cTn id="15" presetID="1" presetClass="entr" presetSubtype="0" fill="hold" nodeType="clickEffect">
-                                  <p:stCondLst>
-                                    <p:cond delay="0"/>
-                                  </p:stCondLst>
-                                  <p:childTnLst>
-                                    <p:set>
-                                      <p:cBhvr>
-                                        <p:cTn id="16" dur="1" fill="hold">
-                                          <p:stCondLst>
-                                            <p:cond delay="0"/>
-                                          </p:stCondLst>
-                                        </p:cTn>
-                                        <p:tgtEl>
-                                          <p:spTgt spid="3">
-                                            <p:txEl>
-                                              <p:pRg st="3" end="3"/>
-                                            </p:txEl>
-                                          </p:spTgt>
-                                        </p:tgtEl>
-                                        <p:attrNameLst>
-                                          <p:attrName>style.visibility</p:attrName>
-                                        </p:attrNameLst>
-                                      </p:cBhvr>
-                                      <p:to>
-                                        <p:strVal val="visible"/>
-                                      </p:to>
-                                    </p:set>
-                                  </p:childTnLst>
-                                </p:cTn>
-                              </p:par>
-                              <p:par>
-                                <p:cTn id="17" presetID="1" presetClass="entr" presetSubtype="0" fill="hold" nodeType="withEffect">
-                                  <p:stCondLst>
-                                    <p:cond delay="0"/>
-                                  </p:stCondLst>
-                                  <p:childTnLst>
-                                    <p:set>
-                                      <p:cBhvr>
-                                        <p:cTn id="18" dur="1" fill="hold">
-                                          <p:stCondLst>
-                                            <p:cond delay="0"/>
-                                          </p:stCondLst>
-                                        </p:cTn>
-                                        <p:tgtEl>
-                                          <p:spTgt spid="3">
-                                            <p:txEl>
-                                              <p:pRg st="4" end="4"/>
-                                            </p:txEl>
-                                          </p:spTgt>
-                                        </p:tgtEl>
-                                        <p:attrNameLst>
-                                          <p:attrName>style.visibility</p:attrName>
-                                        </p:attrNameLst>
-                                      </p:cBhvr>
-                                      <p:to>
-                                        <p:strVal val="visible"/>
-                                      </p:to>
-                                    </p:set>
-                                  </p:childTnLst>
-                                </p:cTn>
-                              </p:par>
-                              <p:par>
-                                <p:cTn id="19" presetID="1" presetClass="entr" presetSubtype="0" fill="hold" nodeType="withEffect">
-                                  <p:stCondLst>
-                                    <p:cond delay="0"/>
-                                  </p:stCondLst>
-                                  <p:childTnLst>
-                                    <p:set>
-                                      <p:cBhvr>
-                                        <p:cTn id="20" dur="1" fill="hold">
-                                          <p:stCondLst>
-                                            <p:cond delay="0"/>
-                                          </p:stCondLst>
-                                        </p:cTn>
-                                        <p:tgtEl>
-                                          <p:spTgt spid="3">
-                                            <p:txEl>
-                                              <p:pRg st="5" end="5"/>
-                                            </p:txEl>
-                                          </p:spTgt>
-                                        </p:tgtEl>
-                                        <p:attrNameLst>
-                                          <p:attrName>style.visibility</p:attrName>
-                                        </p:attrNameLst>
-                                      </p:cBhvr>
-                                      <p:to>
-                                        <p:strVal val="visible"/>
-                                      </p:to>
-                                    </p:set>
-                                  </p:childTnLst>
-                                </p:cTn>
-                              </p:par>
-                            </p:childTnLst>
-                          </p:cTn>
-                        </p:par>
-                      </p:childTnLst>
-                    </p:cTn>
-                  </p:par>
-                  <p:par>
-                    <p:cTn id="21" fill="hold">
-                      <p:stCondLst>
-                        <p:cond delay="indefinite"/>
-                      </p:stCondLst>
-                      <p:childTnLst>
-                        <p:par>
-                          <p:cTn id="22" fill="hold">
-                            <p:stCondLst>
-                              <p:cond delay="0"/>
-                            </p:stCondLst>
-                            <p:childTnLst>
-                              <p:par>
-                                <p:cTn id="23" presetID="1" presetClass="entr" presetSubtype="0" fill="hold" nodeType="clickEffect">
-                                  <p:stCondLst>
-                                    <p:cond delay="0"/>
-                                  </p:stCondLst>
-                                  <p:childTnLst>
-                                    <p:set>
-                                      <p:cBhvr>
-                                        <p:cTn id="24" dur="1" fill="hold">
-                                          <p:stCondLst>
-                                            <p:cond delay="0"/>
-                                          </p:stCondLst>
-                                        </p:cTn>
-                                        <p:tgtEl>
-                                          <p:spTgt spid="3">
-                                            <p:txEl>
-                                              <p:pRg st="6" end="6"/>
-                                            </p:txEl>
-                                          </p:spTgt>
-                                        </p:tgtEl>
-                                        <p:attrNameLst>
-                                          <p:attrName>style.visibility</p:attrName>
-                                        </p:attrNameLst>
-                                      </p:cBhvr>
-                                      <p:to>
-                                        <p:strVal val="visible"/>
-                                      </p:to>
-                                    </p:set>
-                                  </p:childTnLst>
-                                </p:cTn>
-                              </p:par>
-                              <p:par>
-                                <p:cTn id="25" presetID="1" presetClass="entr" presetSubtype="0" fill="hold" nodeType="withEffect">
-                                  <p:stCondLst>
-                                    <p:cond delay="0"/>
-                                  </p:stCondLst>
-                                  <p:childTnLst>
-                                    <p:set>
-                                      <p:cBhvr>
-                                        <p:cTn id="26" dur="1" fill="hold">
-                                          <p:stCondLst>
-                                            <p:cond delay="0"/>
-                                          </p:stCondLst>
-                                        </p:cTn>
-                                        <p:tgtEl>
-                                          <p:spTgt spid="3">
-                                            <p:txEl>
-                                              <p:pRg st="7" end="7"/>
-                                            </p:txEl>
-                                          </p:spTgt>
-                                        </p:tgtEl>
-                                        <p:attrNameLst>
-                                          <p:attrName>style.visibility</p:attrName>
-                                        </p:attrNameLst>
-                                      </p:cBhvr>
-                                      <p:to>
-                                        <p:strVal val="visible"/>
-                                      </p:to>
-                                    </p:set>
-                                  </p:childTnLst>
-                                </p:cTn>
-                              </p:par>
-                            </p:childTnLst>
-                          </p:cTn>
-                        </p:par>
-                      </p:childTnLst>
-                    </p:cTn>
-                  </p:par>
-                  <p:par>
-                    <p:cTn id="27" fill="hold">
-                      <p:stCondLst>
-                        <p:cond delay="indefinite"/>
-                      </p:stCondLst>
-                      <p:childTnLst>
-                        <p:par>
-                          <p:cTn id="28" fill="hold">
-                            <p:stCondLst>
-                              <p:cond delay="0"/>
-                            </p:stCondLst>
-                            <p:childTnLst>
-                              <p:par>
-                                <p:cTn id="29" presetID="1" presetClass="entr" presetSubtype="0" fill="hold" nodeType="clickEffect">
-                                  <p:stCondLst>
-                                    <p:cond delay="0"/>
-                                  </p:stCondLst>
-                                  <p:childTnLst>
-                                    <p:set>
-                                      <p:cBhvr>
-                                        <p:cTn id="30" dur="1" fill="hold">
-                                          <p:stCondLst>
-                                            <p:cond delay="0"/>
-                                          </p:stCondLst>
-                                        </p:cTn>
-                                        <p:tgtEl>
-                                          <p:spTgt spid="3">
-                                            <p:txEl>
-                                              <p:pRg st="8" end="8"/>
-                                            </p:txEl>
-                                          </p:spTgt>
-                                        </p:tgtEl>
-                                        <p:attrNameLst>
-                                          <p:attrName>style.visibility</p:attrName>
-                                        </p:attrNameLst>
-                                      </p:cBhvr>
-                                      <p:to>
-                                        <p:strVal val="visible"/>
-                                      </p:to>
-                                    </p:set>
-                                  </p:childTnLst>
-                                </p:cTn>
-                              </p:par>
-                              <p:par>
-                                <p:cTn id="31" presetID="1" presetClass="entr" presetSubtype="0" fill="hold" nodeType="withEffect">
-                                  <p:stCondLst>
-                                    <p:cond delay="0"/>
-                                  </p:stCondLst>
-                                  <p:childTnLst>
-                                    <p:set>
-                                      <p:cBhvr>
-                                        <p:cTn id="32" dur="1" fill="hold">
-                                          <p:stCondLst>
-                                            <p:cond delay="0"/>
-                                          </p:stCondLst>
-                                        </p:cTn>
-                                        <p:tgtEl>
-                                          <p:spTgt spid="3">
-                                            <p:txEl>
-                                              <p:pRg st="9" end="9"/>
-                                            </p:txEl>
-                                          </p:spTgt>
-                                        </p:tgtEl>
-                                        <p:attrNameLst>
-                                          <p:attrName>style.visibility</p:attrName>
-                                        </p:attrNameLst>
-                                      </p:cBhvr>
-                                      <p:to>
-                                        <p:strVal val="visible"/>
-                                      </p:to>
-                                    </p:set>
-                                  </p:childTnLst>
-                                </p:cTn>
-                              </p:par>
-                              <p:par>
-                                <p:cTn id="33" presetID="1" presetClass="entr" presetSubtype="0" fill="hold" nodeType="withEffect">
-                                  <p:stCondLst>
-                                    <p:cond delay="0"/>
-                                  </p:stCondLst>
-                                  <p:childTnLst>
-                                    <p:set>
-                                      <p:cBhvr>
-                                        <p:cTn id="34" dur="1" fill="hold">
-                                          <p:stCondLst>
-                                            <p:cond delay="0"/>
-                                          </p:stCondLst>
-                                        </p:cTn>
-                                        <p:tgtEl>
-                                          <p:spTgt spid="3">
-                                            <p:txEl>
-                                              <p:pRg st="10" end="10"/>
-                                            </p:txEl>
-                                          </p:spTgt>
-                                        </p:tgtEl>
-                                        <p:attrNameLst>
-                                          <p:attrName>style.visibility</p:attrName>
-                                        </p:attrNameLst>
-                                      </p:cBhvr>
-                                      <p:to>
-                                        <p:strVal val="visible"/>
-                                      </p:to>
-                                    </p:set>
-                                  </p:childTnLst>
-                                </p:cTn>
-                              </p:par>
-                            </p:childTnLst>
-                          </p:cTn>
-                        </p:par>
-                      </p:childTnLst>
-                    </p:cTn>
-                  </p:par>
-                </p:childTnLst>
-              </p:cTn>
-              <p:prevCondLst>
-                <p:cond evt="onPrev" delay="0">
-                  <p:tgtEl>
-                    <p:sldTgt/>
-                  </p:tgtEl>
-                </p:cond>
-              </p:prevCondLst>
-              <p:nextCondLst>
-                <p:cond evt="onNext" delay="0">
-                  <p:tgtEl>
-                    <p:sldTgt/>
-                  </p:tgtEl>
-                </p:cond>
-              </p:nextCondLst>
-            </p:seq>
-          </p:childTnLst>
-        </p:cTn>
-      </p:par>
-    </p:tnLst>
-  </p:timing>
 </p:sld>
 </file>
 

</xml_diff>

<commit_message>
minor updates to ppt 1 & 2
</commit_message>
<xml_diff>
--- a/presentations/1 - Welcome and motivation.pptx
+++ b/presentations/1 - Welcome and motivation.pptx
@@ -210,7 +210,7 @@
           <a:p>
             <a:fld id="{EC387D8F-AD3F-4F1D-953F-F6D09F384E03}" type="datetimeFigureOut">
               <a:rPr lang="en-US" smtClean="0"/>
-              <a:t>11/12/2023</a:t>
+              <a:t>11/13/2023</a:t>
             </a:fld>
             <a:endParaRPr lang="en-US"/>
           </a:p>
@@ -1400,7 +1400,7 @@
           <a:p>
             <a:fld id="{9A69187F-33B1-48D6-A8D1-B3CDAB36B405}" type="datetimeFigureOut">
               <a:rPr lang="en-US" smtClean="0"/>
-              <a:t>11/12/2023</a:t>
+              <a:t>11/13/2023</a:t>
             </a:fld>
             <a:endParaRPr lang="en-US"/>
           </a:p>
@@ -1598,7 +1598,7 @@
           <a:p>
             <a:fld id="{9A69187F-33B1-48D6-A8D1-B3CDAB36B405}" type="datetimeFigureOut">
               <a:rPr lang="en-US" smtClean="0"/>
-              <a:t>11/12/2023</a:t>
+              <a:t>11/13/2023</a:t>
             </a:fld>
             <a:endParaRPr lang="en-US"/>
           </a:p>
@@ -1806,7 +1806,7 @@
           <a:p>
             <a:fld id="{9A69187F-33B1-48D6-A8D1-B3CDAB36B405}" type="datetimeFigureOut">
               <a:rPr lang="en-US" smtClean="0"/>
-              <a:t>11/12/2023</a:t>
+              <a:t>11/13/2023</a:t>
             </a:fld>
             <a:endParaRPr lang="en-US"/>
           </a:p>
@@ -2004,7 +2004,7 @@
           <a:p>
             <a:fld id="{9A69187F-33B1-48D6-A8D1-B3CDAB36B405}" type="datetimeFigureOut">
               <a:rPr lang="en-US" smtClean="0"/>
-              <a:t>11/12/2023</a:t>
+              <a:t>11/13/2023</a:t>
             </a:fld>
             <a:endParaRPr lang="en-US"/>
           </a:p>
@@ -2279,7 +2279,7 @@
           <a:p>
             <a:fld id="{9A69187F-33B1-48D6-A8D1-B3CDAB36B405}" type="datetimeFigureOut">
               <a:rPr lang="en-US" smtClean="0"/>
-              <a:t>11/12/2023</a:t>
+              <a:t>11/13/2023</a:t>
             </a:fld>
             <a:endParaRPr lang="en-US"/>
           </a:p>
@@ -2544,7 +2544,7 @@
           <a:p>
             <a:fld id="{9A69187F-33B1-48D6-A8D1-B3CDAB36B405}" type="datetimeFigureOut">
               <a:rPr lang="en-US" smtClean="0"/>
-              <a:t>11/12/2023</a:t>
+              <a:t>11/13/2023</a:t>
             </a:fld>
             <a:endParaRPr lang="en-US"/>
           </a:p>
@@ -2956,7 +2956,7 @@
           <a:p>
             <a:fld id="{9A69187F-33B1-48D6-A8D1-B3CDAB36B405}" type="datetimeFigureOut">
               <a:rPr lang="en-US" smtClean="0"/>
-              <a:t>11/12/2023</a:t>
+              <a:t>11/13/2023</a:t>
             </a:fld>
             <a:endParaRPr lang="en-US"/>
           </a:p>
@@ -3097,7 +3097,7 @@
           <a:p>
             <a:fld id="{9A69187F-33B1-48D6-A8D1-B3CDAB36B405}" type="datetimeFigureOut">
               <a:rPr lang="en-US" smtClean="0"/>
-              <a:t>11/12/2023</a:t>
+              <a:t>11/13/2023</a:t>
             </a:fld>
             <a:endParaRPr lang="en-US"/>
           </a:p>
@@ -3210,7 +3210,7 @@
           <a:p>
             <a:fld id="{9A69187F-33B1-48D6-A8D1-B3CDAB36B405}" type="datetimeFigureOut">
               <a:rPr lang="en-US" smtClean="0"/>
-              <a:t>11/12/2023</a:t>
+              <a:t>11/13/2023</a:t>
             </a:fld>
             <a:endParaRPr lang="en-US"/>
           </a:p>
@@ -3521,7 +3521,7 @@
           <a:p>
             <a:fld id="{9A69187F-33B1-48D6-A8D1-B3CDAB36B405}" type="datetimeFigureOut">
               <a:rPr lang="en-US" smtClean="0"/>
-              <a:t>11/12/2023</a:t>
+              <a:t>11/13/2023</a:t>
             </a:fld>
             <a:endParaRPr lang="en-US"/>
           </a:p>
@@ -3809,7 +3809,7 @@
           <a:p>
             <a:fld id="{9A69187F-33B1-48D6-A8D1-B3CDAB36B405}" type="datetimeFigureOut">
               <a:rPr lang="en-US" smtClean="0"/>
-              <a:t>11/12/2023</a:t>
+              <a:t>11/13/2023</a:t>
             </a:fld>
             <a:endParaRPr lang="en-US"/>
           </a:p>
@@ -4050,7 +4050,7 @@
           <a:p>
             <a:fld id="{9A69187F-33B1-48D6-A8D1-B3CDAB36B405}" type="datetimeFigureOut">
               <a:rPr lang="en-US" smtClean="0"/>
-              <a:t>11/12/2023</a:t>
+              <a:t>11/13/2023</a:t>
             </a:fld>
             <a:endParaRPr lang="en-US"/>
           </a:p>
@@ -4531,7 +4531,7 @@
         </p:nvSpPr>
         <p:spPr>
           <a:xfrm>
-            <a:off x="3819525" y="1304924"/>
+            <a:off x="1909762" y="2385182"/>
             <a:ext cx="8372475" cy="1530335"/>
           </a:xfrm>
         </p:spPr>
@@ -4566,22 +4566,24 @@
         </p:nvSpPr>
         <p:spPr>
           <a:xfrm>
-            <a:off x="1590040" y="5106067"/>
+            <a:off x="2719385" y="4919167"/>
             <a:ext cx="6753225" cy="1114425"/>
           </a:xfrm>
         </p:spPr>
         <p:txBody>
-          <a:bodyPr/>
+          <a:bodyPr>
+            <a:normAutofit/>
+          </a:bodyPr>
           <a:lstStyle/>
           <a:p>
             <a:r>
-              <a:rPr lang="en-US" dirty="0"/>
+              <a:rPr lang="en-US" sz="2000" dirty="0"/>
               <a:t>November 14–15, 2023</a:t>
             </a:r>
           </a:p>
           <a:p>
             <a:r>
-              <a:rPr lang="en-US" dirty="0"/>
+              <a:rPr lang="en-US" sz="2000" dirty="0"/>
               <a:t>Matt Tyers &amp; Justin Priest</a:t>
             </a:r>
           </a:p>
@@ -4674,7 +4676,7 @@
         </p:nvSpPr>
         <p:spPr>
           <a:xfrm>
-            <a:off x="4966652" y="3120328"/>
+            <a:off x="2719385" y="4230442"/>
             <a:ext cx="6753225" cy="620473"/>
           </a:xfrm>
           <a:prstGeom prst="rect">
@@ -10919,7 +10921,7 @@
             </a:pPr>
             <a:r>
               <a:rPr lang="en-US" dirty="0"/>
-              <a:t>Today we have 17 participants!</a:t>
+              <a:t>Today we have 16 participants!</a:t>
             </a:r>
           </a:p>
           <a:p>
@@ -13091,6 +13093,41 @@
           </p:spPr>
         </p:pic>
       </p:grpSp>
+      <p:sp>
+        <p:nvSpPr>
+          <p:cNvPr id="5" name="TextBox 4">
+            <a:extLst>
+              <a:ext uri="{FF2B5EF4-FFF2-40B4-BE49-F238E27FC236}">
+                <a16:creationId xmlns:a16="http://schemas.microsoft.com/office/drawing/2014/main" id="{035B3F2C-CB36-F1CC-A78D-E914E5B4CF89}"/>
+              </a:ext>
+            </a:extLst>
+          </p:cNvPr>
+          <p:cNvSpPr txBox="1"/>
+          <p:nvPr/>
+        </p:nvSpPr>
+        <p:spPr>
+          <a:xfrm>
+            <a:off x="552659" y="6109398"/>
+            <a:ext cx="8397745" cy="646331"/>
+          </a:xfrm>
+          <a:prstGeom prst="rect">
+            <a:avLst/>
+          </a:prstGeom>
+          <a:noFill/>
+        </p:spPr>
+        <p:txBody>
+          <a:bodyPr wrap="square" rtlCol="0">
+            <a:spAutoFit/>
+          </a:bodyPr>
+          <a:lstStyle/>
+          <a:p>
+            <a:r>
+              <a:rPr lang="en-US" i="1" dirty="0"/>
+              <a:t>One remote learning request: if possible, keep your camera on often (but not always). This way we can see if you’re following us or confused :)</a:t>
+            </a:r>
+          </a:p>
+        </p:txBody>
+      </p:sp>
     </p:spTree>
     <p:extLst>
       <p:ext uri="{BB962C8B-B14F-4D97-AF65-F5344CB8AC3E}">

</xml_diff>

<commit_message>
added matt's slide that I deleted....
</commit_message>
<xml_diff>
--- a/presentations/1 - Welcome and motivation.pptx
+++ b/presentations/1 - Welcome and motivation.pptx
@@ -5,23 +5,24 @@
     <p:sldMasterId id="2147483648" r:id="rId1"/>
   </p:sldMasterIdLst>
   <p:notesMasterIdLst>
-    <p:notesMasterId r:id="rId16"/>
+    <p:notesMasterId r:id="rId17"/>
   </p:notesMasterIdLst>
   <p:sldIdLst>
     <p:sldId id="256" r:id="rId2"/>
-    <p:sldId id="405" r:id="rId3"/>
-    <p:sldId id="402" r:id="rId4"/>
-    <p:sldId id="411" r:id="rId5"/>
-    <p:sldId id="383" r:id="rId6"/>
-    <p:sldId id="401" r:id="rId7"/>
-    <p:sldId id="331" r:id="rId8"/>
-    <p:sldId id="431" r:id="rId9"/>
-    <p:sldId id="332" r:id="rId10"/>
-    <p:sldId id="412" r:id="rId11"/>
-    <p:sldId id="430" r:id="rId12"/>
-    <p:sldId id="297" r:id="rId13"/>
-    <p:sldId id="313" r:id="rId14"/>
-    <p:sldId id="429" r:id="rId15"/>
+    <p:sldId id="432" r:id="rId3"/>
+    <p:sldId id="405" r:id="rId4"/>
+    <p:sldId id="402" r:id="rId5"/>
+    <p:sldId id="411" r:id="rId6"/>
+    <p:sldId id="383" r:id="rId7"/>
+    <p:sldId id="401" r:id="rId8"/>
+    <p:sldId id="331" r:id="rId9"/>
+    <p:sldId id="431" r:id="rId10"/>
+    <p:sldId id="332" r:id="rId11"/>
+    <p:sldId id="412" r:id="rId12"/>
+    <p:sldId id="430" r:id="rId13"/>
+    <p:sldId id="297" r:id="rId14"/>
+    <p:sldId id="313" r:id="rId15"/>
+    <p:sldId id="429" r:id="rId16"/>
   </p:sldIdLst>
   <p:sldSz cx="12192000" cy="6858000"/>
   <p:notesSz cx="6858000" cy="9144000"/>
@@ -545,7 +546,7 @@
           <a:p>
             <a:fld id="{AD86E2D3-8F12-4CB7-B6F3-018CFC08298B}" type="slidenum">
               <a:rPr lang="en-US" smtClean="0"/>
-              <a:t>2</a:t>
+              <a:t>3</a:t>
             </a:fld>
             <a:endParaRPr lang="en-US"/>
           </a:p>
@@ -629,7 +630,7 @@
           <a:p>
             <a:fld id="{AD86E2D3-8F12-4CB7-B6F3-018CFC08298B}" type="slidenum">
               <a:rPr lang="en-US" smtClean="0"/>
-              <a:t>3</a:t>
+              <a:t>4</a:t>
             </a:fld>
             <a:endParaRPr lang="en-US"/>
           </a:p>
@@ -730,7 +731,7 @@
           <a:p>
             <a:fld id="{AD86E2D3-8F12-4CB7-B6F3-018CFC08298B}" type="slidenum">
               <a:rPr lang="en-US" smtClean="0"/>
-              <a:t>5</a:t>
+              <a:t>6</a:t>
             </a:fld>
             <a:endParaRPr lang="en-US"/>
           </a:p>
@@ -823,7 +824,7 @@
           <a:p>
             <a:fld id="{AD86E2D3-8F12-4CB7-B6F3-018CFC08298B}" type="slidenum">
               <a:rPr lang="en-US" smtClean="0"/>
-              <a:t>6</a:t>
+              <a:t>7</a:t>
             </a:fld>
             <a:endParaRPr lang="en-US"/>
           </a:p>
@@ -945,7 +946,7 @@
           <a:p>
             <a:fld id="{AD86E2D3-8F12-4CB7-B6F3-018CFC08298B}" type="slidenum">
               <a:rPr lang="en-US" smtClean="0"/>
-              <a:t>12</a:t>
+              <a:t>13</a:t>
             </a:fld>
             <a:endParaRPr lang="en-US"/>
           </a:p>
@@ -1141,7 +1142,7 @@
           <a:p>
             <a:fld id="{AD86E2D3-8F12-4CB7-B6F3-018CFC08298B}" type="slidenum">
               <a:rPr lang="en-US" smtClean="0"/>
-              <a:t>13</a:t>
+              <a:t>14</a:t>
             </a:fld>
             <a:endParaRPr lang="en-US"/>
           </a:p>
@@ -1234,7 +1235,7 @@
           <a:p>
             <a:fld id="{AD86E2D3-8F12-4CB7-B6F3-018CFC08298B}" type="slidenum">
               <a:rPr lang="en-US" smtClean="0"/>
-              <a:t>14</a:t>
+              <a:t>15</a:t>
             </a:fld>
             <a:endParaRPr lang="en-US"/>
           </a:p>
@@ -4894,6 +4895,993 @@
           <p:cNvPr id="2" name="Title 1">
             <a:extLst>
               <a:ext uri="{FF2B5EF4-FFF2-40B4-BE49-F238E27FC236}">
+                <a16:creationId xmlns:a16="http://schemas.microsoft.com/office/drawing/2014/main" id="{8115451F-211E-5062-3063-EEFCC622ABEA}"/>
+              </a:ext>
+            </a:extLst>
+          </p:cNvPr>
+          <p:cNvSpPr>
+            <a:spLocks noGrp="1"/>
+          </p:cNvSpPr>
+          <p:nvPr>
+            <p:ph type="title"/>
+          </p:nvPr>
+        </p:nvSpPr>
+        <p:spPr>
+          <a:xfrm>
+            <a:off x="741947" y="1"/>
+            <a:ext cx="10515600" cy="914400"/>
+          </a:xfrm>
+        </p:spPr>
+        <p:txBody>
+          <a:bodyPr>
+            <a:noAutofit/>
+          </a:bodyPr>
+          <a:lstStyle/>
+          <a:p>
+            <a:r>
+              <a:rPr lang="en-US" sz="3600" b="1" dirty="0"/>
+              <a:t>Ok, so why R?</a:t>
+            </a:r>
+          </a:p>
+        </p:txBody>
+      </p:sp>
+      <p:sp>
+        <p:nvSpPr>
+          <p:cNvPr id="19" name="Content Placeholder 2">
+            <a:extLst>
+              <a:ext uri="{FF2B5EF4-FFF2-40B4-BE49-F238E27FC236}">
+                <a16:creationId xmlns:a16="http://schemas.microsoft.com/office/drawing/2014/main" id="{1E59D450-1D15-06EF-3C95-D5BD186D82C4}"/>
+              </a:ext>
+            </a:extLst>
+          </p:cNvPr>
+          <p:cNvSpPr txBox="1">
+            <a:spLocks/>
+          </p:cNvSpPr>
+          <p:nvPr/>
+        </p:nvSpPr>
+        <p:spPr>
+          <a:xfrm>
+            <a:off x="741946" y="1165257"/>
+            <a:ext cx="8461047" cy="2649659"/>
+          </a:xfrm>
+          <a:prstGeom prst="rect">
+            <a:avLst/>
+          </a:prstGeom>
+        </p:spPr>
+        <p:txBody>
+          <a:bodyPr vert="horz" lIns="91440" tIns="45720" rIns="91440" bIns="45720" rtlCol="0">
+            <a:normAutofit/>
+          </a:bodyPr>
+          <a:lstStyle>
+            <a:lvl1pPr marL="228600" indent="-228600" algn="l" defTabSz="914400" rtl="0" eaLnBrk="1" latinLnBrk="0" hangingPunct="1">
+              <a:lnSpc>
+                <a:spcPct val="90000"/>
+              </a:lnSpc>
+              <a:spcBef>
+                <a:spcPts val="1000"/>
+              </a:spcBef>
+              <a:buFont typeface="Arial" panose="020B0604020202020204" pitchFamily="34" charset="0"/>
+              <a:buChar char="•"/>
+              <a:defRPr sz="2800" kern="1200">
+                <a:solidFill>
+                  <a:schemeClr val="tx1"/>
+                </a:solidFill>
+                <a:latin typeface="+mn-lt"/>
+                <a:ea typeface="+mn-ea"/>
+                <a:cs typeface="+mn-cs"/>
+              </a:defRPr>
+            </a:lvl1pPr>
+            <a:lvl2pPr marL="685800" indent="-228600" algn="l" defTabSz="914400" rtl="0" eaLnBrk="1" latinLnBrk="0" hangingPunct="1">
+              <a:lnSpc>
+                <a:spcPct val="90000"/>
+              </a:lnSpc>
+              <a:spcBef>
+                <a:spcPts val="500"/>
+              </a:spcBef>
+              <a:buFont typeface="Arial" panose="020B0604020202020204" pitchFamily="34" charset="0"/>
+              <a:buChar char="•"/>
+              <a:defRPr sz="2400" kern="1200">
+                <a:solidFill>
+                  <a:schemeClr val="tx1"/>
+                </a:solidFill>
+                <a:latin typeface="+mn-lt"/>
+                <a:ea typeface="+mn-ea"/>
+                <a:cs typeface="+mn-cs"/>
+              </a:defRPr>
+            </a:lvl2pPr>
+            <a:lvl3pPr marL="1143000" indent="-228600" algn="l" defTabSz="914400" rtl="0" eaLnBrk="1" latinLnBrk="0" hangingPunct="1">
+              <a:lnSpc>
+                <a:spcPct val="90000"/>
+              </a:lnSpc>
+              <a:spcBef>
+                <a:spcPts val="500"/>
+              </a:spcBef>
+              <a:buFont typeface="Arial" panose="020B0604020202020204" pitchFamily="34" charset="0"/>
+              <a:buChar char="•"/>
+              <a:defRPr sz="2000" kern="1200">
+                <a:solidFill>
+                  <a:schemeClr val="tx1"/>
+                </a:solidFill>
+                <a:latin typeface="+mn-lt"/>
+                <a:ea typeface="+mn-ea"/>
+                <a:cs typeface="+mn-cs"/>
+              </a:defRPr>
+            </a:lvl3pPr>
+            <a:lvl4pPr marL="1600200" indent="-228600" algn="l" defTabSz="914400" rtl="0" eaLnBrk="1" latinLnBrk="0" hangingPunct="1">
+              <a:lnSpc>
+                <a:spcPct val="90000"/>
+              </a:lnSpc>
+              <a:spcBef>
+                <a:spcPts val="500"/>
+              </a:spcBef>
+              <a:buFont typeface="Arial" panose="020B0604020202020204" pitchFamily="34" charset="0"/>
+              <a:buChar char="•"/>
+              <a:defRPr sz="1800" kern="1200">
+                <a:solidFill>
+                  <a:schemeClr val="tx1"/>
+                </a:solidFill>
+                <a:latin typeface="+mn-lt"/>
+                <a:ea typeface="+mn-ea"/>
+                <a:cs typeface="+mn-cs"/>
+              </a:defRPr>
+            </a:lvl4pPr>
+            <a:lvl5pPr marL="2057400" indent="-228600" algn="l" defTabSz="914400" rtl="0" eaLnBrk="1" latinLnBrk="0" hangingPunct="1">
+              <a:lnSpc>
+                <a:spcPct val="90000"/>
+              </a:lnSpc>
+              <a:spcBef>
+                <a:spcPts val="500"/>
+              </a:spcBef>
+              <a:buFont typeface="Arial" panose="020B0604020202020204" pitchFamily="34" charset="0"/>
+              <a:buChar char="•"/>
+              <a:defRPr sz="1800" kern="1200">
+                <a:solidFill>
+                  <a:schemeClr val="tx1"/>
+                </a:solidFill>
+                <a:latin typeface="+mn-lt"/>
+                <a:ea typeface="+mn-ea"/>
+                <a:cs typeface="+mn-cs"/>
+              </a:defRPr>
+            </a:lvl5pPr>
+            <a:lvl6pPr marL="2514600" indent="-228600" algn="l" defTabSz="914400" rtl="0" eaLnBrk="1" latinLnBrk="0" hangingPunct="1">
+              <a:lnSpc>
+                <a:spcPct val="90000"/>
+              </a:lnSpc>
+              <a:spcBef>
+                <a:spcPts val="500"/>
+              </a:spcBef>
+              <a:buFont typeface="Arial" panose="020B0604020202020204" pitchFamily="34" charset="0"/>
+              <a:buChar char="•"/>
+              <a:defRPr sz="1800" kern="1200">
+                <a:solidFill>
+                  <a:schemeClr val="tx1"/>
+                </a:solidFill>
+                <a:latin typeface="+mn-lt"/>
+                <a:ea typeface="+mn-ea"/>
+                <a:cs typeface="+mn-cs"/>
+              </a:defRPr>
+            </a:lvl6pPr>
+            <a:lvl7pPr marL="2971800" indent="-228600" algn="l" defTabSz="914400" rtl="0" eaLnBrk="1" latinLnBrk="0" hangingPunct="1">
+              <a:lnSpc>
+                <a:spcPct val="90000"/>
+              </a:lnSpc>
+              <a:spcBef>
+                <a:spcPts val="500"/>
+              </a:spcBef>
+              <a:buFont typeface="Arial" panose="020B0604020202020204" pitchFamily="34" charset="0"/>
+              <a:buChar char="•"/>
+              <a:defRPr sz="1800" kern="1200">
+                <a:solidFill>
+                  <a:schemeClr val="tx1"/>
+                </a:solidFill>
+                <a:latin typeface="+mn-lt"/>
+                <a:ea typeface="+mn-ea"/>
+                <a:cs typeface="+mn-cs"/>
+              </a:defRPr>
+            </a:lvl7pPr>
+            <a:lvl8pPr marL="3429000" indent="-228600" algn="l" defTabSz="914400" rtl="0" eaLnBrk="1" latinLnBrk="0" hangingPunct="1">
+              <a:lnSpc>
+                <a:spcPct val="90000"/>
+              </a:lnSpc>
+              <a:spcBef>
+                <a:spcPts val="500"/>
+              </a:spcBef>
+              <a:buFont typeface="Arial" panose="020B0604020202020204" pitchFamily="34" charset="0"/>
+              <a:buChar char="•"/>
+              <a:defRPr sz="1800" kern="1200">
+                <a:solidFill>
+                  <a:schemeClr val="tx1"/>
+                </a:solidFill>
+                <a:latin typeface="+mn-lt"/>
+                <a:ea typeface="+mn-ea"/>
+                <a:cs typeface="+mn-cs"/>
+              </a:defRPr>
+            </a:lvl8pPr>
+            <a:lvl9pPr marL="3886200" indent="-228600" algn="l" defTabSz="914400" rtl="0" eaLnBrk="1" latinLnBrk="0" hangingPunct="1">
+              <a:lnSpc>
+                <a:spcPct val="90000"/>
+              </a:lnSpc>
+              <a:spcBef>
+                <a:spcPts val="500"/>
+              </a:spcBef>
+              <a:buFont typeface="Arial" panose="020B0604020202020204" pitchFamily="34" charset="0"/>
+              <a:buChar char="•"/>
+              <a:defRPr sz="1800" kern="1200">
+                <a:solidFill>
+                  <a:schemeClr val="tx1"/>
+                </a:solidFill>
+                <a:latin typeface="+mn-lt"/>
+                <a:ea typeface="+mn-ea"/>
+                <a:cs typeface="+mn-cs"/>
+              </a:defRPr>
+            </a:lvl9pPr>
+          </a:lstStyle>
+          <a:p>
+            <a:endParaRPr lang="en-US" dirty="0"/>
+          </a:p>
+        </p:txBody>
+      </p:sp>
+      <p:sp>
+        <p:nvSpPr>
+          <p:cNvPr id="3" name="Content Placeholder 2">
+            <a:extLst>
+              <a:ext uri="{FF2B5EF4-FFF2-40B4-BE49-F238E27FC236}">
+                <a16:creationId xmlns:a16="http://schemas.microsoft.com/office/drawing/2014/main" id="{DB566984-E5C5-ECC5-287A-D44DCCBB65C8}"/>
+              </a:ext>
+            </a:extLst>
+          </p:cNvPr>
+          <p:cNvSpPr txBox="1">
+            <a:spLocks/>
+          </p:cNvSpPr>
+          <p:nvPr/>
+        </p:nvSpPr>
+        <p:spPr>
+          <a:xfrm>
+            <a:off x="741946" y="1165257"/>
+            <a:ext cx="11086260" cy="5134478"/>
+          </a:xfrm>
+          <a:prstGeom prst="rect">
+            <a:avLst/>
+          </a:prstGeom>
+        </p:spPr>
+        <p:txBody>
+          <a:bodyPr vert="horz" lIns="91440" tIns="45720" rIns="91440" bIns="45720" rtlCol="0">
+            <a:normAutofit/>
+          </a:bodyPr>
+          <a:lstStyle>
+            <a:lvl1pPr marL="228600" indent="-228600" algn="l" defTabSz="914400" rtl="0" eaLnBrk="1" latinLnBrk="0" hangingPunct="1">
+              <a:lnSpc>
+                <a:spcPct val="90000"/>
+              </a:lnSpc>
+              <a:spcBef>
+                <a:spcPts val="1000"/>
+              </a:spcBef>
+              <a:buFont typeface="Arial" panose="020B0604020202020204" pitchFamily="34" charset="0"/>
+              <a:buChar char="•"/>
+              <a:defRPr sz="2800" kern="1200">
+                <a:solidFill>
+                  <a:schemeClr val="tx1"/>
+                </a:solidFill>
+                <a:latin typeface="+mn-lt"/>
+                <a:ea typeface="+mn-ea"/>
+                <a:cs typeface="+mn-cs"/>
+              </a:defRPr>
+            </a:lvl1pPr>
+            <a:lvl2pPr marL="685800" indent="-228600" algn="l" defTabSz="914400" rtl="0" eaLnBrk="1" latinLnBrk="0" hangingPunct="1">
+              <a:lnSpc>
+                <a:spcPct val="90000"/>
+              </a:lnSpc>
+              <a:spcBef>
+                <a:spcPts val="500"/>
+              </a:spcBef>
+              <a:buFont typeface="Arial" panose="020B0604020202020204" pitchFamily="34" charset="0"/>
+              <a:buChar char="•"/>
+              <a:defRPr sz="2400" kern="1200">
+                <a:solidFill>
+                  <a:schemeClr val="tx1"/>
+                </a:solidFill>
+                <a:latin typeface="+mn-lt"/>
+                <a:ea typeface="+mn-ea"/>
+                <a:cs typeface="+mn-cs"/>
+              </a:defRPr>
+            </a:lvl2pPr>
+            <a:lvl3pPr marL="1143000" indent="-228600" algn="l" defTabSz="914400" rtl="0" eaLnBrk="1" latinLnBrk="0" hangingPunct="1">
+              <a:lnSpc>
+                <a:spcPct val="90000"/>
+              </a:lnSpc>
+              <a:spcBef>
+                <a:spcPts val="500"/>
+              </a:spcBef>
+              <a:buFont typeface="Arial" panose="020B0604020202020204" pitchFamily="34" charset="0"/>
+              <a:buChar char="•"/>
+              <a:defRPr sz="2000" kern="1200">
+                <a:solidFill>
+                  <a:schemeClr val="tx1"/>
+                </a:solidFill>
+                <a:latin typeface="+mn-lt"/>
+                <a:ea typeface="+mn-ea"/>
+                <a:cs typeface="+mn-cs"/>
+              </a:defRPr>
+            </a:lvl3pPr>
+            <a:lvl4pPr marL="1600200" indent="-228600" algn="l" defTabSz="914400" rtl="0" eaLnBrk="1" latinLnBrk="0" hangingPunct="1">
+              <a:lnSpc>
+                <a:spcPct val="90000"/>
+              </a:lnSpc>
+              <a:spcBef>
+                <a:spcPts val="500"/>
+              </a:spcBef>
+              <a:buFont typeface="Arial" panose="020B0604020202020204" pitchFamily="34" charset="0"/>
+              <a:buChar char="•"/>
+              <a:defRPr sz="1800" kern="1200">
+                <a:solidFill>
+                  <a:schemeClr val="tx1"/>
+                </a:solidFill>
+                <a:latin typeface="+mn-lt"/>
+                <a:ea typeface="+mn-ea"/>
+                <a:cs typeface="+mn-cs"/>
+              </a:defRPr>
+            </a:lvl4pPr>
+            <a:lvl5pPr marL="2057400" indent="-228600" algn="l" defTabSz="914400" rtl="0" eaLnBrk="1" latinLnBrk="0" hangingPunct="1">
+              <a:lnSpc>
+                <a:spcPct val="90000"/>
+              </a:lnSpc>
+              <a:spcBef>
+                <a:spcPts val="500"/>
+              </a:spcBef>
+              <a:buFont typeface="Arial" panose="020B0604020202020204" pitchFamily="34" charset="0"/>
+              <a:buChar char="•"/>
+              <a:defRPr sz="1800" kern="1200">
+                <a:solidFill>
+                  <a:schemeClr val="tx1"/>
+                </a:solidFill>
+                <a:latin typeface="+mn-lt"/>
+                <a:ea typeface="+mn-ea"/>
+                <a:cs typeface="+mn-cs"/>
+              </a:defRPr>
+            </a:lvl5pPr>
+            <a:lvl6pPr marL="2514600" indent="-228600" algn="l" defTabSz="914400" rtl="0" eaLnBrk="1" latinLnBrk="0" hangingPunct="1">
+              <a:lnSpc>
+                <a:spcPct val="90000"/>
+              </a:lnSpc>
+              <a:spcBef>
+                <a:spcPts val="500"/>
+              </a:spcBef>
+              <a:buFont typeface="Arial" panose="020B0604020202020204" pitchFamily="34" charset="0"/>
+              <a:buChar char="•"/>
+              <a:defRPr sz="1800" kern="1200">
+                <a:solidFill>
+                  <a:schemeClr val="tx1"/>
+                </a:solidFill>
+                <a:latin typeface="+mn-lt"/>
+                <a:ea typeface="+mn-ea"/>
+                <a:cs typeface="+mn-cs"/>
+              </a:defRPr>
+            </a:lvl6pPr>
+            <a:lvl7pPr marL="2971800" indent="-228600" algn="l" defTabSz="914400" rtl="0" eaLnBrk="1" latinLnBrk="0" hangingPunct="1">
+              <a:lnSpc>
+                <a:spcPct val="90000"/>
+              </a:lnSpc>
+              <a:spcBef>
+                <a:spcPts val="500"/>
+              </a:spcBef>
+              <a:buFont typeface="Arial" panose="020B0604020202020204" pitchFamily="34" charset="0"/>
+              <a:buChar char="•"/>
+              <a:defRPr sz="1800" kern="1200">
+                <a:solidFill>
+                  <a:schemeClr val="tx1"/>
+                </a:solidFill>
+                <a:latin typeface="+mn-lt"/>
+                <a:ea typeface="+mn-ea"/>
+                <a:cs typeface="+mn-cs"/>
+              </a:defRPr>
+            </a:lvl7pPr>
+            <a:lvl8pPr marL="3429000" indent="-228600" algn="l" defTabSz="914400" rtl="0" eaLnBrk="1" latinLnBrk="0" hangingPunct="1">
+              <a:lnSpc>
+                <a:spcPct val="90000"/>
+              </a:lnSpc>
+              <a:spcBef>
+                <a:spcPts val="500"/>
+              </a:spcBef>
+              <a:buFont typeface="Arial" panose="020B0604020202020204" pitchFamily="34" charset="0"/>
+              <a:buChar char="•"/>
+              <a:defRPr sz="1800" kern="1200">
+                <a:solidFill>
+                  <a:schemeClr val="tx1"/>
+                </a:solidFill>
+                <a:latin typeface="+mn-lt"/>
+                <a:ea typeface="+mn-ea"/>
+                <a:cs typeface="+mn-cs"/>
+              </a:defRPr>
+            </a:lvl8pPr>
+            <a:lvl9pPr marL="3886200" indent="-228600" algn="l" defTabSz="914400" rtl="0" eaLnBrk="1" latinLnBrk="0" hangingPunct="1">
+              <a:lnSpc>
+                <a:spcPct val="90000"/>
+              </a:lnSpc>
+              <a:spcBef>
+                <a:spcPts val="500"/>
+              </a:spcBef>
+              <a:buFont typeface="Arial" panose="020B0604020202020204" pitchFamily="34" charset="0"/>
+              <a:buChar char="•"/>
+              <a:defRPr sz="1800" kern="1200">
+                <a:solidFill>
+                  <a:schemeClr val="tx1"/>
+                </a:solidFill>
+                <a:latin typeface="+mn-lt"/>
+                <a:ea typeface="+mn-ea"/>
+                <a:cs typeface="+mn-cs"/>
+              </a:defRPr>
+            </a:lvl9pPr>
+          </a:lstStyle>
+          <a:p>
+            <a:r>
+              <a:rPr lang="en-US" dirty="0"/>
+              <a:t>It’s free!</a:t>
+            </a:r>
+          </a:p>
+          <a:p>
+            <a:r>
+              <a:rPr lang="en-US" dirty="0"/>
+              <a:t>It’s (relatively) simple to learn</a:t>
+            </a:r>
+          </a:p>
+          <a:p>
+            <a:pPr lvl="1"/>
+            <a:r>
+              <a:rPr lang="en-US" dirty="0"/>
+              <a:t>“high-level” language: you don’t have to be a computer scientist to write code</a:t>
+            </a:r>
+          </a:p>
+          <a:p>
+            <a:r>
+              <a:rPr lang="en-US" dirty="0"/>
+              <a:t>It’s powerful</a:t>
+            </a:r>
+          </a:p>
+          <a:p>
+            <a:pPr lvl="1"/>
+            <a:r>
+              <a:rPr lang="en-US" dirty="0"/>
+              <a:t>Many sophisticated tools are already included</a:t>
+            </a:r>
+          </a:p>
+          <a:p>
+            <a:pPr lvl="1"/>
+            <a:r>
+              <a:rPr lang="en-US" dirty="0"/>
+              <a:t>Easy to install packages that do even more!</a:t>
+            </a:r>
+          </a:p>
+          <a:p>
+            <a:r>
+              <a:rPr lang="en-US" dirty="0"/>
+              <a:t>It’s everywhere</a:t>
+            </a:r>
+          </a:p>
+          <a:p>
+            <a:pPr lvl="1"/>
+            <a:r>
+              <a:rPr lang="en-US" dirty="0"/>
+              <a:t>R is becoming standard for research &amp; academia</a:t>
+            </a:r>
+          </a:p>
+          <a:p>
+            <a:r>
+              <a:rPr lang="en-US" dirty="0"/>
+              <a:t>It’s growing</a:t>
+            </a:r>
+          </a:p>
+          <a:p>
+            <a:pPr lvl="1"/>
+            <a:r>
+              <a:rPr lang="en-US" dirty="0"/>
+              <a:t>The worldwide R community is friendly, helpful, and diverse</a:t>
+            </a:r>
+          </a:p>
+          <a:p>
+            <a:pPr lvl="1"/>
+            <a:r>
+              <a:rPr lang="en-US" dirty="0"/>
+              <a:t>Continued development &amp; extension of new tools!</a:t>
+            </a:r>
+          </a:p>
+        </p:txBody>
+      </p:sp>
+    </p:spTree>
+    <p:extLst>
+      <p:ext uri="{BB962C8B-B14F-4D97-AF65-F5344CB8AC3E}">
+        <p14:creationId xmlns:p14="http://schemas.microsoft.com/office/powerpoint/2010/main" val="2466062801"/>
+      </p:ext>
+    </p:extLst>
+  </p:cSld>
+  <p:clrMapOvr>
+    <a:masterClrMapping/>
+  </p:clrMapOvr>
+  <p:timing>
+    <p:tnLst>
+      <p:par>
+        <p:cTn id="1" dur="indefinite" restart="never" nodeType="tmRoot">
+          <p:childTnLst>
+            <p:seq concurrent="1" nextAc="seek">
+              <p:cTn id="2" dur="indefinite" nodeType="mainSeq">
+                <p:childTnLst>
+                  <p:par>
+                    <p:cTn id="3" fill="hold">
+                      <p:stCondLst>
+                        <p:cond delay="indefinite"/>
+                      </p:stCondLst>
+                      <p:childTnLst>
+                        <p:par>
+                          <p:cTn id="4" fill="hold">
+                            <p:stCondLst>
+                              <p:cond delay="0"/>
+                            </p:stCondLst>
+                            <p:childTnLst>
+                              <p:par>
+                                <p:cTn id="5" presetID="1" presetClass="entr" presetSubtype="0" fill="hold" nodeType="clickEffect">
+                                  <p:stCondLst>
+                                    <p:cond delay="0"/>
+                                  </p:stCondLst>
+                                  <p:childTnLst>
+                                    <p:set>
+                                      <p:cBhvr>
+                                        <p:cTn id="6" dur="1" fill="hold">
+                                          <p:stCondLst>
+                                            <p:cond delay="0"/>
+                                          </p:stCondLst>
+                                        </p:cTn>
+                                        <p:tgtEl>
+                                          <p:spTgt spid="3">
+                                            <p:txEl>
+                                              <p:pRg st="0" end="0"/>
+                                            </p:txEl>
+                                          </p:spTgt>
+                                        </p:tgtEl>
+                                        <p:attrNameLst>
+                                          <p:attrName>style.visibility</p:attrName>
+                                        </p:attrNameLst>
+                                      </p:cBhvr>
+                                      <p:to>
+                                        <p:strVal val="visible"/>
+                                      </p:to>
+                                    </p:set>
+                                  </p:childTnLst>
+                                </p:cTn>
+                              </p:par>
+                            </p:childTnLst>
+                          </p:cTn>
+                        </p:par>
+                      </p:childTnLst>
+                    </p:cTn>
+                  </p:par>
+                  <p:par>
+                    <p:cTn id="7" fill="hold">
+                      <p:stCondLst>
+                        <p:cond delay="indefinite"/>
+                      </p:stCondLst>
+                      <p:childTnLst>
+                        <p:par>
+                          <p:cTn id="8" fill="hold">
+                            <p:stCondLst>
+                              <p:cond delay="0"/>
+                            </p:stCondLst>
+                            <p:childTnLst>
+                              <p:par>
+                                <p:cTn id="9" presetID="1" presetClass="entr" presetSubtype="0" fill="hold" nodeType="clickEffect">
+                                  <p:stCondLst>
+                                    <p:cond delay="0"/>
+                                  </p:stCondLst>
+                                  <p:childTnLst>
+                                    <p:set>
+                                      <p:cBhvr>
+                                        <p:cTn id="10" dur="1" fill="hold">
+                                          <p:stCondLst>
+                                            <p:cond delay="0"/>
+                                          </p:stCondLst>
+                                        </p:cTn>
+                                        <p:tgtEl>
+                                          <p:spTgt spid="3">
+                                            <p:txEl>
+                                              <p:pRg st="1" end="1"/>
+                                            </p:txEl>
+                                          </p:spTgt>
+                                        </p:tgtEl>
+                                        <p:attrNameLst>
+                                          <p:attrName>style.visibility</p:attrName>
+                                        </p:attrNameLst>
+                                      </p:cBhvr>
+                                      <p:to>
+                                        <p:strVal val="visible"/>
+                                      </p:to>
+                                    </p:set>
+                                  </p:childTnLst>
+                                </p:cTn>
+                              </p:par>
+                              <p:par>
+                                <p:cTn id="11" presetID="1" presetClass="entr" presetSubtype="0" fill="hold" nodeType="withEffect">
+                                  <p:stCondLst>
+                                    <p:cond delay="0"/>
+                                  </p:stCondLst>
+                                  <p:childTnLst>
+                                    <p:set>
+                                      <p:cBhvr>
+                                        <p:cTn id="12" dur="1" fill="hold">
+                                          <p:stCondLst>
+                                            <p:cond delay="0"/>
+                                          </p:stCondLst>
+                                        </p:cTn>
+                                        <p:tgtEl>
+                                          <p:spTgt spid="3">
+                                            <p:txEl>
+                                              <p:pRg st="2" end="2"/>
+                                            </p:txEl>
+                                          </p:spTgt>
+                                        </p:tgtEl>
+                                        <p:attrNameLst>
+                                          <p:attrName>style.visibility</p:attrName>
+                                        </p:attrNameLst>
+                                      </p:cBhvr>
+                                      <p:to>
+                                        <p:strVal val="visible"/>
+                                      </p:to>
+                                    </p:set>
+                                  </p:childTnLst>
+                                </p:cTn>
+                              </p:par>
+                            </p:childTnLst>
+                          </p:cTn>
+                        </p:par>
+                      </p:childTnLst>
+                    </p:cTn>
+                  </p:par>
+                  <p:par>
+                    <p:cTn id="13" fill="hold">
+                      <p:stCondLst>
+                        <p:cond delay="indefinite"/>
+                      </p:stCondLst>
+                      <p:childTnLst>
+                        <p:par>
+                          <p:cTn id="14" fill="hold">
+                            <p:stCondLst>
+                              <p:cond delay="0"/>
+                            </p:stCondLst>
+                            <p:childTnLst>
+                              <p:par>
+                                <p:cTn id="15" presetID="1" presetClass="entr" presetSubtype="0" fill="hold" nodeType="clickEffect">
+                                  <p:stCondLst>
+                                    <p:cond delay="0"/>
+                                  </p:stCondLst>
+                                  <p:childTnLst>
+                                    <p:set>
+                                      <p:cBhvr>
+                                        <p:cTn id="16" dur="1" fill="hold">
+                                          <p:stCondLst>
+                                            <p:cond delay="0"/>
+                                          </p:stCondLst>
+                                        </p:cTn>
+                                        <p:tgtEl>
+                                          <p:spTgt spid="3">
+                                            <p:txEl>
+                                              <p:pRg st="3" end="3"/>
+                                            </p:txEl>
+                                          </p:spTgt>
+                                        </p:tgtEl>
+                                        <p:attrNameLst>
+                                          <p:attrName>style.visibility</p:attrName>
+                                        </p:attrNameLst>
+                                      </p:cBhvr>
+                                      <p:to>
+                                        <p:strVal val="visible"/>
+                                      </p:to>
+                                    </p:set>
+                                  </p:childTnLst>
+                                </p:cTn>
+                              </p:par>
+                              <p:par>
+                                <p:cTn id="17" presetID="1" presetClass="entr" presetSubtype="0" fill="hold" nodeType="withEffect">
+                                  <p:stCondLst>
+                                    <p:cond delay="0"/>
+                                  </p:stCondLst>
+                                  <p:childTnLst>
+                                    <p:set>
+                                      <p:cBhvr>
+                                        <p:cTn id="18" dur="1" fill="hold">
+                                          <p:stCondLst>
+                                            <p:cond delay="0"/>
+                                          </p:stCondLst>
+                                        </p:cTn>
+                                        <p:tgtEl>
+                                          <p:spTgt spid="3">
+                                            <p:txEl>
+                                              <p:pRg st="4" end="4"/>
+                                            </p:txEl>
+                                          </p:spTgt>
+                                        </p:tgtEl>
+                                        <p:attrNameLst>
+                                          <p:attrName>style.visibility</p:attrName>
+                                        </p:attrNameLst>
+                                      </p:cBhvr>
+                                      <p:to>
+                                        <p:strVal val="visible"/>
+                                      </p:to>
+                                    </p:set>
+                                  </p:childTnLst>
+                                </p:cTn>
+                              </p:par>
+                              <p:par>
+                                <p:cTn id="19" presetID="1" presetClass="entr" presetSubtype="0" fill="hold" nodeType="withEffect">
+                                  <p:stCondLst>
+                                    <p:cond delay="0"/>
+                                  </p:stCondLst>
+                                  <p:childTnLst>
+                                    <p:set>
+                                      <p:cBhvr>
+                                        <p:cTn id="20" dur="1" fill="hold">
+                                          <p:stCondLst>
+                                            <p:cond delay="0"/>
+                                          </p:stCondLst>
+                                        </p:cTn>
+                                        <p:tgtEl>
+                                          <p:spTgt spid="3">
+                                            <p:txEl>
+                                              <p:pRg st="5" end="5"/>
+                                            </p:txEl>
+                                          </p:spTgt>
+                                        </p:tgtEl>
+                                        <p:attrNameLst>
+                                          <p:attrName>style.visibility</p:attrName>
+                                        </p:attrNameLst>
+                                      </p:cBhvr>
+                                      <p:to>
+                                        <p:strVal val="visible"/>
+                                      </p:to>
+                                    </p:set>
+                                  </p:childTnLst>
+                                </p:cTn>
+                              </p:par>
+                            </p:childTnLst>
+                          </p:cTn>
+                        </p:par>
+                      </p:childTnLst>
+                    </p:cTn>
+                  </p:par>
+                  <p:par>
+                    <p:cTn id="21" fill="hold">
+                      <p:stCondLst>
+                        <p:cond delay="indefinite"/>
+                      </p:stCondLst>
+                      <p:childTnLst>
+                        <p:par>
+                          <p:cTn id="22" fill="hold">
+                            <p:stCondLst>
+                              <p:cond delay="0"/>
+                            </p:stCondLst>
+                            <p:childTnLst>
+                              <p:par>
+                                <p:cTn id="23" presetID="1" presetClass="entr" presetSubtype="0" fill="hold" nodeType="clickEffect">
+                                  <p:stCondLst>
+                                    <p:cond delay="0"/>
+                                  </p:stCondLst>
+                                  <p:childTnLst>
+                                    <p:set>
+                                      <p:cBhvr>
+                                        <p:cTn id="24" dur="1" fill="hold">
+                                          <p:stCondLst>
+                                            <p:cond delay="0"/>
+                                          </p:stCondLst>
+                                        </p:cTn>
+                                        <p:tgtEl>
+                                          <p:spTgt spid="3">
+                                            <p:txEl>
+                                              <p:pRg st="6" end="6"/>
+                                            </p:txEl>
+                                          </p:spTgt>
+                                        </p:tgtEl>
+                                        <p:attrNameLst>
+                                          <p:attrName>style.visibility</p:attrName>
+                                        </p:attrNameLst>
+                                      </p:cBhvr>
+                                      <p:to>
+                                        <p:strVal val="visible"/>
+                                      </p:to>
+                                    </p:set>
+                                  </p:childTnLst>
+                                </p:cTn>
+                              </p:par>
+                              <p:par>
+                                <p:cTn id="25" presetID="1" presetClass="entr" presetSubtype="0" fill="hold" nodeType="withEffect">
+                                  <p:stCondLst>
+                                    <p:cond delay="0"/>
+                                  </p:stCondLst>
+                                  <p:childTnLst>
+                                    <p:set>
+                                      <p:cBhvr>
+                                        <p:cTn id="26" dur="1" fill="hold">
+                                          <p:stCondLst>
+                                            <p:cond delay="0"/>
+                                          </p:stCondLst>
+                                        </p:cTn>
+                                        <p:tgtEl>
+                                          <p:spTgt spid="3">
+                                            <p:txEl>
+                                              <p:pRg st="7" end="7"/>
+                                            </p:txEl>
+                                          </p:spTgt>
+                                        </p:tgtEl>
+                                        <p:attrNameLst>
+                                          <p:attrName>style.visibility</p:attrName>
+                                        </p:attrNameLst>
+                                      </p:cBhvr>
+                                      <p:to>
+                                        <p:strVal val="visible"/>
+                                      </p:to>
+                                    </p:set>
+                                  </p:childTnLst>
+                                </p:cTn>
+                              </p:par>
+                            </p:childTnLst>
+                          </p:cTn>
+                        </p:par>
+                      </p:childTnLst>
+                    </p:cTn>
+                  </p:par>
+                  <p:par>
+                    <p:cTn id="27" fill="hold">
+                      <p:stCondLst>
+                        <p:cond delay="indefinite"/>
+                      </p:stCondLst>
+                      <p:childTnLst>
+                        <p:par>
+                          <p:cTn id="28" fill="hold">
+                            <p:stCondLst>
+                              <p:cond delay="0"/>
+                            </p:stCondLst>
+                            <p:childTnLst>
+                              <p:par>
+                                <p:cTn id="29" presetID="1" presetClass="entr" presetSubtype="0" fill="hold" nodeType="clickEffect">
+                                  <p:stCondLst>
+                                    <p:cond delay="0"/>
+                                  </p:stCondLst>
+                                  <p:childTnLst>
+                                    <p:set>
+                                      <p:cBhvr>
+                                        <p:cTn id="30" dur="1" fill="hold">
+                                          <p:stCondLst>
+                                            <p:cond delay="0"/>
+                                          </p:stCondLst>
+                                        </p:cTn>
+                                        <p:tgtEl>
+                                          <p:spTgt spid="3">
+                                            <p:txEl>
+                                              <p:pRg st="8" end="8"/>
+                                            </p:txEl>
+                                          </p:spTgt>
+                                        </p:tgtEl>
+                                        <p:attrNameLst>
+                                          <p:attrName>style.visibility</p:attrName>
+                                        </p:attrNameLst>
+                                      </p:cBhvr>
+                                      <p:to>
+                                        <p:strVal val="visible"/>
+                                      </p:to>
+                                    </p:set>
+                                  </p:childTnLst>
+                                </p:cTn>
+                              </p:par>
+                              <p:par>
+                                <p:cTn id="31" presetID="1" presetClass="entr" presetSubtype="0" fill="hold" nodeType="withEffect">
+                                  <p:stCondLst>
+                                    <p:cond delay="0"/>
+                                  </p:stCondLst>
+                                  <p:childTnLst>
+                                    <p:set>
+                                      <p:cBhvr>
+                                        <p:cTn id="32" dur="1" fill="hold">
+                                          <p:stCondLst>
+                                            <p:cond delay="0"/>
+                                          </p:stCondLst>
+                                        </p:cTn>
+                                        <p:tgtEl>
+                                          <p:spTgt spid="3">
+                                            <p:txEl>
+                                              <p:pRg st="9" end="9"/>
+                                            </p:txEl>
+                                          </p:spTgt>
+                                        </p:tgtEl>
+                                        <p:attrNameLst>
+                                          <p:attrName>style.visibility</p:attrName>
+                                        </p:attrNameLst>
+                                      </p:cBhvr>
+                                      <p:to>
+                                        <p:strVal val="visible"/>
+                                      </p:to>
+                                    </p:set>
+                                  </p:childTnLst>
+                                </p:cTn>
+                              </p:par>
+                              <p:par>
+                                <p:cTn id="33" presetID="1" presetClass="entr" presetSubtype="0" fill="hold" nodeType="withEffect">
+                                  <p:stCondLst>
+                                    <p:cond delay="0"/>
+                                  </p:stCondLst>
+                                  <p:childTnLst>
+                                    <p:set>
+                                      <p:cBhvr>
+                                        <p:cTn id="34" dur="1" fill="hold">
+                                          <p:stCondLst>
+                                            <p:cond delay="0"/>
+                                          </p:stCondLst>
+                                        </p:cTn>
+                                        <p:tgtEl>
+                                          <p:spTgt spid="3">
+                                            <p:txEl>
+                                              <p:pRg st="10" end="10"/>
+                                            </p:txEl>
+                                          </p:spTgt>
+                                        </p:tgtEl>
+                                        <p:attrNameLst>
+                                          <p:attrName>style.visibility</p:attrName>
+                                        </p:attrNameLst>
+                                      </p:cBhvr>
+                                      <p:to>
+                                        <p:strVal val="visible"/>
+                                      </p:to>
+                                    </p:set>
+                                  </p:childTnLst>
+                                </p:cTn>
+                              </p:par>
+                            </p:childTnLst>
+                          </p:cTn>
+                        </p:par>
+                      </p:childTnLst>
+                    </p:cTn>
+                  </p:par>
+                </p:childTnLst>
+              </p:cTn>
+              <p:prevCondLst>
+                <p:cond evt="onPrev" delay="0">
+                  <p:tgtEl>
+                    <p:sldTgt/>
+                  </p:tgtEl>
+                </p:cond>
+              </p:prevCondLst>
+              <p:nextCondLst>
+                <p:cond evt="onNext" delay="0">
+                  <p:tgtEl>
+                    <p:sldTgt/>
+                  </p:tgtEl>
+                </p:cond>
+              </p:nextCondLst>
+            </p:seq>
+          </p:childTnLst>
+        </p:cTn>
+      </p:par>
+    </p:tnLst>
+  </p:timing>
+</p:sld>
+</file>
+
+<file path=ppt/slides/slide11.xml><?xml version="1.0" encoding="utf-8"?>
+<p:sld xmlns:a="http://schemas.openxmlformats.org/drawingml/2006/main" xmlns:r="http://schemas.openxmlformats.org/officeDocument/2006/relationships" xmlns:p="http://schemas.openxmlformats.org/presentationml/2006/main">
+  <p:cSld>
+    <p:spTree>
+      <p:nvGrpSpPr>
+        <p:cNvPr id="1" name=""/>
+        <p:cNvGrpSpPr/>
+        <p:nvPr/>
+      </p:nvGrpSpPr>
+      <p:grpSpPr>
+        <a:xfrm>
+          <a:off x="0" y="0"/>
+          <a:ext cx="0" cy="0"/>
+          <a:chOff x="0" y="0"/>
+          <a:chExt cx="0" cy="0"/>
+        </a:xfrm>
+      </p:grpSpPr>
+      <p:sp>
+        <p:nvSpPr>
+          <p:cNvPr id="2" name="Title 1">
+            <a:extLst>
+              <a:ext uri="{FF2B5EF4-FFF2-40B4-BE49-F238E27FC236}">
                 <a16:creationId xmlns:a16="http://schemas.microsoft.com/office/drawing/2014/main" id="{8DC51687-C4F4-4E91-B3D5-7EE1E4FF9785}"/>
               </a:ext>
             </a:extLst>
@@ -5014,7 +6002,7 @@
           <a:p>
             <a:fld id="{6D95AE55-B5F4-483D-AEFF-E8059F5502F5}" type="slidenum">
               <a:rPr lang="en-US" smtClean="0"/>
-              <a:t>10</a:t>
+              <a:t>11</a:t>
             </a:fld>
             <a:endParaRPr lang="en-US"/>
           </a:p>
@@ -7363,7 +8351,7 @@
 </p:sld>
 </file>
 
-<file path=ppt/slides/slide11.xml><?xml version="1.0" encoding="utf-8"?>
+<file path=ppt/slides/slide12.xml><?xml version="1.0" encoding="utf-8"?>
 <p:sld xmlns:a="http://schemas.openxmlformats.org/drawingml/2006/main" xmlns:r="http://schemas.openxmlformats.org/officeDocument/2006/relationships" xmlns:p="http://schemas.openxmlformats.org/presentationml/2006/main">
   <p:cSld>
     <p:spTree>
@@ -7495,7 +8483,7 @@
           <a:p>
             <a:fld id="{6D95AE55-B5F4-483D-AEFF-E8059F5502F5}" type="slidenum">
               <a:rPr lang="en-US" smtClean="0"/>
-              <a:t>11</a:t>
+              <a:t>12</a:t>
             </a:fld>
             <a:endParaRPr lang="en-US"/>
           </a:p>
@@ -9562,7 +10550,7 @@
 </p:sld>
 </file>
 
-<file path=ppt/slides/slide12.xml><?xml version="1.0" encoding="utf-8"?>
+<file path=ppt/slides/slide13.xml><?xml version="1.0" encoding="utf-8"?>
 <p:sld xmlns:a="http://schemas.openxmlformats.org/drawingml/2006/main" xmlns:r="http://schemas.openxmlformats.org/officeDocument/2006/relationships" xmlns:p="http://schemas.openxmlformats.org/presentationml/2006/main">
   <p:cSld>
     <p:spTree>
@@ -9716,7 +10704,7 @@
           <a:p>
             <a:fld id="{6D95AE55-B5F4-483D-AEFF-E8059F5502F5}" type="slidenum">
               <a:rPr lang="en-US" smtClean="0"/>
-              <a:t>12</a:t>
+              <a:t>13</a:t>
             </a:fld>
             <a:endParaRPr lang="en-US"/>
           </a:p>
@@ -10057,7 +11045,7 @@
 </p:sld>
 </file>
 
-<file path=ppt/slides/slide13.xml><?xml version="1.0" encoding="utf-8"?>
+<file path=ppt/slides/slide14.xml><?xml version="1.0" encoding="utf-8"?>
 <p:sld xmlns:a="http://schemas.openxmlformats.org/drawingml/2006/main" xmlns:r="http://schemas.openxmlformats.org/officeDocument/2006/relationships" xmlns:p="http://schemas.openxmlformats.org/presentationml/2006/main">
   <p:cSld>
     <p:spTree>
@@ -10220,7 +11208,7 @@
           <a:p>
             <a:fld id="{6D95AE55-B5F4-483D-AEFF-E8059F5502F5}" type="slidenum">
               <a:rPr lang="en-US" smtClean="0"/>
-              <a:t>13</a:t>
+              <a:t>14</a:t>
             </a:fld>
             <a:endParaRPr lang="en-US"/>
           </a:p>
@@ -10416,7 +11404,7 @@
 </p:sld>
 </file>
 
-<file path=ppt/slides/slide14.xml><?xml version="1.0" encoding="utf-8"?>
+<file path=ppt/slides/slide15.xml><?xml version="1.0" encoding="utf-8"?>
 <p:sld xmlns:a="http://schemas.openxmlformats.org/drawingml/2006/main" xmlns:r="http://schemas.openxmlformats.org/officeDocument/2006/relationships" xmlns:p="http://schemas.openxmlformats.org/presentationml/2006/main">
   <p:cSld>
     <p:spTree>
@@ -10579,7 +11567,7 @@
           <a:p>
             <a:fld id="{6D95AE55-B5F4-483D-AEFF-E8059F5502F5}" type="slidenum">
               <a:rPr lang="en-US" smtClean="0"/>
-              <a:t>14</a:t>
+              <a:t>15</a:t>
             </a:fld>
             <a:endParaRPr lang="en-US"/>
           </a:p>
@@ -10848,6 +11836,480 @@
           <a:chExt cx="0" cy="0"/>
         </a:xfrm>
       </p:grpSpPr>
+      <p:pic>
+        <p:nvPicPr>
+          <p:cNvPr id="5" name="Picture 4" descr="A blue smoke on a white background&#10;&#10;Description automatically generated">
+            <a:extLst>
+              <a:ext uri="{FF2B5EF4-FFF2-40B4-BE49-F238E27FC236}">
+                <a16:creationId xmlns:a16="http://schemas.microsoft.com/office/drawing/2014/main" id="{3D7F8E17-74EF-97EE-B202-8E2F88043E52}"/>
+              </a:ext>
+            </a:extLst>
+          </p:cNvPr>
+          <p:cNvPicPr>
+            <a:picLocks noChangeAspect="1"/>
+          </p:cNvPicPr>
+          <p:nvPr/>
+        </p:nvPicPr>
+        <p:blipFill>
+          <a:blip r:embed="rId2">
+            <a:clrChange>
+              <a:clrFrom>
+                <a:srgbClr val="FAFAFA"/>
+              </a:clrFrom>
+              <a:clrTo>
+                <a:srgbClr val="FAFAFA">
+                  <a:alpha val="0"/>
+                </a:srgbClr>
+              </a:clrTo>
+            </a:clrChange>
+            <a:extLst>
+              <a:ext uri="{28A0092B-C50C-407E-A947-70E740481C1C}">
+                <a14:useLocalDpi xmlns:a14="http://schemas.microsoft.com/office/drawing/2010/main" val="0"/>
+              </a:ext>
+            </a:extLst>
+          </a:blip>
+          <a:stretch>
+            <a:fillRect/>
+          </a:stretch>
+        </p:blipFill>
+        <p:spPr>
+          <a:xfrm rot="21243389">
+            <a:off x="2492284" y="-271777"/>
+            <a:ext cx="10314939" cy="2719384"/>
+          </a:xfrm>
+          <a:prstGeom prst="rect">
+            <a:avLst/>
+          </a:prstGeom>
+        </p:spPr>
+      </p:pic>
+      <p:sp>
+        <p:nvSpPr>
+          <p:cNvPr id="2" name="Title 1">
+            <a:extLst>
+              <a:ext uri="{FF2B5EF4-FFF2-40B4-BE49-F238E27FC236}">
+                <a16:creationId xmlns:a16="http://schemas.microsoft.com/office/drawing/2014/main" id="{DFAC539F-2378-0F99-6485-9AB89ECE9174}"/>
+              </a:ext>
+            </a:extLst>
+          </p:cNvPr>
+          <p:cNvSpPr>
+            <a:spLocks noGrp="1"/>
+          </p:cNvSpPr>
+          <p:nvPr>
+            <p:ph type="ctrTitle"/>
+          </p:nvPr>
+        </p:nvSpPr>
+        <p:spPr>
+          <a:xfrm>
+            <a:off x="3040182" y="1728055"/>
+            <a:ext cx="9219141" cy="798986"/>
+          </a:xfrm>
+        </p:spPr>
+        <p:txBody>
+          <a:bodyPr>
+            <a:noAutofit/>
+          </a:bodyPr>
+          <a:lstStyle/>
+          <a:p>
+            <a:r>
+              <a:rPr lang="en-US" sz="4400" b="1" dirty="0"/>
+              <a:t>…coming to a Teams window near you!</a:t>
+            </a:r>
+          </a:p>
+        </p:txBody>
+      </p:sp>
+      <p:sp>
+        <p:nvSpPr>
+          <p:cNvPr id="3" name="Subtitle 2">
+            <a:extLst>
+              <a:ext uri="{FF2B5EF4-FFF2-40B4-BE49-F238E27FC236}">
+                <a16:creationId xmlns:a16="http://schemas.microsoft.com/office/drawing/2014/main" id="{C5328A8B-D655-CF24-B165-16CB5410C26E}"/>
+              </a:ext>
+            </a:extLst>
+          </p:cNvPr>
+          <p:cNvSpPr>
+            <a:spLocks noGrp="1"/>
+          </p:cNvSpPr>
+          <p:nvPr>
+            <p:ph type="subTitle" idx="1"/>
+          </p:nvPr>
+        </p:nvSpPr>
+        <p:spPr>
+          <a:xfrm>
+            <a:off x="1002455" y="3616601"/>
+            <a:ext cx="8514080" cy="2949786"/>
+          </a:xfrm>
+        </p:spPr>
+        <p:txBody>
+          <a:bodyPr/>
+          <a:lstStyle/>
+          <a:p>
+            <a:pPr algn="l"/>
+            <a:r>
+              <a:rPr lang="en-US" i="1" dirty="0"/>
+              <a:t>The Virtual Meeting Housekeeping </a:t>
+            </a:r>
+            <a:r>
+              <a:rPr lang="en-US" i="1" dirty="0" err="1"/>
+              <a:t>Slide</a:t>
+            </a:r>
+            <a:r>
+              <a:rPr lang="en-US" i="1" baseline="30000" dirty="0" err="1"/>
+              <a:t>TM</a:t>
+            </a:r>
+            <a:endParaRPr lang="en-US" i="1" baseline="30000" dirty="0"/>
+          </a:p>
+          <a:p>
+            <a:pPr marL="342900" indent="-342900" algn="l">
+              <a:buFont typeface="Arial" panose="020B0604020202020204" pitchFamily="34" charset="0"/>
+              <a:buChar char="•"/>
+            </a:pPr>
+            <a:r>
+              <a:rPr lang="en-US" dirty="0"/>
+              <a:t>Please mute your microphone when you aren’t talking, but</a:t>
+            </a:r>
+          </a:p>
+          <a:p>
+            <a:pPr marL="342900" indent="-342900" algn="l">
+              <a:buFont typeface="Arial" panose="020B0604020202020204" pitchFamily="34" charset="0"/>
+              <a:buChar char="•"/>
+            </a:pPr>
+            <a:r>
+              <a:rPr lang="en-US" dirty="0"/>
+              <a:t>Please keep your camera on, if you’re comfortable doing so!</a:t>
+            </a:r>
+          </a:p>
+          <a:p>
+            <a:pPr marL="342900" indent="-342900" algn="l">
+              <a:buFont typeface="Arial" panose="020B0604020202020204" pitchFamily="34" charset="0"/>
+              <a:buChar char="•"/>
+            </a:pPr>
+            <a:r>
+              <a:rPr lang="en-US" dirty="0"/>
+              <a:t>HELP US KEEP THIS THING INTERACTIVE</a:t>
+            </a:r>
+          </a:p>
+          <a:p>
+            <a:pPr marL="342900" indent="-342900" algn="l">
+              <a:buFont typeface="Arial" panose="020B0604020202020204" pitchFamily="34" charset="0"/>
+              <a:buChar char="•"/>
+            </a:pPr>
+            <a:r>
+              <a:rPr lang="en-US" dirty="0"/>
+              <a:t>We will be monitoring the meeting chat, if that’s better for you</a:t>
+            </a:r>
+          </a:p>
+          <a:p>
+            <a:pPr marL="342900" indent="-342900" algn="l">
+              <a:buFont typeface="Arial" panose="020B0604020202020204" pitchFamily="34" charset="0"/>
+              <a:buChar char="•"/>
+            </a:pPr>
+            <a:r>
+              <a:rPr lang="en-US" dirty="0"/>
+              <a:t>Please resist the temptation to multitask</a:t>
+            </a:r>
+          </a:p>
+        </p:txBody>
+      </p:sp>
+      <p:pic>
+        <p:nvPicPr>
+          <p:cNvPr id="4" name="Picture 3" descr="A close up of a sign&#10;&#10;Description automatically generated">
+            <a:extLst>
+              <a:ext uri="{FF2B5EF4-FFF2-40B4-BE49-F238E27FC236}">
+                <a16:creationId xmlns:a16="http://schemas.microsoft.com/office/drawing/2014/main" id="{F7FB462F-D73F-D264-9907-A23708A7E74F}"/>
+              </a:ext>
+            </a:extLst>
+          </p:cNvPr>
+          <p:cNvPicPr>
+            <a:picLocks noChangeAspect="1"/>
+          </p:cNvPicPr>
+          <p:nvPr/>
+        </p:nvPicPr>
+        <p:blipFill rotWithShape="1">
+          <a:blip r:embed="rId3">
+            <a:extLst>
+              <a:ext uri="{28A0092B-C50C-407E-A947-70E740481C1C}">
+                <a14:useLocalDpi xmlns:a14="http://schemas.microsoft.com/office/drawing/2010/main" val="0"/>
+              </a:ext>
+            </a:extLst>
+          </a:blip>
+          <a:srcRect l="7087" t="11647" r="63578"/>
+          <a:stretch/>
+        </p:blipFill>
+        <p:spPr>
+          <a:xfrm>
+            <a:off x="0" y="0"/>
+            <a:ext cx="3180080" cy="3363439"/>
+          </a:xfrm>
+          <a:prstGeom prst="rect">
+            <a:avLst/>
+          </a:prstGeom>
+        </p:spPr>
+      </p:pic>
+      <p:pic>
+        <p:nvPicPr>
+          <p:cNvPr id="6" name="Content Placeholder 6" descr="A close up of a sign&#10;&#10;Description automatically generated">
+            <a:extLst>
+              <a:ext uri="{FF2B5EF4-FFF2-40B4-BE49-F238E27FC236}">
+                <a16:creationId xmlns:a16="http://schemas.microsoft.com/office/drawing/2014/main" id="{3D93F3F6-D0E6-A406-6F8F-21819EBBA7A1}"/>
+              </a:ext>
+            </a:extLst>
+          </p:cNvPr>
+          <p:cNvPicPr>
+            <a:picLocks noChangeAspect="1"/>
+          </p:cNvPicPr>
+          <p:nvPr/>
+        </p:nvPicPr>
+        <p:blipFill>
+          <a:blip r:embed="rId4">
+            <a:extLst>
+              <a:ext uri="{28A0092B-C50C-407E-A947-70E740481C1C}">
+                <a14:useLocalDpi xmlns:a14="http://schemas.microsoft.com/office/drawing/2010/main" val="0"/>
+              </a:ext>
+            </a:extLst>
+          </a:blip>
+          <a:stretch>
+            <a:fillRect/>
+          </a:stretch>
+        </p:blipFill>
+        <p:spPr>
+          <a:xfrm>
+            <a:off x="8479827" y="4162189"/>
+            <a:ext cx="4821743" cy="2781773"/>
+          </a:xfrm>
+          <a:prstGeom prst="rect">
+            <a:avLst/>
+          </a:prstGeom>
+        </p:spPr>
+      </p:pic>
+      <p:sp>
+        <p:nvSpPr>
+          <p:cNvPr id="7" name="Subtitle 2">
+            <a:extLst>
+              <a:ext uri="{FF2B5EF4-FFF2-40B4-BE49-F238E27FC236}">
+                <a16:creationId xmlns:a16="http://schemas.microsoft.com/office/drawing/2014/main" id="{D1CBF6D2-E801-F105-E1C5-13025732F0C6}"/>
+              </a:ext>
+            </a:extLst>
+          </p:cNvPr>
+          <p:cNvSpPr txBox="1">
+            <a:spLocks/>
+          </p:cNvSpPr>
+          <p:nvPr/>
+        </p:nvSpPr>
+        <p:spPr>
+          <a:xfrm>
+            <a:off x="5559294" y="2475854"/>
+            <a:ext cx="6361773" cy="620473"/>
+          </a:xfrm>
+          <a:prstGeom prst="rect">
+            <a:avLst/>
+          </a:prstGeom>
+        </p:spPr>
+        <p:txBody>
+          <a:bodyPr vert="horz" lIns="91440" tIns="45720" rIns="91440" bIns="45720" rtlCol="0">
+            <a:normAutofit/>
+          </a:bodyPr>
+          <a:lstStyle>
+            <a:lvl1pPr marL="0" indent="0" algn="ctr" defTabSz="914400" rtl="0" eaLnBrk="1" latinLnBrk="0" hangingPunct="1">
+              <a:lnSpc>
+                <a:spcPct val="90000"/>
+              </a:lnSpc>
+              <a:spcBef>
+                <a:spcPts val="1000"/>
+              </a:spcBef>
+              <a:buFont typeface="Arial" panose="020B0604020202020204" pitchFamily="34" charset="0"/>
+              <a:buNone/>
+              <a:defRPr sz="2400" kern="1200">
+                <a:solidFill>
+                  <a:schemeClr val="tx1"/>
+                </a:solidFill>
+                <a:latin typeface="+mn-lt"/>
+                <a:ea typeface="+mn-ea"/>
+                <a:cs typeface="+mn-cs"/>
+              </a:defRPr>
+            </a:lvl1pPr>
+            <a:lvl2pPr marL="457200" indent="0" algn="ctr" defTabSz="914400" rtl="0" eaLnBrk="1" latinLnBrk="0" hangingPunct="1">
+              <a:lnSpc>
+                <a:spcPct val="90000"/>
+              </a:lnSpc>
+              <a:spcBef>
+                <a:spcPts val="500"/>
+              </a:spcBef>
+              <a:buFont typeface="Arial" panose="020B0604020202020204" pitchFamily="34" charset="0"/>
+              <a:buNone/>
+              <a:defRPr sz="2000" kern="1200">
+                <a:solidFill>
+                  <a:schemeClr val="tx1"/>
+                </a:solidFill>
+                <a:latin typeface="+mn-lt"/>
+                <a:ea typeface="+mn-ea"/>
+                <a:cs typeface="+mn-cs"/>
+              </a:defRPr>
+            </a:lvl2pPr>
+            <a:lvl3pPr marL="914400" indent="0" algn="ctr" defTabSz="914400" rtl="0" eaLnBrk="1" latinLnBrk="0" hangingPunct="1">
+              <a:lnSpc>
+                <a:spcPct val="90000"/>
+              </a:lnSpc>
+              <a:spcBef>
+                <a:spcPts val="500"/>
+              </a:spcBef>
+              <a:buFont typeface="Arial" panose="020B0604020202020204" pitchFamily="34" charset="0"/>
+              <a:buNone/>
+              <a:defRPr sz="1800" kern="1200">
+                <a:solidFill>
+                  <a:schemeClr val="tx1"/>
+                </a:solidFill>
+                <a:latin typeface="+mn-lt"/>
+                <a:ea typeface="+mn-ea"/>
+                <a:cs typeface="+mn-cs"/>
+              </a:defRPr>
+            </a:lvl3pPr>
+            <a:lvl4pPr marL="1371600" indent="0" algn="ctr" defTabSz="914400" rtl="0" eaLnBrk="1" latinLnBrk="0" hangingPunct="1">
+              <a:lnSpc>
+                <a:spcPct val="90000"/>
+              </a:lnSpc>
+              <a:spcBef>
+                <a:spcPts val="500"/>
+              </a:spcBef>
+              <a:buFont typeface="Arial" panose="020B0604020202020204" pitchFamily="34" charset="0"/>
+              <a:buNone/>
+              <a:defRPr sz="1600" kern="1200">
+                <a:solidFill>
+                  <a:schemeClr val="tx1"/>
+                </a:solidFill>
+                <a:latin typeface="+mn-lt"/>
+                <a:ea typeface="+mn-ea"/>
+                <a:cs typeface="+mn-cs"/>
+              </a:defRPr>
+            </a:lvl4pPr>
+            <a:lvl5pPr marL="1828800" indent="0" algn="ctr" defTabSz="914400" rtl="0" eaLnBrk="1" latinLnBrk="0" hangingPunct="1">
+              <a:lnSpc>
+                <a:spcPct val="90000"/>
+              </a:lnSpc>
+              <a:spcBef>
+                <a:spcPts val="500"/>
+              </a:spcBef>
+              <a:buFont typeface="Arial" panose="020B0604020202020204" pitchFamily="34" charset="0"/>
+              <a:buNone/>
+              <a:defRPr sz="1600" kern="1200">
+                <a:solidFill>
+                  <a:schemeClr val="tx1"/>
+                </a:solidFill>
+                <a:latin typeface="+mn-lt"/>
+                <a:ea typeface="+mn-ea"/>
+                <a:cs typeface="+mn-cs"/>
+              </a:defRPr>
+            </a:lvl5pPr>
+            <a:lvl6pPr marL="2286000" indent="0" algn="ctr" defTabSz="914400" rtl="0" eaLnBrk="1" latinLnBrk="0" hangingPunct="1">
+              <a:lnSpc>
+                <a:spcPct val="90000"/>
+              </a:lnSpc>
+              <a:spcBef>
+                <a:spcPts val="500"/>
+              </a:spcBef>
+              <a:buFont typeface="Arial" panose="020B0604020202020204" pitchFamily="34" charset="0"/>
+              <a:buNone/>
+              <a:defRPr sz="1600" kern="1200">
+                <a:solidFill>
+                  <a:schemeClr val="tx1"/>
+                </a:solidFill>
+                <a:latin typeface="+mn-lt"/>
+                <a:ea typeface="+mn-ea"/>
+                <a:cs typeface="+mn-cs"/>
+              </a:defRPr>
+            </a:lvl6pPr>
+            <a:lvl7pPr marL="2743200" indent="0" algn="ctr" defTabSz="914400" rtl="0" eaLnBrk="1" latinLnBrk="0" hangingPunct="1">
+              <a:lnSpc>
+                <a:spcPct val="90000"/>
+              </a:lnSpc>
+              <a:spcBef>
+                <a:spcPts val="500"/>
+              </a:spcBef>
+              <a:buFont typeface="Arial" panose="020B0604020202020204" pitchFamily="34" charset="0"/>
+              <a:buNone/>
+              <a:defRPr sz="1600" kern="1200">
+                <a:solidFill>
+                  <a:schemeClr val="tx1"/>
+                </a:solidFill>
+                <a:latin typeface="+mn-lt"/>
+                <a:ea typeface="+mn-ea"/>
+                <a:cs typeface="+mn-cs"/>
+              </a:defRPr>
+            </a:lvl7pPr>
+            <a:lvl8pPr marL="3200400" indent="0" algn="ctr" defTabSz="914400" rtl="0" eaLnBrk="1" latinLnBrk="0" hangingPunct="1">
+              <a:lnSpc>
+                <a:spcPct val="90000"/>
+              </a:lnSpc>
+              <a:spcBef>
+                <a:spcPts val="500"/>
+              </a:spcBef>
+              <a:buFont typeface="Arial" panose="020B0604020202020204" pitchFamily="34" charset="0"/>
+              <a:buNone/>
+              <a:defRPr sz="1600" kern="1200">
+                <a:solidFill>
+                  <a:schemeClr val="tx1"/>
+                </a:solidFill>
+                <a:latin typeface="+mn-lt"/>
+                <a:ea typeface="+mn-ea"/>
+                <a:cs typeface="+mn-cs"/>
+              </a:defRPr>
+            </a:lvl8pPr>
+            <a:lvl9pPr marL="3657600" indent="0" algn="ctr" defTabSz="914400" rtl="0" eaLnBrk="1" latinLnBrk="0" hangingPunct="1">
+              <a:lnSpc>
+                <a:spcPct val="90000"/>
+              </a:lnSpc>
+              <a:spcBef>
+                <a:spcPts val="500"/>
+              </a:spcBef>
+              <a:buFont typeface="Arial" panose="020B0604020202020204" pitchFamily="34" charset="0"/>
+              <a:buNone/>
+              <a:defRPr sz="1600" kern="1200">
+                <a:solidFill>
+                  <a:schemeClr val="tx1"/>
+                </a:solidFill>
+                <a:latin typeface="+mn-lt"/>
+                <a:ea typeface="+mn-ea"/>
+                <a:cs typeface="+mn-cs"/>
+              </a:defRPr>
+            </a:lvl9pPr>
+          </a:lstStyle>
+          <a:p>
+            <a:r>
+              <a:rPr lang="en-US" sz="2800" dirty="0"/>
+              <a:t>(thanks for your flexibility)</a:t>
+            </a:r>
+          </a:p>
+        </p:txBody>
+      </p:sp>
+    </p:spTree>
+    <p:extLst>
+      <p:ext uri="{BB962C8B-B14F-4D97-AF65-F5344CB8AC3E}">
+        <p14:creationId xmlns:p14="http://schemas.microsoft.com/office/powerpoint/2010/main" val="1955116907"/>
+      </p:ext>
+    </p:extLst>
+  </p:cSld>
+  <p:clrMapOvr>
+    <a:masterClrMapping/>
+  </p:clrMapOvr>
+</p:sld>
+</file>
+
+<file path=ppt/slides/slide3.xml><?xml version="1.0" encoding="utf-8"?>
+<p:sld xmlns:a="http://schemas.openxmlformats.org/drawingml/2006/main" xmlns:r="http://schemas.openxmlformats.org/officeDocument/2006/relationships" xmlns:p="http://schemas.openxmlformats.org/presentationml/2006/main">
+  <p:cSld>
+    <p:spTree>
+      <p:nvGrpSpPr>
+        <p:cNvPr id="1" name=""/>
+        <p:cNvGrpSpPr/>
+        <p:nvPr/>
+      </p:nvGrpSpPr>
+      <p:grpSpPr>
+        <a:xfrm>
+          <a:off x="0" y="0"/>
+          <a:ext cx="0" cy="0"/>
+          <a:chOff x="0" y="0"/>
+          <a:chExt cx="0" cy="0"/>
+        </a:xfrm>
+      </p:grpSpPr>
       <p:sp>
         <p:nvSpPr>
           <p:cNvPr id="2" name="Title 1">
@@ -11014,7 +12476,7 @@
                   <a:spcPts val="600"/>
                 </a:spcAft>
               </a:pPr>
-              <a:t>2</a:t>
+              <a:t>3</a:t>
             </a:fld>
             <a:endParaRPr lang="en-US">
               <a:solidFill>
@@ -13141,7 +14603,7 @@
 </p:sld>
 </file>
 
-<file path=ppt/slides/slide3.xml><?xml version="1.0" encoding="utf-8"?>
+<file path=ppt/slides/slide4.xml><?xml version="1.0" encoding="utf-8"?>
 <p:sld xmlns:a="http://schemas.openxmlformats.org/drawingml/2006/main" xmlns:r="http://schemas.openxmlformats.org/officeDocument/2006/relationships" xmlns:p="http://schemas.openxmlformats.org/presentationml/2006/main">
   <p:cSld>
     <p:spTree>
@@ -13285,7 +14747,7 @@
           <a:p>
             <a:fld id="{6D95AE55-B5F4-483D-AEFF-E8059F5502F5}" type="slidenum">
               <a:rPr lang="en-US" smtClean="0"/>
-              <a:t>3</a:t>
+              <a:t>4</a:t>
             </a:fld>
             <a:endParaRPr lang="en-US"/>
           </a:p>
@@ -14704,7 +16166,7 @@
 </p:sld>
 </file>
 
-<file path=ppt/slides/slide4.xml><?xml version="1.0" encoding="utf-8"?>
+<file path=ppt/slides/slide5.xml><?xml version="1.0" encoding="utf-8"?>
 <p:sld xmlns:a="http://schemas.openxmlformats.org/drawingml/2006/main" xmlns:r="http://schemas.openxmlformats.org/officeDocument/2006/relationships" xmlns:p="http://schemas.openxmlformats.org/presentationml/2006/main">
   <p:cSld>
     <p:spTree>
@@ -14896,7 +16358,7 @@
           <a:p>
             <a:fld id="{6D95AE55-B5F4-483D-AEFF-E8059F5502F5}" type="slidenum">
               <a:rPr lang="en-US" smtClean="0"/>
-              <a:t>4</a:t>
+              <a:t>5</a:t>
             </a:fld>
             <a:endParaRPr lang="en-US" dirty="0"/>
           </a:p>
@@ -15276,7 +16738,7 @@
 </p:sld>
 </file>
 
-<file path=ppt/slides/slide5.xml><?xml version="1.0" encoding="utf-8"?>
+<file path=ppt/slides/slide6.xml><?xml version="1.0" encoding="utf-8"?>
 <p:sld xmlns:a="http://schemas.openxmlformats.org/drawingml/2006/main" xmlns:r="http://schemas.openxmlformats.org/officeDocument/2006/relationships" xmlns:p="http://schemas.openxmlformats.org/presentationml/2006/main">
   <p:cSld>
     <p:spTree>
@@ -15433,7 +16895,7 @@
           <a:p>
             <a:fld id="{6D95AE55-B5F4-483D-AEFF-E8059F5502F5}" type="slidenum">
               <a:rPr lang="en-US" smtClean="0"/>
-              <a:t>5</a:t>
+              <a:t>6</a:t>
             </a:fld>
             <a:endParaRPr lang="en-US"/>
           </a:p>
@@ -15856,7 +17318,7 @@
 </p:sld>
 </file>
 
-<file path=ppt/slides/slide6.xml><?xml version="1.0" encoding="utf-8"?>
+<file path=ppt/slides/slide7.xml><?xml version="1.0" encoding="utf-8"?>
 <p:sld xmlns:a="http://schemas.openxmlformats.org/drawingml/2006/main" xmlns:r="http://schemas.openxmlformats.org/officeDocument/2006/relationships" xmlns:p="http://schemas.openxmlformats.org/presentationml/2006/main">
   <p:cSld>
     <p:spTree>
@@ -15924,7 +17386,7 @@
           <a:p>
             <a:fld id="{6D95AE55-B5F4-483D-AEFF-E8059F5502F5}" type="slidenum">
               <a:rPr lang="en-US" smtClean="0"/>
-              <a:t>6</a:t>
+              <a:t>7</a:t>
             </a:fld>
             <a:endParaRPr lang="en-US"/>
           </a:p>
@@ -16554,7 +18016,7 @@
 </p:sld>
 </file>
 
-<file path=ppt/slides/slide7.xml><?xml version="1.0" encoding="utf-8"?>
+<file path=ppt/slides/slide8.xml><?xml version="1.0" encoding="utf-8"?>
 <p:sld xmlns:a="http://schemas.openxmlformats.org/drawingml/2006/main" xmlns:r="http://schemas.openxmlformats.org/officeDocument/2006/relationships" xmlns:p="http://schemas.openxmlformats.org/presentationml/2006/main">
   <p:cSld>
     <p:spTree>
@@ -17569,7 +19031,7 @@
 </p:sld>
 </file>
 
-<file path=ppt/slides/slide8.xml><?xml version="1.0" encoding="utf-8"?>
+<file path=ppt/slides/slide9.xml><?xml version="1.0" encoding="utf-8"?>
 <p:sld xmlns:a="http://schemas.openxmlformats.org/drawingml/2006/main" xmlns:r="http://schemas.openxmlformats.org/officeDocument/2006/relationships" xmlns:p="http://schemas.openxmlformats.org/presentationml/2006/main">
   <p:cSld>
     <p:spTree>
@@ -17656,993 +19118,6 @@
   <p:clrMapOvr>
     <a:masterClrMapping/>
   </p:clrMapOvr>
-</p:sld>
-</file>
-
-<file path=ppt/slides/slide9.xml><?xml version="1.0" encoding="utf-8"?>
-<p:sld xmlns:a="http://schemas.openxmlformats.org/drawingml/2006/main" xmlns:r="http://schemas.openxmlformats.org/officeDocument/2006/relationships" xmlns:p="http://schemas.openxmlformats.org/presentationml/2006/main">
-  <p:cSld>
-    <p:spTree>
-      <p:nvGrpSpPr>
-        <p:cNvPr id="1" name=""/>
-        <p:cNvGrpSpPr/>
-        <p:nvPr/>
-      </p:nvGrpSpPr>
-      <p:grpSpPr>
-        <a:xfrm>
-          <a:off x="0" y="0"/>
-          <a:ext cx="0" cy="0"/>
-          <a:chOff x="0" y="0"/>
-          <a:chExt cx="0" cy="0"/>
-        </a:xfrm>
-      </p:grpSpPr>
-      <p:sp>
-        <p:nvSpPr>
-          <p:cNvPr id="2" name="Title 1">
-            <a:extLst>
-              <a:ext uri="{FF2B5EF4-FFF2-40B4-BE49-F238E27FC236}">
-                <a16:creationId xmlns:a16="http://schemas.microsoft.com/office/drawing/2014/main" id="{8115451F-211E-5062-3063-EEFCC622ABEA}"/>
-              </a:ext>
-            </a:extLst>
-          </p:cNvPr>
-          <p:cNvSpPr>
-            <a:spLocks noGrp="1"/>
-          </p:cNvSpPr>
-          <p:nvPr>
-            <p:ph type="title"/>
-          </p:nvPr>
-        </p:nvSpPr>
-        <p:spPr>
-          <a:xfrm>
-            <a:off x="741947" y="1"/>
-            <a:ext cx="10515600" cy="914400"/>
-          </a:xfrm>
-        </p:spPr>
-        <p:txBody>
-          <a:bodyPr>
-            <a:noAutofit/>
-          </a:bodyPr>
-          <a:lstStyle/>
-          <a:p>
-            <a:r>
-              <a:rPr lang="en-US" sz="3600" b="1" dirty="0"/>
-              <a:t>Ok, so why R?</a:t>
-            </a:r>
-          </a:p>
-        </p:txBody>
-      </p:sp>
-      <p:sp>
-        <p:nvSpPr>
-          <p:cNvPr id="19" name="Content Placeholder 2">
-            <a:extLst>
-              <a:ext uri="{FF2B5EF4-FFF2-40B4-BE49-F238E27FC236}">
-                <a16:creationId xmlns:a16="http://schemas.microsoft.com/office/drawing/2014/main" id="{1E59D450-1D15-06EF-3C95-D5BD186D82C4}"/>
-              </a:ext>
-            </a:extLst>
-          </p:cNvPr>
-          <p:cNvSpPr txBox="1">
-            <a:spLocks/>
-          </p:cNvSpPr>
-          <p:nvPr/>
-        </p:nvSpPr>
-        <p:spPr>
-          <a:xfrm>
-            <a:off x="741946" y="1165257"/>
-            <a:ext cx="8461047" cy="2649659"/>
-          </a:xfrm>
-          <a:prstGeom prst="rect">
-            <a:avLst/>
-          </a:prstGeom>
-        </p:spPr>
-        <p:txBody>
-          <a:bodyPr vert="horz" lIns="91440" tIns="45720" rIns="91440" bIns="45720" rtlCol="0">
-            <a:normAutofit/>
-          </a:bodyPr>
-          <a:lstStyle>
-            <a:lvl1pPr marL="228600" indent="-228600" algn="l" defTabSz="914400" rtl="0" eaLnBrk="1" latinLnBrk="0" hangingPunct="1">
-              <a:lnSpc>
-                <a:spcPct val="90000"/>
-              </a:lnSpc>
-              <a:spcBef>
-                <a:spcPts val="1000"/>
-              </a:spcBef>
-              <a:buFont typeface="Arial" panose="020B0604020202020204" pitchFamily="34" charset="0"/>
-              <a:buChar char="•"/>
-              <a:defRPr sz="2800" kern="1200">
-                <a:solidFill>
-                  <a:schemeClr val="tx1"/>
-                </a:solidFill>
-                <a:latin typeface="+mn-lt"/>
-                <a:ea typeface="+mn-ea"/>
-                <a:cs typeface="+mn-cs"/>
-              </a:defRPr>
-            </a:lvl1pPr>
-            <a:lvl2pPr marL="685800" indent="-228600" algn="l" defTabSz="914400" rtl="0" eaLnBrk="1" latinLnBrk="0" hangingPunct="1">
-              <a:lnSpc>
-                <a:spcPct val="90000"/>
-              </a:lnSpc>
-              <a:spcBef>
-                <a:spcPts val="500"/>
-              </a:spcBef>
-              <a:buFont typeface="Arial" panose="020B0604020202020204" pitchFamily="34" charset="0"/>
-              <a:buChar char="•"/>
-              <a:defRPr sz="2400" kern="1200">
-                <a:solidFill>
-                  <a:schemeClr val="tx1"/>
-                </a:solidFill>
-                <a:latin typeface="+mn-lt"/>
-                <a:ea typeface="+mn-ea"/>
-                <a:cs typeface="+mn-cs"/>
-              </a:defRPr>
-            </a:lvl2pPr>
-            <a:lvl3pPr marL="1143000" indent="-228600" algn="l" defTabSz="914400" rtl="0" eaLnBrk="1" latinLnBrk="0" hangingPunct="1">
-              <a:lnSpc>
-                <a:spcPct val="90000"/>
-              </a:lnSpc>
-              <a:spcBef>
-                <a:spcPts val="500"/>
-              </a:spcBef>
-              <a:buFont typeface="Arial" panose="020B0604020202020204" pitchFamily="34" charset="0"/>
-              <a:buChar char="•"/>
-              <a:defRPr sz="2000" kern="1200">
-                <a:solidFill>
-                  <a:schemeClr val="tx1"/>
-                </a:solidFill>
-                <a:latin typeface="+mn-lt"/>
-                <a:ea typeface="+mn-ea"/>
-                <a:cs typeface="+mn-cs"/>
-              </a:defRPr>
-            </a:lvl3pPr>
-            <a:lvl4pPr marL="1600200" indent="-228600" algn="l" defTabSz="914400" rtl="0" eaLnBrk="1" latinLnBrk="0" hangingPunct="1">
-              <a:lnSpc>
-                <a:spcPct val="90000"/>
-              </a:lnSpc>
-              <a:spcBef>
-                <a:spcPts val="500"/>
-              </a:spcBef>
-              <a:buFont typeface="Arial" panose="020B0604020202020204" pitchFamily="34" charset="0"/>
-              <a:buChar char="•"/>
-              <a:defRPr sz="1800" kern="1200">
-                <a:solidFill>
-                  <a:schemeClr val="tx1"/>
-                </a:solidFill>
-                <a:latin typeface="+mn-lt"/>
-                <a:ea typeface="+mn-ea"/>
-                <a:cs typeface="+mn-cs"/>
-              </a:defRPr>
-            </a:lvl4pPr>
-            <a:lvl5pPr marL="2057400" indent="-228600" algn="l" defTabSz="914400" rtl="0" eaLnBrk="1" latinLnBrk="0" hangingPunct="1">
-              <a:lnSpc>
-                <a:spcPct val="90000"/>
-              </a:lnSpc>
-              <a:spcBef>
-                <a:spcPts val="500"/>
-              </a:spcBef>
-              <a:buFont typeface="Arial" panose="020B0604020202020204" pitchFamily="34" charset="0"/>
-              <a:buChar char="•"/>
-              <a:defRPr sz="1800" kern="1200">
-                <a:solidFill>
-                  <a:schemeClr val="tx1"/>
-                </a:solidFill>
-                <a:latin typeface="+mn-lt"/>
-                <a:ea typeface="+mn-ea"/>
-                <a:cs typeface="+mn-cs"/>
-              </a:defRPr>
-            </a:lvl5pPr>
-            <a:lvl6pPr marL="2514600" indent="-228600" algn="l" defTabSz="914400" rtl="0" eaLnBrk="1" latinLnBrk="0" hangingPunct="1">
-              <a:lnSpc>
-                <a:spcPct val="90000"/>
-              </a:lnSpc>
-              <a:spcBef>
-                <a:spcPts val="500"/>
-              </a:spcBef>
-              <a:buFont typeface="Arial" panose="020B0604020202020204" pitchFamily="34" charset="0"/>
-              <a:buChar char="•"/>
-              <a:defRPr sz="1800" kern="1200">
-                <a:solidFill>
-                  <a:schemeClr val="tx1"/>
-                </a:solidFill>
-                <a:latin typeface="+mn-lt"/>
-                <a:ea typeface="+mn-ea"/>
-                <a:cs typeface="+mn-cs"/>
-              </a:defRPr>
-            </a:lvl6pPr>
-            <a:lvl7pPr marL="2971800" indent="-228600" algn="l" defTabSz="914400" rtl="0" eaLnBrk="1" latinLnBrk="0" hangingPunct="1">
-              <a:lnSpc>
-                <a:spcPct val="90000"/>
-              </a:lnSpc>
-              <a:spcBef>
-                <a:spcPts val="500"/>
-              </a:spcBef>
-              <a:buFont typeface="Arial" panose="020B0604020202020204" pitchFamily="34" charset="0"/>
-              <a:buChar char="•"/>
-              <a:defRPr sz="1800" kern="1200">
-                <a:solidFill>
-                  <a:schemeClr val="tx1"/>
-                </a:solidFill>
-                <a:latin typeface="+mn-lt"/>
-                <a:ea typeface="+mn-ea"/>
-                <a:cs typeface="+mn-cs"/>
-              </a:defRPr>
-            </a:lvl7pPr>
-            <a:lvl8pPr marL="3429000" indent="-228600" algn="l" defTabSz="914400" rtl="0" eaLnBrk="1" latinLnBrk="0" hangingPunct="1">
-              <a:lnSpc>
-                <a:spcPct val="90000"/>
-              </a:lnSpc>
-              <a:spcBef>
-                <a:spcPts val="500"/>
-              </a:spcBef>
-              <a:buFont typeface="Arial" panose="020B0604020202020204" pitchFamily="34" charset="0"/>
-              <a:buChar char="•"/>
-              <a:defRPr sz="1800" kern="1200">
-                <a:solidFill>
-                  <a:schemeClr val="tx1"/>
-                </a:solidFill>
-                <a:latin typeface="+mn-lt"/>
-                <a:ea typeface="+mn-ea"/>
-                <a:cs typeface="+mn-cs"/>
-              </a:defRPr>
-            </a:lvl8pPr>
-            <a:lvl9pPr marL="3886200" indent="-228600" algn="l" defTabSz="914400" rtl="0" eaLnBrk="1" latinLnBrk="0" hangingPunct="1">
-              <a:lnSpc>
-                <a:spcPct val="90000"/>
-              </a:lnSpc>
-              <a:spcBef>
-                <a:spcPts val="500"/>
-              </a:spcBef>
-              <a:buFont typeface="Arial" panose="020B0604020202020204" pitchFamily="34" charset="0"/>
-              <a:buChar char="•"/>
-              <a:defRPr sz="1800" kern="1200">
-                <a:solidFill>
-                  <a:schemeClr val="tx1"/>
-                </a:solidFill>
-                <a:latin typeface="+mn-lt"/>
-                <a:ea typeface="+mn-ea"/>
-                <a:cs typeface="+mn-cs"/>
-              </a:defRPr>
-            </a:lvl9pPr>
-          </a:lstStyle>
-          <a:p>
-            <a:endParaRPr lang="en-US" dirty="0"/>
-          </a:p>
-        </p:txBody>
-      </p:sp>
-      <p:sp>
-        <p:nvSpPr>
-          <p:cNvPr id="3" name="Content Placeholder 2">
-            <a:extLst>
-              <a:ext uri="{FF2B5EF4-FFF2-40B4-BE49-F238E27FC236}">
-                <a16:creationId xmlns:a16="http://schemas.microsoft.com/office/drawing/2014/main" id="{DB566984-E5C5-ECC5-287A-D44DCCBB65C8}"/>
-              </a:ext>
-            </a:extLst>
-          </p:cNvPr>
-          <p:cNvSpPr txBox="1">
-            <a:spLocks/>
-          </p:cNvSpPr>
-          <p:nvPr/>
-        </p:nvSpPr>
-        <p:spPr>
-          <a:xfrm>
-            <a:off x="741946" y="1165257"/>
-            <a:ext cx="11086260" cy="5134478"/>
-          </a:xfrm>
-          <a:prstGeom prst="rect">
-            <a:avLst/>
-          </a:prstGeom>
-        </p:spPr>
-        <p:txBody>
-          <a:bodyPr vert="horz" lIns="91440" tIns="45720" rIns="91440" bIns="45720" rtlCol="0">
-            <a:normAutofit/>
-          </a:bodyPr>
-          <a:lstStyle>
-            <a:lvl1pPr marL="228600" indent="-228600" algn="l" defTabSz="914400" rtl="0" eaLnBrk="1" latinLnBrk="0" hangingPunct="1">
-              <a:lnSpc>
-                <a:spcPct val="90000"/>
-              </a:lnSpc>
-              <a:spcBef>
-                <a:spcPts val="1000"/>
-              </a:spcBef>
-              <a:buFont typeface="Arial" panose="020B0604020202020204" pitchFamily="34" charset="0"/>
-              <a:buChar char="•"/>
-              <a:defRPr sz="2800" kern="1200">
-                <a:solidFill>
-                  <a:schemeClr val="tx1"/>
-                </a:solidFill>
-                <a:latin typeface="+mn-lt"/>
-                <a:ea typeface="+mn-ea"/>
-                <a:cs typeface="+mn-cs"/>
-              </a:defRPr>
-            </a:lvl1pPr>
-            <a:lvl2pPr marL="685800" indent="-228600" algn="l" defTabSz="914400" rtl="0" eaLnBrk="1" latinLnBrk="0" hangingPunct="1">
-              <a:lnSpc>
-                <a:spcPct val="90000"/>
-              </a:lnSpc>
-              <a:spcBef>
-                <a:spcPts val="500"/>
-              </a:spcBef>
-              <a:buFont typeface="Arial" panose="020B0604020202020204" pitchFamily="34" charset="0"/>
-              <a:buChar char="•"/>
-              <a:defRPr sz="2400" kern="1200">
-                <a:solidFill>
-                  <a:schemeClr val="tx1"/>
-                </a:solidFill>
-                <a:latin typeface="+mn-lt"/>
-                <a:ea typeface="+mn-ea"/>
-                <a:cs typeface="+mn-cs"/>
-              </a:defRPr>
-            </a:lvl2pPr>
-            <a:lvl3pPr marL="1143000" indent="-228600" algn="l" defTabSz="914400" rtl="0" eaLnBrk="1" latinLnBrk="0" hangingPunct="1">
-              <a:lnSpc>
-                <a:spcPct val="90000"/>
-              </a:lnSpc>
-              <a:spcBef>
-                <a:spcPts val="500"/>
-              </a:spcBef>
-              <a:buFont typeface="Arial" panose="020B0604020202020204" pitchFamily="34" charset="0"/>
-              <a:buChar char="•"/>
-              <a:defRPr sz="2000" kern="1200">
-                <a:solidFill>
-                  <a:schemeClr val="tx1"/>
-                </a:solidFill>
-                <a:latin typeface="+mn-lt"/>
-                <a:ea typeface="+mn-ea"/>
-                <a:cs typeface="+mn-cs"/>
-              </a:defRPr>
-            </a:lvl3pPr>
-            <a:lvl4pPr marL="1600200" indent="-228600" algn="l" defTabSz="914400" rtl="0" eaLnBrk="1" latinLnBrk="0" hangingPunct="1">
-              <a:lnSpc>
-                <a:spcPct val="90000"/>
-              </a:lnSpc>
-              <a:spcBef>
-                <a:spcPts val="500"/>
-              </a:spcBef>
-              <a:buFont typeface="Arial" panose="020B0604020202020204" pitchFamily="34" charset="0"/>
-              <a:buChar char="•"/>
-              <a:defRPr sz="1800" kern="1200">
-                <a:solidFill>
-                  <a:schemeClr val="tx1"/>
-                </a:solidFill>
-                <a:latin typeface="+mn-lt"/>
-                <a:ea typeface="+mn-ea"/>
-                <a:cs typeface="+mn-cs"/>
-              </a:defRPr>
-            </a:lvl4pPr>
-            <a:lvl5pPr marL="2057400" indent="-228600" algn="l" defTabSz="914400" rtl="0" eaLnBrk="1" latinLnBrk="0" hangingPunct="1">
-              <a:lnSpc>
-                <a:spcPct val="90000"/>
-              </a:lnSpc>
-              <a:spcBef>
-                <a:spcPts val="500"/>
-              </a:spcBef>
-              <a:buFont typeface="Arial" panose="020B0604020202020204" pitchFamily="34" charset="0"/>
-              <a:buChar char="•"/>
-              <a:defRPr sz="1800" kern="1200">
-                <a:solidFill>
-                  <a:schemeClr val="tx1"/>
-                </a:solidFill>
-                <a:latin typeface="+mn-lt"/>
-                <a:ea typeface="+mn-ea"/>
-                <a:cs typeface="+mn-cs"/>
-              </a:defRPr>
-            </a:lvl5pPr>
-            <a:lvl6pPr marL="2514600" indent="-228600" algn="l" defTabSz="914400" rtl="0" eaLnBrk="1" latinLnBrk="0" hangingPunct="1">
-              <a:lnSpc>
-                <a:spcPct val="90000"/>
-              </a:lnSpc>
-              <a:spcBef>
-                <a:spcPts val="500"/>
-              </a:spcBef>
-              <a:buFont typeface="Arial" panose="020B0604020202020204" pitchFamily="34" charset="0"/>
-              <a:buChar char="•"/>
-              <a:defRPr sz="1800" kern="1200">
-                <a:solidFill>
-                  <a:schemeClr val="tx1"/>
-                </a:solidFill>
-                <a:latin typeface="+mn-lt"/>
-                <a:ea typeface="+mn-ea"/>
-                <a:cs typeface="+mn-cs"/>
-              </a:defRPr>
-            </a:lvl6pPr>
-            <a:lvl7pPr marL="2971800" indent="-228600" algn="l" defTabSz="914400" rtl="0" eaLnBrk="1" latinLnBrk="0" hangingPunct="1">
-              <a:lnSpc>
-                <a:spcPct val="90000"/>
-              </a:lnSpc>
-              <a:spcBef>
-                <a:spcPts val="500"/>
-              </a:spcBef>
-              <a:buFont typeface="Arial" panose="020B0604020202020204" pitchFamily="34" charset="0"/>
-              <a:buChar char="•"/>
-              <a:defRPr sz="1800" kern="1200">
-                <a:solidFill>
-                  <a:schemeClr val="tx1"/>
-                </a:solidFill>
-                <a:latin typeface="+mn-lt"/>
-                <a:ea typeface="+mn-ea"/>
-                <a:cs typeface="+mn-cs"/>
-              </a:defRPr>
-            </a:lvl7pPr>
-            <a:lvl8pPr marL="3429000" indent="-228600" algn="l" defTabSz="914400" rtl="0" eaLnBrk="1" latinLnBrk="0" hangingPunct="1">
-              <a:lnSpc>
-                <a:spcPct val="90000"/>
-              </a:lnSpc>
-              <a:spcBef>
-                <a:spcPts val="500"/>
-              </a:spcBef>
-              <a:buFont typeface="Arial" panose="020B0604020202020204" pitchFamily="34" charset="0"/>
-              <a:buChar char="•"/>
-              <a:defRPr sz="1800" kern="1200">
-                <a:solidFill>
-                  <a:schemeClr val="tx1"/>
-                </a:solidFill>
-                <a:latin typeface="+mn-lt"/>
-                <a:ea typeface="+mn-ea"/>
-                <a:cs typeface="+mn-cs"/>
-              </a:defRPr>
-            </a:lvl8pPr>
-            <a:lvl9pPr marL="3886200" indent="-228600" algn="l" defTabSz="914400" rtl="0" eaLnBrk="1" latinLnBrk="0" hangingPunct="1">
-              <a:lnSpc>
-                <a:spcPct val="90000"/>
-              </a:lnSpc>
-              <a:spcBef>
-                <a:spcPts val="500"/>
-              </a:spcBef>
-              <a:buFont typeface="Arial" panose="020B0604020202020204" pitchFamily="34" charset="0"/>
-              <a:buChar char="•"/>
-              <a:defRPr sz="1800" kern="1200">
-                <a:solidFill>
-                  <a:schemeClr val="tx1"/>
-                </a:solidFill>
-                <a:latin typeface="+mn-lt"/>
-                <a:ea typeface="+mn-ea"/>
-                <a:cs typeface="+mn-cs"/>
-              </a:defRPr>
-            </a:lvl9pPr>
-          </a:lstStyle>
-          <a:p>
-            <a:r>
-              <a:rPr lang="en-US" dirty="0"/>
-              <a:t>It’s free!</a:t>
-            </a:r>
-          </a:p>
-          <a:p>
-            <a:r>
-              <a:rPr lang="en-US" dirty="0"/>
-              <a:t>It’s (relatively) simple to learn</a:t>
-            </a:r>
-          </a:p>
-          <a:p>
-            <a:pPr lvl="1"/>
-            <a:r>
-              <a:rPr lang="en-US" dirty="0"/>
-              <a:t>“high-level” language: you don’t have to be a computer scientist to write code</a:t>
-            </a:r>
-          </a:p>
-          <a:p>
-            <a:r>
-              <a:rPr lang="en-US" dirty="0"/>
-              <a:t>It’s powerful</a:t>
-            </a:r>
-          </a:p>
-          <a:p>
-            <a:pPr lvl="1"/>
-            <a:r>
-              <a:rPr lang="en-US" dirty="0"/>
-              <a:t>Many sophisticated tools are already included</a:t>
-            </a:r>
-          </a:p>
-          <a:p>
-            <a:pPr lvl="1"/>
-            <a:r>
-              <a:rPr lang="en-US" dirty="0"/>
-              <a:t>Easy to install packages that do even more!</a:t>
-            </a:r>
-          </a:p>
-          <a:p>
-            <a:r>
-              <a:rPr lang="en-US" dirty="0"/>
-              <a:t>It’s everywhere</a:t>
-            </a:r>
-          </a:p>
-          <a:p>
-            <a:pPr lvl="1"/>
-            <a:r>
-              <a:rPr lang="en-US" dirty="0"/>
-              <a:t>R is becoming standard for research &amp; academia</a:t>
-            </a:r>
-          </a:p>
-          <a:p>
-            <a:r>
-              <a:rPr lang="en-US" dirty="0"/>
-              <a:t>It’s growing</a:t>
-            </a:r>
-          </a:p>
-          <a:p>
-            <a:pPr lvl="1"/>
-            <a:r>
-              <a:rPr lang="en-US" dirty="0"/>
-              <a:t>The worldwide R community is friendly, helpful, and diverse</a:t>
-            </a:r>
-          </a:p>
-          <a:p>
-            <a:pPr lvl="1"/>
-            <a:r>
-              <a:rPr lang="en-US" dirty="0"/>
-              <a:t>Continued development &amp; extension of new tools!</a:t>
-            </a:r>
-          </a:p>
-        </p:txBody>
-      </p:sp>
-    </p:spTree>
-    <p:extLst>
-      <p:ext uri="{BB962C8B-B14F-4D97-AF65-F5344CB8AC3E}">
-        <p14:creationId xmlns:p14="http://schemas.microsoft.com/office/powerpoint/2010/main" val="2466062801"/>
-      </p:ext>
-    </p:extLst>
-  </p:cSld>
-  <p:clrMapOvr>
-    <a:masterClrMapping/>
-  </p:clrMapOvr>
-  <p:timing>
-    <p:tnLst>
-      <p:par>
-        <p:cTn id="1" dur="indefinite" restart="never" nodeType="tmRoot">
-          <p:childTnLst>
-            <p:seq concurrent="1" nextAc="seek">
-              <p:cTn id="2" dur="indefinite" nodeType="mainSeq">
-                <p:childTnLst>
-                  <p:par>
-                    <p:cTn id="3" fill="hold">
-                      <p:stCondLst>
-                        <p:cond delay="indefinite"/>
-                      </p:stCondLst>
-                      <p:childTnLst>
-                        <p:par>
-                          <p:cTn id="4" fill="hold">
-                            <p:stCondLst>
-                              <p:cond delay="0"/>
-                            </p:stCondLst>
-                            <p:childTnLst>
-                              <p:par>
-                                <p:cTn id="5" presetID="1" presetClass="entr" presetSubtype="0" fill="hold" nodeType="clickEffect">
-                                  <p:stCondLst>
-                                    <p:cond delay="0"/>
-                                  </p:stCondLst>
-                                  <p:childTnLst>
-                                    <p:set>
-                                      <p:cBhvr>
-                                        <p:cTn id="6" dur="1" fill="hold">
-                                          <p:stCondLst>
-                                            <p:cond delay="0"/>
-                                          </p:stCondLst>
-                                        </p:cTn>
-                                        <p:tgtEl>
-                                          <p:spTgt spid="3">
-                                            <p:txEl>
-                                              <p:pRg st="0" end="0"/>
-                                            </p:txEl>
-                                          </p:spTgt>
-                                        </p:tgtEl>
-                                        <p:attrNameLst>
-                                          <p:attrName>style.visibility</p:attrName>
-                                        </p:attrNameLst>
-                                      </p:cBhvr>
-                                      <p:to>
-                                        <p:strVal val="visible"/>
-                                      </p:to>
-                                    </p:set>
-                                  </p:childTnLst>
-                                </p:cTn>
-                              </p:par>
-                            </p:childTnLst>
-                          </p:cTn>
-                        </p:par>
-                      </p:childTnLst>
-                    </p:cTn>
-                  </p:par>
-                  <p:par>
-                    <p:cTn id="7" fill="hold">
-                      <p:stCondLst>
-                        <p:cond delay="indefinite"/>
-                      </p:stCondLst>
-                      <p:childTnLst>
-                        <p:par>
-                          <p:cTn id="8" fill="hold">
-                            <p:stCondLst>
-                              <p:cond delay="0"/>
-                            </p:stCondLst>
-                            <p:childTnLst>
-                              <p:par>
-                                <p:cTn id="9" presetID="1" presetClass="entr" presetSubtype="0" fill="hold" nodeType="clickEffect">
-                                  <p:stCondLst>
-                                    <p:cond delay="0"/>
-                                  </p:stCondLst>
-                                  <p:childTnLst>
-                                    <p:set>
-                                      <p:cBhvr>
-                                        <p:cTn id="10" dur="1" fill="hold">
-                                          <p:stCondLst>
-                                            <p:cond delay="0"/>
-                                          </p:stCondLst>
-                                        </p:cTn>
-                                        <p:tgtEl>
-                                          <p:spTgt spid="3">
-                                            <p:txEl>
-                                              <p:pRg st="1" end="1"/>
-                                            </p:txEl>
-                                          </p:spTgt>
-                                        </p:tgtEl>
-                                        <p:attrNameLst>
-                                          <p:attrName>style.visibility</p:attrName>
-                                        </p:attrNameLst>
-                                      </p:cBhvr>
-                                      <p:to>
-                                        <p:strVal val="visible"/>
-                                      </p:to>
-                                    </p:set>
-                                  </p:childTnLst>
-                                </p:cTn>
-                              </p:par>
-                              <p:par>
-                                <p:cTn id="11" presetID="1" presetClass="entr" presetSubtype="0" fill="hold" nodeType="withEffect">
-                                  <p:stCondLst>
-                                    <p:cond delay="0"/>
-                                  </p:stCondLst>
-                                  <p:childTnLst>
-                                    <p:set>
-                                      <p:cBhvr>
-                                        <p:cTn id="12" dur="1" fill="hold">
-                                          <p:stCondLst>
-                                            <p:cond delay="0"/>
-                                          </p:stCondLst>
-                                        </p:cTn>
-                                        <p:tgtEl>
-                                          <p:spTgt spid="3">
-                                            <p:txEl>
-                                              <p:pRg st="2" end="2"/>
-                                            </p:txEl>
-                                          </p:spTgt>
-                                        </p:tgtEl>
-                                        <p:attrNameLst>
-                                          <p:attrName>style.visibility</p:attrName>
-                                        </p:attrNameLst>
-                                      </p:cBhvr>
-                                      <p:to>
-                                        <p:strVal val="visible"/>
-                                      </p:to>
-                                    </p:set>
-                                  </p:childTnLst>
-                                </p:cTn>
-                              </p:par>
-                            </p:childTnLst>
-                          </p:cTn>
-                        </p:par>
-                      </p:childTnLst>
-                    </p:cTn>
-                  </p:par>
-                  <p:par>
-                    <p:cTn id="13" fill="hold">
-                      <p:stCondLst>
-                        <p:cond delay="indefinite"/>
-                      </p:stCondLst>
-                      <p:childTnLst>
-                        <p:par>
-                          <p:cTn id="14" fill="hold">
-                            <p:stCondLst>
-                              <p:cond delay="0"/>
-                            </p:stCondLst>
-                            <p:childTnLst>
-                              <p:par>
-                                <p:cTn id="15" presetID="1" presetClass="entr" presetSubtype="0" fill="hold" nodeType="clickEffect">
-                                  <p:stCondLst>
-                                    <p:cond delay="0"/>
-                                  </p:stCondLst>
-                                  <p:childTnLst>
-                                    <p:set>
-                                      <p:cBhvr>
-                                        <p:cTn id="16" dur="1" fill="hold">
-                                          <p:stCondLst>
-                                            <p:cond delay="0"/>
-                                          </p:stCondLst>
-                                        </p:cTn>
-                                        <p:tgtEl>
-                                          <p:spTgt spid="3">
-                                            <p:txEl>
-                                              <p:pRg st="3" end="3"/>
-                                            </p:txEl>
-                                          </p:spTgt>
-                                        </p:tgtEl>
-                                        <p:attrNameLst>
-                                          <p:attrName>style.visibility</p:attrName>
-                                        </p:attrNameLst>
-                                      </p:cBhvr>
-                                      <p:to>
-                                        <p:strVal val="visible"/>
-                                      </p:to>
-                                    </p:set>
-                                  </p:childTnLst>
-                                </p:cTn>
-                              </p:par>
-                              <p:par>
-                                <p:cTn id="17" presetID="1" presetClass="entr" presetSubtype="0" fill="hold" nodeType="withEffect">
-                                  <p:stCondLst>
-                                    <p:cond delay="0"/>
-                                  </p:stCondLst>
-                                  <p:childTnLst>
-                                    <p:set>
-                                      <p:cBhvr>
-                                        <p:cTn id="18" dur="1" fill="hold">
-                                          <p:stCondLst>
-                                            <p:cond delay="0"/>
-                                          </p:stCondLst>
-                                        </p:cTn>
-                                        <p:tgtEl>
-                                          <p:spTgt spid="3">
-                                            <p:txEl>
-                                              <p:pRg st="4" end="4"/>
-                                            </p:txEl>
-                                          </p:spTgt>
-                                        </p:tgtEl>
-                                        <p:attrNameLst>
-                                          <p:attrName>style.visibility</p:attrName>
-                                        </p:attrNameLst>
-                                      </p:cBhvr>
-                                      <p:to>
-                                        <p:strVal val="visible"/>
-                                      </p:to>
-                                    </p:set>
-                                  </p:childTnLst>
-                                </p:cTn>
-                              </p:par>
-                              <p:par>
-                                <p:cTn id="19" presetID="1" presetClass="entr" presetSubtype="0" fill="hold" nodeType="withEffect">
-                                  <p:stCondLst>
-                                    <p:cond delay="0"/>
-                                  </p:stCondLst>
-                                  <p:childTnLst>
-                                    <p:set>
-                                      <p:cBhvr>
-                                        <p:cTn id="20" dur="1" fill="hold">
-                                          <p:stCondLst>
-                                            <p:cond delay="0"/>
-                                          </p:stCondLst>
-                                        </p:cTn>
-                                        <p:tgtEl>
-                                          <p:spTgt spid="3">
-                                            <p:txEl>
-                                              <p:pRg st="5" end="5"/>
-                                            </p:txEl>
-                                          </p:spTgt>
-                                        </p:tgtEl>
-                                        <p:attrNameLst>
-                                          <p:attrName>style.visibility</p:attrName>
-                                        </p:attrNameLst>
-                                      </p:cBhvr>
-                                      <p:to>
-                                        <p:strVal val="visible"/>
-                                      </p:to>
-                                    </p:set>
-                                  </p:childTnLst>
-                                </p:cTn>
-                              </p:par>
-                            </p:childTnLst>
-                          </p:cTn>
-                        </p:par>
-                      </p:childTnLst>
-                    </p:cTn>
-                  </p:par>
-                  <p:par>
-                    <p:cTn id="21" fill="hold">
-                      <p:stCondLst>
-                        <p:cond delay="indefinite"/>
-                      </p:stCondLst>
-                      <p:childTnLst>
-                        <p:par>
-                          <p:cTn id="22" fill="hold">
-                            <p:stCondLst>
-                              <p:cond delay="0"/>
-                            </p:stCondLst>
-                            <p:childTnLst>
-                              <p:par>
-                                <p:cTn id="23" presetID="1" presetClass="entr" presetSubtype="0" fill="hold" nodeType="clickEffect">
-                                  <p:stCondLst>
-                                    <p:cond delay="0"/>
-                                  </p:stCondLst>
-                                  <p:childTnLst>
-                                    <p:set>
-                                      <p:cBhvr>
-                                        <p:cTn id="24" dur="1" fill="hold">
-                                          <p:stCondLst>
-                                            <p:cond delay="0"/>
-                                          </p:stCondLst>
-                                        </p:cTn>
-                                        <p:tgtEl>
-                                          <p:spTgt spid="3">
-                                            <p:txEl>
-                                              <p:pRg st="6" end="6"/>
-                                            </p:txEl>
-                                          </p:spTgt>
-                                        </p:tgtEl>
-                                        <p:attrNameLst>
-                                          <p:attrName>style.visibility</p:attrName>
-                                        </p:attrNameLst>
-                                      </p:cBhvr>
-                                      <p:to>
-                                        <p:strVal val="visible"/>
-                                      </p:to>
-                                    </p:set>
-                                  </p:childTnLst>
-                                </p:cTn>
-                              </p:par>
-                              <p:par>
-                                <p:cTn id="25" presetID="1" presetClass="entr" presetSubtype="0" fill="hold" nodeType="withEffect">
-                                  <p:stCondLst>
-                                    <p:cond delay="0"/>
-                                  </p:stCondLst>
-                                  <p:childTnLst>
-                                    <p:set>
-                                      <p:cBhvr>
-                                        <p:cTn id="26" dur="1" fill="hold">
-                                          <p:stCondLst>
-                                            <p:cond delay="0"/>
-                                          </p:stCondLst>
-                                        </p:cTn>
-                                        <p:tgtEl>
-                                          <p:spTgt spid="3">
-                                            <p:txEl>
-                                              <p:pRg st="7" end="7"/>
-                                            </p:txEl>
-                                          </p:spTgt>
-                                        </p:tgtEl>
-                                        <p:attrNameLst>
-                                          <p:attrName>style.visibility</p:attrName>
-                                        </p:attrNameLst>
-                                      </p:cBhvr>
-                                      <p:to>
-                                        <p:strVal val="visible"/>
-                                      </p:to>
-                                    </p:set>
-                                  </p:childTnLst>
-                                </p:cTn>
-                              </p:par>
-                            </p:childTnLst>
-                          </p:cTn>
-                        </p:par>
-                      </p:childTnLst>
-                    </p:cTn>
-                  </p:par>
-                  <p:par>
-                    <p:cTn id="27" fill="hold">
-                      <p:stCondLst>
-                        <p:cond delay="indefinite"/>
-                      </p:stCondLst>
-                      <p:childTnLst>
-                        <p:par>
-                          <p:cTn id="28" fill="hold">
-                            <p:stCondLst>
-                              <p:cond delay="0"/>
-                            </p:stCondLst>
-                            <p:childTnLst>
-                              <p:par>
-                                <p:cTn id="29" presetID="1" presetClass="entr" presetSubtype="0" fill="hold" nodeType="clickEffect">
-                                  <p:stCondLst>
-                                    <p:cond delay="0"/>
-                                  </p:stCondLst>
-                                  <p:childTnLst>
-                                    <p:set>
-                                      <p:cBhvr>
-                                        <p:cTn id="30" dur="1" fill="hold">
-                                          <p:stCondLst>
-                                            <p:cond delay="0"/>
-                                          </p:stCondLst>
-                                        </p:cTn>
-                                        <p:tgtEl>
-                                          <p:spTgt spid="3">
-                                            <p:txEl>
-                                              <p:pRg st="8" end="8"/>
-                                            </p:txEl>
-                                          </p:spTgt>
-                                        </p:tgtEl>
-                                        <p:attrNameLst>
-                                          <p:attrName>style.visibility</p:attrName>
-                                        </p:attrNameLst>
-                                      </p:cBhvr>
-                                      <p:to>
-                                        <p:strVal val="visible"/>
-                                      </p:to>
-                                    </p:set>
-                                  </p:childTnLst>
-                                </p:cTn>
-                              </p:par>
-                              <p:par>
-                                <p:cTn id="31" presetID="1" presetClass="entr" presetSubtype="0" fill="hold" nodeType="withEffect">
-                                  <p:stCondLst>
-                                    <p:cond delay="0"/>
-                                  </p:stCondLst>
-                                  <p:childTnLst>
-                                    <p:set>
-                                      <p:cBhvr>
-                                        <p:cTn id="32" dur="1" fill="hold">
-                                          <p:stCondLst>
-                                            <p:cond delay="0"/>
-                                          </p:stCondLst>
-                                        </p:cTn>
-                                        <p:tgtEl>
-                                          <p:spTgt spid="3">
-                                            <p:txEl>
-                                              <p:pRg st="9" end="9"/>
-                                            </p:txEl>
-                                          </p:spTgt>
-                                        </p:tgtEl>
-                                        <p:attrNameLst>
-                                          <p:attrName>style.visibility</p:attrName>
-                                        </p:attrNameLst>
-                                      </p:cBhvr>
-                                      <p:to>
-                                        <p:strVal val="visible"/>
-                                      </p:to>
-                                    </p:set>
-                                  </p:childTnLst>
-                                </p:cTn>
-                              </p:par>
-                              <p:par>
-                                <p:cTn id="33" presetID="1" presetClass="entr" presetSubtype="0" fill="hold" nodeType="withEffect">
-                                  <p:stCondLst>
-                                    <p:cond delay="0"/>
-                                  </p:stCondLst>
-                                  <p:childTnLst>
-                                    <p:set>
-                                      <p:cBhvr>
-                                        <p:cTn id="34" dur="1" fill="hold">
-                                          <p:stCondLst>
-                                            <p:cond delay="0"/>
-                                          </p:stCondLst>
-                                        </p:cTn>
-                                        <p:tgtEl>
-                                          <p:spTgt spid="3">
-                                            <p:txEl>
-                                              <p:pRg st="10" end="10"/>
-                                            </p:txEl>
-                                          </p:spTgt>
-                                        </p:tgtEl>
-                                        <p:attrNameLst>
-                                          <p:attrName>style.visibility</p:attrName>
-                                        </p:attrNameLst>
-                                      </p:cBhvr>
-                                      <p:to>
-                                        <p:strVal val="visible"/>
-                                      </p:to>
-                                    </p:set>
-                                  </p:childTnLst>
-                                </p:cTn>
-                              </p:par>
-                            </p:childTnLst>
-                          </p:cTn>
-                        </p:par>
-                      </p:childTnLst>
-                    </p:cTn>
-                  </p:par>
-                </p:childTnLst>
-              </p:cTn>
-              <p:prevCondLst>
-                <p:cond evt="onPrev" delay="0">
-                  <p:tgtEl>
-                    <p:sldTgt/>
-                  </p:tgtEl>
-                </p:cond>
-              </p:prevCondLst>
-              <p:nextCondLst>
-                <p:cond evt="onNext" delay="0">
-                  <p:tgtEl>
-                    <p:sldTgt/>
-                  </p:tgtEl>
-                </p:cond>
-              </p:nextCondLst>
-            </p:seq>
-          </p:childTnLst>
-        </p:cTn>
-      </p:par>
-    </p:tnLst>
-  </p:timing>
 </p:sld>
 </file>
 

</xml_diff>

<commit_message>
more tiny changes to 1 and 2
</commit_message>
<xml_diff>
--- a/presentations/1 - Welcome and motivation.pptx
+++ b/presentations/1 - Welcome and motivation.pptx
@@ -4592,41 +4592,6 @@
       </p:sp>
       <p:pic>
         <p:nvPicPr>
-          <p:cNvPr id="4" name="Picture 3" descr="A close up of a sign&#10;&#10;Description automatically generated">
-            <a:extLst>
-              <a:ext uri="{FF2B5EF4-FFF2-40B4-BE49-F238E27FC236}">
-                <a16:creationId xmlns:a16="http://schemas.microsoft.com/office/drawing/2014/main" id="{F7FB462F-D73F-D264-9907-A23708A7E74F}"/>
-              </a:ext>
-            </a:extLst>
-          </p:cNvPr>
-          <p:cNvPicPr>
-            <a:picLocks noChangeAspect="1"/>
-          </p:cNvPicPr>
-          <p:nvPr/>
-        </p:nvPicPr>
-        <p:blipFill rotWithShape="1">
-          <a:blip r:embed="rId3">
-            <a:extLst>
-              <a:ext uri="{28A0092B-C50C-407E-A947-70E740481C1C}">
-                <a14:useLocalDpi xmlns:a14="http://schemas.microsoft.com/office/drawing/2010/main" val="0"/>
-              </a:ext>
-            </a:extLst>
-          </a:blip>
-          <a:srcRect l="7087" t="11647" r="63578"/>
-          <a:stretch/>
-        </p:blipFill>
-        <p:spPr>
-          <a:xfrm>
-            <a:off x="0" y="0"/>
-            <a:ext cx="3180080" cy="3363439"/>
-          </a:xfrm>
-          <a:prstGeom prst="rect">
-            <a:avLst/>
-          </a:prstGeom>
-        </p:spPr>
-      </p:pic>
-      <p:pic>
-        <p:nvPicPr>
           <p:cNvPr id="6" name="Content Placeholder 6" descr="A close up of a sign&#10;&#10;Description automatically generated">
             <a:extLst>
               <a:ext uri="{FF2B5EF4-FFF2-40B4-BE49-F238E27FC236}">
@@ -4640,7 +4605,7 @@
           <p:nvPr/>
         </p:nvPicPr>
         <p:blipFill>
-          <a:blip r:embed="rId4">
+          <a:blip r:embed="rId3">
             <a:extLst>
               <a:ext uri="{28A0092B-C50C-407E-A947-70E740481C1C}">
                 <a14:useLocalDpi xmlns:a14="http://schemas.microsoft.com/office/drawing/2010/main" val="0"/>
@@ -4860,6 +4825,41 @@
           </a:p>
         </p:txBody>
       </p:sp>
+      <p:pic>
+        <p:nvPicPr>
+          <p:cNvPr id="4" name="Picture 3" descr="A close up of a sign&#10;&#10;Description automatically generated">
+            <a:extLst>
+              <a:ext uri="{FF2B5EF4-FFF2-40B4-BE49-F238E27FC236}">
+                <a16:creationId xmlns:a16="http://schemas.microsoft.com/office/drawing/2014/main" id="{F7FB462F-D73F-D264-9907-A23708A7E74F}"/>
+              </a:ext>
+            </a:extLst>
+          </p:cNvPr>
+          <p:cNvPicPr>
+            <a:picLocks noChangeAspect="1"/>
+          </p:cNvPicPr>
+          <p:nvPr/>
+        </p:nvPicPr>
+        <p:blipFill rotWithShape="1">
+          <a:blip r:embed="rId4">
+            <a:extLst>
+              <a:ext uri="{28A0092B-C50C-407E-A947-70E740481C1C}">
+                <a14:useLocalDpi xmlns:a14="http://schemas.microsoft.com/office/drawing/2010/main" val="0"/>
+              </a:ext>
+            </a:extLst>
+          </a:blip>
+          <a:srcRect l="7087" t="11647" r="63578"/>
+          <a:stretch/>
+        </p:blipFill>
+        <p:spPr>
+          <a:xfrm>
+            <a:off x="0" y="0"/>
+            <a:ext cx="3180080" cy="3363439"/>
+          </a:xfrm>
+          <a:prstGeom prst="rect">
+            <a:avLst/>
+          </a:prstGeom>
+        </p:spPr>
+      </p:pic>
     </p:spTree>
     <p:extLst>
       <p:ext uri="{BB962C8B-B14F-4D97-AF65-F5344CB8AC3E}">

</xml_diff>

<commit_message>
Revert "more tiny changes to 1 and 2"
This reverts commit 2a29995fd294ee391a241da7f227c7e21238adbd.
</commit_message>
<xml_diff>
--- a/presentations/1 - Welcome and motivation.pptx
+++ b/presentations/1 - Welcome and motivation.pptx
@@ -4592,6 +4592,41 @@
       </p:sp>
       <p:pic>
         <p:nvPicPr>
+          <p:cNvPr id="4" name="Picture 3" descr="A close up of a sign&#10;&#10;Description automatically generated">
+            <a:extLst>
+              <a:ext uri="{FF2B5EF4-FFF2-40B4-BE49-F238E27FC236}">
+                <a16:creationId xmlns:a16="http://schemas.microsoft.com/office/drawing/2014/main" id="{F7FB462F-D73F-D264-9907-A23708A7E74F}"/>
+              </a:ext>
+            </a:extLst>
+          </p:cNvPr>
+          <p:cNvPicPr>
+            <a:picLocks noChangeAspect="1"/>
+          </p:cNvPicPr>
+          <p:nvPr/>
+        </p:nvPicPr>
+        <p:blipFill rotWithShape="1">
+          <a:blip r:embed="rId3">
+            <a:extLst>
+              <a:ext uri="{28A0092B-C50C-407E-A947-70E740481C1C}">
+                <a14:useLocalDpi xmlns:a14="http://schemas.microsoft.com/office/drawing/2010/main" val="0"/>
+              </a:ext>
+            </a:extLst>
+          </a:blip>
+          <a:srcRect l="7087" t="11647" r="63578"/>
+          <a:stretch/>
+        </p:blipFill>
+        <p:spPr>
+          <a:xfrm>
+            <a:off x="0" y="0"/>
+            <a:ext cx="3180080" cy="3363439"/>
+          </a:xfrm>
+          <a:prstGeom prst="rect">
+            <a:avLst/>
+          </a:prstGeom>
+        </p:spPr>
+      </p:pic>
+      <p:pic>
+        <p:nvPicPr>
           <p:cNvPr id="6" name="Content Placeholder 6" descr="A close up of a sign&#10;&#10;Description automatically generated">
             <a:extLst>
               <a:ext uri="{FF2B5EF4-FFF2-40B4-BE49-F238E27FC236}">
@@ -4605,7 +4640,7 @@
           <p:nvPr/>
         </p:nvPicPr>
         <p:blipFill>
-          <a:blip r:embed="rId3">
+          <a:blip r:embed="rId4">
             <a:extLst>
               <a:ext uri="{28A0092B-C50C-407E-A947-70E740481C1C}">
                 <a14:useLocalDpi xmlns:a14="http://schemas.microsoft.com/office/drawing/2010/main" val="0"/>
@@ -4825,41 +4860,6 @@
           </a:p>
         </p:txBody>
       </p:sp>
-      <p:pic>
-        <p:nvPicPr>
-          <p:cNvPr id="4" name="Picture 3" descr="A close up of a sign&#10;&#10;Description automatically generated">
-            <a:extLst>
-              <a:ext uri="{FF2B5EF4-FFF2-40B4-BE49-F238E27FC236}">
-                <a16:creationId xmlns:a16="http://schemas.microsoft.com/office/drawing/2014/main" id="{F7FB462F-D73F-D264-9907-A23708A7E74F}"/>
-              </a:ext>
-            </a:extLst>
-          </p:cNvPr>
-          <p:cNvPicPr>
-            <a:picLocks noChangeAspect="1"/>
-          </p:cNvPicPr>
-          <p:nvPr/>
-        </p:nvPicPr>
-        <p:blipFill rotWithShape="1">
-          <a:blip r:embed="rId4">
-            <a:extLst>
-              <a:ext uri="{28A0092B-C50C-407E-A947-70E740481C1C}">
-                <a14:useLocalDpi xmlns:a14="http://schemas.microsoft.com/office/drawing/2010/main" val="0"/>
-              </a:ext>
-            </a:extLst>
-          </a:blip>
-          <a:srcRect l="7087" t="11647" r="63578"/>
-          <a:stretch/>
-        </p:blipFill>
-        <p:spPr>
-          <a:xfrm>
-            <a:off x="0" y="0"/>
-            <a:ext cx="3180080" cy="3363439"/>
-          </a:xfrm>
-          <a:prstGeom prst="rect">
-            <a:avLst/>
-          </a:prstGeom>
-        </p:spPr>
-      </p:pic>
     </p:spTree>
     <p:extLst>
       <p:ext uri="{BB962C8B-B14F-4D97-AF65-F5344CB8AC3E}">

</xml_diff>

<commit_message>
MT changes to 1 and 2, hopefully not overwriting JP changes
</commit_message>
<xml_diff>
--- a/presentations/1 - Welcome and motivation.pptx
+++ b/presentations/1 - Welcome and motivation.pptx
@@ -565,6 +565,295 @@
 </p:notes>
 </file>
 
+<file path=ppt/notesSlides/notesSlide10.xml><?xml version="1.0" encoding="utf-8"?>
+<p:notes xmlns:a="http://schemas.openxmlformats.org/drawingml/2006/main" xmlns:r="http://schemas.openxmlformats.org/officeDocument/2006/relationships" xmlns:p="http://schemas.openxmlformats.org/presentationml/2006/main">
+  <p:cSld>
+    <p:spTree>
+      <p:nvGrpSpPr>
+        <p:cNvPr id="1" name=""/>
+        <p:cNvGrpSpPr/>
+        <p:nvPr/>
+      </p:nvGrpSpPr>
+      <p:grpSpPr>
+        <a:xfrm>
+          <a:off x="0" y="0"/>
+          <a:ext cx="0" cy="0"/>
+          <a:chOff x="0" y="0"/>
+          <a:chExt cx="0" cy="0"/>
+        </a:xfrm>
+      </p:grpSpPr>
+      <p:sp>
+        <p:nvSpPr>
+          <p:cNvPr id="2" name="Slide Image Placeholder 1"/>
+          <p:cNvSpPr>
+            <a:spLocks noGrp="1" noRot="1" noChangeAspect="1"/>
+          </p:cNvSpPr>
+          <p:nvPr>
+            <p:ph type="sldImg"/>
+          </p:nvPr>
+        </p:nvSpPr>
+        <p:spPr/>
+      </p:sp>
+      <p:sp>
+        <p:nvSpPr>
+          <p:cNvPr id="3" name="Notes Placeholder 2"/>
+          <p:cNvSpPr>
+            <a:spLocks noGrp="1"/>
+          </p:cNvSpPr>
+          <p:nvPr>
+            <p:ph type="body" idx="1"/>
+          </p:nvPr>
+        </p:nvSpPr>
+        <p:spPr/>
+        <p:txBody>
+          <a:bodyPr/>
+          <a:lstStyle/>
+          <a:p>
+            <a:pPr marL="0" marR="0" lvl="0" indent="0" algn="l" defTabSz="914400" rtl="0" eaLnBrk="1" fontAlgn="auto" latinLnBrk="0" hangingPunct="1">
+              <a:lnSpc>
+                <a:spcPct val="100000"/>
+              </a:lnSpc>
+              <a:spcBef>
+                <a:spcPts val="0"/>
+              </a:spcBef>
+              <a:spcAft>
+                <a:spcPts val="0"/>
+              </a:spcAft>
+              <a:buClrTx/>
+              <a:buSzTx/>
+              <a:buFontTx/>
+              <a:buNone/>
+              <a:tabLst/>
+              <a:defRPr/>
+            </a:pPr>
+            <a:r>
+              <a:rPr lang="en-US" dirty="0"/>
+              <a:t>Sometimes you should pay close attention to the slides, sometimes you should be practicing in RStudio; I’ll let you know</a:t>
+            </a:r>
+          </a:p>
+          <a:p>
+            <a:pPr marL="0" marR="0" lvl="0" indent="0" algn="l" defTabSz="914400" rtl="0" eaLnBrk="1" fontAlgn="auto" latinLnBrk="0" hangingPunct="1">
+              <a:lnSpc>
+                <a:spcPct val="100000"/>
+              </a:lnSpc>
+              <a:spcBef>
+                <a:spcPts val="0"/>
+              </a:spcBef>
+              <a:spcAft>
+                <a:spcPts val="0"/>
+              </a:spcAft>
+              <a:buClrTx/>
+              <a:buSzTx/>
+              <a:buFontTx/>
+              <a:buNone/>
+              <a:tabLst/>
+              <a:defRPr/>
+            </a:pPr>
+            <a:endParaRPr lang="en-US" dirty="0"/>
+          </a:p>
+          <a:p>
+            <a:pPr marL="0" marR="0" lvl="0" indent="0" algn="l" defTabSz="914400" rtl="0" eaLnBrk="1" fontAlgn="auto" latinLnBrk="0" hangingPunct="1">
+              <a:lnSpc>
+                <a:spcPct val="100000"/>
+              </a:lnSpc>
+              <a:spcBef>
+                <a:spcPts val="0"/>
+              </a:spcBef>
+              <a:spcAft>
+                <a:spcPts val="0"/>
+              </a:spcAft>
+              <a:buClrTx/>
+              <a:buSzTx/>
+              <a:buFontTx/>
+              <a:buNone/>
+              <a:tabLst/>
+              <a:defRPr/>
+            </a:pPr>
+            <a:r>
+              <a:rPr lang="en-US" dirty="0"/>
+              <a:t>Teaching philosophy thanks to:</a:t>
+            </a:r>
+          </a:p>
+          <a:p>
+            <a:pPr marL="0" marR="0" lvl="0" indent="0" algn="l" defTabSz="914400" rtl="0" eaLnBrk="1" fontAlgn="auto" latinLnBrk="0" hangingPunct="1">
+              <a:lnSpc>
+                <a:spcPct val="100000"/>
+              </a:lnSpc>
+              <a:spcBef>
+                <a:spcPts val="0"/>
+              </a:spcBef>
+              <a:spcAft>
+                <a:spcPts val="0"/>
+              </a:spcAft>
+              <a:buClrTx/>
+              <a:buSzTx/>
+              <a:buFontTx/>
+              <a:buNone/>
+              <a:tabLst/>
+              <a:defRPr/>
+            </a:pPr>
+            <a:r>
+              <a:rPr lang="en-US" dirty="0"/>
+              <a:t>http://teachtogether.tech/en/index.html</a:t>
+            </a:r>
+          </a:p>
+          <a:p>
+            <a:pPr marL="0" marR="0" lvl="0" indent="0" algn="l" defTabSz="914400" rtl="0" eaLnBrk="1" fontAlgn="auto" latinLnBrk="0" hangingPunct="1">
+              <a:lnSpc>
+                <a:spcPct val="100000"/>
+              </a:lnSpc>
+              <a:spcBef>
+                <a:spcPts val="0"/>
+              </a:spcBef>
+              <a:spcAft>
+                <a:spcPts val="0"/>
+              </a:spcAft>
+              <a:buClrTx/>
+              <a:buSzTx/>
+              <a:buFontTx/>
+              <a:buNone/>
+              <a:tabLst/>
+              <a:defRPr/>
+            </a:pPr>
+            <a:r>
+              <a:rPr lang="en-US" dirty="0"/>
+              <a:t>https://journals.plos.org/ploscompbiol/article?id=10.1371/journal.pcbi.1006023</a:t>
+            </a:r>
+          </a:p>
+          <a:p>
+            <a:endParaRPr lang="en-US" dirty="0"/>
+          </a:p>
+        </p:txBody>
+      </p:sp>
+      <p:sp>
+        <p:nvSpPr>
+          <p:cNvPr id="4" name="Slide Number Placeholder 3"/>
+          <p:cNvSpPr>
+            <a:spLocks noGrp="1"/>
+          </p:cNvSpPr>
+          <p:nvPr>
+            <p:ph type="sldNum" sz="quarter" idx="5"/>
+          </p:nvPr>
+        </p:nvSpPr>
+        <p:spPr/>
+        <p:txBody>
+          <a:bodyPr/>
+          <a:lstStyle/>
+          <a:p>
+            <a:fld id="{AD86E2D3-8F12-4CB7-B6F3-018CFC08298B}" type="slidenum">
+              <a:rPr lang="en-US" smtClean="0"/>
+              <a:t>14</a:t>
+            </a:fld>
+            <a:endParaRPr lang="en-US"/>
+          </a:p>
+        </p:txBody>
+      </p:sp>
+    </p:spTree>
+    <p:extLst>
+      <p:ext uri="{BB962C8B-B14F-4D97-AF65-F5344CB8AC3E}">
+        <p14:creationId xmlns:p14="http://schemas.microsoft.com/office/powerpoint/2010/main" val="99746442"/>
+      </p:ext>
+    </p:extLst>
+  </p:cSld>
+  <p:clrMapOvr>
+    <a:masterClrMapping/>
+  </p:clrMapOvr>
+</p:notes>
+</file>
+
+<file path=ppt/notesSlides/notesSlide11.xml><?xml version="1.0" encoding="utf-8"?>
+<p:notes xmlns:a="http://schemas.openxmlformats.org/drawingml/2006/main" xmlns:r="http://schemas.openxmlformats.org/officeDocument/2006/relationships" xmlns:p="http://schemas.openxmlformats.org/presentationml/2006/main">
+  <p:cSld>
+    <p:spTree>
+      <p:nvGrpSpPr>
+        <p:cNvPr id="1" name=""/>
+        <p:cNvGrpSpPr/>
+        <p:nvPr/>
+      </p:nvGrpSpPr>
+      <p:grpSpPr>
+        <a:xfrm>
+          <a:off x="0" y="0"/>
+          <a:ext cx="0" cy="0"/>
+          <a:chOff x="0" y="0"/>
+          <a:chExt cx="0" cy="0"/>
+        </a:xfrm>
+      </p:grpSpPr>
+      <p:sp>
+        <p:nvSpPr>
+          <p:cNvPr id="2" name="Slide Image Placeholder 1"/>
+          <p:cNvSpPr>
+            <a:spLocks noGrp="1" noRot="1" noChangeAspect="1"/>
+          </p:cNvSpPr>
+          <p:nvPr>
+            <p:ph type="sldImg"/>
+          </p:nvPr>
+        </p:nvSpPr>
+        <p:spPr/>
+      </p:sp>
+      <p:sp>
+        <p:nvSpPr>
+          <p:cNvPr id="3" name="Notes Placeholder 2"/>
+          <p:cNvSpPr>
+            <a:spLocks noGrp="1"/>
+          </p:cNvSpPr>
+          <p:nvPr>
+            <p:ph type="body" idx="1"/>
+          </p:nvPr>
+        </p:nvSpPr>
+        <p:spPr/>
+        <p:txBody>
+          <a:bodyPr/>
+          <a:lstStyle/>
+          <a:p>
+            <a:r>
+              <a:rPr lang="en-US" dirty="0"/>
+              <a:t>These points are so important that I’m going to reiterate them again here. </a:t>
+            </a:r>
+          </a:p>
+          <a:p>
+            <a:r>
+              <a:rPr lang="en-US" dirty="0"/>
+              <a:t>This point, especially the last one, can be the difference between success and frustration. </a:t>
+            </a:r>
+          </a:p>
+        </p:txBody>
+      </p:sp>
+      <p:sp>
+        <p:nvSpPr>
+          <p:cNvPr id="4" name="Slide Number Placeholder 3"/>
+          <p:cNvSpPr>
+            <a:spLocks noGrp="1"/>
+          </p:cNvSpPr>
+          <p:nvPr>
+            <p:ph type="sldNum" sz="quarter" idx="5"/>
+          </p:nvPr>
+        </p:nvSpPr>
+        <p:spPr/>
+        <p:txBody>
+          <a:bodyPr/>
+          <a:lstStyle/>
+          <a:p>
+            <a:fld id="{AD86E2D3-8F12-4CB7-B6F3-018CFC08298B}" type="slidenum">
+              <a:rPr lang="en-US" smtClean="0"/>
+              <a:t>15</a:t>
+            </a:fld>
+            <a:endParaRPr lang="en-US"/>
+          </a:p>
+        </p:txBody>
+      </p:sp>
+    </p:spTree>
+    <p:extLst>
+      <p:ext uri="{BB962C8B-B14F-4D97-AF65-F5344CB8AC3E}">
+        <p14:creationId xmlns:p14="http://schemas.microsoft.com/office/powerpoint/2010/main" val="1026739189"/>
+      </p:ext>
+    </p:extLst>
+  </p:cSld>
+  <p:clrMapOvr>
+    <a:masterClrMapping/>
+  </p:clrMapOvr>
+</p:notes>
+</file>
+
 <file path=ppt/notesSlides/notesSlide2.xml><?xml version="1.0" encoding="utf-8"?>
 <p:notes xmlns:a="http://schemas.openxmlformats.org/drawingml/2006/main" xmlns:r="http://schemas.openxmlformats.org/officeDocument/2006/relationships" xmlns:p="http://schemas.openxmlformats.org/presentationml/2006/main">
   <p:cSld>
@@ -889,36 +1178,16 @@
           <a:p>
             <a:r>
               <a:rPr lang="en-US" dirty="0"/>
-              <a:t>Because of this, the slides are intentionally a little bit wordy. I apologize for that as it makes the aesthetics worse but I want this document to serve a little bit as a reference guide for you. </a:t>
-            </a:r>
+              <a:t>it’s worth taking a moment to motivate what we’re doing.  Chances are, you’re a very proficient Excel user, and you’re good at your job.  And here we are pushing this new thing, so it’s worth talking about WHY.</a:t>
+            </a:r>
+          </a:p>
+          <a:p>
+            <a:endParaRPr lang="en-US" dirty="0"/>
           </a:p>
           <a:p>
             <a:r>
               <a:rPr lang="en-US" dirty="0"/>
-              <a:t>Today might be slow but we’re laying the foundation for charts &amp; modeling</a:t>
-            </a:r>
-          </a:p>
-          <a:p>
-            <a:pPr marL="0" marR="0" lvl="0" indent="0" algn="l" defTabSz="914400" rtl="0" eaLnBrk="1" fontAlgn="auto" latinLnBrk="0" hangingPunct="1">
-              <a:lnSpc>
-                <a:spcPct val="100000"/>
-              </a:lnSpc>
-              <a:spcBef>
-                <a:spcPts val="0"/>
-              </a:spcBef>
-              <a:spcAft>
-                <a:spcPts val="0"/>
-              </a:spcAft>
-              <a:buClrTx/>
-              <a:buSzTx/>
-              <a:buFontTx/>
-              <a:buNone/>
-              <a:tabLst/>
-              <a:defRPr/>
-            </a:pPr>
-            <a:r>
-              <a:rPr lang="en-US" dirty="0"/>
-              <a:t>Not everyone needs to be an expert, but if you’re here, I want you to move up a level and at least be able to “read” R</a:t>
+              <a:t>So without going into the statistical and graphical tools that R provides, I’d just like to talk about reproducibility…</a:t>
             </a:r>
           </a:p>
           <a:p>
@@ -944,9 +1213,9 @@
           <a:bodyPr/>
           <a:lstStyle/>
           <a:p>
-            <a:fld id="{AD86E2D3-8F12-4CB7-B6F3-018CFC08298B}" type="slidenum">
+            <a:fld id="{2D3618BD-5D63-447F-BEC2-3BD80D62BA09}" type="slidenum">
               <a:rPr lang="en-US" smtClean="0"/>
-              <a:t>13</a:t>
+              <a:t>8</a:t>
             </a:fld>
             <a:endParaRPr lang="en-US"/>
           </a:p>
@@ -955,7 +1224,7 @@
     </p:spTree>
     <p:extLst>
       <p:ext uri="{BB962C8B-B14F-4D97-AF65-F5344CB8AC3E}">
-        <p14:creationId xmlns:p14="http://schemas.microsoft.com/office/powerpoint/2010/main" val="2465146486"/>
+        <p14:creationId xmlns:p14="http://schemas.microsoft.com/office/powerpoint/2010/main" val="1489899700"/>
       </p:ext>
     </p:extLst>
   </p:cSld>
@@ -1028,96 +1297,7 @@
             </a:pPr>
             <a:r>
               <a:rPr lang="en-US" dirty="0"/>
-              <a:t>Sometimes you should pay close attention to the slides, sometimes you should be practicing in RStudio; I’ll let you know</a:t>
-            </a:r>
-          </a:p>
-          <a:p>
-            <a:pPr marL="0" marR="0" lvl="0" indent="0" algn="l" defTabSz="914400" rtl="0" eaLnBrk="1" fontAlgn="auto" latinLnBrk="0" hangingPunct="1">
-              <a:lnSpc>
-                <a:spcPct val="100000"/>
-              </a:lnSpc>
-              <a:spcBef>
-                <a:spcPts val="0"/>
-              </a:spcBef>
-              <a:spcAft>
-                <a:spcPts val="0"/>
-              </a:spcAft>
-              <a:buClrTx/>
-              <a:buSzTx/>
-              <a:buFontTx/>
-              <a:buNone/>
-              <a:tabLst/>
-              <a:defRPr/>
-            </a:pPr>
-            <a:endParaRPr lang="en-US" dirty="0"/>
-          </a:p>
-          <a:p>
-            <a:pPr marL="0" marR="0" lvl="0" indent="0" algn="l" defTabSz="914400" rtl="0" eaLnBrk="1" fontAlgn="auto" latinLnBrk="0" hangingPunct="1">
-              <a:lnSpc>
-                <a:spcPct val="100000"/>
-              </a:lnSpc>
-              <a:spcBef>
-                <a:spcPts val="0"/>
-              </a:spcBef>
-              <a:spcAft>
-                <a:spcPts val="0"/>
-              </a:spcAft>
-              <a:buClrTx/>
-              <a:buSzTx/>
-              <a:buFontTx/>
-              <a:buNone/>
-              <a:tabLst/>
-              <a:defRPr/>
-            </a:pPr>
-            <a:r>
-              <a:rPr lang="en-US" dirty="0"/>
-              <a:t>Teaching philosophy thanks to:</a:t>
-            </a:r>
-          </a:p>
-          <a:p>
-            <a:pPr marL="0" marR="0" lvl="0" indent="0" algn="l" defTabSz="914400" rtl="0" eaLnBrk="1" fontAlgn="auto" latinLnBrk="0" hangingPunct="1">
-              <a:lnSpc>
-                <a:spcPct val="100000"/>
-              </a:lnSpc>
-              <a:spcBef>
-                <a:spcPts val="0"/>
-              </a:spcBef>
-              <a:spcAft>
-                <a:spcPts val="0"/>
-              </a:spcAft>
-              <a:buClrTx/>
-              <a:buSzTx/>
-              <a:buFontTx/>
-              <a:buNone/>
-              <a:tabLst/>
-              <a:defRPr/>
-            </a:pPr>
-            <a:r>
-              <a:rPr lang="en-US" dirty="0"/>
-              <a:t>http://teachtogether.tech/en/index.html</a:t>
-            </a:r>
-          </a:p>
-          <a:p>
-            <a:pPr marL="0" marR="0" lvl="0" indent="0" algn="l" defTabSz="914400" rtl="0" eaLnBrk="1" fontAlgn="auto" latinLnBrk="0" hangingPunct="1">
-              <a:lnSpc>
-                <a:spcPct val="100000"/>
-              </a:lnSpc>
-              <a:spcBef>
-                <a:spcPts val="0"/>
-              </a:spcBef>
-              <a:spcAft>
-                <a:spcPts val="0"/>
-              </a:spcAft>
-              <a:buClrTx/>
-              <a:buSzTx/>
-              <a:buFontTx/>
-              <a:buNone/>
-              <a:tabLst/>
-              <a:defRPr/>
-            </a:pPr>
-            <a:r>
-              <a:rPr lang="en-US" dirty="0"/>
-              <a:t>https://journals.plos.org/ploscompbiol/article?id=10.1371/journal.pcbi.1006023</a:t>
+              <a:t>“anything that CAN be automated, SHOULD be automated”</a:t>
             </a:r>
           </a:p>
           <a:p>
@@ -1140,9 +1320,9 @@
           <a:bodyPr/>
           <a:lstStyle/>
           <a:p>
-            <a:fld id="{AD86E2D3-8F12-4CB7-B6F3-018CFC08298B}" type="slidenum">
+            <a:fld id="{2D3618BD-5D63-447F-BEC2-3BD80D62BA09}" type="slidenum">
               <a:rPr lang="en-US" smtClean="0"/>
-              <a:t>14</a:t>
+              <a:t>9</a:t>
             </a:fld>
             <a:endParaRPr lang="en-US"/>
           </a:p>
@@ -1151,7 +1331,7 @@
     </p:spTree>
     <p:extLst>
       <p:ext uri="{BB962C8B-B14F-4D97-AF65-F5344CB8AC3E}">
-        <p14:creationId xmlns:p14="http://schemas.microsoft.com/office/powerpoint/2010/main" val="99746442"/>
+        <p14:creationId xmlns:p14="http://schemas.microsoft.com/office/powerpoint/2010/main" val="870374245"/>
       </p:ext>
     </p:extLst>
   </p:cSld>
@@ -1205,16 +1385,38 @@
           <a:bodyPr/>
           <a:lstStyle/>
           <a:p>
+            <a:pPr marL="0" marR="0" lvl="0" indent="0" algn="l" defTabSz="914400" rtl="0" eaLnBrk="1" fontAlgn="auto" latinLnBrk="0" hangingPunct="1">
+              <a:lnSpc>
+                <a:spcPct val="100000"/>
+              </a:lnSpc>
+              <a:spcBef>
+                <a:spcPts val="0"/>
+              </a:spcBef>
+              <a:spcAft>
+                <a:spcPts val="0"/>
+              </a:spcAft>
+              <a:buClrTx/>
+              <a:buSzTx/>
+              <a:buFontTx/>
+              <a:buNone/>
+              <a:tabLst/>
+              <a:defRPr/>
+            </a:pPr>
             <a:r>
               <a:rPr lang="en-US" dirty="0"/>
-              <a:t>These points are so important that I’m going to reiterate them again here. </a:t>
-            </a:r>
-          </a:p>
-          <a:p>
+              <a:t>So why R?  Why not SAS, or </a:t>
+            </a:r>
+            <a:r>
+              <a:rPr lang="en-US" dirty="0" err="1"/>
+              <a:t>Matlab</a:t>
+            </a:r>
             <a:r>
               <a:rPr lang="en-US" dirty="0"/>
-              <a:t>This point, especially the last one, can be the difference between success and frustration. </a:t>
-            </a:r>
+              <a:t>, or C++, or any other script-based tool?</a:t>
+            </a:r>
+          </a:p>
+          <a:p>
+            <a:endParaRPr lang="en-US" dirty="0"/>
           </a:p>
         </p:txBody>
       </p:sp>
@@ -1233,9 +1435,9 @@
           <a:bodyPr/>
           <a:lstStyle/>
           <a:p>
-            <a:fld id="{AD86E2D3-8F12-4CB7-B6F3-018CFC08298B}" type="slidenum">
+            <a:fld id="{2D3618BD-5D63-447F-BEC2-3BD80D62BA09}" type="slidenum">
               <a:rPr lang="en-US" smtClean="0"/>
-              <a:t>15</a:t>
+              <a:t>10</a:t>
             </a:fld>
             <a:endParaRPr lang="en-US"/>
           </a:p>
@@ -1244,7 +1446,241 @@
     </p:spTree>
     <p:extLst>
       <p:ext uri="{BB962C8B-B14F-4D97-AF65-F5344CB8AC3E}">
-        <p14:creationId xmlns:p14="http://schemas.microsoft.com/office/powerpoint/2010/main" val="1026739189"/>
+        <p14:creationId xmlns:p14="http://schemas.microsoft.com/office/powerpoint/2010/main" val="1353162103"/>
+      </p:ext>
+    </p:extLst>
+  </p:cSld>
+  <p:clrMapOvr>
+    <a:masterClrMapping/>
+  </p:clrMapOvr>
+</p:notes>
+</file>
+
+<file path=ppt/notesSlides/notesSlide8.xml><?xml version="1.0" encoding="utf-8"?>
+<p:notes xmlns:a="http://schemas.openxmlformats.org/drawingml/2006/main" xmlns:r="http://schemas.openxmlformats.org/officeDocument/2006/relationships" xmlns:p="http://schemas.openxmlformats.org/presentationml/2006/main">
+  <p:cSld>
+    <p:spTree>
+      <p:nvGrpSpPr>
+        <p:cNvPr id="1" name=""/>
+        <p:cNvGrpSpPr/>
+        <p:nvPr/>
+      </p:nvGrpSpPr>
+      <p:grpSpPr>
+        <a:xfrm>
+          <a:off x="0" y="0"/>
+          <a:ext cx="0" cy="0"/>
+          <a:chOff x="0" y="0"/>
+          <a:chExt cx="0" cy="0"/>
+        </a:xfrm>
+      </p:grpSpPr>
+      <p:sp>
+        <p:nvSpPr>
+          <p:cNvPr id="2" name="Slide Image Placeholder 1"/>
+          <p:cNvSpPr>
+            <a:spLocks noGrp="1" noRot="1" noChangeAspect="1"/>
+          </p:cNvSpPr>
+          <p:nvPr>
+            <p:ph type="sldImg"/>
+          </p:nvPr>
+        </p:nvSpPr>
+        <p:spPr/>
+      </p:sp>
+      <p:sp>
+        <p:nvSpPr>
+          <p:cNvPr id="3" name="Notes Placeholder 2"/>
+          <p:cNvSpPr>
+            <a:spLocks noGrp="1"/>
+          </p:cNvSpPr>
+          <p:nvPr>
+            <p:ph type="body" idx="1"/>
+          </p:nvPr>
+        </p:nvSpPr>
+        <p:spPr/>
+        <p:txBody>
+          <a:bodyPr/>
+          <a:lstStyle/>
+          <a:p>
+            <a:r>
+              <a:rPr lang="en-US" dirty="0"/>
+              <a:t>So to set the stage for the next couple days, it’s really useful to approach this like learning a new LANGUAGE.  Which … it is.</a:t>
+            </a:r>
+          </a:p>
+          <a:p>
+            <a:endParaRPr lang="en-US" dirty="0"/>
+          </a:p>
+          <a:p>
+            <a:r>
+              <a:rPr lang="en-US" dirty="0"/>
+              <a:t>In that: it’s necessary to learn new vocab AND new grammar rules at the same time, otherwise it doesn’t make sense.  So be patient with yourselves, because it’s a stretch!</a:t>
+            </a:r>
+          </a:p>
+          <a:p>
+            <a:endParaRPr lang="en-US" dirty="0"/>
+          </a:p>
+          <a:p>
+            <a:r>
+              <a:rPr lang="en-US" dirty="0"/>
+              <a:t>Also, it’s really only possible with immersion, and it won’t REALLY make sense until you USE it.  </a:t>
+            </a:r>
+            <a:r>
+              <a:rPr lang="en-US"/>
+              <a:t>And ideally, when you use it on your OWN stuff!</a:t>
+            </a:r>
+          </a:p>
+          <a:p>
+            <a:endParaRPr lang="en-US"/>
+          </a:p>
+        </p:txBody>
+      </p:sp>
+      <p:sp>
+        <p:nvSpPr>
+          <p:cNvPr id="4" name="Slide Number Placeholder 3"/>
+          <p:cNvSpPr>
+            <a:spLocks noGrp="1"/>
+          </p:cNvSpPr>
+          <p:nvPr>
+            <p:ph type="sldNum" sz="quarter" idx="5"/>
+          </p:nvPr>
+        </p:nvSpPr>
+        <p:spPr/>
+        <p:txBody>
+          <a:bodyPr/>
+          <a:lstStyle/>
+          <a:p>
+            <a:fld id="{2D3618BD-5D63-447F-BEC2-3BD80D62BA09}" type="slidenum">
+              <a:rPr lang="en-US" smtClean="0"/>
+              <a:t>11</a:t>
+            </a:fld>
+            <a:endParaRPr lang="en-US"/>
+          </a:p>
+        </p:txBody>
+      </p:sp>
+    </p:spTree>
+    <p:extLst>
+      <p:ext uri="{BB962C8B-B14F-4D97-AF65-F5344CB8AC3E}">
+        <p14:creationId xmlns:p14="http://schemas.microsoft.com/office/powerpoint/2010/main" val="443200328"/>
+      </p:ext>
+    </p:extLst>
+  </p:cSld>
+  <p:clrMapOvr>
+    <a:masterClrMapping/>
+  </p:clrMapOvr>
+</p:notes>
+</file>
+
+<file path=ppt/notesSlides/notesSlide9.xml><?xml version="1.0" encoding="utf-8"?>
+<p:notes xmlns:a="http://schemas.openxmlformats.org/drawingml/2006/main" xmlns:r="http://schemas.openxmlformats.org/officeDocument/2006/relationships" xmlns:p="http://schemas.openxmlformats.org/presentationml/2006/main">
+  <p:cSld>
+    <p:spTree>
+      <p:nvGrpSpPr>
+        <p:cNvPr id="1" name=""/>
+        <p:cNvGrpSpPr/>
+        <p:nvPr/>
+      </p:nvGrpSpPr>
+      <p:grpSpPr>
+        <a:xfrm>
+          <a:off x="0" y="0"/>
+          <a:ext cx="0" cy="0"/>
+          <a:chOff x="0" y="0"/>
+          <a:chExt cx="0" cy="0"/>
+        </a:xfrm>
+      </p:grpSpPr>
+      <p:sp>
+        <p:nvSpPr>
+          <p:cNvPr id="2" name="Slide Image Placeholder 1"/>
+          <p:cNvSpPr>
+            <a:spLocks noGrp="1" noRot="1" noChangeAspect="1"/>
+          </p:cNvSpPr>
+          <p:nvPr>
+            <p:ph type="sldImg"/>
+          </p:nvPr>
+        </p:nvSpPr>
+        <p:spPr/>
+      </p:sp>
+      <p:sp>
+        <p:nvSpPr>
+          <p:cNvPr id="3" name="Notes Placeholder 2"/>
+          <p:cNvSpPr>
+            <a:spLocks noGrp="1"/>
+          </p:cNvSpPr>
+          <p:nvPr>
+            <p:ph type="body" idx="1"/>
+          </p:nvPr>
+        </p:nvSpPr>
+        <p:spPr/>
+        <p:txBody>
+          <a:bodyPr/>
+          <a:lstStyle/>
+          <a:p>
+            <a:r>
+              <a:rPr lang="en-US" dirty="0"/>
+              <a:t>Because of this, the slides are intentionally a little bit wordy. I apologize for that as it makes the aesthetics worse but I want this document to serve a little bit as a reference guide for you. </a:t>
+            </a:r>
+          </a:p>
+          <a:p>
+            <a:r>
+              <a:rPr lang="en-US" dirty="0"/>
+              <a:t>Today might be slow but we’re laying the foundation for charts &amp; modeling</a:t>
+            </a:r>
+          </a:p>
+          <a:p>
+            <a:pPr marL="0" marR="0" lvl="0" indent="0" algn="l" defTabSz="914400" rtl="0" eaLnBrk="1" fontAlgn="auto" latinLnBrk="0" hangingPunct="1">
+              <a:lnSpc>
+                <a:spcPct val="100000"/>
+              </a:lnSpc>
+              <a:spcBef>
+                <a:spcPts val="0"/>
+              </a:spcBef>
+              <a:spcAft>
+                <a:spcPts val="0"/>
+              </a:spcAft>
+              <a:buClrTx/>
+              <a:buSzTx/>
+              <a:buFontTx/>
+              <a:buNone/>
+              <a:tabLst/>
+              <a:defRPr/>
+            </a:pPr>
+            <a:r>
+              <a:rPr lang="en-US" dirty="0"/>
+              <a:t>Not everyone needs to be an expert, but if you’re here, I want you to move up a level and at least be able to “read” R</a:t>
+            </a:r>
+          </a:p>
+          <a:p>
+            <a:endParaRPr lang="en-US" dirty="0"/>
+          </a:p>
+          <a:p>
+            <a:endParaRPr lang="en-US" dirty="0"/>
+          </a:p>
+        </p:txBody>
+      </p:sp>
+      <p:sp>
+        <p:nvSpPr>
+          <p:cNvPr id="4" name="Slide Number Placeholder 3"/>
+          <p:cNvSpPr>
+            <a:spLocks noGrp="1"/>
+          </p:cNvSpPr>
+          <p:nvPr>
+            <p:ph type="sldNum" sz="quarter" idx="5"/>
+          </p:nvPr>
+        </p:nvSpPr>
+        <p:spPr/>
+        <p:txBody>
+          <a:bodyPr/>
+          <a:lstStyle/>
+          <a:p>
+            <a:fld id="{AD86E2D3-8F12-4CB7-B6F3-018CFC08298B}" type="slidenum">
+              <a:rPr lang="en-US" smtClean="0"/>
+              <a:t>13</a:t>
+            </a:fld>
+            <a:endParaRPr lang="en-US"/>
+          </a:p>
+        </p:txBody>
+      </p:sp>
+    </p:spTree>
+    <p:extLst>
+      <p:ext uri="{BB962C8B-B14F-4D97-AF65-F5344CB8AC3E}">
+        <p14:creationId xmlns:p14="http://schemas.microsoft.com/office/powerpoint/2010/main" val="2465146486"/>
       </p:ext>
     </p:extLst>
   </p:cSld>
@@ -6242,7 +6678,7 @@
             <p:nvPr/>
           </p:nvPicPr>
           <p:blipFill rotWithShape="1">
-            <a:blip r:embed="rId2">
+            <a:blip r:embed="rId3">
               <a:extLst>
                 <a:ext uri="{28A0092B-C50C-407E-A947-70E740481C1C}">
                   <a14:useLocalDpi xmlns:a14="http://schemas.microsoft.com/office/drawing/2010/main" val="0"/>
@@ -8036,7 +8472,7 @@
           <p:nvPr/>
         </p:nvPicPr>
         <p:blipFill rotWithShape="1">
-          <a:blip r:embed="rId2">
+          <a:blip r:embed="rId3">
             <a:extLst>
               <a:ext uri="{28A0092B-C50C-407E-A947-70E740481C1C}">
                 <a14:useLocalDpi xmlns:a14="http://schemas.microsoft.com/office/drawing/2010/main" val="0"/>
@@ -18592,7 +19028,7 @@
           <p:nvPr/>
         </p:nvPicPr>
         <p:blipFill rotWithShape="1">
-          <a:blip r:embed="rId2"/>
+          <a:blip r:embed="rId3"/>
           <a:srcRect l="50000"/>
           <a:stretch/>
         </p:blipFill>
@@ -19090,7 +19526,7 @@
           </p:nvPr>
         </p:nvPicPr>
         <p:blipFill>
-          <a:blip r:embed="rId2">
+          <a:blip r:embed="rId3">
             <a:extLst>
               <a:ext uri="{28A0092B-C50C-407E-A947-70E740481C1C}">
                 <a14:useLocalDpi xmlns:a14="http://schemas.microsoft.com/office/drawing/2010/main" val="0"/>

</xml_diff>

<commit_message>
powerpoint fixes better wording in tutorial 3 intro
</commit_message>
<xml_diff>
--- a/presentations/1 - Welcome and motivation.pptx
+++ b/presentations/1 - Welcome and motivation.pptx
@@ -122,6 +122,33 @@
     </a:lvl9pPr>
   </p:defaultTextStyle>
   <p:extLst>
+    <p:ext uri="{521415D9-36F7-43E2-AB2F-B90AF26B5E84}">
+      <p14:sectionLst xmlns:p14="http://schemas.microsoft.com/office/powerpoint/2010/main">
+        <p14:section name="Default Section" id="{2A488BF3-F36A-4D29-B1B4-B8B19BE2EB28}">
+          <p14:sldIdLst>
+            <p14:sldId id="256"/>
+            <p14:sldId id="432"/>
+            <p14:sldId id="405"/>
+          </p14:sldIdLst>
+        </p14:section>
+        <p14:section name="Section 1 - Welcome" id="{1711D4D6-A940-4D4B-B619-CA063D11BA72}">
+          <p14:sldIdLst>
+            <p14:sldId id="402"/>
+            <p14:sldId id="411"/>
+            <p14:sldId id="383"/>
+            <p14:sldId id="401"/>
+            <p14:sldId id="331"/>
+            <p14:sldId id="431"/>
+            <p14:sldId id="332"/>
+            <p14:sldId id="412"/>
+            <p14:sldId id="430"/>
+            <p14:sldId id="297"/>
+            <p14:sldId id="313"/>
+            <p14:sldId id="429"/>
+          </p14:sldIdLst>
+        </p14:section>
+      </p14:sectionLst>
+    </p:ext>
     <p:ext uri="{EFAFB233-063F-42B5-8137-9DF3F51BA10A}">
       <p15:sldGuideLst xmlns:p15="http://schemas.microsoft.com/office/powerpoint/2012/main"/>
     </p:ext>
@@ -628,49 +655,6 @@
             </a:pPr>
             <a:r>
               <a:rPr lang="en-US" dirty="0"/>
-              <a:t>Sometimes you should pay close attention to the slides, sometimes you should be practicing in RStudio; I’ll let you know</a:t>
-            </a:r>
-          </a:p>
-          <a:p>
-            <a:pPr marL="0" marR="0" lvl="0" indent="0" algn="l" defTabSz="914400" rtl="0" eaLnBrk="1" fontAlgn="auto" latinLnBrk="0" hangingPunct="1">
-              <a:lnSpc>
-                <a:spcPct val="100000"/>
-              </a:lnSpc>
-              <a:spcBef>
-                <a:spcPts val="0"/>
-              </a:spcBef>
-              <a:spcAft>
-                <a:spcPts val="0"/>
-              </a:spcAft>
-              <a:buClrTx/>
-              <a:buSzTx/>
-              <a:buFontTx/>
-              <a:buNone/>
-              <a:tabLst/>
-              <a:defRPr/>
-            </a:pPr>
-            <a:endParaRPr lang="en-US" dirty="0"/>
-          </a:p>
-          <a:p>
-            <a:pPr marL="0" marR="0" lvl="0" indent="0" algn="l" defTabSz="914400" rtl="0" eaLnBrk="1" fontAlgn="auto" latinLnBrk="0" hangingPunct="1">
-              <a:lnSpc>
-                <a:spcPct val="100000"/>
-              </a:lnSpc>
-              <a:spcBef>
-                <a:spcPts val="0"/>
-              </a:spcBef>
-              <a:spcAft>
-                <a:spcPts val="0"/>
-              </a:spcAft>
-              <a:buClrTx/>
-              <a:buSzTx/>
-              <a:buFontTx/>
-              <a:buNone/>
-              <a:tabLst/>
-              <a:defRPr/>
-            </a:pPr>
-            <a:r>
-              <a:rPr lang="en-US" dirty="0"/>
               <a:t>Teaching philosophy thanks to:</a:t>
             </a:r>
           </a:p>
@@ -1645,12 +1629,6 @@
               <a:rPr lang="en-US" dirty="0"/>
               <a:t>Not everyone needs to be an expert, but if you’re here, I want you to move up a level and at least be able to “read” R</a:t>
             </a:r>
-          </a:p>
-          <a:p>
-            <a:endParaRPr lang="en-US" dirty="0"/>
-          </a:p>
-          <a:p>
-            <a:endParaRPr lang="en-US" dirty="0"/>
           </a:p>
         </p:txBody>
       </p:sp>
@@ -12804,8 +12782,8 @@
         </p:nvSpPr>
         <p:spPr>
           <a:xfrm>
-            <a:off x="371093" y="2366397"/>
-            <a:ext cx="6397222" cy="3989953"/>
+            <a:off x="371093" y="2731521"/>
+            <a:ext cx="6397222" cy="3989954"/>
           </a:xfrm>
         </p:spPr>
         <p:txBody>
@@ -12815,15 +12793,6 @@
           <a:lstStyle/>
           <a:p>
             <a:pPr marL="0" indent="0">
-              <a:buNone/>
-            </a:pPr>
-            <a:r>
-              <a:rPr lang="en-US" dirty="0"/>
-              <a:t>Today we have 16 participants!</a:t>
-            </a:r>
-          </a:p>
-          <a:p>
-            <a:pPr marL="0" indent="0">
               <a:spcBef>
                 <a:spcPts val="2400"/>
               </a:spcBef>
@@ -12839,7 +12808,11 @@
             </a:r>
           </a:p>
           <a:p>
-            <a:pPr lvl="1"/>
+            <a:pPr lvl="1">
+              <a:spcAft>
+                <a:spcPts val="1200"/>
+              </a:spcAft>
+            </a:pPr>
             <a:r>
               <a:rPr lang="en-US" sz="2800" dirty="0"/>
               <a:t>What type of work you do</a:t>
@@ -12853,14 +12826,25 @@
             </a:r>
           </a:p>
           <a:p>
-            <a:pPr lvl="2"/>
+            <a:pPr lvl="2">
+              <a:spcBef>
+                <a:spcPts val="0"/>
+              </a:spcBef>
+              <a:spcAft>
+                <a:spcPts val="1200"/>
+              </a:spcAft>
+            </a:pPr>
             <a:r>
               <a:rPr lang="en-US" sz="2400" dirty="0"/>
               <a:t>(Optional) Something specific you’d like to take away from this course?</a:t>
             </a:r>
           </a:p>
           <a:p>
-            <a:pPr lvl="1"/>
+            <a:pPr lvl="1">
+              <a:spcAft>
+                <a:spcPts val="1200"/>
+              </a:spcAft>
+            </a:pPr>
             <a:r>
               <a:rPr lang="en-US" sz="2800" dirty="0"/>
               <a:t>One small, non-work accomplishment from the past year </a:t>
@@ -14991,41 +14975,6 @@
           </p:spPr>
         </p:pic>
       </p:grpSp>
-      <p:sp>
-        <p:nvSpPr>
-          <p:cNvPr id="5" name="TextBox 4">
-            <a:extLst>
-              <a:ext uri="{FF2B5EF4-FFF2-40B4-BE49-F238E27FC236}">
-                <a16:creationId xmlns:a16="http://schemas.microsoft.com/office/drawing/2014/main" id="{035B3F2C-CB36-F1CC-A78D-E914E5B4CF89}"/>
-              </a:ext>
-            </a:extLst>
-          </p:cNvPr>
-          <p:cNvSpPr txBox="1"/>
-          <p:nvPr/>
-        </p:nvSpPr>
-        <p:spPr>
-          <a:xfrm>
-            <a:off x="552659" y="6109398"/>
-            <a:ext cx="8397745" cy="646331"/>
-          </a:xfrm>
-          <a:prstGeom prst="rect">
-            <a:avLst/>
-          </a:prstGeom>
-          <a:noFill/>
-        </p:spPr>
-        <p:txBody>
-          <a:bodyPr wrap="square" rtlCol="0">
-            <a:spAutoFit/>
-          </a:bodyPr>
-          <a:lstStyle/>
-          <a:p>
-            <a:r>
-              <a:rPr lang="en-US" i="1" dirty="0"/>
-              <a:t>One remote learning request: if possible, keep your camera on often (but not always). This way we can see if you’re following us or confused :)</a:t>
-            </a:r>
-          </a:p>
-        </p:txBody>
-      </p:sp>
     </p:spTree>
     <p:extLst>
       <p:ext uri="{BB962C8B-B14F-4D97-AF65-F5344CB8AC3E}">
@@ -15103,7 +15052,7 @@
         <p:spPr>
           <a:xfrm>
             <a:off x="572757" y="1825625"/>
-            <a:ext cx="6052480" cy="4846906"/>
+            <a:ext cx="6443268" cy="4846906"/>
           </a:xfrm>
         </p:spPr>
         <p:txBody>
@@ -15146,7 +15095,7 @@
             </a:pPr>
             <a:r>
               <a:rPr lang="en-US" sz="2400" i="1" dirty="0"/>
-              <a:t>If there is something that is wrong (e.g., broken link) or could be explained better, please let me know and/or write it down. </a:t>
+              <a:t>If there is something that is wrong (e.g., broken link) or could be explained better, please message us immediately and/or write it down. </a:t>
             </a:r>
           </a:p>
           <a:p>

</xml_diff>

<commit_message>
updating ppts 1 and 2 to incorp feedback from last time
</commit_message>
<xml_diff>
--- a/presentations/1 - Welcome and motivation.pptx
+++ b/presentations/1 - Welcome and motivation.pptx
@@ -5,24 +5,25 @@
     <p:sldMasterId id="2147483648" r:id="rId1"/>
   </p:sldMasterIdLst>
   <p:notesMasterIdLst>
-    <p:notesMasterId r:id="rId17"/>
+    <p:notesMasterId r:id="rId18"/>
   </p:notesMasterIdLst>
   <p:sldIdLst>
     <p:sldId id="256" r:id="rId2"/>
     <p:sldId id="432" r:id="rId3"/>
-    <p:sldId id="405" r:id="rId4"/>
-    <p:sldId id="411" r:id="rId5"/>
-    <p:sldId id="402" r:id="rId6"/>
-    <p:sldId id="383" r:id="rId7"/>
-    <p:sldId id="401" r:id="rId8"/>
-    <p:sldId id="331" r:id="rId9"/>
-    <p:sldId id="431" r:id="rId10"/>
-    <p:sldId id="332" r:id="rId11"/>
-    <p:sldId id="412" r:id="rId12"/>
-    <p:sldId id="430" r:id="rId13"/>
-    <p:sldId id="297" r:id="rId14"/>
-    <p:sldId id="313" r:id="rId15"/>
-    <p:sldId id="429" r:id="rId16"/>
+    <p:sldId id="411" r:id="rId4"/>
+    <p:sldId id="405" r:id="rId5"/>
+    <p:sldId id="434" r:id="rId6"/>
+    <p:sldId id="402" r:id="rId7"/>
+    <p:sldId id="383" r:id="rId8"/>
+    <p:sldId id="401" r:id="rId9"/>
+    <p:sldId id="331" r:id="rId10"/>
+    <p:sldId id="431" r:id="rId11"/>
+    <p:sldId id="332" r:id="rId12"/>
+    <p:sldId id="412" r:id="rId13"/>
+    <p:sldId id="430" r:id="rId14"/>
+    <p:sldId id="297" r:id="rId15"/>
+    <p:sldId id="313" r:id="rId16"/>
+    <p:sldId id="429" r:id="rId17"/>
   </p:sldIdLst>
   <p:sldSz cx="12192000" cy="6858000"/>
   <p:notesSz cx="6858000" cy="9144000"/>
@@ -128,12 +129,13 @@
           <p14:sldIdLst>
             <p14:sldId id="256"/>
             <p14:sldId id="432"/>
-            <p14:sldId id="405"/>
           </p14:sldIdLst>
         </p14:section>
         <p14:section name="Section 1 - Welcome" id="{1711D4D6-A940-4D4B-B619-CA063D11BA72}">
           <p14:sldIdLst>
             <p14:sldId id="411"/>
+            <p14:sldId id="405"/>
+            <p14:sldId id="434"/>
             <p14:sldId id="402"/>
             <p14:sldId id="383"/>
             <p14:sldId id="401"/>
@@ -238,7 +240,7 @@
           <a:p>
             <a:fld id="{EC387D8F-AD3F-4F1D-953F-F6D09F384E03}" type="datetimeFigureOut">
               <a:rPr lang="en-US" smtClean="0"/>
-              <a:t>11/14/2023</a:t>
+              <a:t>12/10/2023</a:t>
             </a:fld>
             <a:endParaRPr lang="en-US"/>
           </a:p>
@@ -549,10 +551,7 @@
           <a:bodyPr/>
           <a:lstStyle/>
           <a:p>
-            <a:r>
-              <a:rPr lang="en-US" dirty="0"/>
-              <a:t>Have everyone introduce themselves in 1-2 sentences</a:t>
-            </a:r>
+            <a:endParaRPr lang="en-US" dirty="0"/>
           </a:p>
         </p:txBody>
       </p:sp>
@@ -573,7 +572,7 @@
           <a:p>
             <a:fld id="{AD86E2D3-8F12-4CB7-B6F3-018CFC08298B}" type="slidenum">
               <a:rPr lang="en-US" smtClean="0"/>
-              <a:t>3</a:t>
+              <a:t>4</a:t>
             </a:fld>
             <a:endParaRPr lang="en-US"/>
           </a:p>
@@ -636,6 +635,18 @@
           <a:bodyPr/>
           <a:lstStyle/>
           <a:p>
+            <a:r>
+              <a:rPr lang="en-US" dirty="0"/>
+              <a:t>Because of this, the slides are intentionally a little bit wordy. I apologize for that as it makes the aesthetics worse but I want this document to serve a little bit as a reference guide for you. </a:t>
+            </a:r>
+          </a:p>
+          <a:p>
+            <a:r>
+              <a:rPr lang="en-US" dirty="0"/>
+              <a:t>Today might be slow but we’re laying the foundation for charts &amp; modeling</a:t>
+            </a:r>
+          </a:p>
+          <a:p>
             <a:pPr marL="0" marR="0" lvl="0" indent="0" algn="l" defTabSz="914400" rtl="0" eaLnBrk="1" fontAlgn="auto" latinLnBrk="0" hangingPunct="1">
               <a:lnSpc>
                 <a:spcPct val="100000"/>
@@ -655,57 +666,8 @@
             </a:pPr>
             <a:r>
               <a:rPr lang="en-US" dirty="0"/>
-              <a:t>Teaching philosophy thanks to:</a:t>
-            </a:r>
-          </a:p>
-          <a:p>
-            <a:pPr marL="0" marR="0" lvl="0" indent="0" algn="l" defTabSz="914400" rtl="0" eaLnBrk="1" fontAlgn="auto" latinLnBrk="0" hangingPunct="1">
-              <a:lnSpc>
-                <a:spcPct val="100000"/>
-              </a:lnSpc>
-              <a:spcBef>
-                <a:spcPts val="0"/>
-              </a:spcBef>
-              <a:spcAft>
-                <a:spcPts val="0"/>
-              </a:spcAft>
-              <a:buClrTx/>
-              <a:buSzTx/>
-              <a:buFontTx/>
-              <a:buNone/>
-              <a:tabLst/>
-              <a:defRPr/>
-            </a:pPr>
-            <a:r>
-              <a:rPr lang="en-US" dirty="0"/>
-              <a:t>http://teachtogether.tech/en/index.html</a:t>
-            </a:r>
-          </a:p>
-          <a:p>
-            <a:pPr marL="0" marR="0" lvl="0" indent="0" algn="l" defTabSz="914400" rtl="0" eaLnBrk="1" fontAlgn="auto" latinLnBrk="0" hangingPunct="1">
-              <a:lnSpc>
-                <a:spcPct val="100000"/>
-              </a:lnSpc>
-              <a:spcBef>
-                <a:spcPts val="0"/>
-              </a:spcBef>
-              <a:spcAft>
-                <a:spcPts val="0"/>
-              </a:spcAft>
-              <a:buClrTx/>
-              <a:buSzTx/>
-              <a:buFontTx/>
-              <a:buNone/>
-              <a:tabLst/>
-              <a:defRPr/>
-            </a:pPr>
-            <a:r>
-              <a:rPr lang="en-US" dirty="0"/>
-              <a:t>https://journals.plos.org/ploscompbiol/article?id=10.1371/journal.pcbi.1006023</a:t>
-            </a:r>
-          </a:p>
-          <a:p>
-            <a:endParaRPr lang="en-US" dirty="0"/>
+              <a:t>Not everyone needs to be an expert, but if you’re here, I want you to move up a level and at least be able to “read” R</a:t>
+            </a:r>
           </a:p>
         </p:txBody>
       </p:sp>
@@ -735,7 +697,7 @@
     </p:spTree>
     <p:extLst>
       <p:ext uri="{BB962C8B-B14F-4D97-AF65-F5344CB8AC3E}">
-        <p14:creationId xmlns:p14="http://schemas.microsoft.com/office/powerpoint/2010/main" val="99746442"/>
+        <p14:creationId xmlns:p14="http://schemas.microsoft.com/office/powerpoint/2010/main" val="2465146486"/>
       </p:ext>
     </p:extLst>
   </p:cSld>
@@ -789,16 +751,76 @@
           <a:bodyPr/>
           <a:lstStyle/>
           <a:p>
+            <a:pPr marL="0" marR="0" lvl="0" indent="0" algn="l" defTabSz="914400" rtl="0" eaLnBrk="1" fontAlgn="auto" latinLnBrk="0" hangingPunct="1">
+              <a:lnSpc>
+                <a:spcPct val="100000"/>
+              </a:lnSpc>
+              <a:spcBef>
+                <a:spcPts val="0"/>
+              </a:spcBef>
+              <a:spcAft>
+                <a:spcPts val="0"/>
+              </a:spcAft>
+              <a:buClrTx/>
+              <a:buSzTx/>
+              <a:buFontTx/>
+              <a:buNone/>
+              <a:tabLst/>
+              <a:defRPr/>
+            </a:pPr>
             <a:r>
               <a:rPr lang="en-US" dirty="0"/>
-              <a:t>These points are so important that I’m going to reiterate them again here. </a:t>
-            </a:r>
-          </a:p>
-          <a:p>
+              <a:t>Teaching philosophy thanks to:</a:t>
+            </a:r>
+          </a:p>
+          <a:p>
+            <a:pPr marL="0" marR="0" lvl="0" indent="0" algn="l" defTabSz="914400" rtl="0" eaLnBrk="1" fontAlgn="auto" latinLnBrk="0" hangingPunct="1">
+              <a:lnSpc>
+                <a:spcPct val="100000"/>
+              </a:lnSpc>
+              <a:spcBef>
+                <a:spcPts val="0"/>
+              </a:spcBef>
+              <a:spcAft>
+                <a:spcPts val="0"/>
+              </a:spcAft>
+              <a:buClrTx/>
+              <a:buSzTx/>
+              <a:buFontTx/>
+              <a:buNone/>
+              <a:tabLst/>
+              <a:defRPr/>
+            </a:pPr>
             <a:r>
               <a:rPr lang="en-US" dirty="0"/>
-              <a:t>This point, especially the last one, can be the difference between success and frustration. </a:t>
-            </a:r>
+              <a:t>http://teachtogether.tech/en/index.html</a:t>
+            </a:r>
+          </a:p>
+          <a:p>
+            <a:pPr marL="0" marR="0" lvl="0" indent="0" algn="l" defTabSz="914400" rtl="0" eaLnBrk="1" fontAlgn="auto" latinLnBrk="0" hangingPunct="1">
+              <a:lnSpc>
+                <a:spcPct val="100000"/>
+              </a:lnSpc>
+              <a:spcBef>
+                <a:spcPts val="0"/>
+              </a:spcBef>
+              <a:spcAft>
+                <a:spcPts val="0"/>
+              </a:spcAft>
+              <a:buClrTx/>
+              <a:buSzTx/>
+              <a:buFontTx/>
+              <a:buNone/>
+              <a:tabLst/>
+              <a:defRPr/>
+            </a:pPr>
+            <a:r>
+              <a:rPr lang="en-US" dirty="0"/>
+              <a:t>https://journals.plos.org/ploscompbiol/article?id=10.1371/journal.pcbi.1006023</a:t>
+            </a:r>
+          </a:p>
+          <a:p>
+            <a:endParaRPr lang="en-US" dirty="0"/>
           </a:p>
         </p:txBody>
       </p:sp>
@@ -820,6 +842,99 @@
             <a:fld id="{AD86E2D3-8F12-4CB7-B6F3-018CFC08298B}" type="slidenum">
               <a:rPr lang="en-US" smtClean="0"/>
               <a:t>15</a:t>
+            </a:fld>
+            <a:endParaRPr lang="en-US"/>
+          </a:p>
+        </p:txBody>
+      </p:sp>
+    </p:spTree>
+    <p:extLst>
+      <p:ext uri="{BB962C8B-B14F-4D97-AF65-F5344CB8AC3E}">
+        <p14:creationId xmlns:p14="http://schemas.microsoft.com/office/powerpoint/2010/main" val="99746442"/>
+      </p:ext>
+    </p:extLst>
+  </p:cSld>
+  <p:clrMapOvr>
+    <a:masterClrMapping/>
+  </p:clrMapOvr>
+</p:notes>
+</file>
+
+<file path=ppt/notesSlides/notesSlide12.xml><?xml version="1.0" encoding="utf-8"?>
+<p:notes xmlns:a="http://schemas.openxmlformats.org/drawingml/2006/main" xmlns:r="http://schemas.openxmlformats.org/officeDocument/2006/relationships" xmlns:p="http://schemas.openxmlformats.org/presentationml/2006/main">
+  <p:cSld>
+    <p:spTree>
+      <p:nvGrpSpPr>
+        <p:cNvPr id="1" name=""/>
+        <p:cNvGrpSpPr/>
+        <p:nvPr/>
+      </p:nvGrpSpPr>
+      <p:grpSpPr>
+        <a:xfrm>
+          <a:off x="0" y="0"/>
+          <a:ext cx="0" cy="0"/>
+          <a:chOff x="0" y="0"/>
+          <a:chExt cx="0" cy="0"/>
+        </a:xfrm>
+      </p:grpSpPr>
+      <p:sp>
+        <p:nvSpPr>
+          <p:cNvPr id="2" name="Slide Image Placeholder 1"/>
+          <p:cNvSpPr>
+            <a:spLocks noGrp="1" noRot="1" noChangeAspect="1"/>
+          </p:cNvSpPr>
+          <p:nvPr>
+            <p:ph type="sldImg"/>
+          </p:nvPr>
+        </p:nvSpPr>
+        <p:spPr/>
+      </p:sp>
+      <p:sp>
+        <p:nvSpPr>
+          <p:cNvPr id="3" name="Notes Placeholder 2"/>
+          <p:cNvSpPr>
+            <a:spLocks noGrp="1"/>
+          </p:cNvSpPr>
+          <p:nvPr>
+            <p:ph type="body" idx="1"/>
+          </p:nvPr>
+        </p:nvSpPr>
+        <p:spPr/>
+        <p:txBody>
+          <a:bodyPr/>
+          <a:lstStyle/>
+          <a:p>
+            <a:r>
+              <a:rPr lang="en-US" dirty="0"/>
+              <a:t>These points are so important that I’m going to reiterate them again here. </a:t>
+            </a:r>
+          </a:p>
+          <a:p>
+            <a:r>
+              <a:rPr lang="en-US" dirty="0"/>
+              <a:t>This point, especially the last one, can be the difference between success and frustration. </a:t>
+            </a:r>
+          </a:p>
+        </p:txBody>
+      </p:sp>
+      <p:sp>
+        <p:nvSpPr>
+          <p:cNvPr id="4" name="Slide Number Placeholder 3"/>
+          <p:cNvSpPr>
+            <a:spLocks noGrp="1"/>
+          </p:cNvSpPr>
+          <p:nvPr>
+            <p:ph type="sldNum" sz="quarter" idx="5"/>
+          </p:nvPr>
+        </p:nvSpPr>
+        <p:spPr/>
+        <p:txBody>
+          <a:bodyPr/>
+          <a:lstStyle/>
+          <a:p>
+            <a:fld id="{AD86E2D3-8F12-4CB7-B6F3-018CFC08298B}" type="slidenum">
+              <a:rPr lang="en-US" smtClean="0"/>
+              <a:t>16</a:t>
             </a:fld>
             <a:endParaRPr lang="en-US"/>
           </a:p>
@@ -882,7 +997,10 @@
           <a:bodyPr/>
           <a:lstStyle/>
           <a:p>
-            <a:endParaRPr lang="en-US" dirty="0"/>
+            <a:r>
+              <a:rPr lang="en-US" dirty="0"/>
+              <a:t>Have everyone introduce themselves in 1-2 sentences</a:t>
+            </a:r>
           </a:p>
         </p:txBody>
       </p:sp>
@@ -912,7 +1030,7 @@
     </p:spTree>
     <p:extLst>
       <p:ext uri="{BB962C8B-B14F-4D97-AF65-F5344CB8AC3E}">
-        <p14:creationId xmlns:p14="http://schemas.microsoft.com/office/powerpoint/2010/main" val="2807426565"/>
+        <p14:creationId xmlns:p14="http://schemas.microsoft.com/office/powerpoint/2010/main" val="3435368634"/>
       </p:ext>
     </p:extLst>
   </p:cSld>
@@ -966,24 +1084,7 @@
           <a:bodyPr/>
           <a:lstStyle/>
           <a:p>
-            <a:r>
-              <a:rPr lang="en-US" dirty="0"/>
-              <a:t>In the first section we’ll go over what R is, the basic overview of the “grammar” used, and some simple commands. For this first section, it will mostly be </a:t>
-            </a:r>
-            <a:r>
-              <a:rPr lang="en-US" dirty="0" err="1"/>
-              <a:t>powerpoint</a:t>
-            </a:r>
-            <a:r>
-              <a:rPr lang="en-US" dirty="0"/>
-              <a:t> based so follow along with the slideshow. </a:t>
-            </a:r>
-          </a:p>
-          <a:p>
-            <a:r>
-              <a:rPr lang="en-US" dirty="0"/>
-              <a:t>In sections 2 through 4 we’ll cover more about how to understand what R is and how to get it to do what you want. These are broken into individual script files for each section so that you may follow along. We’ll build a little bit more on the foundations previously learned with each section.</a:t>
-            </a:r>
+            <a:endParaRPr lang="en-US" dirty="0"/>
           </a:p>
         </p:txBody>
       </p:sp>
@@ -1013,7 +1114,7 @@
     </p:spTree>
     <p:extLst>
       <p:ext uri="{BB962C8B-B14F-4D97-AF65-F5344CB8AC3E}">
-        <p14:creationId xmlns:p14="http://schemas.microsoft.com/office/powerpoint/2010/main" val="634339299"/>
+        <p14:creationId xmlns:p14="http://schemas.microsoft.com/office/powerpoint/2010/main" val="2807426565"/>
       </p:ext>
     </p:extLst>
   </p:cSld>
@@ -1069,13 +1170,21 @@
           <a:p>
             <a:r>
               <a:rPr lang="en-US" dirty="0"/>
-              <a:t>Just so we have a little bit of a roadmap, here’s tomorrow’s schedule</a:t>
-            </a:r>
-          </a:p>
-          <a:p>
+              <a:t>In the first section we’ll go over what R is, the basic overview of the “grammar” used, and some simple commands. For this first section, it will mostly be </a:t>
+            </a:r>
+            <a:r>
+              <a:rPr lang="en-US" dirty="0" err="1"/>
+              <a:t>powerpoint</a:t>
+            </a:r>
             <a:r>
               <a:rPr lang="en-US" dirty="0"/>
-              <a:t>Don’t stress too much about your final project. You won’t have to present it and nothing needs to be shared</a:t>
+              <a:t> based so follow along with the slideshow. </a:t>
+            </a:r>
+          </a:p>
+          <a:p>
+            <a:r>
+              <a:rPr lang="en-US" dirty="0"/>
+              <a:t>In sections 2 through 4 we’ll cover more about how to understand what R is and how to get it to do what you want. These are broken into individual script files for each section so that you may follow along. We’ll build a little bit more on the foundations previously learned with each section.</a:t>
             </a:r>
           </a:p>
         </p:txBody>
@@ -1106,7 +1215,7 @@
     </p:spTree>
     <p:extLst>
       <p:ext uri="{BB962C8B-B14F-4D97-AF65-F5344CB8AC3E}">
-        <p14:creationId xmlns:p14="http://schemas.microsoft.com/office/powerpoint/2010/main" val="76548694"/>
+        <p14:creationId xmlns:p14="http://schemas.microsoft.com/office/powerpoint/2010/main" val="634339299"/>
       </p:ext>
     </p:extLst>
   </p:cSld>
@@ -1162,23 +1271,14 @@
           <a:p>
             <a:r>
               <a:rPr lang="en-US" dirty="0"/>
-              <a:t>it’s worth taking a moment to motivate what we’re doing.  Chances are, you’re a very proficient Excel user, and you’re good at your job.  And here we are pushing this new thing, so it’s worth talking about WHY.</a:t>
-            </a:r>
-          </a:p>
-          <a:p>
-            <a:endParaRPr lang="en-US" dirty="0"/>
+              <a:t>Just so we have a little bit of a roadmap, here’s tomorrow’s schedule</a:t>
+            </a:r>
           </a:p>
           <a:p>
             <a:r>
               <a:rPr lang="en-US" dirty="0"/>
-              <a:t>So without going into the statistical and graphical tools that R provides, I’d just like to talk about reproducibility…</a:t>
-            </a:r>
-          </a:p>
-          <a:p>
-            <a:endParaRPr lang="en-US" dirty="0"/>
-          </a:p>
-          <a:p>
-            <a:endParaRPr lang="en-US" dirty="0"/>
+              <a:t>Don’t stress too much about your final project. You won’t have to present it and nothing needs to be shared</a:t>
+            </a:r>
           </a:p>
         </p:txBody>
       </p:sp>
@@ -1197,7 +1297,7 @@
           <a:bodyPr/>
           <a:lstStyle/>
           <a:p>
-            <a:fld id="{2D3618BD-5D63-447F-BEC2-3BD80D62BA09}" type="slidenum">
+            <a:fld id="{AD86E2D3-8F12-4CB7-B6F3-018CFC08298B}" type="slidenum">
               <a:rPr lang="en-US" smtClean="0"/>
               <a:t>8</a:t>
             </a:fld>
@@ -1208,7 +1308,7 @@
     </p:spTree>
     <p:extLst>
       <p:ext uri="{BB962C8B-B14F-4D97-AF65-F5344CB8AC3E}">
-        <p14:creationId xmlns:p14="http://schemas.microsoft.com/office/powerpoint/2010/main" val="1489899700"/>
+        <p14:creationId xmlns:p14="http://schemas.microsoft.com/office/powerpoint/2010/main" val="76548694"/>
       </p:ext>
     </p:extLst>
   </p:cSld>
@@ -1262,27 +1362,22 @@
           <a:bodyPr/>
           <a:lstStyle/>
           <a:p>
-            <a:pPr marL="0" marR="0" lvl="0" indent="0" algn="l" defTabSz="914400" rtl="0" eaLnBrk="1" fontAlgn="auto" latinLnBrk="0" hangingPunct="1">
-              <a:lnSpc>
-                <a:spcPct val="100000"/>
-              </a:lnSpc>
-              <a:spcBef>
-                <a:spcPts val="0"/>
-              </a:spcBef>
-              <a:spcAft>
-                <a:spcPts val="0"/>
-              </a:spcAft>
-              <a:buClrTx/>
-              <a:buSzTx/>
-              <a:buFontTx/>
-              <a:buNone/>
-              <a:tabLst/>
-              <a:defRPr/>
-            </a:pPr>
             <a:r>
               <a:rPr lang="en-US" dirty="0"/>
-              <a:t>“anything that CAN be automated, SHOULD be automated”</a:t>
-            </a:r>
+              <a:t>it’s worth taking a moment to motivate what we’re doing.  Chances are, you’re a very proficient Excel user, and you’re good at your job.  And here we are pushing this new thing, so it’s worth talking about WHY.</a:t>
+            </a:r>
+          </a:p>
+          <a:p>
+            <a:endParaRPr lang="en-US" dirty="0"/>
+          </a:p>
+          <a:p>
+            <a:r>
+              <a:rPr lang="en-US" dirty="0"/>
+              <a:t>So without going into the statistical and graphical tools that R provides, I’d just like to talk about reproducibility…</a:t>
+            </a:r>
+          </a:p>
+          <a:p>
+            <a:endParaRPr lang="en-US" dirty="0"/>
           </a:p>
           <a:p>
             <a:endParaRPr lang="en-US" dirty="0"/>
@@ -1315,7 +1410,7 @@
     </p:spTree>
     <p:extLst>
       <p:ext uri="{BB962C8B-B14F-4D97-AF65-F5344CB8AC3E}">
-        <p14:creationId xmlns:p14="http://schemas.microsoft.com/office/powerpoint/2010/main" val="870374245"/>
+        <p14:creationId xmlns:p14="http://schemas.microsoft.com/office/powerpoint/2010/main" val="1489899700"/>
       </p:ext>
     </p:extLst>
   </p:cSld>
@@ -1388,15 +1483,7 @@
             </a:pPr>
             <a:r>
               <a:rPr lang="en-US" dirty="0"/>
-              <a:t>So why R?  Why not SAS, or </a:t>
-            </a:r>
-            <a:r>
-              <a:rPr lang="en-US" dirty="0" err="1"/>
-              <a:t>Matlab</a:t>
-            </a:r>
-            <a:r>
-              <a:rPr lang="en-US" dirty="0"/>
-              <a:t>, or C++, or any other script-based tool?</a:t>
+              <a:t>“anything that CAN be automated, SHOULD be automated”</a:t>
             </a:r>
           </a:p>
           <a:p>
@@ -1430,7 +1517,7 @@
     </p:spTree>
     <p:extLst>
       <p:ext uri="{BB962C8B-B14F-4D97-AF65-F5344CB8AC3E}">
-        <p14:creationId xmlns:p14="http://schemas.microsoft.com/office/powerpoint/2010/main" val="1353162103"/>
+        <p14:creationId xmlns:p14="http://schemas.microsoft.com/office/powerpoint/2010/main" val="870374245"/>
       </p:ext>
     </p:extLst>
   </p:cSld>
@@ -1484,35 +1571,38 @@
           <a:bodyPr/>
           <a:lstStyle/>
           <a:p>
+            <a:pPr marL="0" marR="0" lvl="0" indent="0" algn="l" defTabSz="914400" rtl="0" eaLnBrk="1" fontAlgn="auto" latinLnBrk="0" hangingPunct="1">
+              <a:lnSpc>
+                <a:spcPct val="100000"/>
+              </a:lnSpc>
+              <a:spcBef>
+                <a:spcPts val="0"/>
+              </a:spcBef>
+              <a:spcAft>
+                <a:spcPts val="0"/>
+              </a:spcAft>
+              <a:buClrTx/>
+              <a:buSzTx/>
+              <a:buFontTx/>
+              <a:buNone/>
+              <a:tabLst/>
+              <a:defRPr/>
+            </a:pPr>
             <a:r>
               <a:rPr lang="en-US" dirty="0"/>
-              <a:t>So to set the stage for the next couple days, it’s really useful to approach this like learning a new LANGUAGE.  Which … it is.</a:t>
+              <a:t>So why R?  Why not SAS, or </a:t>
+            </a:r>
+            <a:r>
+              <a:rPr lang="en-US" dirty="0" err="1"/>
+              <a:t>Matlab</a:t>
+            </a:r>
+            <a:r>
+              <a:rPr lang="en-US" dirty="0"/>
+              <a:t>, or C++, or any other script-based tool?</a:t>
             </a:r>
           </a:p>
           <a:p>
             <a:endParaRPr lang="en-US" dirty="0"/>
-          </a:p>
-          <a:p>
-            <a:r>
-              <a:rPr lang="en-US" dirty="0"/>
-              <a:t>In that: it’s necessary to learn new vocab AND new grammar rules at the same time, otherwise it doesn’t make sense.  So be patient with yourselves, because it’s a stretch!</a:t>
-            </a:r>
-          </a:p>
-          <a:p>
-            <a:endParaRPr lang="en-US" dirty="0"/>
-          </a:p>
-          <a:p>
-            <a:r>
-              <a:rPr lang="en-US" dirty="0"/>
-              <a:t>Also, it’s really only possible with immersion, and it won’t REALLY make sense until you USE it.  </a:t>
-            </a:r>
-            <a:r>
-              <a:rPr lang="en-US"/>
-              <a:t>And ideally, when you use it on your OWN stuff!</a:t>
-            </a:r>
-          </a:p>
-          <a:p>
-            <a:endParaRPr lang="en-US"/>
           </a:p>
         </p:txBody>
       </p:sp>
@@ -1542,7 +1632,7 @@
     </p:spTree>
     <p:extLst>
       <p:ext uri="{BB962C8B-B14F-4D97-AF65-F5344CB8AC3E}">
-        <p14:creationId xmlns:p14="http://schemas.microsoft.com/office/powerpoint/2010/main" val="443200328"/>
+        <p14:creationId xmlns:p14="http://schemas.microsoft.com/office/powerpoint/2010/main" val="1353162103"/>
       </p:ext>
     </p:extLst>
   </p:cSld>
@@ -1598,37 +1688,33 @@
           <a:p>
             <a:r>
               <a:rPr lang="en-US" dirty="0"/>
-              <a:t>Because of this, the slides are intentionally a little bit wordy. I apologize for that as it makes the aesthetics worse but I want this document to serve a little bit as a reference guide for you. </a:t>
-            </a:r>
+              <a:t>So to set the stage for the next couple days, it’s really useful to approach this like learning a new LANGUAGE.  Which … it is.</a:t>
+            </a:r>
+          </a:p>
+          <a:p>
+            <a:endParaRPr lang="en-US" dirty="0"/>
           </a:p>
           <a:p>
             <a:r>
               <a:rPr lang="en-US" dirty="0"/>
-              <a:t>Today might be slow but we’re laying the foundation for charts &amp; modeling</a:t>
-            </a:r>
-          </a:p>
-          <a:p>
-            <a:pPr marL="0" marR="0" lvl="0" indent="0" algn="l" defTabSz="914400" rtl="0" eaLnBrk="1" fontAlgn="auto" latinLnBrk="0" hangingPunct="1">
-              <a:lnSpc>
-                <a:spcPct val="100000"/>
-              </a:lnSpc>
-              <a:spcBef>
-                <a:spcPts val="0"/>
-              </a:spcBef>
-              <a:spcAft>
-                <a:spcPts val="0"/>
-              </a:spcAft>
-              <a:buClrTx/>
-              <a:buSzTx/>
-              <a:buFontTx/>
-              <a:buNone/>
-              <a:tabLst/>
-              <a:defRPr/>
-            </a:pPr>
+              <a:t>In that: it’s necessary to learn new vocab AND new grammar rules at the same time, otherwise it doesn’t make sense.  So be patient with yourselves, because it’s a stretch!</a:t>
+            </a:r>
+          </a:p>
+          <a:p>
+            <a:endParaRPr lang="en-US" dirty="0"/>
+          </a:p>
+          <a:p>
             <a:r>
               <a:rPr lang="en-US" dirty="0"/>
-              <a:t>Not everyone needs to be an expert, but if you’re here, I want you to move up a level and at least be able to “read” R</a:t>
-            </a:r>
+              <a:t>Also, it’s really only possible with immersion, and it won’t REALLY make sense until you USE it.  </a:t>
+            </a:r>
+            <a:r>
+              <a:rPr lang="en-US"/>
+              <a:t>And ideally, when you use it on your OWN stuff!</a:t>
+            </a:r>
+          </a:p>
+          <a:p>
+            <a:endParaRPr lang="en-US"/>
           </a:p>
         </p:txBody>
       </p:sp>
@@ -1647,9 +1733,9 @@
           <a:bodyPr/>
           <a:lstStyle/>
           <a:p>
-            <a:fld id="{AD86E2D3-8F12-4CB7-B6F3-018CFC08298B}" type="slidenum">
+            <a:fld id="{2D3618BD-5D63-447F-BEC2-3BD80D62BA09}" type="slidenum">
               <a:rPr lang="en-US" smtClean="0"/>
-              <a:t>13</a:t>
+              <a:t>12</a:t>
             </a:fld>
             <a:endParaRPr lang="en-US"/>
           </a:p>
@@ -1658,7 +1744,7 @@
     </p:spTree>
     <p:extLst>
       <p:ext uri="{BB962C8B-B14F-4D97-AF65-F5344CB8AC3E}">
-        <p14:creationId xmlns:p14="http://schemas.microsoft.com/office/powerpoint/2010/main" val="2465146486"/>
+        <p14:creationId xmlns:p14="http://schemas.microsoft.com/office/powerpoint/2010/main" val="443200328"/>
       </p:ext>
     </p:extLst>
   </p:cSld>
@@ -1815,7 +1901,7 @@
           <a:p>
             <a:fld id="{9A69187F-33B1-48D6-A8D1-B3CDAB36B405}" type="datetimeFigureOut">
               <a:rPr lang="en-US" smtClean="0"/>
-              <a:t>11/14/2023</a:t>
+              <a:t>12/10/2023</a:t>
             </a:fld>
             <a:endParaRPr lang="en-US"/>
           </a:p>
@@ -2013,7 +2099,7 @@
           <a:p>
             <a:fld id="{9A69187F-33B1-48D6-A8D1-B3CDAB36B405}" type="datetimeFigureOut">
               <a:rPr lang="en-US" smtClean="0"/>
-              <a:t>11/14/2023</a:t>
+              <a:t>12/10/2023</a:t>
             </a:fld>
             <a:endParaRPr lang="en-US"/>
           </a:p>
@@ -2221,7 +2307,7 @@
           <a:p>
             <a:fld id="{9A69187F-33B1-48D6-A8D1-B3CDAB36B405}" type="datetimeFigureOut">
               <a:rPr lang="en-US" smtClean="0"/>
-              <a:t>11/14/2023</a:t>
+              <a:t>12/10/2023</a:t>
             </a:fld>
             <a:endParaRPr lang="en-US"/>
           </a:p>
@@ -2419,7 +2505,7 @@
           <a:p>
             <a:fld id="{9A69187F-33B1-48D6-A8D1-B3CDAB36B405}" type="datetimeFigureOut">
               <a:rPr lang="en-US" smtClean="0"/>
-              <a:t>11/14/2023</a:t>
+              <a:t>12/10/2023</a:t>
             </a:fld>
             <a:endParaRPr lang="en-US"/>
           </a:p>
@@ -2694,7 +2780,7 @@
           <a:p>
             <a:fld id="{9A69187F-33B1-48D6-A8D1-B3CDAB36B405}" type="datetimeFigureOut">
               <a:rPr lang="en-US" smtClean="0"/>
-              <a:t>11/14/2023</a:t>
+              <a:t>12/10/2023</a:t>
             </a:fld>
             <a:endParaRPr lang="en-US"/>
           </a:p>
@@ -2959,7 +3045,7 @@
           <a:p>
             <a:fld id="{9A69187F-33B1-48D6-A8D1-B3CDAB36B405}" type="datetimeFigureOut">
               <a:rPr lang="en-US" smtClean="0"/>
-              <a:t>11/14/2023</a:t>
+              <a:t>12/10/2023</a:t>
             </a:fld>
             <a:endParaRPr lang="en-US"/>
           </a:p>
@@ -3371,7 +3457,7 @@
           <a:p>
             <a:fld id="{9A69187F-33B1-48D6-A8D1-B3CDAB36B405}" type="datetimeFigureOut">
               <a:rPr lang="en-US" smtClean="0"/>
-              <a:t>11/14/2023</a:t>
+              <a:t>12/10/2023</a:t>
             </a:fld>
             <a:endParaRPr lang="en-US"/>
           </a:p>
@@ -3512,7 +3598,7 @@
           <a:p>
             <a:fld id="{9A69187F-33B1-48D6-A8D1-B3CDAB36B405}" type="datetimeFigureOut">
               <a:rPr lang="en-US" smtClean="0"/>
-              <a:t>11/14/2023</a:t>
+              <a:t>12/10/2023</a:t>
             </a:fld>
             <a:endParaRPr lang="en-US"/>
           </a:p>
@@ -3625,7 +3711,7 @@
           <a:p>
             <a:fld id="{9A69187F-33B1-48D6-A8D1-B3CDAB36B405}" type="datetimeFigureOut">
               <a:rPr lang="en-US" smtClean="0"/>
-              <a:t>11/14/2023</a:t>
+              <a:t>12/10/2023</a:t>
             </a:fld>
             <a:endParaRPr lang="en-US"/>
           </a:p>
@@ -3936,7 +4022,7 @@
           <a:p>
             <a:fld id="{9A69187F-33B1-48D6-A8D1-B3CDAB36B405}" type="datetimeFigureOut">
               <a:rPr lang="en-US" smtClean="0"/>
-              <a:t>11/14/2023</a:t>
+              <a:t>12/10/2023</a:t>
             </a:fld>
             <a:endParaRPr lang="en-US"/>
           </a:p>
@@ -4224,7 +4310,7 @@
           <a:p>
             <a:fld id="{9A69187F-33B1-48D6-A8D1-B3CDAB36B405}" type="datetimeFigureOut">
               <a:rPr lang="en-US" smtClean="0"/>
-              <a:t>11/14/2023</a:t>
+              <a:t>12/10/2023</a:t>
             </a:fld>
             <a:endParaRPr lang="en-US"/>
           </a:p>
@@ -4465,7 +4551,7 @@
           <a:p>
             <a:fld id="{9A69187F-33B1-48D6-A8D1-B3CDAB36B405}" type="datetimeFigureOut">
               <a:rPr lang="en-US" smtClean="0"/>
-              <a:t>11/14/2023</a:t>
+              <a:t>12/10/2023</a:t>
             </a:fld>
             <a:endParaRPr lang="en-US"/>
           </a:p>
@@ -5288,6 +5374,96 @@
 </file>
 
 <file path=ppt/slides/slide10.xml><?xml version="1.0" encoding="utf-8"?>
+<p:sld xmlns:a="http://schemas.openxmlformats.org/drawingml/2006/main" xmlns:r="http://schemas.openxmlformats.org/officeDocument/2006/relationships" xmlns:p="http://schemas.openxmlformats.org/presentationml/2006/main">
+  <p:cSld>
+    <p:spTree>
+      <p:nvGrpSpPr>
+        <p:cNvPr id="1" name=""/>
+        <p:cNvGrpSpPr/>
+        <p:nvPr/>
+      </p:nvGrpSpPr>
+      <p:grpSpPr>
+        <a:xfrm>
+          <a:off x="0" y="0"/>
+          <a:ext cx="0" cy="0"/>
+          <a:chOff x="0" y="0"/>
+          <a:chExt cx="0" cy="0"/>
+        </a:xfrm>
+      </p:grpSpPr>
+      <p:sp>
+        <p:nvSpPr>
+          <p:cNvPr id="2" name="Title 1">
+            <a:extLst>
+              <a:ext uri="{FF2B5EF4-FFF2-40B4-BE49-F238E27FC236}">
+                <a16:creationId xmlns:a16="http://schemas.microsoft.com/office/drawing/2014/main" id="{ACD980A7-0204-9CD9-DCFC-61FE609FD2F7}"/>
+              </a:ext>
+            </a:extLst>
+          </p:cNvPr>
+          <p:cNvSpPr>
+            <a:spLocks noGrp="1"/>
+          </p:cNvSpPr>
+          <p:nvPr>
+            <p:ph type="title"/>
+          </p:nvPr>
+        </p:nvSpPr>
+        <p:spPr/>
+        <p:txBody>
+          <a:bodyPr/>
+          <a:lstStyle/>
+          <a:p>
+            <a:endParaRPr lang="en-US"/>
+          </a:p>
+        </p:txBody>
+      </p:sp>
+      <p:pic>
+        <p:nvPicPr>
+          <p:cNvPr id="5" name="Content Placeholder 4" descr="A cartoon character with a yellow background&#10;&#10;Description automatically generated">
+            <a:extLst>
+              <a:ext uri="{FF2B5EF4-FFF2-40B4-BE49-F238E27FC236}">
+                <a16:creationId xmlns:a16="http://schemas.microsoft.com/office/drawing/2014/main" id="{F9E65229-512E-C113-6DD1-939F9FBC6A1F}"/>
+              </a:ext>
+            </a:extLst>
+          </p:cNvPr>
+          <p:cNvPicPr>
+            <a:picLocks noGrp="1" noChangeAspect="1"/>
+          </p:cNvPicPr>
+          <p:nvPr>
+            <p:ph idx="1"/>
+          </p:nvPr>
+        </p:nvPicPr>
+        <p:blipFill>
+          <a:blip r:embed="rId3">
+            <a:extLst>
+              <a:ext uri="{28A0092B-C50C-407E-A947-70E740481C1C}">
+                <a14:useLocalDpi xmlns:a14="http://schemas.microsoft.com/office/drawing/2010/main" val="0"/>
+              </a:ext>
+            </a:extLst>
+          </a:blip>
+          <a:stretch>
+            <a:fillRect/>
+          </a:stretch>
+        </p:blipFill>
+        <p:spPr>
+          <a:xfrm>
+            <a:off x="2748817" y="1825625"/>
+            <a:ext cx="6694366" cy="4351338"/>
+          </a:xfrm>
+        </p:spPr>
+      </p:pic>
+    </p:spTree>
+    <p:extLst>
+      <p:ext uri="{BB962C8B-B14F-4D97-AF65-F5344CB8AC3E}">
+        <p14:creationId xmlns:p14="http://schemas.microsoft.com/office/powerpoint/2010/main" val="2635761389"/>
+      </p:ext>
+    </p:extLst>
+  </p:cSld>
+  <p:clrMapOvr>
+    <a:masterClrMapping/>
+  </p:clrMapOvr>
+</p:sld>
+</file>
+
+<file path=ppt/slides/slide11.xml><?xml version="1.0" encoding="utf-8"?>
 <p:sld xmlns:a="http://schemas.openxmlformats.org/drawingml/2006/main" xmlns:r="http://schemas.openxmlformats.org/officeDocument/2006/relationships" xmlns:p="http://schemas.openxmlformats.org/presentationml/2006/main">
   <p:cSld>
     <p:spTree>
@@ -6274,7 +6450,7 @@
 </p:sld>
 </file>
 
-<file path=ppt/slides/slide11.xml><?xml version="1.0" encoding="utf-8"?>
+<file path=ppt/slides/slide12.xml><?xml version="1.0" encoding="utf-8"?>
 <p:sld xmlns:a="http://schemas.openxmlformats.org/drawingml/2006/main" xmlns:r="http://schemas.openxmlformats.org/officeDocument/2006/relationships" xmlns:p="http://schemas.openxmlformats.org/presentationml/2006/main">
   <p:cSld>
     <p:spTree>
@@ -6416,7 +6592,7 @@
           <a:p>
             <a:fld id="{6D95AE55-B5F4-483D-AEFF-E8059F5502F5}" type="slidenum">
               <a:rPr lang="en-US" smtClean="0"/>
-              <a:t>11</a:t>
+              <a:t>12</a:t>
             </a:fld>
             <a:endParaRPr lang="en-US"/>
           </a:p>
@@ -8765,7 +8941,7 @@
 </p:sld>
 </file>
 
-<file path=ppt/slides/slide12.xml><?xml version="1.0" encoding="utf-8"?>
+<file path=ppt/slides/slide13.xml><?xml version="1.0" encoding="utf-8"?>
 <p:sld xmlns:a="http://schemas.openxmlformats.org/drawingml/2006/main" xmlns:r="http://schemas.openxmlformats.org/officeDocument/2006/relationships" xmlns:p="http://schemas.openxmlformats.org/presentationml/2006/main">
   <p:cSld>
     <p:spTree>
@@ -8897,7 +9073,7 @@
           <a:p>
             <a:fld id="{6D95AE55-B5F4-483D-AEFF-E8059F5502F5}" type="slidenum">
               <a:rPr lang="en-US" smtClean="0"/>
-              <a:t>12</a:t>
+              <a:t>13</a:t>
             </a:fld>
             <a:endParaRPr lang="en-US"/>
           </a:p>
@@ -10964,7 +11140,7 @@
 </p:sld>
 </file>
 
-<file path=ppt/slides/slide13.xml><?xml version="1.0" encoding="utf-8"?>
+<file path=ppt/slides/slide14.xml><?xml version="1.0" encoding="utf-8"?>
 <p:sld xmlns:a="http://schemas.openxmlformats.org/drawingml/2006/main" xmlns:r="http://schemas.openxmlformats.org/officeDocument/2006/relationships" xmlns:p="http://schemas.openxmlformats.org/presentationml/2006/main">
   <p:cSld>
     <p:spTree>
@@ -11118,7 +11294,7 @@
           <a:p>
             <a:fld id="{6D95AE55-B5F4-483D-AEFF-E8059F5502F5}" type="slidenum">
               <a:rPr lang="en-US" smtClean="0"/>
-              <a:t>13</a:t>
+              <a:t>14</a:t>
             </a:fld>
             <a:endParaRPr lang="en-US"/>
           </a:p>
@@ -11459,7 +11635,7 @@
 </p:sld>
 </file>
 
-<file path=ppt/slides/slide14.xml><?xml version="1.0" encoding="utf-8"?>
+<file path=ppt/slides/slide15.xml><?xml version="1.0" encoding="utf-8"?>
 <p:sld xmlns:a="http://schemas.openxmlformats.org/drawingml/2006/main" xmlns:r="http://schemas.openxmlformats.org/officeDocument/2006/relationships" xmlns:p="http://schemas.openxmlformats.org/presentationml/2006/main">
   <p:cSld>
     <p:spTree>
@@ -11622,7 +11798,7 @@
           <a:p>
             <a:fld id="{6D95AE55-B5F4-483D-AEFF-E8059F5502F5}" type="slidenum">
               <a:rPr lang="en-US" smtClean="0"/>
-              <a:t>14</a:t>
+              <a:t>15</a:t>
             </a:fld>
             <a:endParaRPr lang="en-US"/>
           </a:p>
@@ -11818,7 +11994,7 @@
 </p:sld>
 </file>
 
-<file path=ppt/slides/slide15.xml><?xml version="1.0" encoding="utf-8"?>
+<file path=ppt/slides/slide16.xml><?xml version="1.0" encoding="utf-8"?>
 <p:sld xmlns:a="http://schemas.openxmlformats.org/drawingml/2006/main" xmlns:r="http://schemas.openxmlformats.org/officeDocument/2006/relationships" xmlns:p="http://schemas.openxmlformats.org/presentationml/2006/main">
   <p:cSld>
     <p:spTree>
@@ -11981,7 +12157,7 @@
           <a:p>
             <a:fld id="{6D95AE55-B5F4-483D-AEFF-E8059F5502F5}" type="slidenum">
               <a:rPr lang="en-US" smtClean="0"/>
-              <a:t>15</a:t>
+              <a:t>16</a:t>
             </a:fld>
             <a:endParaRPr lang="en-US"/>
           </a:p>
@@ -12724,6 +12900,578 @@
           <a:chExt cx="0" cy="0"/>
         </a:xfrm>
       </p:grpSpPr>
+      <p:pic>
+        <p:nvPicPr>
+          <p:cNvPr id="7" name="Content Placeholder 4" descr="A person holding a fish&#10;&#10;Description automatically generated">
+            <a:extLst>
+              <a:ext uri="{FF2B5EF4-FFF2-40B4-BE49-F238E27FC236}">
+                <a16:creationId xmlns:a16="http://schemas.microsoft.com/office/drawing/2014/main" id="{F6C94C61-5792-4FE1-B79C-5F355CCA7F54}"/>
+              </a:ext>
+            </a:extLst>
+          </p:cNvPr>
+          <p:cNvPicPr>
+            <a:picLocks noChangeAspect="1"/>
+          </p:cNvPicPr>
+          <p:nvPr/>
+        </p:nvPicPr>
+        <p:blipFill rotWithShape="1">
+          <a:blip r:embed="rId2">
+            <a:extLst>
+              <a:ext uri="{28A0092B-C50C-407E-A947-70E740481C1C}">
+                <a14:useLocalDpi xmlns:a14="http://schemas.microsoft.com/office/drawing/2010/main" val="0"/>
+              </a:ext>
+            </a:extLst>
+          </a:blip>
+          <a:srcRect l="14559" r="10214"/>
+          <a:stretch/>
+        </p:blipFill>
+        <p:spPr>
+          <a:xfrm>
+            <a:off x="869074" y="3146682"/>
+            <a:ext cx="3567314" cy="3556535"/>
+          </a:xfrm>
+          <a:custGeom>
+            <a:avLst/>
+            <a:gdLst/>
+            <a:ahLst/>
+            <a:cxnLst/>
+            <a:rect l="l" t="t" r="r" b="b"/>
+            <a:pathLst>
+              <a:path w="6878775" h="6858000">
+                <a:moveTo>
+                  <a:pt x="1102973" y="0"/>
+                </a:moveTo>
+                <a:lnTo>
+                  <a:pt x="1160688" y="0"/>
+                </a:lnTo>
+                <a:lnTo>
+                  <a:pt x="983189" y="331786"/>
+                </a:lnTo>
+                <a:cubicBezTo>
+                  <a:pt x="914866" y="469145"/>
+                  <a:pt x="850355" y="608712"/>
+                  <a:pt x="789261" y="750263"/>
+                </a:cubicBezTo>
+                <a:cubicBezTo>
+                  <a:pt x="774307" y="784928"/>
+                  <a:pt x="759992" y="819849"/>
+                  <a:pt x="745295" y="854514"/>
+                </a:cubicBezTo>
+                <a:cubicBezTo>
+                  <a:pt x="756682" y="845393"/>
+                  <a:pt x="765489" y="833492"/>
+                  <a:pt x="770857" y="819975"/>
+                </a:cubicBezTo>
+                <a:cubicBezTo>
+                  <a:pt x="879943" y="589569"/>
+                  <a:pt x="999605" y="365513"/>
+                  <a:pt x="1131329" y="148742"/>
+                </a:cubicBezTo>
+                <a:lnTo>
+                  <a:pt x="1227589" y="0"/>
+                </a:lnTo>
+                <a:lnTo>
+                  <a:pt x="6878775" y="0"/>
+                </a:lnTo>
+                <a:lnTo>
+                  <a:pt x="6878775" y="6858000"/>
+                </a:lnTo>
+                <a:lnTo>
+                  <a:pt x="713521" y="6858000"/>
+                </a:lnTo>
+                <a:lnTo>
+                  <a:pt x="625642" y="6670527"/>
+                </a:lnTo>
+                <a:cubicBezTo>
+                  <a:pt x="507232" y="6398531"/>
+                  <a:pt x="403083" y="6118381"/>
+                  <a:pt x="312785" y="5830359"/>
+                </a:cubicBezTo>
+                <a:cubicBezTo>
+                  <a:pt x="278149" y="5719759"/>
+                  <a:pt x="248879" y="5607635"/>
+                  <a:pt x="212198" y="5480401"/>
+                </a:cubicBezTo>
+                <a:cubicBezTo>
+                  <a:pt x="212208" y="5491601"/>
+                  <a:pt x="212803" y="5502788"/>
+                  <a:pt x="213988" y="5513923"/>
+                </a:cubicBezTo>
+                <a:cubicBezTo>
+                  <a:pt x="264089" y="5723695"/>
+                  <a:pt x="307290" y="5935370"/>
+                  <a:pt x="365826" y="6142729"/>
+                </a:cubicBezTo>
+                <a:cubicBezTo>
+                  <a:pt x="433152" y="6380817"/>
+                  <a:pt x="510068" y="6614016"/>
+                  <a:pt x="597975" y="6841549"/>
+                </a:cubicBezTo>
+                <a:lnTo>
+                  <a:pt x="604824" y="6858000"/>
+                </a:lnTo>
+                <a:lnTo>
+                  <a:pt x="552056" y="6858000"/>
+                </a:lnTo>
+                <a:lnTo>
+                  <a:pt x="539576" y="6828295"/>
+                </a:lnTo>
+                <a:cubicBezTo>
+                  <a:pt x="380597" y="6414594"/>
+                  <a:pt x="260223" y="5988893"/>
+                  <a:pt x="171555" y="5552906"/>
+                </a:cubicBezTo>
+                <a:cubicBezTo>
+                  <a:pt x="91163" y="5157998"/>
+                  <a:pt x="43746" y="4758899"/>
+                  <a:pt x="12305" y="4357388"/>
+                </a:cubicBezTo>
+                <a:cubicBezTo>
+                  <a:pt x="-14281" y="4013908"/>
+                  <a:pt x="4507" y="3672965"/>
+                  <a:pt x="46684" y="3331516"/>
+                </a:cubicBezTo>
+                <a:cubicBezTo>
+                  <a:pt x="127203" y="2664286"/>
+                  <a:pt x="277819" y="2007265"/>
+                  <a:pt x="496065" y="1371196"/>
+                </a:cubicBezTo>
+                <a:cubicBezTo>
+                  <a:pt x="636273" y="966066"/>
+                  <a:pt x="800445" y="573253"/>
+                  <a:pt x="995723" y="196614"/>
+                </a:cubicBezTo>
+                <a:close/>
+              </a:path>
+            </a:pathLst>
+          </a:custGeom>
+        </p:spPr>
+      </p:pic>
+      <p:sp>
+        <p:nvSpPr>
+          <p:cNvPr id="4" name="Slide Number Placeholder 3">
+            <a:extLst>
+              <a:ext uri="{FF2B5EF4-FFF2-40B4-BE49-F238E27FC236}">
+                <a16:creationId xmlns:a16="http://schemas.microsoft.com/office/drawing/2014/main" id="{E2FBF6B4-F10C-4781-AE21-B980DCE6B61B}"/>
+              </a:ext>
+            </a:extLst>
+          </p:cNvPr>
+          <p:cNvSpPr>
+            <a:spLocks noGrp="1"/>
+          </p:cNvSpPr>
+          <p:nvPr>
+            <p:ph type="sldNum" sz="quarter" idx="12"/>
+          </p:nvPr>
+        </p:nvSpPr>
+        <p:spPr>
+          <a:xfrm>
+            <a:off x="8649101" y="6468033"/>
+            <a:ext cx="2743200" cy="365125"/>
+          </a:xfrm>
+        </p:spPr>
+        <p:txBody>
+          <a:bodyPr/>
+          <a:lstStyle/>
+          <a:p>
+            <a:fld id="{6D95AE55-B5F4-483D-AEFF-E8059F5502F5}" type="slidenum">
+              <a:rPr lang="en-US" smtClean="0"/>
+              <a:t>3</a:t>
+            </a:fld>
+            <a:endParaRPr lang="en-US" dirty="0"/>
+          </a:p>
+        </p:txBody>
+      </p:sp>
+      <p:pic>
+        <p:nvPicPr>
+          <p:cNvPr id="5" name="Content Placeholder 6" descr="A close up of a sign&#10;&#10;Description automatically generated">
+            <a:extLst>
+              <a:ext uri="{FF2B5EF4-FFF2-40B4-BE49-F238E27FC236}">
+                <a16:creationId xmlns:a16="http://schemas.microsoft.com/office/drawing/2014/main" id="{1070C901-7B80-4964-BAB9-9990630CD6D0}"/>
+              </a:ext>
+            </a:extLst>
+          </p:cNvPr>
+          <p:cNvPicPr>
+            <a:picLocks noChangeAspect="1"/>
+          </p:cNvPicPr>
+          <p:nvPr/>
+        </p:nvPicPr>
+        <p:blipFill>
+          <a:blip r:embed="rId3">
+            <a:extLst>
+              <a:ext uri="{28A0092B-C50C-407E-A947-70E740481C1C}">
+                <a14:useLocalDpi xmlns:a14="http://schemas.microsoft.com/office/drawing/2010/main" val="0"/>
+              </a:ext>
+            </a:extLst>
+          </a:blip>
+          <a:stretch>
+            <a:fillRect/>
+          </a:stretch>
+        </p:blipFill>
+        <p:spPr>
+          <a:xfrm>
+            <a:off x="4296964" y="2391095"/>
+            <a:ext cx="3598071" cy="2075809"/>
+          </a:xfrm>
+          <a:prstGeom prst="rect">
+            <a:avLst/>
+          </a:prstGeom>
+        </p:spPr>
+      </p:pic>
+      <p:sp>
+        <p:nvSpPr>
+          <p:cNvPr id="6" name="TextBox 5">
+            <a:extLst>
+              <a:ext uri="{FF2B5EF4-FFF2-40B4-BE49-F238E27FC236}">
+                <a16:creationId xmlns:a16="http://schemas.microsoft.com/office/drawing/2014/main" id="{1FAE114B-20EE-4498-B490-B559E10EDAE0}"/>
+              </a:ext>
+            </a:extLst>
+          </p:cNvPr>
+          <p:cNvSpPr txBox="1"/>
+          <p:nvPr/>
+        </p:nvSpPr>
+        <p:spPr>
+          <a:xfrm>
+            <a:off x="127016" y="321109"/>
+            <a:ext cx="4899087" cy="2646318"/>
+          </a:xfrm>
+          <a:prstGeom prst="rect">
+            <a:avLst/>
+          </a:prstGeom>
+        </p:spPr>
+        <p:txBody>
+          <a:bodyPr vert="horz" lIns="91440" tIns="45720" rIns="91440" bIns="45720" rtlCol="0">
+            <a:normAutofit/>
+          </a:bodyPr>
+          <a:lstStyle/>
+          <a:p>
+            <a:pPr algn="ctr">
+              <a:lnSpc>
+                <a:spcPct val="90000"/>
+              </a:lnSpc>
+              <a:spcAft>
+                <a:spcPts val="3000"/>
+              </a:spcAft>
+            </a:pPr>
+            <a:r>
+              <a:rPr lang="en-US" sz="3600" b="1" dirty="0">
+                <a:latin typeface="+mj-lt"/>
+              </a:rPr>
+              <a:t>Justin Priest</a:t>
+            </a:r>
+          </a:p>
+          <a:p>
+            <a:pPr algn="ctr">
+              <a:lnSpc>
+                <a:spcPct val="90000"/>
+              </a:lnSpc>
+              <a:spcAft>
+                <a:spcPts val="1800"/>
+              </a:spcAft>
+            </a:pPr>
+            <a:r>
+              <a:rPr lang="en-US" dirty="0"/>
+              <a:t>2020 UAF CFOS Graduate</a:t>
+            </a:r>
+          </a:p>
+          <a:p>
+            <a:pPr algn="ctr">
+              <a:lnSpc>
+                <a:spcPct val="90000"/>
+              </a:lnSpc>
+            </a:pPr>
+            <a:r>
+              <a:rPr lang="en-US" dirty="0"/>
+              <a:t>Learned R tools at CFOS (easy way) &amp; </a:t>
+            </a:r>
+          </a:p>
+          <a:p>
+            <a:pPr algn="ctr">
+              <a:lnSpc>
+                <a:spcPct val="90000"/>
+              </a:lnSpc>
+              <a:spcAft>
+                <a:spcPts val="1800"/>
+              </a:spcAft>
+            </a:pPr>
+            <a:r>
+              <a:rPr lang="en-US" dirty="0"/>
+              <a:t>taught myself (hard but fun way)</a:t>
+            </a:r>
+          </a:p>
+          <a:p>
+            <a:pPr algn="ctr">
+              <a:lnSpc>
+                <a:spcPct val="90000"/>
+              </a:lnSpc>
+              <a:spcAft>
+                <a:spcPts val="1800"/>
+              </a:spcAft>
+            </a:pPr>
+            <a:r>
+              <a:rPr lang="en-US" dirty="0"/>
+              <a:t>ADF&amp;G Salmon Researcher in Sitka</a:t>
+            </a:r>
+          </a:p>
+        </p:txBody>
+      </p:sp>
+      <p:pic>
+        <p:nvPicPr>
+          <p:cNvPr id="10" name="Picture 9">
+            <a:extLst>
+              <a:ext uri="{FF2B5EF4-FFF2-40B4-BE49-F238E27FC236}">
+                <a16:creationId xmlns:a16="http://schemas.microsoft.com/office/drawing/2014/main" id="{BF9C1CE2-113E-49BE-B9E2-DD785B611D5B}"/>
+              </a:ext>
+            </a:extLst>
+          </p:cNvPr>
+          <p:cNvPicPr>
+            <a:picLocks noChangeAspect="1"/>
+          </p:cNvPicPr>
+          <p:nvPr/>
+        </p:nvPicPr>
+        <p:blipFill>
+          <a:blip r:embed="rId4">
+            <a:clrChange>
+              <a:clrFrom>
+                <a:srgbClr val="FFFFFF"/>
+              </a:clrFrom>
+              <a:clrTo>
+                <a:srgbClr val="FFFFFF">
+                  <a:alpha val="0"/>
+                </a:srgbClr>
+              </a:clrTo>
+            </a:clrChange>
+          </a:blip>
+          <a:stretch>
+            <a:fillRect/>
+          </a:stretch>
+        </p:blipFill>
+        <p:spPr>
+          <a:xfrm>
+            <a:off x="585835" y="784661"/>
+            <a:ext cx="3981450" cy="352425"/>
+          </a:xfrm>
+          <a:prstGeom prst="rect">
+            <a:avLst/>
+          </a:prstGeom>
+        </p:spPr>
+      </p:pic>
+      <p:pic>
+        <p:nvPicPr>
+          <p:cNvPr id="8" name="Picture 7" descr="A person standing on a rock with a kite in the air&#10;&#10;Description automatically generated">
+            <a:extLst>
+              <a:ext uri="{FF2B5EF4-FFF2-40B4-BE49-F238E27FC236}">
+                <a16:creationId xmlns:a16="http://schemas.microsoft.com/office/drawing/2014/main" id="{C76CD833-D384-F0B8-FCCC-C65211198858}"/>
+              </a:ext>
+            </a:extLst>
+          </p:cNvPr>
+          <p:cNvPicPr>
+            <a:picLocks noChangeAspect="1"/>
+          </p:cNvPicPr>
+          <p:nvPr/>
+        </p:nvPicPr>
+        <p:blipFill>
+          <a:blip r:embed="rId5">
+            <a:extLst>
+              <a:ext uri="{28A0092B-C50C-407E-A947-70E740481C1C}">
+                <a14:useLocalDpi xmlns:a14="http://schemas.microsoft.com/office/drawing/2010/main" val="0"/>
+              </a:ext>
+            </a:extLst>
+          </a:blip>
+          <a:stretch>
+            <a:fillRect/>
+          </a:stretch>
+        </p:blipFill>
+        <p:spPr>
+          <a:xfrm>
+            <a:off x="7755614" y="206000"/>
+            <a:ext cx="3771896" cy="3769958"/>
+          </a:xfrm>
+          <a:prstGeom prst="rect">
+            <a:avLst/>
+          </a:prstGeom>
+        </p:spPr>
+      </p:pic>
+      <p:sp>
+        <p:nvSpPr>
+          <p:cNvPr id="9" name="TextBox 8">
+            <a:extLst>
+              <a:ext uri="{FF2B5EF4-FFF2-40B4-BE49-F238E27FC236}">
+                <a16:creationId xmlns:a16="http://schemas.microsoft.com/office/drawing/2014/main" id="{43A8A50F-89A1-7E10-5347-FD276C6A6FD6}"/>
+              </a:ext>
+            </a:extLst>
+          </p:cNvPr>
+          <p:cNvSpPr txBox="1"/>
+          <p:nvPr/>
+        </p:nvSpPr>
+        <p:spPr>
+          <a:xfrm>
+            <a:off x="7418926" y="4211682"/>
+            <a:ext cx="4445269" cy="2646318"/>
+          </a:xfrm>
+          <a:prstGeom prst="rect">
+            <a:avLst/>
+          </a:prstGeom>
+        </p:spPr>
+        <p:txBody>
+          <a:bodyPr vert="horz" lIns="91440" tIns="45720" rIns="91440" bIns="45720" rtlCol="0">
+            <a:normAutofit/>
+          </a:bodyPr>
+          <a:lstStyle/>
+          <a:p>
+            <a:pPr algn="ctr">
+              <a:lnSpc>
+                <a:spcPct val="90000"/>
+              </a:lnSpc>
+              <a:spcAft>
+                <a:spcPts val="3000"/>
+              </a:spcAft>
+            </a:pPr>
+            <a:r>
+              <a:rPr lang="en-US" sz="3600" b="1" dirty="0">
+                <a:latin typeface="+mj-lt"/>
+              </a:rPr>
+              <a:t>Matt Tyers</a:t>
+            </a:r>
+          </a:p>
+          <a:p>
+            <a:pPr algn="ctr">
+              <a:lnSpc>
+                <a:spcPct val="90000"/>
+              </a:lnSpc>
+              <a:spcAft>
+                <a:spcPts val="1800"/>
+              </a:spcAft>
+            </a:pPr>
+            <a:r>
+              <a:rPr lang="en-US" dirty="0"/>
+              <a:t>2014 Montana State Statistics Graduate</a:t>
+            </a:r>
+          </a:p>
+          <a:p>
+            <a:pPr algn="ctr">
+              <a:lnSpc>
+                <a:spcPct val="90000"/>
+              </a:lnSpc>
+            </a:pPr>
+            <a:r>
+              <a:rPr lang="en-US" dirty="0"/>
+              <a:t>Old-</a:t>
+            </a:r>
+            <a:r>
+              <a:rPr lang="en-US" dirty="0" err="1"/>
+              <a:t>skool</a:t>
+            </a:r>
+            <a:r>
+              <a:rPr lang="en-US" dirty="0"/>
+              <a:t> </a:t>
+            </a:r>
+            <a:r>
+              <a:rPr lang="en-US" dirty="0" err="1"/>
+              <a:t>syntaxer</a:t>
+            </a:r>
+            <a:endParaRPr lang="en-US" dirty="0"/>
+          </a:p>
+          <a:p>
+            <a:pPr algn="ctr">
+              <a:lnSpc>
+                <a:spcPct val="90000"/>
+              </a:lnSpc>
+              <a:spcAft>
+                <a:spcPts val="1800"/>
+              </a:spcAft>
+            </a:pPr>
+            <a:r>
+              <a:rPr lang="en-US" dirty="0"/>
+              <a:t>But I’m learning</a:t>
+            </a:r>
+          </a:p>
+          <a:p>
+            <a:pPr algn="ctr">
+              <a:lnSpc>
+                <a:spcPct val="90000"/>
+              </a:lnSpc>
+              <a:spcAft>
+                <a:spcPts val="1800"/>
+              </a:spcAft>
+            </a:pPr>
+            <a:r>
+              <a:rPr lang="en-US" dirty="0"/>
+              <a:t>ADF&amp;G Sport Fish Biometrician in Anchorage</a:t>
+            </a:r>
+          </a:p>
+        </p:txBody>
+      </p:sp>
+      <p:pic>
+        <p:nvPicPr>
+          <p:cNvPr id="11" name="Picture 10">
+            <a:extLst>
+              <a:ext uri="{FF2B5EF4-FFF2-40B4-BE49-F238E27FC236}">
+                <a16:creationId xmlns:a16="http://schemas.microsoft.com/office/drawing/2014/main" id="{BD6B9106-2282-53A3-CC0A-395B2762FCA6}"/>
+              </a:ext>
+            </a:extLst>
+          </p:cNvPr>
+          <p:cNvPicPr>
+            <a:picLocks noChangeAspect="1"/>
+          </p:cNvPicPr>
+          <p:nvPr/>
+        </p:nvPicPr>
+        <p:blipFill>
+          <a:blip r:embed="rId4">
+            <a:clrChange>
+              <a:clrFrom>
+                <a:srgbClr val="FFFFFF"/>
+              </a:clrFrom>
+              <a:clrTo>
+                <a:srgbClr val="FFFFFF">
+                  <a:alpha val="0"/>
+                </a:srgbClr>
+              </a:clrTo>
+            </a:clrChange>
+          </a:blip>
+          <a:stretch>
+            <a:fillRect/>
+          </a:stretch>
+        </p:blipFill>
+        <p:spPr>
+          <a:xfrm>
+            <a:off x="7650836" y="4702021"/>
+            <a:ext cx="3981450" cy="352425"/>
+          </a:xfrm>
+          <a:prstGeom prst="rect">
+            <a:avLst/>
+          </a:prstGeom>
+        </p:spPr>
+      </p:pic>
+    </p:spTree>
+    <p:extLst>
+      <p:ext uri="{BB962C8B-B14F-4D97-AF65-F5344CB8AC3E}">
+        <p14:creationId xmlns:p14="http://schemas.microsoft.com/office/powerpoint/2010/main" val="3335962958"/>
+      </p:ext>
+    </p:extLst>
+  </p:cSld>
+  <p:clrMapOvr>
+    <a:masterClrMapping/>
+  </p:clrMapOvr>
+</p:sld>
+</file>
+
+<file path=ppt/slides/slide4.xml><?xml version="1.0" encoding="utf-8"?>
+<p:sld xmlns:a="http://schemas.openxmlformats.org/drawingml/2006/main" xmlns:r="http://schemas.openxmlformats.org/officeDocument/2006/relationships" xmlns:p="http://schemas.openxmlformats.org/presentationml/2006/main">
+  <p:cSld>
+    <p:spTree>
+      <p:nvGrpSpPr>
+        <p:cNvPr id="1" name=""/>
+        <p:cNvGrpSpPr/>
+        <p:nvPr/>
+      </p:nvGrpSpPr>
+      <p:grpSpPr>
+        <a:xfrm>
+          <a:off x="0" y="0"/>
+          <a:ext cx="0" cy="0"/>
+          <a:chOff x="0" y="0"/>
+          <a:chExt cx="0" cy="0"/>
+        </a:xfrm>
+      </p:grpSpPr>
       <p:sp>
         <p:nvSpPr>
           <p:cNvPr id="2" name="Title 1">
@@ -12742,8 +13490,8 @@
         </p:nvSpPr>
         <p:spPr>
           <a:xfrm>
-            <a:off x="371093" y="665825"/>
-            <a:ext cx="4928876" cy="1620175"/>
+            <a:off x="371093" y="585441"/>
+            <a:ext cx="5135404" cy="1768580"/>
           </a:xfrm>
         </p:spPr>
         <p:txBody>
@@ -12752,6 +13500,13 @@
           </a:bodyPr>
           <a:lstStyle/>
           <a:p>
+            <a:r>
+              <a:rPr lang="en-US" sz="6000" b="1" dirty="0"/>
+              <a:t>Proctor</a:t>
+            </a:r>
+            <a:br>
+              <a:rPr lang="en-US" sz="6000" b="1" dirty="0"/>
+            </a:br>
             <a:r>
               <a:rPr lang="en-US" sz="6000" b="1" dirty="0"/>
               <a:t>Introductions!</a:t>
@@ -12800,55 +13555,53 @@
             </a:pPr>
             <a:r>
               <a:rPr lang="en-US" dirty="0"/>
-              <a:t>Briefly i</a:t>
-            </a:r>
-            <a:r>
-              <a:rPr lang="en-US" sz="2800" dirty="0"/>
-              <a:t>ntroduce yourself, including</a:t>
-            </a:r>
-          </a:p>
-          <a:p>
-            <a:pPr lvl="1">
-              <a:spcAft>
-                <a:spcPts val="1200"/>
-              </a:spcAft>
+              <a:t>Anchorage – Jiaqi </a:t>
+            </a:r>
+          </a:p>
+          <a:p>
+            <a:pPr marL="0" indent="0">
+              <a:spcBef>
+                <a:spcPts val="2400"/>
+              </a:spcBef>
+              <a:buNone/>
             </a:pPr>
             <a:r>
-              <a:rPr lang="en-US" sz="2800" dirty="0"/>
-              <a:t>What type of work you do</a:t>
-            </a:r>
-          </a:p>
-          <a:p>
-            <a:pPr lvl="1"/>
-            <a:r>
-              <a:rPr lang="en-US" sz="2800" dirty="0"/>
-              <a:t>Your R experience / familiarity</a:t>
-            </a:r>
-          </a:p>
-          <a:p>
-            <a:pPr lvl="2">
+              <a:rPr lang="en-US" dirty="0"/>
+              <a:t>Douglas – Randy</a:t>
+            </a:r>
+          </a:p>
+          <a:p>
+            <a:pPr marL="0" indent="0">
               <a:spcBef>
-                <a:spcPts val="0"/>
+                <a:spcPts val="2400"/>
               </a:spcBef>
-              <a:spcAft>
-                <a:spcPts val="1200"/>
-              </a:spcAft>
+              <a:buNone/>
             </a:pPr>
             <a:r>
-              <a:rPr lang="en-US" sz="2400" dirty="0"/>
-              <a:t>(Optional) Something specific you’d like to take away from this course?</a:t>
-            </a:r>
-          </a:p>
-          <a:p>
-            <a:pPr lvl="1">
-              <a:spcAft>
-                <a:spcPts val="1200"/>
-              </a:spcAft>
+              <a:rPr lang="en-US" dirty="0"/>
+              <a:t>Fairbanks – Mackenzie </a:t>
+            </a:r>
+          </a:p>
+          <a:p>
+            <a:pPr marL="0" indent="0">
+              <a:spcBef>
+                <a:spcPts val="2400"/>
+              </a:spcBef>
+              <a:buNone/>
             </a:pPr>
             <a:r>
-              <a:rPr lang="en-US" sz="2800" dirty="0"/>
-              <a:t>One small, non-work accomplishment from the past year </a:t>
-            </a:r>
+              <a:rPr lang="en-US" dirty="0"/>
+              <a:t>Kodiak – Tyler</a:t>
+            </a:r>
+          </a:p>
+          <a:p>
+            <a:pPr marL="0" indent="0">
+              <a:spcBef>
+                <a:spcPts val="2400"/>
+              </a:spcBef>
+              <a:buNone/>
+            </a:pPr>
+            <a:endParaRPr lang="en-US" sz="2800" dirty="0"/>
           </a:p>
         </p:txBody>
       </p:sp>
@@ -12896,7 +13649,7 @@
                   <a:spcPts val="600"/>
                 </a:spcAft>
               </a:pPr>
-              <a:t>3</a:t>
+              <a:t>4</a:t>
             </a:fld>
             <a:endParaRPr lang="en-US">
               <a:solidFill>
@@ -14988,7 +15741,7 @@
 </p:sld>
 </file>
 
-<file path=ppt/slides/slide4.xml><?xml version="1.0" encoding="utf-8"?>
+<file path=ppt/slides/slide5.xml><?xml version="1.0" encoding="utf-8"?>
 <p:sld xmlns:a="http://schemas.openxmlformats.org/drawingml/2006/main" xmlns:r="http://schemas.openxmlformats.org/officeDocument/2006/relationships" xmlns:p="http://schemas.openxmlformats.org/presentationml/2006/main">
   <p:cSld>
     <p:spTree>
@@ -15005,159 +15758,115 @@
           <a:chExt cx="0" cy="0"/>
         </a:xfrm>
       </p:grpSpPr>
-      <p:pic>
-        <p:nvPicPr>
-          <p:cNvPr id="7" name="Content Placeholder 4" descr="A person holding a fish&#10;&#10;Description automatically generated">
+      <p:sp>
+        <p:nvSpPr>
+          <p:cNvPr id="2" name="Title 1">
             <a:extLst>
               <a:ext uri="{FF2B5EF4-FFF2-40B4-BE49-F238E27FC236}">
-                <a16:creationId xmlns:a16="http://schemas.microsoft.com/office/drawing/2014/main" id="{F6C94C61-5792-4FE1-B79C-5F355CCA7F54}"/>
+                <a16:creationId xmlns:a16="http://schemas.microsoft.com/office/drawing/2014/main" id="{D55CB181-329B-40E6-B14F-21E78D7563CB}"/>
               </a:ext>
             </a:extLst>
           </p:cNvPr>
-          <p:cNvPicPr>
-            <a:picLocks noChangeAspect="1"/>
-          </p:cNvPicPr>
-          <p:nvPr/>
-        </p:nvPicPr>
-        <p:blipFill rotWithShape="1">
-          <a:blip r:embed="rId2">
+          <p:cNvSpPr>
+            <a:spLocks noGrp="1"/>
+          </p:cNvSpPr>
+          <p:nvPr>
+            <p:ph type="title"/>
+          </p:nvPr>
+        </p:nvSpPr>
+        <p:spPr>
+          <a:xfrm>
+            <a:off x="371093" y="665825"/>
+            <a:ext cx="4928876" cy="1620175"/>
+          </a:xfrm>
+        </p:spPr>
+        <p:txBody>
+          <a:bodyPr anchor="b">
+            <a:normAutofit/>
+          </a:bodyPr>
+          <a:lstStyle/>
+          <a:p>
+            <a:r>
+              <a:rPr lang="en-US" sz="6000" b="1" dirty="0"/>
+              <a:t>Introductions!</a:t>
+            </a:r>
+            <a:endParaRPr lang="en-US" sz="4800" b="1" dirty="0">
+              <a:highlight>
+                <a:srgbClr val="FFFF00"/>
+              </a:highlight>
+            </a:endParaRPr>
+          </a:p>
+        </p:txBody>
+      </p:sp>
+      <p:sp>
+        <p:nvSpPr>
+          <p:cNvPr id="3" name="Content Placeholder 2">
             <a:extLst>
-              <a:ext uri="{28A0092B-C50C-407E-A947-70E740481C1C}">
-                <a14:useLocalDpi xmlns:a14="http://schemas.microsoft.com/office/drawing/2010/main" val="0"/>
+              <a:ext uri="{FF2B5EF4-FFF2-40B4-BE49-F238E27FC236}">
+                <a16:creationId xmlns:a16="http://schemas.microsoft.com/office/drawing/2014/main" id="{AF17B8D6-64F8-4488-8642-7611696D9465}"/>
               </a:ext>
             </a:extLst>
-          </a:blip>
-          <a:srcRect l="14559" r="10214"/>
-          <a:stretch/>
-        </p:blipFill>
+          </p:cNvPr>
+          <p:cNvSpPr>
+            <a:spLocks noGrp="1"/>
+          </p:cNvSpPr>
+          <p:nvPr>
+            <p:ph idx="1"/>
+          </p:nvPr>
+        </p:nvSpPr>
         <p:spPr>
           <a:xfrm>
-            <a:off x="869074" y="3146682"/>
-            <a:ext cx="3567314" cy="3556535"/>
+            <a:off x="371093" y="2731521"/>
+            <a:ext cx="6397222" cy="3989954"/>
           </a:xfrm>
-          <a:custGeom>
-            <a:avLst/>
-            <a:gdLst/>
-            <a:ahLst/>
-            <a:cxnLst/>
-            <a:rect l="l" t="t" r="r" b="b"/>
-            <a:pathLst>
-              <a:path w="6878775" h="6858000">
-                <a:moveTo>
-                  <a:pt x="1102973" y="0"/>
-                </a:moveTo>
-                <a:lnTo>
-                  <a:pt x="1160688" y="0"/>
-                </a:lnTo>
-                <a:lnTo>
-                  <a:pt x="983189" y="331786"/>
-                </a:lnTo>
-                <a:cubicBezTo>
-                  <a:pt x="914866" y="469145"/>
-                  <a:pt x="850355" y="608712"/>
-                  <a:pt x="789261" y="750263"/>
-                </a:cubicBezTo>
-                <a:cubicBezTo>
-                  <a:pt x="774307" y="784928"/>
-                  <a:pt x="759992" y="819849"/>
-                  <a:pt x="745295" y="854514"/>
-                </a:cubicBezTo>
-                <a:cubicBezTo>
-                  <a:pt x="756682" y="845393"/>
-                  <a:pt x="765489" y="833492"/>
-                  <a:pt x="770857" y="819975"/>
-                </a:cubicBezTo>
-                <a:cubicBezTo>
-                  <a:pt x="879943" y="589569"/>
-                  <a:pt x="999605" y="365513"/>
-                  <a:pt x="1131329" y="148742"/>
-                </a:cubicBezTo>
-                <a:lnTo>
-                  <a:pt x="1227589" y="0"/>
-                </a:lnTo>
-                <a:lnTo>
-                  <a:pt x="6878775" y="0"/>
-                </a:lnTo>
-                <a:lnTo>
-                  <a:pt x="6878775" y="6858000"/>
-                </a:lnTo>
-                <a:lnTo>
-                  <a:pt x="713521" y="6858000"/>
-                </a:lnTo>
-                <a:lnTo>
-                  <a:pt x="625642" y="6670527"/>
-                </a:lnTo>
-                <a:cubicBezTo>
-                  <a:pt x="507232" y="6398531"/>
-                  <a:pt x="403083" y="6118381"/>
-                  <a:pt x="312785" y="5830359"/>
-                </a:cubicBezTo>
-                <a:cubicBezTo>
-                  <a:pt x="278149" y="5719759"/>
-                  <a:pt x="248879" y="5607635"/>
-                  <a:pt x="212198" y="5480401"/>
-                </a:cubicBezTo>
-                <a:cubicBezTo>
-                  <a:pt x="212208" y="5491601"/>
-                  <a:pt x="212803" y="5502788"/>
-                  <a:pt x="213988" y="5513923"/>
-                </a:cubicBezTo>
-                <a:cubicBezTo>
-                  <a:pt x="264089" y="5723695"/>
-                  <a:pt x="307290" y="5935370"/>
-                  <a:pt x="365826" y="6142729"/>
-                </a:cubicBezTo>
-                <a:cubicBezTo>
-                  <a:pt x="433152" y="6380817"/>
-                  <a:pt x="510068" y="6614016"/>
-                  <a:pt x="597975" y="6841549"/>
-                </a:cubicBezTo>
-                <a:lnTo>
-                  <a:pt x="604824" y="6858000"/>
-                </a:lnTo>
-                <a:lnTo>
-                  <a:pt x="552056" y="6858000"/>
-                </a:lnTo>
-                <a:lnTo>
-                  <a:pt x="539576" y="6828295"/>
-                </a:lnTo>
-                <a:cubicBezTo>
-                  <a:pt x="380597" y="6414594"/>
-                  <a:pt x="260223" y="5988893"/>
-                  <a:pt x="171555" y="5552906"/>
-                </a:cubicBezTo>
-                <a:cubicBezTo>
-                  <a:pt x="91163" y="5157998"/>
-                  <a:pt x="43746" y="4758899"/>
-                  <a:pt x="12305" y="4357388"/>
-                </a:cubicBezTo>
-                <a:cubicBezTo>
-                  <a:pt x="-14281" y="4013908"/>
-                  <a:pt x="4507" y="3672965"/>
-                  <a:pt x="46684" y="3331516"/>
-                </a:cubicBezTo>
-                <a:cubicBezTo>
-                  <a:pt x="127203" y="2664286"/>
-                  <a:pt x="277819" y="2007265"/>
-                  <a:pt x="496065" y="1371196"/>
-                </a:cubicBezTo>
-                <a:cubicBezTo>
-                  <a:pt x="636273" y="966066"/>
-                  <a:pt x="800445" y="573253"/>
-                  <a:pt x="995723" y="196614"/>
-                </a:cubicBezTo>
-                <a:close/>
-              </a:path>
-            </a:pathLst>
-          </a:custGeom>
         </p:spPr>
-      </p:pic>
+        <p:txBody>
+          <a:bodyPr anchor="t">
+            <a:normAutofit/>
+          </a:bodyPr>
+          <a:lstStyle/>
+          <a:p>
+            <a:pPr marL="0" indent="0">
+              <a:spcBef>
+                <a:spcPts val="2400"/>
+              </a:spcBef>
+              <a:buNone/>
+            </a:pPr>
+            <a:r>
+              <a:rPr lang="en-US" dirty="0"/>
+              <a:t>In the chat, write a sentence or two </a:t>
+            </a:r>
+            <a:r>
+              <a:rPr lang="en-US" sz="2800" dirty="0"/>
+              <a:t>about yourself:</a:t>
+            </a:r>
+          </a:p>
+          <a:p>
+            <a:pPr lvl="1">
+              <a:spcAft>
+                <a:spcPts val="1200"/>
+              </a:spcAft>
+            </a:pPr>
+            <a:r>
+              <a:rPr lang="en-US" sz="2800" dirty="0"/>
+              <a:t>Where your home ADF&amp;G office is</a:t>
+            </a:r>
+          </a:p>
+          <a:p>
+            <a:pPr lvl="1"/>
+            <a:r>
+              <a:rPr lang="en-US" sz="2800" dirty="0"/>
+              <a:t>Something specific you’d like to take away from this course</a:t>
+            </a:r>
+          </a:p>
+        </p:txBody>
+      </p:sp>
       <p:sp>
         <p:nvSpPr>
           <p:cNvPr id="4" name="Slide Number Placeholder 3">
             <a:extLst>
               <a:ext uri="{FF2B5EF4-FFF2-40B4-BE49-F238E27FC236}">
-                <a16:creationId xmlns:a16="http://schemas.microsoft.com/office/drawing/2014/main" id="{E2FBF6B4-F10C-4781-AE21-B980DCE6B61B}"/>
+                <a16:creationId xmlns:a16="http://schemas.microsoft.com/office/drawing/2014/main" id="{0517DE60-94E6-41D2-9303-4D442F8BF45B}"/>
               </a:ext>
             </a:extLst>
           </p:cNvPr>
@@ -15170,387 +15879,2115 @@
         </p:nvSpPr>
         <p:spPr>
           <a:xfrm>
-            <a:off x="8649101" y="6468033"/>
+            <a:off x="9077706" y="6356350"/>
             <a:ext cx="2743200" cy="365125"/>
           </a:xfrm>
         </p:spPr>
         <p:txBody>
-          <a:bodyPr/>
+          <a:bodyPr>
+            <a:normAutofit/>
+          </a:bodyPr>
           <a:lstStyle/>
           <a:p>
+            <a:pPr>
+              <a:spcAft>
+                <a:spcPts val="600"/>
+              </a:spcAft>
+            </a:pPr>
             <a:fld id="{6D95AE55-B5F4-483D-AEFF-E8059F5502F5}" type="slidenum">
-              <a:rPr lang="en-US" smtClean="0"/>
-              <a:t>4</a:t>
+              <a:rPr lang="en-US">
+                <a:solidFill>
+                  <a:schemeClr val="bg1"/>
+                </a:solidFill>
+              </a:rPr>
+              <a:pPr>
+                <a:spcAft>
+                  <a:spcPts val="600"/>
+                </a:spcAft>
+              </a:pPr>
+              <a:t>5</a:t>
             </a:fld>
-            <a:endParaRPr lang="en-US" dirty="0"/>
+            <a:endParaRPr lang="en-US">
+              <a:solidFill>
+                <a:schemeClr val="bg1"/>
+              </a:solidFill>
+            </a:endParaRPr>
           </a:p>
         </p:txBody>
       </p:sp>
-      <p:pic>
-        <p:nvPicPr>
-          <p:cNvPr id="5" name="Content Placeholder 6" descr="A close up of a sign&#10;&#10;Description automatically generated">
+      <p:grpSp>
+        <p:nvGrpSpPr>
+          <p:cNvPr id="18" name="Group 17">
             <a:extLst>
               <a:ext uri="{FF2B5EF4-FFF2-40B4-BE49-F238E27FC236}">
-                <a16:creationId xmlns:a16="http://schemas.microsoft.com/office/drawing/2014/main" id="{1070C901-7B80-4964-BAB9-9990630CD6D0}"/>
+                <a16:creationId xmlns:a16="http://schemas.microsoft.com/office/drawing/2014/main" id="{DDB16C2C-3AB6-BD57-DFC4-D0E7FC987619}"/>
               </a:ext>
             </a:extLst>
           </p:cNvPr>
-          <p:cNvPicPr>
-            <a:picLocks noChangeAspect="1"/>
-          </p:cNvPicPr>
+          <p:cNvGrpSpPr/>
           <p:nvPr/>
-        </p:nvPicPr>
-        <p:blipFill>
-          <a:blip r:embed="rId3">
-            <a:extLst>
-              <a:ext uri="{28A0092B-C50C-407E-A947-70E740481C1C}">
-                <a14:useLocalDpi xmlns:a14="http://schemas.microsoft.com/office/drawing/2010/main" val="0"/>
-              </a:ext>
-            </a:extLst>
-          </a:blip>
-          <a:stretch>
-            <a:fillRect/>
-          </a:stretch>
-        </p:blipFill>
-        <p:spPr>
+        </p:nvGrpSpPr>
+        <p:grpSpPr>
           <a:xfrm>
-            <a:off x="4296964" y="2391095"/>
-            <a:ext cx="3598071" cy="2075809"/>
+            <a:off x="7416432" y="417106"/>
+            <a:ext cx="4268094" cy="3989953"/>
+            <a:chOff x="7120196" y="1889771"/>
+            <a:chExt cx="4268094" cy="3989953"/>
           </a:xfrm>
-          <a:prstGeom prst="rect">
-            <a:avLst/>
-          </a:prstGeom>
-        </p:spPr>
-      </p:pic>
-      <p:sp>
-        <p:nvSpPr>
-          <p:cNvPr id="6" name="TextBox 5">
-            <a:extLst>
-              <a:ext uri="{FF2B5EF4-FFF2-40B4-BE49-F238E27FC236}">
-                <a16:creationId xmlns:a16="http://schemas.microsoft.com/office/drawing/2014/main" id="{1FAE114B-20EE-4498-B490-B559E10EDAE0}"/>
-              </a:ext>
-            </a:extLst>
-          </p:cNvPr>
-          <p:cNvSpPr txBox="1"/>
-          <p:nvPr/>
-        </p:nvSpPr>
-        <p:spPr>
-          <a:xfrm>
-            <a:off x="127016" y="321109"/>
-            <a:ext cx="4899087" cy="2646318"/>
-          </a:xfrm>
-          <a:prstGeom prst="rect">
-            <a:avLst/>
-          </a:prstGeom>
-        </p:spPr>
-        <p:txBody>
-          <a:bodyPr vert="horz" lIns="91440" tIns="45720" rIns="91440" bIns="45720" rtlCol="0">
-            <a:normAutofit/>
-          </a:bodyPr>
-          <a:lstStyle/>
-          <a:p>
-            <a:pPr algn="ctr">
-              <a:lnSpc>
-                <a:spcPct val="90000"/>
-              </a:lnSpc>
-              <a:spcAft>
-                <a:spcPts val="3000"/>
-              </a:spcAft>
-            </a:pPr>
-            <a:r>
-              <a:rPr lang="en-US" sz="3600" b="1" dirty="0">
-                <a:latin typeface="+mj-lt"/>
-              </a:rPr>
-              <a:t>Justin Priest</a:t>
-            </a:r>
-          </a:p>
-          <a:p>
-            <a:pPr algn="ctr">
-              <a:lnSpc>
-                <a:spcPct val="90000"/>
-              </a:lnSpc>
-              <a:spcAft>
-                <a:spcPts val="1800"/>
-              </a:spcAft>
-            </a:pPr>
-            <a:r>
-              <a:rPr lang="en-US" dirty="0"/>
-              <a:t>2020 UAF CFOS Graduate</a:t>
-            </a:r>
-          </a:p>
-          <a:p>
-            <a:pPr algn="ctr">
-              <a:lnSpc>
-                <a:spcPct val="90000"/>
-              </a:lnSpc>
-            </a:pPr>
-            <a:r>
-              <a:rPr lang="en-US" dirty="0"/>
-              <a:t>Learned R tools at CFOS (easy way) &amp; </a:t>
-            </a:r>
-          </a:p>
-          <a:p>
-            <a:pPr algn="ctr">
-              <a:lnSpc>
-                <a:spcPct val="90000"/>
-              </a:lnSpc>
-              <a:spcAft>
-                <a:spcPts val="1800"/>
-              </a:spcAft>
-            </a:pPr>
-            <a:r>
-              <a:rPr lang="en-US" dirty="0"/>
-              <a:t>taught myself (hard but fun way)</a:t>
-            </a:r>
-          </a:p>
-          <a:p>
-            <a:pPr algn="ctr">
-              <a:lnSpc>
-                <a:spcPct val="90000"/>
-              </a:lnSpc>
-              <a:spcAft>
-                <a:spcPts val="1800"/>
-              </a:spcAft>
-            </a:pPr>
-            <a:r>
-              <a:rPr lang="en-US" dirty="0"/>
-              <a:t>ADF&amp;G Salmon Researcher in Sitka</a:t>
-            </a:r>
-          </a:p>
-        </p:txBody>
-      </p:sp>
-      <p:pic>
-        <p:nvPicPr>
-          <p:cNvPr id="10" name="Picture 9">
-            <a:extLst>
-              <a:ext uri="{FF2B5EF4-FFF2-40B4-BE49-F238E27FC236}">
-                <a16:creationId xmlns:a16="http://schemas.microsoft.com/office/drawing/2014/main" id="{BF9C1CE2-113E-49BE-B9E2-DD785B611D5B}"/>
-              </a:ext>
-            </a:extLst>
-          </p:cNvPr>
-          <p:cNvPicPr>
-            <a:picLocks noChangeAspect="1"/>
-          </p:cNvPicPr>
-          <p:nvPr/>
-        </p:nvPicPr>
-        <p:blipFill>
-          <a:blip r:embed="rId4">
-            <a:clrChange>
-              <a:clrFrom>
-                <a:srgbClr val="FFFFFF"/>
-              </a:clrFrom>
-              <a:clrTo>
-                <a:srgbClr val="FFFFFF">
-                  <a:alpha val="0"/>
-                </a:srgbClr>
-              </a:clrTo>
-            </a:clrChange>
-          </a:blip>
-          <a:stretch>
-            <a:fillRect/>
-          </a:stretch>
-        </p:blipFill>
-        <p:spPr>
-          <a:xfrm>
-            <a:off x="585835" y="784661"/>
-            <a:ext cx="3981450" cy="352425"/>
-          </a:xfrm>
-          <a:prstGeom prst="rect">
-            <a:avLst/>
-          </a:prstGeom>
-        </p:spPr>
-      </p:pic>
-      <p:pic>
-        <p:nvPicPr>
-          <p:cNvPr id="8" name="Picture 7" descr="A person standing on a rock with a kite in the air&#10;&#10;Description automatically generated">
-            <a:extLst>
-              <a:ext uri="{FF2B5EF4-FFF2-40B4-BE49-F238E27FC236}">
-                <a16:creationId xmlns:a16="http://schemas.microsoft.com/office/drawing/2014/main" id="{C76CD833-D384-F0B8-FCCC-C65211198858}"/>
-              </a:ext>
-            </a:extLst>
-          </p:cNvPr>
-          <p:cNvPicPr>
-            <a:picLocks noChangeAspect="1"/>
-          </p:cNvPicPr>
-          <p:nvPr/>
-        </p:nvPicPr>
-        <p:blipFill>
-          <a:blip r:embed="rId5">
-            <a:extLst>
-              <a:ext uri="{28A0092B-C50C-407E-A947-70E740481C1C}">
-                <a14:useLocalDpi xmlns:a14="http://schemas.microsoft.com/office/drawing/2010/main" val="0"/>
-              </a:ext>
-            </a:extLst>
-          </a:blip>
-          <a:stretch>
-            <a:fillRect/>
-          </a:stretch>
-        </p:blipFill>
-        <p:spPr>
-          <a:xfrm>
-            <a:off x="7755614" y="206000"/>
-            <a:ext cx="3771896" cy="3769958"/>
-          </a:xfrm>
-          <a:prstGeom prst="rect">
-            <a:avLst/>
-          </a:prstGeom>
-        </p:spPr>
-      </p:pic>
-      <p:sp>
-        <p:nvSpPr>
-          <p:cNvPr id="9" name="TextBox 8">
-            <a:extLst>
-              <a:ext uri="{FF2B5EF4-FFF2-40B4-BE49-F238E27FC236}">
-                <a16:creationId xmlns:a16="http://schemas.microsoft.com/office/drawing/2014/main" id="{43A8A50F-89A1-7E10-5347-FD276C6A6FD6}"/>
-              </a:ext>
-            </a:extLst>
-          </p:cNvPr>
-          <p:cNvSpPr txBox="1"/>
-          <p:nvPr/>
-        </p:nvSpPr>
-        <p:spPr>
-          <a:xfrm>
-            <a:off x="7418926" y="4211682"/>
-            <a:ext cx="4445269" cy="2646318"/>
-          </a:xfrm>
-          <a:prstGeom prst="rect">
-            <a:avLst/>
-          </a:prstGeom>
-        </p:spPr>
-        <p:txBody>
-          <a:bodyPr vert="horz" lIns="91440" tIns="45720" rIns="91440" bIns="45720" rtlCol="0">
-            <a:normAutofit/>
-          </a:bodyPr>
-          <a:lstStyle/>
-          <a:p>
-            <a:pPr algn="ctr">
-              <a:lnSpc>
-                <a:spcPct val="90000"/>
-              </a:lnSpc>
-              <a:spcAft>
-                <a:spcPts val="3000"/>
-              </a:spcAft>
-            </a:pPr>
-            <a:r>
-              <a:rPr lang="en-US" sz="3600" b="1" dirty="0">
-                <a:latin typeface="+mj-lt"/>
-              </a:rPr>
-              <a:t>Matt Tyers</a:t>
-            </a:r>
-          </a:p>
-          <a:p>
-            <a:pPr algn="ctr">
-              <a:lnSpc>
-                <a:spcPct val="90000"/>
-              </a:lnSpc>
-              <a:spcAft>
-                <a:spcPts val="1800"/>
-              </a:spcAft>
-            </a:pPr>
-            <a:r>
-              <a:rPr lang="en-US" dirty="0"/>
-              <a:t>2014 Montana State Statistics Graduate</a:t>
-            </a:r>
-          </a:p>
-          <a:p>
-            <a:pPr algn="ctr">
-              <a:lnSpc>
-                <a:spcPct val="90000"/>
-              </a:lnSpc>
-            </a:pPr>
-            <a:r>
-              <a:rPr lang="en-US" dirty="0"/>
-              <a:t>Old-</a:t>
-            </a:r>
-            <a:r>
-              <a:rPr lang="en-US" dirty="0" err="1"/>
-              <a:t>skool</a:t>
-            </a:r>
-            <a:r>
-              <a:rPr lang="en-US" dirty="0"/>
-              <a:t> </a:t>
-            </a:r>
-            <a:r>
-              <a:rPr lang="en-US" dirty="0" err="1"/>
-              <a:t>syntaxer</a:t>
-            </a:r>
-            <a:endParaRPr lang="en-US" dirty="0"/>
-          </a:p>
-          <a:p>
-            <a:pPr algn="ctr">
-              <a:lnSpc>
-                <a:spcPct val="90000"/>
-              </a:lnSpc>
-              <a:spcAft>
-                <a:spcPts val="1800"/>
-              </a:spcAft>
-            </a:pPr>
-            <a:r>
-              <a:rPr lang="en-US" dirty="0"/>
-              <a:t>But I’m learning</a:t>
-            </a:r>
-          </a:p>
-          <a:p>
-            <a:pPr algn="ctr">
-              <a:lnSpc>
-                <a:spcPct val="90000"/>
-              </a:lnSpc>
-              <a:spcAft>
-                <a:spcPts val="1800"/>
-              </a:spcAft>
-            </a:pPr>
-            <a:r>
-              <a:rPr lang="en-US" dirty="0"/>
-              <a:t>ADF&amp;G Sport Fish Biometrician in Anchorage</a:t>
-            </a:r>
-          </a:p>
-        </p:txBody>
-      </p:sp>
-      <p:pic>
-        <p:nvPicPr>
-          <p:cNvPr id="11" name="Picture 10">
-            <a:extLst>
-              <a:ext uri="{FF2B5EF4-FFF2-40B4-BE49-F238E27FC236}">
-                <a16:creationId xmlns:a16="http://schemas.microsoft.com/office/drawing/2014/main" id="{BD6B9106-2282-53A3-CC0A-395B2762FCA6}"/>
-              </a:ext>
-            </a:extLst>
-          </p:cNvPr>
-          <p:cNvPicPr>
-            <a:picLocks noChangeAspect="1"/>
-          </p:cNvPicPr>
-          <p:nvPr/>
-        </p:nvPicPr>
-        <p:blipFill>
-          <a:blip r:embed="rId4">
-            <a:clrChange>
-              <a:clrFrom>
-                <a:srgbClr val="FFFFFF"/>
-              </a:clrFrom>
-              <a:clrTo>
-                <a:srgbClr val="FFFFFF">
-                  <a:alpha val="0"/>
-                </a:srgbClr>
-              </a:clrTo>
-            </a:clrChange>
-          </a:blip>
-          <a:stretch>
-            <a:fillRect/>
-          </a:stretch>
-        </p:blipFill>
-        <p:spPr>
-          <a:xfrm>
-            <a:off x="7650836" y="4702021"/>
-            <a:ext cx="3981450" cy="352425"/>
-          </a:xfrm>
-          <a:prstGeom prst="rect">
-            <a:avLst/>
-          </a:prstGeom>
-        </p:spPr>
-      </p:pic>
+        </p:grpSpPr>
+        <p:grpSp>
+          <p:nvGrpSpPr>
+            <p:cNvPr id="6" name="Group 5">
+              <a:extLst>
+                <a:ext uri="{FF2B5EF4-FFF2-40B4-BE49-F238E27FC236}">
+                  <a16:creationId xmlns:a16="http://schemas.microsoft.com/office/drawing/2014/main" id="{68F0FB18-4279-0E07-3178-16140414A226}"/>
+                </a:ext>
+              </a:extLst>
+            </p:cNvPr>
+            <p:cNvGrpSpPr/>
+            <p:nvPr/>
+          </p:nvGrpSpPr>
+          <p:grpSpPr>
+            <a:xfrm>
+              <a:off x="7120196" y="1889771"/>
+              <a:ext cx="4268094" cy="3989953"/>
+              <a:chOff x="6758377" y="1910333"/>
+              <a:chExt cx="3852765" cy="3671441"/>
+            </a:xfrm>
+          </p:grpSpPr>
+          <p:sp>
+            <p:nvSpPr>
+              <p:cNvPr id="7" name="Freeform: Shape 6">
+                <a:extLst>
+                  <a:ext uri="{FF2B5EF4-FFF2-40B4-BE49-F238E27FC236}">
+                    <a16:creationId xmlns:a16="http://schemas.microsoft.com/office/drawing/2014/main" id="{F4B0A05C-137C-7B4C-B765-12E9C67193A1}"/>
+                  </a:ext>
+                </a:extLst>
+              </p:cNvPr>
+              <p:cNvSpPr/>
+              <p:nvPr/>
+            </p:nvSpPr>
+            <p:spPr>
+              <a:xfrm>
+                <a:off x="8143078" y="2409432"/>
+                <a:ext cx="1299410" cy="1357162"/>
+              </a:xfrm>
+              <a:custGeom>
+                <a:avLst/>
+                <a:gdLst>
+                  <a:gd name="connsiteX0" fmla="*/ 19250 w 1299410"/>
+                  <a:gd name="connsiteY0" fmla="*/ 154004 h 1357162"/>
+                  <a:gd name="connsiteX1" fmla="*/ 211755 w 1299410"/>
+                  <a:gd name="connsiteY1" fmla="*/ 67376 h 1357162"/>
+                  <a:gd name="connsiteX2" fmla="*/ 577515 w 1299410"/>
+                  <a:gd name="connsiteY2" fmla="*/ 0 h 1357162"/>
+                  <a:gd name="connsiteX3" fmla="*/ 808522 w 1299410"/>
+                  <a:gd name="connsiteY3" fmla="*/ 0 h 1357162"/>
+                  <a:gd name="connsiteX4" fmla="*/ 1106905 w 1299410"/>
+                  <a:gd name="connsiteY4" fmla="*/ 67376 h 1357162"/>
+                  <a:gd name="connsiteX5" fmla="*/ 1299410 w 1299410"/>
+                  <a:gd name="connsiteY5" fmla="*/ 173254 h 1357162"/>
+                  <a:gd name="connsiteX6" fmla="*/ 1280160 w 1299410"/>
+                  <a:gd name="connsiteY6" fmla="*/ 798896 h 1357162"/>
+                  <a:gd name="connsiteX7" fmla="*/ 1193532 w 1299410"/>
+                  <a:gd name="connsiteY7" fmla="*/ 1039528 h 1357162"/>
+                  <a:gd name="connsiteX8" fmla="*/ 1049153 w 1299410"/>
+                  <a:gd name="connsiteY8" fmla="*/ 1241658 h 1357162"/>
+                  <a:gd name="connsiteX9" fmla="*/ 789271 w 1299410"/>
+                  <a:gd name="connsiteY9" fmla="*/ 1357162 h 1357162"/>
+                  <a:gd name="connsiteX10" fmla="*/ 442762 w 1299410"/>
+                  <a:gd name="connsiteY10" fmla="*/ 1318661 h 1357162"/>
+                  <a:gd name="connsiteX11" fmla="*/ 211755 w 1299410"/>
+                  <a:gd name="connsiteY11" fmla="*/ 1183907 h 1357162"/>
+                  <a:gd name="connsiteX12" fmla="*/ 77002 w 1299410"/>
+                  <a:gd name="connsiteY12" fmla="*/ 1010652 h 1357162"/>
+                  <a:gd name="connsiteX13" fmla="*/ 19250 w 1299410"/>
+                  <a:gd name="connsiteY13" fmla="*/ 837397 h 1357162"/>
+                  <a:gd name="connsiteX14" fmla="*/ 19250 w 1299410"/>
+                  <a:gd name="connsiteY14" fmla="*/ 664143 h 1357162"/>
+                  <a:gd name="connsiteX15" fmla="*/ 0 w 1299410"/>
+                  <a:gd name="connsiteY15" fmla="*/ 375385 h 1357162"/>
+                  <a:gd name="connsiteX16" fmla="*/ 19250 w 1299410"/>
+                  <a:gd name="connsiteY16" fmla="*/ 154004 h 1357162"/>
+                </a:gdLst>
+                <a:ahLst/>
+                <a:cxnLst>
+                  <a:cxn ang="0">
+                    <a:pos x="connsiteX0" y="connsiteY0"/>
+                  </a:cxn>
+                  <a:cxn ang="0">
+                    <a:pos x="connsiteX1" y="connsiteY1"/>
+                  </a:cxn>
+                  <a:cxn ang="0">
+                    <a:pos x="connsiteX2" y="connsiteY2"/>
+                  </a:cxn>
+                  <a:cxn ang="0">
+                    <a:pos x="connsiteX3" y="connsiteY3"/>
+                  </a:cxn>
+                  <a:cxn ang="0">
+                    <a:pos x="connsiteX4" y="connsiteY4"/>
+                  </a:cxn>
+                  <a:cxn ang="0">
+                    <a:pos x="connsiteX5" y="connsiteY5"/>
+                  </a:cxn>
+                  <a:cxn ang="0">
+                    <a:pos x="connsiteX6" y="connsiteY6"/>
+                  </a:cxn>
+                  <a:cxn ang="0">
+                    <a:pos x="connsiteX7" y="connsiteY7"/>
+                  </a:cxn>
+                  <a:cxn ang="0">
+                    <a:pos x="connsiteX8" y="connsiteY8"/>
+                  </a:cxn>
+                  <a:cxn ang="0">
+                    <a:pos x="connsiteX9" y="connsiteY9"/>
+                  </a:cxn>
+                  <a:cxn ang="0">
+                    <a:pos x="connsiteX10" y="connsiteY10"/>
+                  </a:cxn>
+                  <a:cxn ang="0">
+                    <a:pos x="connsiteX11" y="connsiteY11"/>
+                  </a:cxn>
+                  <a:cxn ang="0">
+                    <a:pos x="connsiteX12" y="connsiteY12"/>
+                  </a:cxn>
+                  <a:cxn ang="0">
+                    <a:pos x="connsiteX13" y="connsiteY13"/>
+                  </a:cxn>
+                  <a:cxn ang="0">
+                    <a:pos x="connsiteX14" y="connsiteY14"/>
+                  </a:cxn>
+                  <a:cxn ang="0">
+                    <a:pos x="connsiteX15" y="connsiteY15"/>
+                  </a:cxn>
+                  <a:cxn ang="0">
+                    <a:pos x="connsiteX16" y="connsiteY16"/>
+                  </a:cxn>
+                </a:cxnLst>
+                <a:rect l="l" t="t" r="r" b="b"/>
+                <a:pathLst>
+                  <a:path w="1299410" h="1357162">
+                    <a:moveTo>
+                      <a:pt x="19250" y="154004"/>
+                    </a:moveTo>
+                    <a:lnTo>
+                      <a:pt x="211755" y="67376"/>
+                    </a:lnTo>
+                    <a:lnTo>
+                      <a:pt x="577515" y="0"/>
+                    </a:lnTo>
+                    <a:lnTo>
+                      <a:pt x="808522" y="0"/>
+                    </a:lnTo>
+                    <a:lnTo>
+                      <a:pt x="1106905" y="67376"/>
+                    </a:lnTo>
+                    <a:lnTo>
+                      <a:pt x="1299410" y="173254"/>
+                    </a:lnTo>
+                    <a:lnTo>
+                      <a:pt x="1280160" y="798896"/>
+                    </a:lnTo>
+                    <a:lnTo>
+                      <a:pt x="1193532" y="1039528"/>
+                    </a:lnTo>
+                    <a:lnTo>
+                      <a:pt x="1049153" y="1241658"/>
+                    </a:lnTo>
+                    <a:lnTo>
+                      <a:pt x="789271" y="1357162"/>
+                    </a:lnTo>
+                    <a:lnTo>
+                      <a:pt x="442762" y="1318661"/>
+                    </a:lnTo>
+                    <a:lnTo>
+                      <a:pt x="211755" y="1183907"/>
+                    </a:lnTo>
+                    <a:lnTo>
+                      <a:pt x="77002" y="1010652"/>
+                    </a:lnTo>
+                    <a:lnTo>
+                      <a:pt x="19250" y="837397"/>
+                    </a:lnTo>
+                    <a:lnTo>
+                      <a:pt x="19250" y="664143"/>
+                    </a:lnTo>
+                    <a:lnTo>
+                      <a:pt x="0" y="375385"/>
+                    </a:lnTo>
+                    <a:lnTo>
+                      <a:pt x="19250" y="154004"/>
+                    </a:lnTo>
+                    <a:close/>
+                  </a:path>
+                </a:pathLst>
+              </a:custGeom>
+              <a:solidFill>
+                <a:srgbClr val="75AADB"/>
+              </a:solidFill>
+              <a:ln>
+                <a:noFill/>
+              </a:ln>
+            </p:spPr>
+            <p:style>
+              <a:lnRef idx="2">
+                <a:schemeClr val="accent1">
+                  <a:shade val="50000"/>
+                </a:schemeClr>
+              </a:lnRef>
+              <a:fillRef idx="1">
+                <a:schemeClr val="accent1"/>
+              </a:fillRef>
+              <a:effectRef idx="0">
+                <a:schemeClr val="accent1"/>
+              </a:effectRef>
+              <a:fontRef idx="minor">
+                <a:schemeClr val="lt1"/>
+              </a:fontRef>
+            </p:style>
+            <p:txBody>
+              <a:bodyPr rtlCol="0" anchor="ctr"/>
+              <a:lstStyle/>
+              <a:p>
+                <a:pPr algn="ctr"/>
+                <a:endParaRPr lang="en-US"/>
+              </a:p>
+            </p:txBody>
+          </p:sp>
+          <p:pic>
+            <p:nvPicPr>
+              <p:cNvPr id="9" name="Picture 8" descr="A close up of a sign&#10;&#10;Description automatically generated">
+                <a:extLst>
+                  <a:ext uri="{FF2B5EF4-FFF2-40B4-BE49-F238E27FC236}">
+                    <a16:creationId xmlns:a16="http://schemas.microsoft.com/office/drawing/2014/main" id="{C04E11AF-577E-1468-7FD6-4C926E478AD1}"/>
+                  </a:ext>
+                </a:extLst>
+              </p:cNvPr>
+              <p:cNvPicPr>
+                <a:picLocks noChangeAspect="1"/>
+              </p:cNvPicPr>
+              <p:nvPr/>
+            </p:nvPicPr>
+            <p:blipFill rotWithShape="1">
+              <a:blip r:embed="rId3">
+                <a:extLst>
+                  <a:ext uri="{28A0092B-C50C-407E-A947-70E740481C1C}">
+                    <a14:useLocalDpi xmlns:a14="http://schemas.microsoft.com/office/drawing/2010/main" val="0"/>
+                  </a:ext>
+                </a:extLst>
+              </a:blip>
+              <a:srcRect l="9699" t="21804" r="72779" b="28032"/>
+              <a:stretch/>
+            </p:blipFill>
+            <p:spPr>
+              <a:xfrm>
+                <a:off x="8428416" y="2577963"/>
+                <a:ext cx="724694" cy="728586"/>
+              </a:xfrm>
+              <a:prstGeom prst="rect">
+                <a:avLst/>
+              </a:prstGeom>
+            </p:spPr>
+          </p:pic>
+          <p:grpSp>
+            <p:nvGrpSpPr>
+              <p:cNvPr id="11" name="Graphic 5" descr="Astronaut male outline">
+                <a:extLst>
+                  <a:ext uri="{FF2B5EF4-FFF2-40B4-BE49-F238E27FC236}">
+                    <a16:creationId xmlns:a16="http://schemas.microsoft.com/office/drawing/2014/main" id="{96220629-C877-E5C1-AD4D-30F7E327A5DD}"/>
+                  </a:ext>
+                </a:extLst>
+              </p:cNvPr>
+              <p:cNvGrpSpPr/>
+              <p:nvPr/>
+            </p:nvGrpSpPr>
+            <p:grpSpPr>
+              <a:xfrm>
+                <a:off x="6758377" y="1910333"/>
+                <a:ext cx="3852765" cy="3671441"/>
+                <a:chOff x="6758377" y="1910333"/>
+                <a:chExt cx="3852765" cy="3671441"/>
+              </a:xfrm>
+              <a:solidFill>
+                <a:srgbClr val="000000"/>
+              </a:solidFill>
+            </p:grpSpPr>
+            <p:sp>
+              <p:nvSpPr>
+                <p:cNvPr id="12" name="Freeform: Shape 11">
+                  <a:extLst>
+                    <a:ext uri="{FF2B5EF4-FFF2-40B4-BE49-F238E27FC236}">
+                      <a16:creationId xmlns:a16="http://schemas.microsoft.com/office/drawing/2014/main" id="{0196A79C-06F8-C576-369D-96F2E375062B}"/>
+                    </a:ext>
+                  </a:extLst>
+                </p:cNvPr>
+                <p:cNvSpPr/>
+                <p:nvPr/>
+              </p:nvSpPr>
+              <p:spPr>
+                <a:xfrm>
+                  <a:off x="8299476" y="4448568"/>
+                  <a:ext cx="997136" cy="634570"/>
+                </a:xfrm>
+                <a:custGeom>
+                  <a:avLst/>
+                  <a:gdLst>
+                    <a:gd name="connsiteX0" fmla="*/ 861157 w 997136"/>
+                    <a:gd name="connsiteY0" fmla="*/ 0 h 634570"/>
+                    <a:gd name="connsiteX1" fmla="*/ 135979 w 997136"/>
+                    <a:gd name="connsiteY1" fmla="*/ 0 h 634570"/>
+                    <a:gd name="connsiteX2" fmla="*/ 0 w 997136"/>
+                    <a:gd name="connsiteY2" fmla="*/ 135979 h 634570"/>
+                    <a:gd name="connsiteX3" fmla="*/ 0 w 997136"/>
+                    <a:gd name="connsiteY3" fmla="*/ 498591 h 634570"/>
+                    <a:gd name="connsiteX4" fmla="*/ 135979 w 997136"/>
+                    <a:gd name="connsiteY4" fmla="*/ 634570 h 634570"/>
+                    <a:gd name="connsiteX5" fmla="*/ 861157 w 997136"/>
+                    <a:gd name="connsiteY5" fmla="*/ 634570 h 634570"/>
+                    <a:gd name="connsiteX6" fmla="*/ 997136 w 997136"/>
+                    <a:gd name="connsiteY6" fmla="*/ 498591 h 634570"/>
+                    <a:gd name="connsiteX7" fmla="*/ 997136 w 997136"/>
+                    <a:gd name="connsiteY7" fmla="*/ 135979 h 634570"/>
+                    <a:gd name="connsiteX8" fmla="*/ 861157 w 997136"/>
+                    <a:gd name="connsiteY8" fmla="*/ 0 h 634570"/>
+                    <a:gd name="connsiteX9" fmla="*/ 906483 w 997136"/>
+                    <a:gd name="connsiteY9" fmla="*/ 498591 h 634570"/>
+                    <a:gd name="connsiteX10" fmla="*/ 861157 w 997136"/>
+                    <a:gd name="connsiteY10" fmla="*/ 543917 h 634570"/>
+                    <a:gd name="connsiteX11" fmla="*/ 135979 w 997136"/>
+                    <a:gd name="connsiteY11" fmla="*/ 543917 h 634570"/>
+                    <a:gd name="connsiteX12" fmla="*/ 90653 w 997136"/>
+                    <a:gd name="connsiteY12" fmla="*/ 498591 h 634570"/>
+                    <a:gd name="connsiteX13" fmla="*/ 90653 w 997136"/>
+                    <a:gd name="connsiteY13" fmla="*/ 135979 h 634570"/>
+                    <a:gd name="connsiteX14" fmla="*/ 135979 w 997136"/>
+                    <a:gd name="connsiteY14" fmla="*/ 90653 h 634570"/>
+                    <a:gd name="connsiteX15" fmla="*/ 861157 w 997136"/>
+                    <a:gd name="connsiteY15" fmla="*/ 90653 h 634570"/>
+                    <a:gd name="connsiteX16" fmla="*/ 906483 w 997136"/>
+                    <a:gd name="connsiteY16" fmla="*/ 135979 h 634570"/>
+                  </a:gdLst>
+                  <a:ahLst/>
+                  <a:cxnLst>
+                    <a:cxn ang="0">
+                      <a:pos x="connsiteX0" y="connsiteY0"/>
+                    </a:cxn>
+                    <a:cxn ang="0">
+                      <a:pos x="connsiteX1" y="connsiteY1"/>
+                    </a:cxn>
+                    <a:cxn ang="0">
+                      <a:pos x="connsiteX2" y="connsiteY2"/>
+                    </a:cxn>
+                    <a:cxn ang="0">
+                      <a:pos x="connsiteX3" y="connsiteY3"/>
+                    </a:cxn>
+                    <a:cxn ang="0">
+                      <a:pos x="connsiteX4" y="connsiteY4"/>
+                    </a:cxn>
+                    <a:cxn ang="0">
+                      <a:pos x="connsiteX5" y="connsiteY5"/>
+                    </a:cxn>
+                    <a:cxn ang="0">
+                      <a:pos x="connsiteX6" y="connsiteY6"/>
+                    </a:cxn>
+                    <a:cxn ang="0">
+                      <a:pos x="connsiteX7" y="connsiteY7"/>
+                    </a:cxn>
+                    <a:cxn ang="0">
+                      <a:pos x="connsiteX8" y="connsiteY8"/>
+                    </a:cxn>
+                    <a:cxn ang="0">
+                      <a:pos x="connsiteX9" y="connsiteY9"/>
+                    </a:cxn>
+                    <a:cxn ang="0">
+                      <a:pos x="connsiteX10" y="connsiteY10"/>
+                    </a:cxn>
+                    <a:cxn ang="0">
+                      <a:pos x="connsiteX11" y="connsiteY11"/>
+                    </a:cxn>
+                    <a:cxn ang="0">
+                      <a:pos x="connsiteX12" y="connsiteY12"/>
+                    </a:cxn>
+                    <a:cxn ang="0">
+                      <a:pos x="connsiteX13" y="connsiteY13"/>
+                    </a:cxn>
+                    <a:cxn ang="0">
+                      <a:pos x="connsiteX14" y="connsiteY14"/>
+                    </a:cxn>
+                    <a:cxn ang="0">
+                      <a:pos x="connsiteX15" y="connsiteY15"/>
+                    </a:cxn>
+                    <a:cxn ang="0">
+                      <a:pos x="connsiteX16" y="connsiteY16"/>
+                    </a:cxn>
+                  </a:cxnLst>
+                  <a:rect l="l" t="t" r="r" b="b"/>
+                  <a:pathLst>
+                    <a:path w="997136" h="634570">
+                      <a:moveTo>
+                        <a:pt x="861157" y="0"/>
+                      </a:moveTo>
+                      <a:lnTo>
+                        <a:pt x="135979" y="0"/>
+                      </a:lnTo>
+                      <a:cubicBezTo>
+                        <a:pt x="60914" y="82"/>
+                        <a:pt x="82" y="60914"/>
+                        <a:pt x="0" y="135979"/>
+                      </a:cubicBezTo>
+                      <a:lnTo>
+                        <a:pt x="0" y="498591"/>
+                      </a:lnTo>
+                      <a:cubicBezTo>
+                        <a:pt x="82" y="573656"/>
+                        <a:pt x="60914" y="634489"/>
+                        <a:pt x="135979" y="634570"/>
+                      </a:cubicBezTo>
+                      <a:lnTo>
+                        <a:pt x="861157" y="634570"/>
+                      </a:lnTo>
+                      <a:cubicBezTo>
+                        <a:pt x="936222" y="634489"/>
+                        <a:pt x="997055" y="573656"/>
+                        <a:pt x="997136" y="498591"/>
+                      </a:cubicBezTo>
+                      <a:lnTo>
+                        <a:pt x="997136" y="135979"/>
+                      </a:lnTo>
+                      <a:cubicBezTo>
+                        <a:pt x="997055" y="60914"/>
+                        <a:pt x="936222" y="82"/>
+                        <a:pt x="861157" y="0"/>
+                      </a:cubicBezTo>
+                      <a:close/>
+                      <a:moveTo>
+                        <a:pt x="906483" y="498591"/>
+                      </a:moveTo>
+                      <a:cubicBezTo>
+                        <a:pt x="906452" y="523611"/>
+                        <a:pt x="886177" y="543885"/>
+                        <a:pt x="861157" y="543917"/>
+                      </a:cubicBezTo>
+                      <a:lnTo>
+                        <a:pt x="135979" y="543917"/>
+                      </a:lnTo>
+                      <a:cubicBezTo>
+                        <a:pt x="110959" y="543885"/>
+                        <a:pt x="90685" y="523611"/>
+                        <a:pt x="90653" y="498591"/>
+                      </a:cubicBezTo>
+                      <a:lnTo>
+                        <a:pt x="90653" y="135979"/>
+                      </a:lnTo>
+                      <a:cubicBezTo>
+                        <a:pt x="90685" y="110959"/>
+                        <a:pt x="110959" y="90685"/>
+                        <a:pt x="135979" y="90653"/>
+                      </a:cubicBezTo>
+                      <a:lnTo>
+                        <a:pt x="861157" y="90653"/>
+                      </a:lnTo>
+                      <a:cubicBezTo>
+                        <a:pt x="886177" y="90685"/>
+                        <a:pt x="906452" y="110959"/>
+                        <a:pt x="906483" y="135979"/>
+                      </a:cubicBezTo>
+                      <a:close/>
+                    </a:path>
+                  </a:pathLst>
+                </a:custGeom>
+                <a:solidFill>
+                  <a:srgbClr val="000000"/>
+                </a:solidFill>
+                <a:ln w="45244" cap="flat">
+                  <a:noFill/>
+                  <a:prstDash val="solid"/>
+                  <a:miter/>
+                </a:ln>
+              </p:spPr>
+              <p:txBody>
+                <a:bodyPr rtlCol="0" anchor="ctr"/>
+                <a:lstStyle/>
+                <a:p>
+                  <a:endParaRPr lang="en-US"/>
+                </a:p>
+              </p:txBody>
+            </p:sp>
+            <p:sp>
+              <p:nvSpPr>
+                <p:cNvPr id="13" name="Freeform: Shape 12">
+                  <a:extLst>
+                    <a:ext uri="{FF2B5EF4-FFF2-40B4-BE49-F238E27FC236}">
+                      <a16:creationId xmlns:a16="http://schemas.microsoft.com/office/drawing/2014/main" id="{16532F22-C3C1-6CDC-1608-CE1D7B7C724A}"/>
+                    </a:ext>
+                  </a:extLst>
+                </p:cNvPr>
+                <p:cNvSpPr/>
+                <p:nvPr/>
+              </p:nvSpPr>
+              <p:spPr>
+                <a:xfrm>
+                  <a:off x="7163469" y="1910333"/>
+                  <a:ext cx="3269160" cy="3671441"/>
+                </a:xfrm>
+                <a:custGeom>
+                  <a:avLst/>
+                  <a:gdLst>
+                    <a:gd name="connsiteX0" fmla="*/ 2606030 w 3269160"/>
+                    <a:gd name="connsiteY0" fmla="*/ 1035478 h 3671441"/>
+                    <a:gd name="connsiteX1" fmla="*/ 2609117 w 3269160"/>
+                    <a:gd name="connsiteY1" fmla="*/ 974518 h 3671441"/>
+                    <a:gd name="connsiteX2" fmla="*/ 1634598 w 3269160"/>
+                    <a:gd name="connsiteY2" fmla="*/ 0 h 3671441"/>
+                    <a:gd name="connsiteX3" fmla="*/ 660080 w 3269160"/>
+                    <a:gd name="connsiteY3" fmla="*/ 974518 h 3671441"/>
+                    <a:gd name="connsiteX4" fmla="*/ 662845 w 3269160"/>
+                    <a:gd name="connsiteY4" fmla="*/ 1029055 h 3671441"/>
+                    <a:gd name="connsiteX5" fmla="*/ 663525 w 3269160"/>
+                    <a:gd name="connsiteY5" fmla="*/ 1042508 h 3671441"/>
+                    <a:gd name="connsiteX6" fmla="*/ 883127 w 3269160"/>
+                    <a:gd name="connsiteY6" fmla="*/ 1594294 h 3671441"/>
+                    <a:gd name="connsiteX7" fmla="*/ 713125 w 3269160"/>
+                    <a:gd name="connsiteY7" fmla="*/ 1881500 h 3671441"/>
+                    <a:gd name="connsiteX8" fmla="*/ 741309 w 3269160"/>
+                    <a:gd name="connsiteY8" fmla="*/ 1947505 h 3671441"/>
+                    <a:gd name="connsiteX9" fmla="*/ 266619 w 3269160"/>
+                    <a:gd name="connsiteY9" fmla="*/ 2205634 h 3671441"/>
+                    <a:gd name="connsiteX10" fmla="*/ 77155 w 3269160"/>
+                    <a:gd name="connsiteY10" fmla="*/ 2528254 h 3671441"/>
+                    <a:gd name="connsiteX11" fmla="*/ 0 w 3269160"/>
+                    <a:gd name="connsiteY11" fmla="*/ 3477843 h 3671441"/>
+                    <a:gd name="connsiteX12" fmla="*/ 35300 w 3269160"/>
+                    <a:gd name="connsiteY12" fmla="*/ 3488291 h 3671441"/>
+                    <a:gd name="connsiteX13" fmla="*/ 1634113 w 3269160"/>
+                    <a:gd name="connsiteY13" fmla="*/ 3671442 h 3671441"/>
+                    <a:gd name="connsiteX14" fmla="*/ 3233860 w 3269160"/>
+                    <a:gd name="connsiteY14" fmla="*/ 3488277 h 3671441"/>
+                    <a:gd name="connsiteX15" fmla="*/ 3269160 w 3269160"/>
+                    <a:gd name="connsiteY15" fmla="*/ 3477852 h 3671441"/>
+                    <a:gd name="connsiteX16" fmla="*/ 3192318 w 3269160"/>
+                    <a:gd name="connsiteY16" fmla="*/ 2523917 h 3671441"/>
+                    <a:gd name="connsiteX17" fmla="*/ 3004418 w 3269160"/>
+                    <a:gd name="connsiteY17" fmla="*/ 2206364 h 3671441"/>
+                    <a:gd name="connsiteX18" fmla="*/ 2530271 w 3269160"/>
+                    <a:gd name="connsiteY18" fmla="*/ 1943471 h 3671441"/>
+                    <a:gd name="connsiteX19" fmla="*/ 2448176 w 3269160"/>
+                    <a:gd name="connsiteY19" fmla="*/ 1620135 h 3671441"/>
+                    <a:gd name="connsiteX20" fmla="*/ 2386056 w 3269160"/>
+                    <a:gd name="connsiteY20" fmla="*/ 1594330 h 3671441"/>
+                    <a:gd name="connsiteX21" fmla="*/ 2605672 w 3269160"/>
+                    <a:gd name="connsiteY21" fmla="*/ 1042508 h 3671441"/>
+                    <a:gd name="connsiteX22" fmla="*/ 3004649 w 3269160"/>
+                    <a:gd name="connsiteY22" fmla="*/ 2331547 h 3671441"/>
+                    <a:gd name="connsiteX23" fmla="*/ 2770506 w 3269160"/>
+                    <a:gd name="connsiteY23" fmla="*/ 2532239 h 3671441"/>
+                    <a:gd name="connsiteX24" fmla="*/ 2652539 w 3269160"/>
+                    <a:gd name="connsiteY24" fmla="*/ 2394596 h 3671441"/>
+                    <a:gd name="connsiteX25" fmla="*/ 2862038 w 3269160"/>
+                    <a:gd name="connsiteY25" fmla="*/ 2215012 h 3671441"/>
+                    <a:gd name="connsiteX26" fmla="*/ 2948113 w 3269160"/>
+                    <a:gd name="connsiteY26" fmla="*/ 2277450 h 3671441"/>
+                    <a:gd name="connsiteX27" fmla="*/ 3004649 w 3269160"/>
+                    <a:gd name="connsiteY27" fmla="*/ 2331547 h 3671441"/>
+                    <a:gd name="connsiteX28" fmla="*/ 753543 w 3269160"/>
+                    <a:gd name="connsiteY28" fmla="*/ 1029912 h 3671441"/>
+                    <a:gd name="connsiteX29" fmla="*/ 954570 w 3269160"/>
+                    <a:gd name="connsiteY29" fmla="*/ 729112 h 3671441"/>
+                    <a:gd name="connsiteX30" fmla="*/ 954570 w 3269160"/>
+                    <a:gd name="connsiteY30" fmla="*/ 1223814 h 3671441"/>
+                    <a:gd name="connsiteX31" fmla="*/ 1190127 w 3269160"/>
+                    <a:gd name="connsiteY31" fmla="*/ 1737254 h 3671441"/>
+                    <a:gd name="connsiteX32" fmla="*/ 753543 w 3269160"/>
+                    <a:gd name="connsiteY32" fmla="*/ 1029912 h 3671441"/>
+                    <a:gd name="connsiteX33" fmla="*/ 2223711 w 3269160"/>
+                    <a:gd name="connsiteY33" fmla="*/ 1223814 h 3671441"/>
+                    <a:gd name="connsiteX34" fmla="*/ 2194878 w 3269160"/>
+                    <a:gd name="connsiteY34" fmla="*/ 1405120 h 3671441"/>
+                    <a:gd name="connsiteX35" fmla="*/ 1946943 w 3269160"/>
+                    <a:gd name="connsiteY35" fmla="*/ 1405120 h 3671441"/>
+                    <a:gd name="connsiteX36" fmla="*/ 1868981 w 3269160"/>
+                    <a:gd name="connsiteY36" fmla="*/ 1359793 h 3671441"/>
+                    <a:gd name="connsiteX37" fmla="*/ 1778328 w 3269160"/>
+                    <a:gd name="connsiteY37" fmla="*/ 1359793 h 3671441"/>
+                    <a:gd name="connsiteX38" fmla="*/ 1687676 w 3269160"/>
+                    <a:gd name="connsiteY38" fmla="*/ 1450446 h 3671441"/>
+                    <a:gd name="connsiteX39" fmla="*/ 1778328 w 3269160"/>
+                    <a:gd name="connsiteY39" fmla="*/ 1541099 h 3671441"/>
+                    <a:gd name="connsiteX40" fmla="*/ 1868981 w 3269160"/>
+                    <a:gd name="connsiteY40" fmla="*/ 1541099 h 3671441"/>
+                    <a:gd name="connsiteX41" fmla="*/ 1946943 w 3269160"/>
+                    <a:gd name="connsiteY41" fmla="*/ 1495773 h 3671441"/>
+                    <a:gd name="connsiteX42" fmla="*/ 2156686 w 3269160"/>
+                    <a:gd name="connsiteY42" fmla="*/ 1495773 h 3671441"/>
+                    <a:gd name="connsiteX43" fmla="*/ 1362517 w 3269160"/>
+                    <a:gd name="connsiteY43" fmla="*/ 1746677 h 3671441"/>
+                    <a:gd name="connsiteX44" fmla="*/ 1045228 w 3269160"/>
+                    <a:gd name="connsiteY44" fmla="*/ 1223814 h 3671441"/>
+                    <a:gd name="connsiteX45" fmla="*/ 1045228 w 3269160"/>
+                    <a:gd name="connsiteY45" fmla="*/ 675872 h 3671441"/>
+                    <a:gd name="connsiteX46" fmla="*/ 1634598 w 3269160"/>
+                    <a:gd name="connsiteY46" fmla="*/ 543917 h 3671441"/>
+                    <a:gd name="connsiteX47" fmla="*/ 2223711 w 3269160"/>
+                    <a:gd name="connsiteY47" fmla="*/ 676030 h 3671441"/>
+                    <a:gd name="connsiteX48" fmla="*/ 2314363 w 3269160"/>
+                    <a:gd name="connsiteY48" fmla="*/ 1223814 h 3671441"/>
+                    <a:gd name="connsiteX49" fmla="*/ 2314363 w 3269160"/>
+                    <a:gd name="connsiteY49" fmla="*/ 729411 h 3671441"/>
+                    <a:gd name="connsiteX50" fmla="*/ 2515355 w 3269160"/>
+                    <a:gd name="connsiteY50" fmla="*/ 1035922 h 3671441"/>
+                    <a:gd name="connsiteX51" fmla="*/ 2078267 w 3269160"/>
+                    <a:gd name="connsiteY51" fmla="*/ 1737743 h 3671441"/>
+                    <a:gd name="connsiteX52" fmla="*/ 2314363 w 3269160"/>
+                    <a:gd name="connsiteY52" fmla="*/ 1223814 h 3671441"/>
+                    <a:gd name="connsiteX53" fmla="*/ 1634598 w 3269160"/>
+                    <a:gd name="connsiteY53" fmla="*/ 90653 h 3671441"/>
+                    <a:gd name="connsiteX54" fmla="*/ 2492669 w 3269160"/>
+                    <a:gd name="connsiteY54" fmla="*/ 766316 h 3671441"/>
+                    <a:gd name="connsiteX55" fmla="*/ 1634598 w 3269160"/>
+                    <a:gd name="connsiteY55" fmla="*/ 453264 h 3671441"/>
+                    <a:gd name="connsiteX56" fmla="*/ 776895 w 3269160"/>
+                    <a:gd name="connsiteY56" fmla="*/ 764897 h 3671441"/>
+                    <a:gd name="connsiteX57" fmla="*/ 1634598 w 3269160"/>
+                    <a:gd name="connsiteY57" fmla="*/ 90653 h 3671441"/>
+                    <a:gd name="connsiteX58" fmla="*/ 816955 w 3269160"/>
+                    <a:gd name="connsiteY58" fmla="*/ 1748368 h 3671441"/>
+                    <a:gd name="connsiteX59" fmla="*/ 907231 w 3269160"/>
+                    <a:gd name="connsiteY59" fmla="*/ 1681484 h 3671441"/>
+                    <a:gd name="connsiteX60" fmla="*/ 943062 w 3269160"/>
+                    <a:gd name="connsiteY60" fmla="*/ 1677078 h 3671441"/>
+                    <a:gd name="connsiteX61" fmla="*/ 962434 w 3269160"/>
+                    <a:gd name="connsiteY61" fmla="*/ 1678393 h 3671441"/>
+                    <a:gd name="connsiteX62" fmla="*/ 2306554 w 3269160"/>
+                    <a:gd name="connsiteY62" fmla="*/ 1678588 h 3671441"/>
+                    <a:gd name="connsiteX63" fmla="*/ 2471873 w 3269160"/>
+                    <a:gd name="connsiteY63" fmla="*/ 1804088 h 3671441"/>
+                    <a:gd name="connsiteX64" fmla="*/ 2401961 w 3269160"/>
+                    <a:gd name="connsiteY64" fmla="*/ 1949857 h 3671441"/>
+                    <a:gd name="connsiteX65" fmla="*/ 1634598 w 3269160"/>
+                    <a:gd name="connsiteY65" fmla="*/ 2130343 h 3671441"/>
+                    <a:gd name="connsiteX66" fmla="*/ 867222 w 3269160"/>
+                    <a:gd name="connsiteY66" fmla="*/ 1949835 h 3671441"/>
+                    <a:gd name="connsiteX67" fmla="*/ 816955 w 3269160"/>
+                    <a:gd name="connsiteY67" fmla="*/ 1748368 h 3671441"/>
+                    <a:gd name="connsiteX68" fmla="*/ 319755 w 3269160"/>
+                    <a:gd name="connsiteY68" fmla="*/ 2279050 h 3671441"/>
+                    <a:gd name="connsiteX69" fmla="*/ 412004 w 3269160"/>
+                    <a:gd name="connsiteY69" fmla="*/ 2219146 h 3671441"/>
+                    <a:gd name="connsiteX70" fmla="*/ 616657 w 3269160"/>
+                    <a:gd name="connsiteY70" fmla="*/ 2394560 h 3671441"/>
+                    <a:gd name="connsiteX71" fmla="*/ 498695 w 3269160"/>
+                    <a:gd name="connsiteY71" fmla="*/ 2532220 h 3671441"/>
+                    <a:gd name="connsiteX72" fmla="*/ 263940 w 3269160"/>
+                    <a:gd name="connsiteY72" fmla="*/ 2331007 h 3671441"/>
+                    <a:gd name="connsiteX73" fmla="*/ 319755 w 3269160"/>
+                    <a:gd name="connsiteY73" fmla="*/ 2279050 h 3671441"/>
+                    <a:gd name="connsiteX74" fmla="*/ 2584899 w 3269160"/>
+                    <a:gd name="connsiteY74" fmla="*/ 3519847 h 3671441"/>
+                    <a:gd name="connsiteX75" fmla="*/ 2540819 w 3269160"/>
+                    <a:gd name="connsiteY75" fmla="*/ 3167185 h 3671441"/>
+                    <a:gd name="connsiteX76" fmla="*/ 2489722 w 3269160"/>
+                    <a:gd name="connsiteY76" fmla="*/ 3128481 h 3671441"/>
+                    <a:gd name="connsiteX77" fmla="*/ 2450873 w 3269160"/>
+                    <a:gd name="connsiteY77" fmla="*/ 3178426 h 3671441"/>
+                    <a:gd name="connsiteX78" fmla="*/ 2494949 w 3269160"/>
+                    <a:gd name="connsiteY78" fmla="*/ 3531007 h 3671441"/>
+                    <a:gd name="connsiteX79" fmla="*/ 1634113 w 3269160"/>
+                    <a:gd name="connsiteY79" fmla="*/ 3580789 h 3671441"/>
+                    <a:gd name="connsiteX80" fmla="*/ 774248 w 3269160"/>
+                    <a:gd name="connsiteY80" fmla="*/ 3531029 h 3671441"/>
+                    <a:gd name="connsiteX81" fmla="*/ 818324 w 3269160"/>
+                    <a:gd name="connsiteY81" fmla="*/ 3178426 h 3671441"/>
+                    <a:gd name="connsiteX82" fmla="*/ 779792 w 3269160"/>
+                    <a:gd name="connsiteY82" fmla="*/ 3127198 h 3671441"/>
+                    <a:gd name="connsiteX83" fmla="*/ 728564 w 3269160"/>
+                    <a:gd name="connsiteY83" fmla="*/ 3165730 h 3671441"/>
+                    <a:gd name="connsiteX84" fmla="*/ 728382 w 3269160"/>
+                    <a:gd name="connsiteY84" fmla="*/ 3167185 h 3671441"/>
+                    <a:gd name="connsiteX85" fmla="*/ 684298 w 3269160"/>
+                    <a:gd name="connsiteY85" fmla="*/ 3519861 h 3671441"/>
+                    <a:gd name="connsiteX86" fmla="*/ 96414 w 3269160"/>
+                    <a:gd name="connsiteY86" fmla="*/ 3410905 h 3671441"/>
+                    <a:gd name="connsiteX87" fmla="*/ 167123 w 3269160"/>
+                    <a:gd name="connsiteY87" fmla="*/ 2538988 h 3671441"/>
+                    <a:gd name="connsiteX88" fmla="*/ 212350 w 3269160"/>
+                    <a:gd name="connsiteY88" fmla="*/ 2406181 h 3671441"/>
+                    <a:gd name="connsiteX89" fmla="*/ 474119 w 3269160"/>
+                    <a:gd name="connsiteY89" fmla="*/ 2630547 h 3671441"/>
+                    <a:gd name="connsiteX90" fmla="*/ 503622 w 3269160"/>
+                    <a:gd name="connsiteY90" fmla="*/ 2641462 h 3671441"/>
+                    <a:gd name="connsiteX91" fmla="*/ 507094 w 3269160"/>
+                    <a:gd name="connsiteY91" fmla="*/ 2641326 h 3671441"/>
+                    <a:gd name="connsiteX92" fmla="*/ 538034 w 3269160"/>
+                    <a:gd name="connsiteY92" fmla="*/ 2625634 h 3671441"/>
+                    <a:gd name="connsiteX93" fmla="*/ 715002 w 3269160"/>
+                    <a:gd name="connsiteY93" fmla="*/ 2419145 h 3671441"/>
+                    <a:gd name="connsiteX94" fmla="*/ 710089 w 3269160"/>
+                    <a:gd name="connsiteY94" fmla="*/ 2355234 h 3671441"/>
+                    <a:gd name="connsiteX95" fmla="*/ 493909 w 3269160"/>
+                    <a:gd name="connsiteY95" fmla="*/ 2169922 h 3671441"/>
+                    <a:gd name="connsiteX96" fmla="*/ 808538 w 3269160"/>
+                    <a:gd name="connsiteY96" fmla="*/ 2018531 h 3671441"/>
+                    <a:gd name="connsiteX97" fmla="*/ 820594 w 3269160"/>
+                    <a:gd name="connsiteY97" fmla="*/ 2027533 h 3671441"/>
+                    <a:gd name="connsiteX98" fmla="*/ 1634598 w 3269160"/>
+                    <a:gd name="connsiteY98" fmla="*/ 2220996 h 3671441"/>
+                    <a:gd name="connsiteX99" fmla="*/ 2448616 w 3269160"/>
+                    <a:gd name="connsiteY99" fmla="*/ 2027560 h 3671441"/>
+                    <a:gd name="connsiteX100" fmla="*/ 2464480 w 3269160"/>
+                    <a:gd name="connsiteY100" fmla="*/ 2015717 h 3671441"/>
+                    <a:gd name="connsiteX101" fmla="*/ 2781874 w 3269160"/>
+                    <a:gd name="connsiteY101" fmla="*/ 2164306 h 3671441"/>
+                    <a:gd name="connsiteX102" fmla="*/ 2559122 w 3269160"/>
+                    <a:gd name="connsiteY102" fmla="*/ 2355248 h 3671441"/>
+                    <a:gd name="connsiteX103" fmla="*/ 2554208 w 3269160"/>
+                    <a:gd name="connsiteY103" fmla="*/ 2419158 h 3671441"/>
+                    <a:gd name="connsiteX104" fmla="*/ 2731176 w 3269160"/>
+                    <a:gd name="connsiteY104" fmla="*/ 2625647 h 3671441"/>
+                    <a:gd name="connsiteX105" fmla="*/ 2762116 w 3269160"/>
+                    <a:gd name="connsiteY105" fmla="*/ 2641339 h 3671441"/>
+                    <a:gd name="connsiteX106" fmla="*/ 2765593 w 3269160"/>
+                    <a:gd name="connsiteY106" fmla="*/ 2641475 h 3671441"/>
+                    <a:gd name="connsiteX107" fmla="*/ 2795091 w 3269160"/>
+                    <a:gd name="connsiteY107" fmla="*/ 2630561 h 3671441"/>
+                    <a:gd name="connsiteX108" fmla="*/ 3056357 w 3269160"/>
+                    <a:gd name="connsiteY108" fmla="*/ 2406621 h 3671441"/>
+                    <a:gd name="connsiteX109" fmla="*/ 3102531 w 3269160"/>
+                    <a:gd name="connsiteY109" fmla="*/ 2535561 h 3671441"/>
+                    <a:gd name="connsiteX110" fmla="*/ 3172819 w 3269160"/>
+                    <a:gd name="connsiteY110" fmla="*/ 3410905 h 3671441"/>
+                    <a:gd name="connsiteX111" fmla="*/ 2584899 w 3269160"/>
+                    <a:gd name="connsiteY111" fmla="*/ 3519847 h 3671441"/>
+                  </a:gdLst>
+                  <a:ahLst/>
+                  <a:cxnLst>
+                    <a:cxn ang="0">
+                      <a:pos x="connsiteX0" y="connsiteY0"/>
+                    </a:cxn>
+                    <a:cxn ang="0">
+                      <a:pos x="connsiteX1" y="connsiteY1"/>
+                    </a:cxn>
+                    <a:cxn ang="0">
+                      <a:pos x="connsiteX2" y="connsiteY2"/>
+                    </a:cxn>
+                    <a:cxn ang="0">
+                      <a:pos x="connsiteX3" y="connsiteY3"/>
+                    </a:cxn>
+                    <a:cxn ang="0">
+                      <a:pos x="connsiteX4" y="connsiteY4"/>
+                    </a:cxn>
+                    <a:cxn ang="0">
+                      <a:pos x="connsiteX5" y="connsiteY5"/>
+                    </a:cxn>
+                    <a:cxn ang="0">
+                      <a:pos x="connsiteX6" y="connsiteY6"/>
+                    </a:cxn>
+                    <a:cxn ang="0">
+                      <a:pos x="connsiteX7" y="connsiteY7"/>
+                    </a:cxn>
+                    <a:cxn ang="0">
+                      <a:pos x="connsiteX8" y="connsiteY8"/>
+                    </a:cxn>
+                    <a:cxn ang="0">
+                      <a:pos x="connsiteX9" y="connsiteY9"/>
+                    </a:cxn>
+                    <a:cxn ang="0">
+                      <a:pos x="connsiteX10" y="connsiteY10"/>
+                    </a:cxn>
+                    <a:cxn ang="0">
+                      <a:pos x="connsiteX11" y="connsiteY11"/>
+                    </a:cxn>
+                    <a:cxn ang="0">
+                      <a:pos x="connsiteX12" y="connsiteY12"/>
+                    </a:cxn>
+                    <a:cxn ang="0">
+                      <a:pos x="connsiteX13" y="connsiteY13"/>
+                    </a:cxn>
+                    <a:cxn ang="0">
+                      <a:pos x="connsiteX14" y="connsiteY14"/>
+                    </a:cxn>
+                    <a:cxn ang="0">
+                      <a:pos x="connsiteX15" y="connsiteY15"/>
+                    </a:cxn>
+                    <a:cxn ang="0">
+                      <a:pos x="connsiteX16" y="connsiteY16"/>
+                    </a:cxn>
+                    <a:cxn ang="0">
+                      <a:pos x="connsiteX17" y="connsiteY17"/>
+                    </a:cxn>
+                    <a:cxn ang="0">
+                      <a:pos x="connsiteX18" y="connsiteY18"/>
+                    </a:cxn>
+                    <a:cxn ang="0">
+                      <a:pos x="connsiteX19" y="connsiteY19"/>
+                    </a:cxn>
+                    <a:cxn ang="0">
+                      <a:pos x="connsiteX20" y="connsiteY20"/>
+                    </a:cxn>
+                    <a:cxn ang="0">
+                      <a:pos x="connsiteX21" y="connsiteY21"/>
+                    </a:cxn>
+                    <a:cxn ang="0">
+                      <a:pos x="connsiteX22" y="connsiteY22"/>
+                    </a:cxn>
+                    <a:cxn ang="0">
+                      <a:pos x="connsiteX23" y="connsiteY23"/>
+                    </a:cxn>
+                    <a:cxn ang="0">
+                      <a:pos x="connsiteX24" y="connsiteY24"/>
+                    </a:cxn>
+                    <a:cxn ang="0">
+                      <a:pos x="connsiteX25" y="connsiteY25"/>
+                    </a:cxn>
+                    <a:cxn ang="0">
+                      <a:pos x="connsiteX26" y="connsiteY26"/>
+                    </a:cxn>
+                    <a:cxn ang="0">
+                      <a:pos x="connsiteX27" y="connsiteY27"/>
+                    </a:cxn>
+                    <a:cxn ang="0">
+                      <a:pos x="connsiteX28" y="connsiteY28"/>
+                    </a:cxn>
+                    <a:cxn ang="0">
+                      <a:pos x="connsiteX29" y="connsiteY29"/>
+                    </a:cxn>
+                    <a:cxn ang="0">
+                      <a:pos x="connsiteX30" y="connsiteY30"/>
+                    </a:cxn>
+                    <a:cxn ang="0">
+                      <a:pos x="connsiteX31" y="connsiteY31"/>
+                    </a:cxn>
+                    <a:cxn ang="0">
+                      <a:pos x="connsiteX32" y="connsiteY32"/>
+                    </a:cxn>
+                    <a:cxn ang="0">
+                      <a:pos x="connsiteX33" y="connsiteY33"/>
+                    </a:cxn>
+                    <a:cxn ang="0">
+                      <a:pos x="connsiteX34" y="connsiteY34"/>
+                    </a:cxn>
+                    <a:cxn ang="0">
+                      <a:pos x="connsiteX35" y="connsiteY35"/>
+                    </a:cxn>
+                    <a:cxn ang="0">
+                      <a:pos x="connsiteX36" y="connsiteY36"/>
+                    </a:cxn>
+                    <a:cxn ang="0">
+                      <a:pos x="connsiteX37" y="connsiteY37"/>
+                    </a:cxn>
+                    <a:cxn ang="0">
+                      <a:pos x="connsiteX38" y="connsiteY38"/>
+                    </a:cxn>
+                    <a:cxn ang="0">
+                      <a:pos x="connsiteX39" y="connsiteY39"/>
+                    </a:cxn>
+                    <a:cxn ang="0">
+                      <a:pos x="connsiteX40" y="connsiteY40"/>
+                    </a:cxn>
+                    <a:cxn ang="0">
+                      <a:pos x="connsiteX41" y="connsiteY41"/>
+                    </a:cxn>
+                    <a:cxn ang="0">
+                      <a:pos x="connsiteX42" y="connsiteY42"/>
+                    </a:cxn>
+                    <a:cxn ang="0">
+                      <a:pos x="connsiteX43" y="connsiteY43"/>
+                    </a:cxn>
+                    <a:cxn ang="0">
+                      <a:pos x="connsiteX44" y="connsiteY44"/>
+                    </a:cxn>
+                    <a:cxn ang="0">
+                      <a:pos x="connsiteX45" y="connsiteY45"/>
+                    </a:cxn>
+                    <a:cxn ang="0">
+                      <a:pos x="connsiteX46" y="connsiteY46"/>
+                    </a:cxn>
+                    <a:cxn ang="0">
+                      <a:pos x="connsiteX47" y="connsiteY47"/>
+                    </a:cxn>
+                    <a:cxn ang="0">
+                      <a:pos x="connsiteX48" y="connsiteY48"/>
+                    </a:cxn>
+                    <a:cxn ang="0">
+                      <a:pos x="connsiteX49" y="connsiteY49"/>
+                    </a:cxn>
+                    <a:cxn ang="0">
+                      <a:pos x="connsiteX50" y="connsiteY50"/>
+                    </a:cxn>
+                    <a:cxn ang="0">
+                      <a:pos x="connsiteX51" y="connsiteY51"/>
+                    </a:cxn>
+                    <a:cxn ang="0">
+                      <a:pos x="connsiteX52" y="connsiteY52"/>
+                    </a:cxn>
+                    <a:cxn ang="0">
+                      <a:pos x="connsiteX53" y="connsiteY53"/>
+                    </a:cxn>
+                    <a:cxn ang="0">
+                      <a:pos x="connsiteX54" y="connsiteY54"/>
+                    </a:cxn>
+                    <a:cxn ang="0">
+                      <a:pos x="connsiteX55" y="connsiteY55"/>
+                    </a:cxn>
+                    <a:cxn ang="0">
+                      <a:pos x="connsiteX56" y="connsiteY56"/>
+                    </a:cxn>
+                    <a:cxn ang="0">
+                      <a:pos x="connsiteX57" y="connsiteY57"/>
+                    </a:cxn>
+                    <a:cxn ang="0">
+                      <a:pos x="connsiteX58" y="connsiteY58"/>
+                    </a:cxn>
+                    <a:cxn ang="0">
+                      <a:pos x="connsiteX59" y="connsiteY59"/>
+                    </a:cxn>
+                    <a:cxn ang="0">
+                      <a:pos x="connsiteX60" y="connsiteY60"/>
+                    </a:cxn>
+                    <a:cxn ang="0">
+                      <a:pos x="connsiteX61" y="connsiteY61"/>
+                    </a:cxn>
+                    <a:cxn ang="0">
+                      <a:pos x="connsiteX62" y="connsiteY62"/>
+                    </a:cxn>
+                    <a:cxn ang="0">
+                      <a:pos x="connsiteX63" y="connsiteY63"/>
+                    </a:cxn>
+                    <a:cxn ang="0">
+                      <a:pos x="connsiteX64" y="connsiteY64"/>
+                    </a:cxn>
+                    <a:cxn ang="0">
+                      <a:pos x="connsiteX65" y="connsiteY65"/>
+                    </a:cxn>
+                    <a:cxn ang="0">
+                      <a:pos x="connsiteX66" y="connsiteY66"/>
+                    </a:cxn>
+                    <a:cxn ang="0">
+                      <a:pos x="connsiteX67" y="connsiteY67"/>
+                    </a:cxn>
+                    <a:cxn ang="0">
+                      <a:pos x="connsiteX68" y="connsiteY68"/>
+                    </a:cxn>
+                    <a:cxn ang="0">
+                      <a:pos x="connsiteX69" y="connsiteY69"/>
+                    </a:cxn>
+                    <a:cxn ang="0">
+                      <a:pos x="connsiteX70" y="connsiteY70"/>
+                    </a:cxn>
+                    <a:cxn ang="0">
+                      <a:pos x="connsiteX71" y="connsiteY71"/>
+                    </a:cxn>
+                    <a:cxn ang="0">
+                      <a:pos x="connsiteX72" y="connsiteY72"/>
+                    </a:cxn>
+                    <a:cxn ang="0">
+                      <a:pos x="connsiteX73" y="connsiteY73"/>
+                    </a:cxn>
+                    <a:cxn ang="0">
+                      <a:pos x="connsiteX74" y="connsiteY74"/>
+                    </a:cxn>
+                    <a:cxn ang="0">
+                      <a:pos x="connsiteX75" y="connsiteY75"/>
+                    </a:cxn>
+                    <a:cxn ang="0">
+                      <a:pos x="connsiteX76" y="connsiteY76"/>
+                    </a:cxn>
+                    <a:cxn ang="0">
+                      <a:pos x="connsiteX77" y="connsiteY77"/>
+                    </a:cxn>
+                    <a:cxn ang="0">
+                      <a:pos x="connsiteX78" y="connsiteY78"/>
+                    </a:cxn>
+                    <a:cxn ang="0">
+                      <a:pos x="connsiteX79" y="connsiteY79"/>
+                    </a:cxn>
+                    <a:cxn ang="0">
+                      <a:pos x="connsiteX80" y="connsiteY80"/>
+                    </a:cxn>
+                    <a:cxn ang="0">
+                      <a:pos x="connsiteX81" y="connsiteY81"/>
+                    </a:cxn>
+                    <a:cxn ang="0">
+                      <a:pos x="connsiteX82" y="connsiteY82"/>
+                    </a:cxn>
+                    <a:cxn ang="0">
+                      <a:pos x="connsiteX83" y="connsiteY83"/>
+                    </a:cxn>
+                    <a:cxn ang="0">
+                      <a:pos x="connsiteX84" y="connsiteY84"/>
+                    </a:cxn>
+                    <a:cxn ang="0">
+                      <a:pos x="connsiteX85" y="connsiteY85"/>
+                    </a:cxn>
+                    <a:cxn ang="0">
+                      <a:pos x="connsiteX86" y="connsiteY86"/>
+                    </a:cxn>
+                    <a:cxn ang="0">
+                      <a:pos x="connsiteX87" y="connsiteY87"/>
+                    </a:cxn>
+                    <a:cxn ang="0">
+                      <a:pos x="connsiteX88" y="connsiteY88"/>
+                    </a:cxn>
+                    <a:cxn ang="0">
+                      <a:pos x="connsiteX89" y="connsiteY89"/>
+                    </a:cxn>
+                    <a:cxn ang="0">
+                      <a:pos x="connsiteX90" y="connsiteY90"/>
+                    </a:cxn>
+                    <a:cxn ang="0">
+                      <a:pos x="connsiteX91" y="connsiteY91"/>
+                    </a:cxn>
+                    <a:cxn ang="0">
+                      <a:pos x="connsiteX92" y="connsiteY92"/>
+                    </a:cxn>
+                    <a:cxn ang="0">
+                      <a:pos x="connsiteX93" y="connsiteY93"/>
+                    </a:cxn>
+                    <a:cxn ang="0">
+                      <a:pos x="connsiteX94" y="connsiteY94"/>
+                    </a:cxn>
+                    <a:cxn ang="0">
+                      <a:pos x="connsiteX95" y="connsiteY95"/>
+                    </a:cxn>
+                    <a:cxn ang="0">
+                      <a:pos x="connsiteX96" y="connsiteY96"/>
+                    </a:cxn>
+                    <a:cxn ang="0">
+                      <a:pos x="connsiteX97" y="connsiteY97"/>
+                    </a:cxn>
+                    <a:cxn ang="0">
+                      <a:pos x="connsiteX98" y="connsiteY98"/>
+                    </a:cxn>
+                    <a:cxn ang="0">
+                      <a:pos x="connsiteX99" y="connsiteY99"/>
+                    </a:cxn>
+                    <a:cxn ang="0">
+                      <a:pos x="connsiteX100" y="connsiteY100"/>
+                    </a:cxn>
+                    <a:cxn ang="0">
+                      <a:pos x="connsiteX101" y="connsiteY101"/>
+                    </a:cxn>
+                    <a:cxn ang="0">
+                      <a:pos x="connsiteX102" y="connsiteY102"/>
+                    </a:cxn>
+                    <a:cxn ang="0">
+                      <a:pos x="connsiteX103" y="connsiteY103"/>
+                    </a:cxn>
+                    <a:cxn ang="0">
+                      <a:pos x="connsiteX104" y="connsiteY104"/>
+                    </a:cxn>
+                    <a:cxn ang="0">
+                      <a:pos x="connsiteX105" y="connsiteY105"/>
+                    </a:cxn>
+                    <a:cxn ang="0">
+                      <a:pos x="connsiteX106" y="connsiteY106"/>
+                    </a:cxn>
+                    <a:cxn ang="0">
+                      <a:pos x="connsiteX107" y="connsiteY107"/>
+                    </a:cxn>
+                    <a:cxn ang="0">
+                      <a:pos x="connsiteX108" y="connsiteY108"/>
+                    </a:cxn>
+                    <a:cxn ang="0">
+                      <a:pos x="connsiteX109" y="connsiteY109"/>
+                    </a:cxn>
+                    <a:cxn ang="0">
+                      <a:pos x="connsiteX110" y="connsiteY110"/>
+                    </a:cxn>
+                    <a:cxn ang="0">
+                      <a:pos x="connsiteX111" y="connsiteY111"/>
+                    </a:cxn>
+                  </a:cxnLst>
+                  <a:rect l="l" t="t" r="r" b="b"/>
+                  <a:pathLst>
+                    <a:path w="3269160" h="3671441">
+                      <a:moveTo>
+                        <a:pt x="2606030" y="1035478"/>
+                      </a:moveTo>
+                      <a:cubicBezTo>
+                        <a:pt x="2607295" y="1015213"/>
+                        <a:pt x="2609117" y="995097"/>
+                        <a:pt x="2609117" y="974518"/>
+                      </a:cubicBezTo>
+                      <a:cubicBezTo>
+                        <a:pt x="2609117" y="436308"/>
+                        <a:pt x="2172809" y="0"/>
+                        <a:pt x="1634598" y="0"/>
+                      </a:cubicBezTo>
+                      <a:cubicBezTo>
+                        <a:pt x="1096388" y="0"/>
+                        <a:pt x="660080" y="436308"/>
+                        <a:pt x="660080" y="974518"/>
+                      </a:cubicBezTo>
+                      <a:cubicBezTo>
+                        <a:pt x="660080" y="992925"/>
+                        <a:pt x="661834" y="1010897"/>
+                        <a:pt x="662845" y="1029055"/>
+                      </a:cubicBezTo>
+                      <a:lnTo>
+                        <a:pt x="663525" y="1042508"/>
+                      </a:lnTo>
+                      <a:cubicBezTo>
+                        <a:pt x="677218" y="1244877"/>
+                        <a:pt x="754019" y="1437859"/>
+                        <a:pt x="883127" y="1594294"/>
+                      </a:cubicBezTo>
+                      <a:cubicBezTo>
+                        <a:pt x="756870" y="1626657"/>
+                        <a:pt x="680758" y="1755244"/>
+                        <a:pt x="713125" y="1881500"/>
+                      </a:cubicBezTo>
+                      <a:cubicBezTo>
+                        <a:pt x="719099" y="1904812"/>
+                        <a:pt x="728604" y="1927067"/>
+                        <a:pt x="741309" y="1947505"/>
+                      </a:cubicBezTo>
+                      <a:cubicBezTo>
+                        <a:pt x="574155" y="2016011"/>
+                        <a:pt x="414982" y="2102571"/>
+                        <a:pt x="266619" y="2205634"/>
+                      </a:cubicBezTo>
+                      <a:cubicBezTo>
+                        <a:pt x="163560" y="2284131"/>
+                        <a:pt x="95507" y="2400012"/>
+                        <a:pt x="77155" y="2528254"/>
+                      </a:cubicBezTo>
+                      <a:lnTo>
+                        <a:pt x="0" y="3477843"/>
+                      </a:lnTo>
+                      <a:lnTo>
+                        <a:pt x="35300" y="3488291"/>
+                      </a:lnTo>
+                      <a:cubicBezTo>
+                        <a:pt x="41510" y="3490136"/>
+                        <a:pt x="666122" y="3671442"/>
+                        <a:pt x="1634113" y="3671442"/>
+                      </a:cubicBezTo>
+                      <a:cubicBezTo>
+                        <a:pt x="2602105" y="3671442"/>
+                        <a:pt x="3227641" y="3490136"/>
+                        <a:pt x="3233860" y="3488277"/>
+                      </a:cubicBezTo>
+                      <a:lnTo>
+                        <a:pt x="3269160" y="3477852"/>
+                      </a:lnTo>
+                      <a:lnTo>
+                        <a:pt x="3192318" y="2523917"/>
+                      </a:lnTo>
+                      <a:cubicBezTo>
+                        <a:pt x="3170603" y="2398657"/>
+                        <a:pt x="3103760" y="2285690"/>
+                        <a:pt x="3004418" y="2206364"/>
+                      </a:cubicBezTo>
+                      <a:cubicBezTo>
+                        <a:pt x="2860334" y="2095623"/>
+                        <a:pt x="2700527" y="2007014"/>
+                        <a:pt x="2530271" y="1943471"/>
+                      </a:cubicBezTo>
+                      <a:cubicBezTo>
+                        <a:pt x="2596888" y="1831514"/>
+                        <a:pt x="2560133" y="1686751"/>
+                        <a:pt x="2448176" y="1620135"/>
+                      </a:cubicBezTo>
+                      <a:cubicBezTo>
+                        <a:pt x="2428808" y="1608608"/>
+                        <a:pt x="2407890" y="1599919"/>
+                        <a:pt x="2386056" y="1594330"/>
+                      </a:cubicBezTo>
+                      <a:cubicBezTo>
+                        <a:pt x="2515173" y="1437886"/>
+                        <a:pt x="2591983" y="1244891"/>
+                        <a:pt x="2605672" y="1042508"/>
+                      </a:cubicBezTo>
+                      <a:close/>
+                      <a:moveTo>
+                        <a:pt x="3004649" y="2331547"/>
+                      </a:moveTo>
+                      <a:lnTo>
+                        <a:pt x="2770506" y="2532239"/>
+                      </a:lnTo>
+                      <a:lnTo>
+                        <a:pt x="2652539" y="2394596"/>
+                      </a:lnTo>
+                      <a:lnTo>
+                        <a:pt x="2862038" y="2215012"/>
+                      </a:lnTo>
+                      <a:cubicBezTo>
+                        <a:pt x="2892031" y="2235228"/>
+                        <a:pt x="2921035" y="2255901"/>
+                        <a:pt x="2948113" y="2277450"/>
+                      </a:cubicBezTo>
+                      <a:cubicBezTo>
+                        <a:pt x="2968619" y="2293663"/>
+                        <a:pt x="2987552" y="2311775"/>
+                        <a:pt x="3004649" y="2331547"/>
+                      </a:cubicBezTo>
+                      <a:close/>
+                      <a:moveTo>
+                        <a:pt x="753543" y="1029912"/>
+                      </a:moveTo>
+                      <a:cubicBezTo>
+                        <a:pt x="758824" y="917203"/>
+                        <a:pt x="833435" y="812345"/>
+                        <a:pt x="954570" y="729112"/>
+                      </a:cubicBezTo>
+                      <a:lnTo>
+                        <a:pt x="954570" y="1223814"/>
+                      </a:lnTo>
+                      <a:cubicBezTo>
+                        <a:pt x="954661" y="1421079"/>
+                        <a:pt x="1040654" y="1608522"/>
+                        <a:pt x="1190127" y="1737254"/>
+                      </a:cubicBezTo>
+                      <a:cubicBezTo>
+                        <a:pt x="935841" y="1588936"/>
+                        <a:pt x="772136" y="1323704"/>
+                        <a:pt x="753543" y="1029912"/>
+                      </a:cubicBezTo>
+                      <a:close/>
+                      <a:moveTo>
+                        <a:pt x="2223711" y="1223814"/>
+                      </a:moveTo>
+                      <a:cubicBezTo>
+                        <a:pt x="2223679" y="1285390"/>
+                        <a:pt x="2213947" y="1346572"/>
+                        <a:pt x="2194878" y="1405120"/>
+                      </a:cubicBezTo>
+                      <a:lnTo>
+                        <a:pt x="1946943" y="1405120"/>
+                      </a:lnTo>
+                      <a:cubicBezTo>
+                        <a:pt x="1930847" y="1377239"/>
+                        <a:pt x="1901172" y="1359988"/>
+                        <a:pt x="1868981" y="1359793"/>
+                      </a:cubicBezTo>
+                      <a:lnTo>
+                        <a:pt x="1778328" y="1359793"/>
+                      </a:lnTo>
+                      <a:cubicBezTo>
+                        <a:pt x="1728261" y="1359793"/>
+                        <a:pt x="1687676" y="1400379"/>
+                        <a:pt x="1687676" y="1450446"/>
+                      </a:cubicBezTo>
+                      <a:cubicBezTo>
+                        <a:pt x="1687676" y="1500514"/>
+                        <a:pt x="1728261" y="1541099"/>
+                        <a:pt x="1778328" y="1541099"/>
+                      </a:cubicBezTo>
+                      <a:lnTo>
+                        <a:pt x="1868981" y="1541099"/>
+                      </a:lnTo>
+                      <a:cubicBezTo>
+                        <a:pt x="1901172" y="1540904"/>
+                        <a:pt x="1930847" y="1523653"/>
+                        <a:pt x="1946943" y="1495773"/>
+                      </a:cubicBezTo>
+                      <a:lnTo>
+                        <a:pt x="2156686" y="1495773"/>
+                      </a:lnTo>
+                      <a:cubicBezTo>
+                        <a:pt x="2006669" y="1784361"/>
+                        <a:pt x="1651106" y="1896694"/>
+                        <a:pt x="1362517" y="1746677"/>
+                      </a:cubicBezTo>
+                      <a:cubicBezTo>
+                        <a:pt x="1167451" y="1645273"/>
+                        <a:pt x="1045105" y="1443661"/>
+                        <a:pt x="1045228" y="1223814"/>
+                      </a:cubicBezTo>
+                      <a:lnTo>
+                        <a:pt x="1045228" y="675872"/>
+                      </a:lnTo>
+                      <a:cubicBezTo>
+                        <a:pt x="1228705" y="586520"/>
+                        <a:pt x="1430539" y="541329"/>
+                        <a:pt x="1634598" y="543917"/>
+                      </a:cubicBezTo>
+                      <a:cubicBezTo>
+                        <a:pt x="1838595" y="541329"/>
+                        <a:pt x="2040356" y="586579"/>
+                        <a:pt x="2223711" y="676030"/>
+                      </a:cubicBezTo>
+                      <a:close/>
+                      <a:moveTo>
+                        <a:pt x="2314363" y="1223814"/>
+                      </a:moveTo>
+                      <a:lnTo>
+                        <a:pt x="2314363" y="729411"/>
+                      </a:lnTo>
+                      <a:cubicBezTo>
+                        <a:pt x="2437293" y="814076"/>
+                        <a:pt x="2512540" y="921051"/>
+                        <a:pt x="2515355" y="1035922"/>
+                      </a:cubicBezTo>
+                      <a:cubicBezTo>
+                        <a:pt x="2494844" y="1327802"/>
+                        <a:pt x="2331175" y="1590600"/>
+                        <a:pt x="2078267" y="1737743"/>
+                      </a:cubicBezTo>
+                      <a:cubicBezTo>
+                        <a:pt x="2228066" y="1609002"/>
+                        <a:pt x="2314282" y="1421337"/>
+                        <a:pt x="2314363" y="1223814"/>
+                      </a:cubicBezTo>
+                      <a:close/>
+                      <a:moveTo>
+                        <a:pt x="1634598" y="90653"/>
+                      </a:moveTo>
+                      <a:cubicBezTo>
+                        <a:pt x="2042096" y="91375"/>
+                        <a:pt x="2396391" y="370353"/>
+                        <a:pt x="2492669" y="766316"/>
+                      </a:cubicBezTo>
+                      <a:cubicBezTo>
+                        <a:pt x="2329063" y="580278"/>
+                        <a:pt x="2005976" y="453264"/>
+                        <a:pt x="1634598" y="453264"/>
+                      </a:cubicBezTo>
+                      <a:cubicBezTo>
+                        <a:pt x="1263828" y="453264"/>
+                        <a:pt x="941031" y="579616"/>
+                        <a:pt x="776895" y="764897"/>
+                      </a:cubicBezTo>
+                      <a:cubicBezTo>
+                        <a:pt x="873694" y="369628"/>
+                        <a:pt x="1227653" y="91381"/>
+                        <a:pt x="1634598" y="90653"/>
+                      </a:cubicBezTo>
+                      <a:close/>
+                      <a:moveTo>
+                        <a:pt x="816955" y="1748368"/>
+                      </a:moveTo>
+                      <a:cubicBezTo>
+                        <a:pt x="836907" y="1714912"/>
+                        <a:pt x="869415" y="1690830"/>
+                        <a:pt x="907231" y="1681484"/>
+                      </a:cubicBezTo>
+                      <a:cubicBezTo>
+                        <a:pt x="918948" y="1678556"/>
+                        <a:pt x="930982" y="1677078"/>
+                        <a:pt x="943062" y="1677078"/>
+                      </a:cubicBezTo>
+                      <a:cubicBezTo>
+                        <a:pt x="949539" y="1677083"/>
+                        <a:pt x="956012" y="1677522"/>
+                        <a:pt x="962434" y="1678393"/>
+                      </a:cubicBezTo>
+                      <a:cubicBezTo>
+                        <a:pt x="1337801" y="2039205"/>
+                        <a:pt x="1931083" y="2039291"/>
+                        <a:pt x="2306554" y="1678588"/>
+                      </a:cubicBezTo>
+                      <a:cubicBezTo>
+                        <a:pt x="2386863" y="1667591"/>
+                        <a:pt x="2460877" y="1723783"/>
+                        <a:pt x="2471873" y="1804088"/>
+                      </a:cubicBezTo>
+                      <a:cubicBezTo>
+                        <a:pt x="2479841" y="1862291"/>
+                        <a:pt x="2452337" y="1919638"/>
+                        <a:pt x="2401961" y="1949857"/>
+                      </a:cubicBezTo>
+                      <a:cubicBezTo>
+                        <a:pt x="2210933" y="2064542"/>
+                        <a:pt x="1931237" y="2130343"/>
+                        <a:pt x="1634598" y="2130343"/>
+                      </a:cubicBezTo>
+                      <a:cubicBezTo>
+                        <a:pt x="1337959" y="2130343"/>
+                        <a:pt x="1058282" y="2064542"/>
+                        <a:pt x="867222" y="1949835"/>
+                      </a:cubicBezTo>
+                      <a:cubicBezTo>
+                        <a:pt x="797791" y="1908021"/>
+                        <a:pt x="775304" y="1817898"/>
+                        <a:pt x="816955" y="1748368"/>
+                      </a:cubicBezTo>
+                      <a:close/>
+                      <a:moveTo>
+                        <a:pt x="319755" y="2279050"/>
+                      </a:moveTo>
+                      <a:cubicBezTo>
+                        <a:pt x="349961" y="2258027"/>
+                        <a:pt x="381019" y="2238659"/>
+                        <a:pt x="412004" y="2219146"/>
+                      </a:cubicBezTo>
+                      <a:lnTo>
+                        <a:pt x="616657" y="2394560"/>
+                      </a:lnTo>
+                      <a:lnTo>
+                        <a:pt x="498695" y="2532220"/>
+                      </a:lnTo>
+                      <a:lnTo>
+                        <a:pt x="263940" y="2331007"/>
+                      </a:lnTo>
+                      <a:cubicBezTo>
+                        <a:pt x="280720" y="2311825"/>
+                        <a:pt x="299422" y="2294415"/>
+                        <a:pt x="319755" y="2279050"/>
+                      </a:cubicBezTo>
+                      <a:close/>
+                      <a:moveTo>
+                        <a:pt x="2584899" y="3519847"/>
+                      </a:moveTo>
+                      <a:lnTo>
+                        <a:pt x="2540819" y="3167185"/>
+                      </a:lnTo>
+                      <a:cubicBezTo>
+                        <a:pt x="2537397" y="3142387"/>
+                        <a:pt x="2514521" y="3125059"/>
+                        <a:pt x="2489722" y="3128481"/>
+                      </a:cubicBezTo>
+                      <a:cubicBezTo>
+                        <a:pt x="2465373" y="3131839"/>
+                        <a:pt x="2448135" y="3153995"/>
+                        <a:pt x="2450873" y="3178426"/>
+                      </a:cubicBezTo>
+                      <a:lnTo>
+                        <a:pt x="2494949" y="3531007"/>
+                      </a:lnTo>
+                      <a:cubicBezTo>
+                        <a:pt x="2209224" y="3564426"/>
+                        <a:pt x="1921787" y="3581052"/>
+                        <a:pt x="1634113" y="3580789"/>
+                      </a:cubicBezTo>
+                      <a:cubicBezTo>
+                        <a:pt x="1346766" y="3581047"/>
+                        <a:pt x="1059651" y="3564430"/>
+                        <a:pt x="774248" y="3531029"/>
+                      </a:cubicBezTo>
+                      <a:lnTo>
+                        <a:pt x="818324" y="3178426"/>
+                      </a:lnTo>
+                      <a:cubicBezTo>
+                        <a:pt x="821832" y="3153642"/>
+                        <a:pt x="804581" y="3130702"/>
+                        <a:pt x="779792" y="3127198"/>
+                      </a:cubicBezTo>
+                      <a:cubicBezTo>
+                        <a:pt x="755007" y="3123690"/>
+                        <a:pt x="732072" y="3140941"/>
+                        <a:pt x="728564" y="3165730"/>
+                      </a:cubicBezTo>
+                      <a:cubicBezTo>
+                        <a:pt x="728496" y="3166215"/>
+                        <a:pt x="728437" y="3166700"/>
+                        <a:pt x="728382" y="3167185"/>
+                      </a:cubicBezTo>
+                      <a:lnTo>
+                        <a:pt x="684298" y="3519861"/>
+                      </a:lnTo>
+                      <a:cubicBezTo>
+                        <a:pt x="486362" y="3495149"/>
+                        <a:pt x="290057" y="3458765"/>
+                        <a:pt x="96414" y="3410905"/>
+                      </a:cubicBezTo>
+                      <a:lnTo>
+                        <a:pt x="167123" y="2538988"/>
+                      </a:lnTo>
+                      <a:cubicBezTo>
+                        <a:pt x="174611" y="2492487"/>
+                        <a:pt x="189904" y="2447587"/>
+                        <a:pt x="212350" y="2406181"/>
+                      </a:cubicBezTo>
+                      <a:lnTo>
+                        <a:pt x="474119" y="2630547"/>
+                      </a:lnTo>
+                      <a:cubicBezTo>
+                        <a:pt x="482337" y="2637586"/>
+                        <a:pt x="492803" y="2641457"/>
+                        <a:pt x="503622" y="2641462"/>
+                      </a:cubicBezTo>
+                      <a:cubicBezTo>
+                        <a:pt x="504773" y="2641462"/>
+                        <a:pt x="505943" y="2641416"/>
+                        <a:pt x="507094" y="2641326"/>
+                      </a:cubicBezTo>
+                      <a:cubicBezTo>
+                        <a:pt x="519078" y="2640406"/>
+                        <a:pt x="530211" y="2634763"/>
+                        <a:pt x="538034" y="2625634"/>
+                      </a:cubicBezTo>
+                      <a:lnTo>
+                        <a:pt x="715002" y="2419145"/>
+                      </a:lnTo>
+                      <a:cubicBezTo>
+                        <a:pt x="731292" y="2400139"/>
+                        <a:pt x="729094" y="2371525"/>
+                        <a:pt x="710089" y="2355234"/>
+                      </a:cubicBezTo>
+                      <a:lnTo>
+                        <a:pt x="493909" y="2169922"/>
+                      </a:lnTo>
+                      <a:cubicBezTo>
+                        <a:pt x="594932" y="2111813"/>
+                        <a:pt x="700094" y="2061215"/>
+                        <a:pt x="808538" y="2018531"/>
+                      </a:cubicBezTo>
+                      <a:cubicBezTo>
+                        <a:pt x="812699" y="2021405"/>
+                        <a:pt x="816198" y="2024877"/>
+                        <a:pt x="820594" y="2027533"/>
+                      </a:cubicBezTo>
+                      <a:cubicBezTo>
+                        <a:pt x="1025302" y="2150481"/>
+                        <a:pt x="1322004" y="2220996"/>
+                        <a:pt x="1634598" y="2220996"/>
+                      </a:cubicBezTo>
+                      <a:cubicBezTo>
+                        <a:pt x="1947192" y="2220996"/>
+                        <a:pt x="2243894" y="2150481"/>
+                        <a:pt x="2448616" y="2027560"/>
+                      </a:cubicBezTo>
+                      <a:cubicBezTo>
+                        <a:pt x="2454400" y="2024088"/>
+                        <a:pt x="2459100" y="2019587"/>
+                        <a:pt x="2464480" y="2015717"/>
+                      </a:cubicBezTo>
+                      <a:cubicBezTo>
+                        <a:pt x="2574365" y="2055998"/>
+                        <a:pt x="2680560" y="2105717"/>
+                        <a:pt x="2781874" y="2164306"/>
+                      </a:cubicBezTo>
+                      <a:lnTo>
+                        <a:pt x="2559122" y="2355248"/>
+                      </a:lnTo>
+                      <a:cubicBezTo>
+                        <a:pt x="2540116" y="2371538"/>
+                        <a:pt x="2537918" y="2400153"/>
+                        <a:pt x="2554208" y="2419158"/>
+                      </a:cubicBezTo>
+                      <a:lnTo>
+                        <a:pt x="2731176" y="2625647"/>
+                      </a:lnTo>
+                      <a:cubicBezTo>
+                        <a:pt x="2739004" y="2634772"/>
+                        <a:pt x="2750132" y="2640415"/>
+                        <a:pt x="2762116" y="2641339"/>
+                      </a:cubicBezTo>
+                      <a:cubicBezTo>
+                        <a:pt x="2763267" y="2641430"/>
+                        <a:pt x="2764442" y="2641475"/>
+                        <a:pt x="2765593" y="2641475"/>
+                      </a:cubicBezTo>
+                      <a:cubicBezTo>
+                        <a:pt x="2776412" y="2641471"/>
+                        <a:pt x="2786873" y="2637600"/>
+                        <a:pt x="2795091" y="2630561"/>
+                      </a:cubicBezTo>
+                      <a:lnTo>
+                        <a:pt x="3056357" y="2406621"/>
+                      </a:lnTo>
+                      <a:cubicBezTo>
+                        <a:pt x="3078549" y="2446853"/>
+                        <a:pt x="3094141" y="2490389"/>
+                        <a:pt x="3102531" y="2535561"/>
+                      </a:cubicBezTo>
+                      <a:lnTo>
+                        <a:pt x="3172819" y="3410905"/>
+                      </a:lnTo>
+                      <a:cubicBezTo>
+                        <a:pt x="2979162" y="3458770"/>
+                        <a:pt x="2782848" y="3495144"/>
+                        <a:pt x="2584899" y="3519847"/>
+                      </a:cubicBezTo>
+                      <a:close/>
+                    </a:path>
+                  </a:pathLst>
+                </a:custGeom>
+                <a:solidFill>
+                  <a:srgbClr val="000000"/>
+                </a:solidFill>
+                <a:ln w="45244" cap="flat">
+                  <a:noFill/>
+                  <a:prstDash val="solid"/>
+                  <a:miter/>
+                </a:ln>
+              </p:spPr>
+              <p:txBody>
+                <a:bodyPr rtlCol="0" anchor="ctr"/>
+                <a:lstStyle/>
+                <a:p>
+                  <a:endParaRPr lang="en-US" dirty="0"/>
+                </a:p>
+              </p:txBody>
+            </p:sp>
+            <p:sp>
+              <p:nvSpPr>
+                <p:cNvPr id="14" name="Freeform: Shape 13">
+                  <a:extLst>
+                    <a:ext uri="{FF2B5EF4-FFF2-40B4-BE49-F238E27FC236}">
+                      <a16:creationId xmlns:a16="http://schemas.microsoft.com/office/drawing/2014/main" id="{831A9704-2285-C063-DB4C-748FEB377A36}"/>
+                    </a:ext>
+                  </a:extLst>
+                </p:cNvPr>
+                <p:cNvSpPr/>
+                <p:nvPr/>
+              </p:nvSpPr>
+              <p:spPr>
+                <a:xfrm>
+                  <a:off x="7239527" y="2046258"/>
+                  <a:ext cx="380071" cy="450032"/>
+                </a:xfrm>
+                <a:custGeom>
+                  <a:avLst/>
+                  <a:gdLst>
+                    <a:gd name="connsiteX0" fmla="*/ 190018 w 380071"/>
+                    <a:gd name="connsiteY0" fmla="*/ 189555 h 450032"/>
+                    <a:gd name="connsiteX1" fmla="*/ 222249 w 380071"/>
+                    <a:gd name="connsiteY1" fmla="*/ 225014 h 450032"/>
+                    <a:gd name="connsiteX2" fmla="*/ 190018 w 380071"/>
+                    <a:gd name="connsiteY2" fmla="*/ 260477 h 450032"/>
+                    <a:gd name="connsiteX3" fmla="*/ 157781 w 380071"/>
+                    <a:gd name="connsiteY3" fmla="*/ 225014 h 450032"/>
+                    <a:gd name="connsiteX4" fmla="*/ 190018 w 380071"/>
+                    <a:gd name="connsiteY4" fmla="*/ 189555 h 450032"/>
+                    <a:gd name="connsiteX5" fmla="*/ 190018 w 380071"/>
+                    <a:gd name="connsiteY5" fmla="*/ 0 h 450032"/>
+                    <a:gd name="connsiteX6" fmla="*/ 0 w 380071"/>
+                    <a:gd name="connsiteY6" fmla="*/ 225014 h 450032"/>
+                    <a:gd name="connsiteX7" fmla="*/ 190036 w 380071"/>
+                    <a:gd name="connsiteY7" fmla="*/ 450033 h 450032"/>
+                    <a:gd name="connsiteX8" fmla="*/ 380071 w 380071"/>
+                    <a:gd name="connsiteY8" fmla="*/ 225014 h 450032"/>
+                    <a:gd name="connsiteX9" fmla="*/ 190018 w 380071"/>
+                    <a:gd name="connsiteY9" fmla="*/ 0 h 450032"/>
+                  </a:gdLst>
+                  <a:ahLst/>
+                  <a:cxnLst>
+                    <a:cxn ang="0">
+                      <a:pos x="connsiteX0" y="connsiteY0"/>
+                    </a:cxn>
+                    <a:cxn ang="0">
+                      <a:pos x="connsiteX1" y="connsiteY1"/>
+                    </a:cxn>
+                    <a:cxn ang="0">
+                      <a:pos x="connsiteX2" y="connsiteY2"/>
+                    </a:cxn>
+                    <a:cxn ang="0">
+                      <a:pos x="connsiteX3" y="connsiteY3"/>
+                    </a:cxn>
+                    <a:cxn ang="0">
+                      <a:pos x="connsiteX4" y="connsiteY4"/>
+                    </a:cxn>
+                    <a:cxn ang="0">
+                      <a:pos x="connsiteX5" y="connsiteY5"/>
+                    </a:cxn>
+                    <a:cxn ang="0">
+                      <a:pos x="connsiteX6" y="connsiteY6"/>
+                    </a:cxn>
+                    <a:cxn ang="0">
+                      <a:pos x="connsiteX7" y="connsiteY7"/>
+                    </a:cxn>
+                    <a:cxn ang="0">
+                      <a:pos x="connsiteX8" y="connsiteY8"/>
+                    </a:cxn>
+                    <a:cxn ang="0">
+                      <a:pos x="connsiteX9" y="connsiteY9"/>
+                    </a:cxn>
+                  </a:cxnLst>
+                  <a:rect l="l" t="t" r="r" b="b"/>
+                  <a:pathLst>
+                    <a:path w="380071" h="450032">
+                      <a:moveTo>
+                        <a:pt x="190018" y="189555"/>
+                      </a:moveTo>
+                      <a:cubicBezTo>
+                        <a:pt x="200112" y="201947"/>
+                        <a:pt x="210872" y="213787"/>
+                        <a:pt x="222249" y="225014"/>
+                      </a:cubicBezTo>
+                      <a:cubicBezTo>
+                        <a:pt x="210872" y="236246"/>
+                        <a:pt x="200112" y="248081"/>
+                        <a:pt x="190018" y="260477"/>
+                      </a:cubicBezTo>
+                      <a:cubicBezTo>
+                        <a:pt x="179919" y="248081"/>
+                        <a:pt x="169158" y="236246"/>
+                        <a:pt x="157781" y="225014"/>
+                      </a:cubicBezTo>
+                      <a:cubicBezTo>
+                        <a:pt x="169158" y="213787"/>
+                        <a:pt x="179919" y="201947"/>
+                        <a:pt x="190018" y="189555"/>
+                      </a:cubicBezTo>
+                      <a:close/>
+                      <a:moveTo>
+                        <a:pt x="190018" y="0"/>
+                      </a:moveTo>
+                      <a:cubicBezTo>
+                        <a:pt x="161969" y="98834"/>
+                        <a:pt x="92742" y="180812"/>
+                        <a:pt x="0" y="225014"/>
+                      </a:cubicBezTo>
+                      <a:cubicBezTo>
+                        <a:pt x="92747" y="269212"/>
+                        <a:pt x="161983" y="351194"/>
+                        <a:pt x="190036" y="450033"/>
+                      </a:cubicBezTo>
+                      <a:cubicBezTo>
+                        <a:pt x="218088" y="351194"/>
+                        <a:pt x="287324" y="269212"/>
+                        <a:pt x="380071" y="225014"/>
+                      </a:cubicBezTo>
+                      <a:cubicBezTo>
+                        <a:pt x="287315" y="180821"/>
+                        <a:pt x="218075" y="98839"/>
+                        <a:pt x="190018" y="0"/>
+                      </a:cubicBezTo>
+                      <a:close/>
+                    </a:path>
+                  </a:pathLst>
+                </a:custGeom>
+                <a:solidFill>
+                  <a:srgbClr val="000000"/>
+                </a:solidFill>
+                <a:ln w="45244" cap="flat">
+                  <a:noFill/>
+                  <a:prstDash val="solid"/>
+                  <a:miter/>
+                </a:ln>
+              </p:spPr>
+              <p:txBody>
+                <a:bodyPr rtlCol="0" anchor="ctr"/>
+                <a:lstStyle/>
+                <a:p>
+                  <a:endParaRPr lang="en-US"/>
+                </a:p>
+              </p:txBody>
+            </p:sp>
+            <p:sp>
+              <p:nvSpPr>
+                <p:cNvPr id="15" name="Freeform: Shape 14">
+                  <a:extLst>
+                    <a:ext uri="{FF2B5EF4-FFF2-40B4-BE49-F238E27FC236}">
+                      <a16:creationId xmlns:a16="http://schemas.microsoft.com/office/drawing/2014/main" id="{00F53130-64A7-35F7-9FCB-B139D9954C6F}"/>
+                    </a:ext>
+                  </a:extLst>
+                </p:cNvPr>
+                <p:cNvSpPr/>
+                <p:nvPr/>
+              </p:nvSpPr>
+              <p:spPr>
+                <a:xfrm>
+                  <a:off x="6758377" y="3270072"/>
+                  <a:ext cx="380071" cy="450032"/>
+                </a:xfrm>
+                <a:custGeom>
+                  <a:avLst/>
+                  <a:gdLst>
+                    <a:gd name="connsiteX0" fmla="*/ 190036 w 380071"/>
+                    <a:gd name="connsiteY0" fmla="*/ 189555 h 450032"/>
+                    <a:gd name="connsiteX1" fmla="*/ 222272 w 380071"/>
+                    <a:gd name="connsiteY1" fmla="*/ 225014 h 450032"/>
+                    <a:gd name="connsiteX2" fmla="*/ 190036 w 380071"/>
+                    <a:gd name="connsiteY2" fmla="*/ 260477 h 450032"/>
+                    <a:gd name="connsiteX3" fmla="*/ 157804 w 380071"/>
+                    <a:gd name="connsiteY3" fmla="*/ 225014 h 450032"/>
+                    <a:gd name="connsiteX4" fmla="*/ 190036 w 380071"/>
+                    <a:gd name="connsiteY4" fmla="*/ 189555 h 450032"/>
+                    <a:gd name="connsiteX5" fmla="*/ 190036 w 380071"/>
+                    <a:gd name="connsiteY5" fmla="*/ 0 h 450032"/>
+                    <a:gd name="connsiteX6" fmla="*/ 0 w 380071"/>
+                    <a:gd name="connsiteY6" fmla="*/ 225014 h 450032"/>
+                    <a:gd name="connsiteX7" fmla="*/ 190036 w 380071"/>
+                    <a:gd name="connsiteY7" fmla="*/ 450033 h 450032"/>
+                    <a:gd name="connsiteX8" fmla="*/ 380071 w 380071"/>
+                    <a:gd name="connsiteY8" fmla="*/ 225014 h 450032"/>
+                    <a:gd name="connsiteX9" fmla="*/ 190036 w 380071"/>
+                    <a:gd name="connsiteY9" fmla="*/ 0 h 450032"/>
+                  </a:gdLst>
+                  <a:ahLst/>
+                  <a:cxnLst>
+                    <a:cxn ang="0">
+                      <a:pos x="connsiteX0" y="connsiteY0"/>
+                    </a:cxn>
+                    <a:cxn ang="0">
+                      <a:pos x="connsiteX1" y="connsiteY1"/>
+                    </a:cxn>
+                    <a:cxn ang="0">
+                      <a:pos x="connsiteX2" y="connsiteY2"/>
+                    </a:cxn>
+                    <a:cxn ang="0">
+                      <a:pos x="connsiteX3" y="connsiteY3"/>
+                    </a:cxn>
+                    <a:cxn ang="0">
+                      <a:pos x="connsiteX4" y="connsiteY4"/>
+                    </a:cxn>
+                    <a:cxn ang="0">
+                      <a:pos x="connsiteX5" y="connsiteY5"/>
+                    </a:cxn>
+                    <a:cxn ang="0">
+                      <a:pos x="connsiteX6" y="connsiteY6"/>
+                    </a:cxn>
+                    <a:cxn ang="0">
+                      <a:pos x="connsiteX7" y="connsiteY7"/>
+                    </a:cxn>
+                    <a:cxn ang="0">
+                      <a:pos x="connsiteX8" y="connsiteY8"/>
+                    </a:cxn>
+                    <a:cxn ang="0">
+                      <a:pos x="connsiteX9" y="connsiteY9"/>
+                    </a:cxn>
+                  </a:cxnLst>
+                  <a:rect l="l" t="t" r="r" b="b"/>
+                  <a:pathLst>
+                    <a:path w="380071" h="450032">
+                      <a:moveTo>
+                        <a:pt x="190036" y="189555"/>
+                      </a:moveTo>
+                      <a:cubicBezTo>
+                        <a:pt x="200132" y="201948"/>
+                        <a:pt x="210893" y="213787"/>
+                        <a:pt x="222272" y="225014"/>
+                      </a:cubicBezTo>
+                      <a:cubicBezTo>
+                        <a:pt x="210892" y="236241"/>
+                        <a:pt x="200131" y="248081"/>
+                        <a:pt x="190036" y="260477"/>
+                      </a:cubicBezTo>
+                      <a:cubicBezTo>
+                        <a:pt x="179941" y="248081"/>
+                        <a:pt x="169181" y="236246"/>
+                        <a:pt x="157804" y="225014"/>
+                      </a:cubicBezTo>
+                      <a:cubicBezTo>
+                        <a:pt x="169181" y="213787"/>
+                        <a:pt x="179941" y="201948"/>
+                        <a:pt x="190036" y="189555"/>
+                      </a:cubicBezTo>
+                      <a:close/>
+                      <a:moveTo>
+                        <a:pt x="190036" y="0"/>
+                      </a:moveTo>
+                      <a:cubicBezTo>
+                        <a:pt x="161985" y="98839"/>
+                        <a:pt x="92748" y="180816"/>
+                        <a:pt x="0" y="225014"/>
+                      </a:cubicBezTo>
+                      <a:cubicBezTo>
+                        <a:pt x="92747" y="269212"/>
+                        <a:pt x="161984" y="351194"/>
+                        <a:pt x="190036" y="450033"/>
+                      </a:cubicBezTo>
+                      <a:cubicBezTo>
+                        <a:pt x="218088" y="351194"/>
+                        <a:pt x="287324" y="269212"/>
+                        <a:pt x="380071" y="225014"/>
+                      </a:cubicBezTo>
+                      <a:cubicBezTo>
+                        <a:pt x="287323" y="180816"/>
+                        <a:pt x="218087" y="98839"/>
+                        <a:pt x="190036" y="0"/>
+                      </a:cubicBezTo>
+                      <a:close/>
+                    </a:path>
+                  </a:pathLst>
+                </a:custGeom>
+                <a:solidFill>
+                  <a:srgbClr val="000000"/>
+                </a:solidFill>
+                <a:ln w="45244" cap="flat">
+                  <a:noFill/>
+                  <a:prstDash val="solid"/>
+                  <a:miter/>
+                </a:ln>
+              </p:spPr>
+              <p:txBody>
+                <a:bodyPr rtlCol="0" anchor="ctr"/>
+                <a:lstStyle/>
+                <a:p>
+                  <a:endParaRPr lang="en-US"/>
+                </a:p>
+              </p:txBody>
+            </p:sp>
+            <p:sp>
+              <p:nvSpPr>
+                <p:cNvPr id="16" name="Freeform: Shape 15">
+                  <a:extLst>
+                    <a:ext uri="{FF2B5EF4-FFF2-40B4-BE49-F238E27FC236}">
+                      <a16:creationId xmlns:a16="http://schemas.microsoft.com/office/drawing/2014/main" id="{C4A97114-8603-9420-6154-25A08D45CDBD}"/>
+                    </a:ext>
+                  </a:extLst>
+                </p:cNvPr>
+                <p:cNvSpPr/>
+                <p:nvPr/>
+              </p:nvSpPr>
+              <p:spPr>
+                <a:xfrm>
+                  <a:off x="10231072" y="3045058"/>
+                  <a:ext cx="380071" cy="450028"/>
+                </a:xfrm>
+                <a:custGeom>
+                  <a:avLst/>
+                  <a:gdLst>
+                    <a:gd name="connsiteX0" fmla="*/ 190017 w 380071"/>
+                    <a:gd name="connsiteY0" fmla="*/ 189551 h 450028"/>
+                    <a:gd name="connsiteX1" fmla="*/ 222254 w 380071"/>
+                    <a:gd name="connsiteY1" fmla="*/ 225014 h 450028"/>
+                    <a:gd name="connsiteX2" fmla="*/ 190017 w 380071"/>
+                    <a:gd name="connsiteY2" fmla="*/ 260477 h 450028"/>
+                    <a:gd name="connsiteX3" fmla="*/ 157786 w 380071"/>
+                    <a:gd name="connsiteY3" fmla="*/ 225014 h 450028"/>
+                    <a:gd name="connsiteX4" fmla="*/ 190017 w 380071"/>
+                    <a:gd name="connsiteY4" fmla="*/ 189551 h 450028"/>
+                    <a:gd name="connsiteX5" fmla="*/ 190017 w 380071"/>
+                    <a:gd name="connsiteY5" fmla="*/ 0 h 450028"/>
+                    <a:gd name="connsiteX6" fmla="*/ 0 w 380071"/>
+                    <a:gd name="connsiteY6" fmla="*/ 225014 h 450028"/>
+                    <a:gd name="connsiteX7" fmla="*/ 190035 w 380071"/>
+                    <a:gd name="connsiteY7" fmla="*/ 450028 h 450028"/>
+                    <a:gd name="connsiteX8" fmla="*/ 380071 w 380071"/>
+                    <a:gd name="connsiteY8" fmla="*/ 225014 h 450028"/>
+                    <a:gd name="connsiteX9" fmla="*/ 190017 w 380071"/>
+                    <a:gd name="connsiteY9" fmla="*/ 0 h 450028"/>
+                  </a:gdLst>
+                  <a:ahLst/>
+                  <a:cxnLst>
+                    <a:cxn ang="0">
+                      <a:pos x="connsiteX0" y="connsiteY0"/>
+                    </a:cxn>
+                    <a:cxn ang="0">
+                      <a:pos x="connsiteX1" y="connsiteY1"/>
+                    </a:cxn>
+                    <a:cxn ang="0">
+                      <a:pos x="connsiteX2" y="connsiteY2"/>
+                    </a:cxn>
+                    <a:cxn ang="0">
+                      <a:pos x="connsiteX3" y="connsiteY3"/>
+                    </a:cxn>
+                    <a:cxn ang="0">
+                      <a:pos x="connsiteX4" y="connsiteY4"/>
+                    </a:cxn>
+                    <a:cxn ang="0">
+                      <a:pos x="connsiteX5" y="connsiteY5"/>
+                    </a:cxn>
+                    <a:cxn ang="0">
+                      <a:pos x="connsiteX6" y="connsiteY6"/>
+                    </a:cxn>
+                    <a:cxn ang="0">
+                      <a:pos x="connsiteX7" y="connsiteY7"/>
+                    </a:cxn>
+                    <a:cxn ang="0">
+                      <a:pos x="connsiteX8" y="connsiteY8"/>
+                    </a:cxn>
+                    <a:cxn ang="0">
+                      <a:pos x="connsiteX9" y="connsiteY9"/>
+                    </a:cxn>
+                  </a:cxnLst>
+                  <a:rect l="l" t="t" r="r" b="b"/>
+                  <a:pathLst>
+                    <a:path w="380071" h="450028">
+                      <a:moveTo>
+                        <a:pt x="190017" y="189551"/>
+                      </a:moveTo>
+                      <a:cubicBezTo>
+                        <a:pt x="200111" y="201947"/>
+                        <a:pt x="210872" y="213787"/>
+                        <a:pt x="222254" y="225014"/>
+                      </a:cubicBezTo>
+                      <a:cubicBezTo>
+                        <a:pt x="210872" y="236241"/>
+                        <a:pt x="200111" y="248081"/>
+                        <a:pt x="190017" y="260477"/>
+                      </a:cubicBezTo>
+                      <a:cubicBezTo>
+                        <a:pt x="179923" y="248085"/>
+                        <a:pt x="169163" y="236246"/>
+                        <a:pt x="157786" y="225014"/>
+                      </a:cubicBezTo>
+                      <a:cubicBezTo>
+                        <a:pt x="169163" y="213782"/>
+                        <a:pt x="179923" y="201947"/>
+                        <a:pt x="190017" y="189551"/>
+                      </a:cubicBezTo>
+                      <a:close/>
+                      <a:moveTo>
+                        <a:pt x="190017" y="0"/>
+                      </a:moveTo>
+                      <a:cubicBezTo>
+                        <a:pt x="161969" y="98834"/>
+                        <a:pt x="92742" y="180812"/>
+                        <a:pt x="0" y="225014"/>
+                      </a:cubicBezTo>
+                      <a:cubicBezTo>
+                        <a:pt x="92747" y="269212"/>
+                        <a:pt x="161983" y="351194"/>
+                        <a:pt x="190035" y="450028"/>
+                      </a:cubicBezTo>
+                      <a:cubicBezTo>
+                        <a:pt x="218088" y="351194"/>
+                        <a:pt x="287324" y="269212"/>
+                        <a:pt x="380071" y="225014"/>
+                      </a:cubicBezTo>
+                      <a:cubicBezTo>
+                        <a:pt x="287315" y="180821"/>
+                        <a:pt x="218074" y="98839"/>
+                        <a:pt x="190017" y="0"/>
+                      </a:cubicBezTo>
+                      <a:close/>
+                    </a:path>
+                  </a:pathLst>
+                </a:custGeom>
+                <a:solidFill>
+                  <a:srgbClr val="000000"/>
+                </a:solidFill>
+                <a:ln w="45244" cap="flat">
+                  <a:noFill/>
+                  <a:prstDash val="solid"/>
+                  <a:miter/>
+                </a:ln>
+              </p:spPr>
+              <p:txBody>
+                <a:bodyPr rtlCol="0" anchor="ctr"/>
+                <a:lstStyle/>
+                <a:p>
+                  <a:endParaRPr lang="en-US"/>
+                </a:p>
+              </p:txBody>
+            </p:sp>
+          </p:grpSp>
+        </p:grpSp>
+        <p:pic>
+          <p:nvPicPr>
+            <p:cNvPr id="17" name="Picture 16" descr="A close up of a sign&#10;&#10;Description automatically generated">
+              <a:extLst>
+                <a:ext uri="{FF2B5EF4-FFF2-40B4-BE49-F238E27FC236}">
+                  <a16:creationId xmlns:a16="http://schemas.microsoft.com/office/drawing/2014/main" id="{33233867-63E3-ECE2-489A-4F2019C38D37}"/>
+                </a:ext>
+              </a:extLst>
+            </p:cNvPr>
+            <p:cNvPicPr>
+              <a:picLocks noChangeAspect="1"/>
+            </p:cNvPicPr>
+            <p:nvPr/>
+          </p:nvPicPr>
+          <p:blipFill rotWithShape="1">
+            <a:blip r:embed="rId3">
+              <a:extLst>
+                <a:ext uri="{28A0092B-C50C-407E-A947-70E740481C1C}">
+                  <a14:useLocalDpi xmlns:a14="http://schemas.microsoft.com/office/drawing/2010/main" val="0"/>
+                </a:ext>
+              </a:extLst>
+            </a:blip>
+            <a:srcRect l="37013"/>
+            <a:stretch/>
+          </p:blipFill>
+          <p:spPr>
+            <a:xfrm>
+              <a:off x="8941391" y="4860758"/>
+              <a:ext cx="876378" cy="451805"/>
+            </a:xfrm>
+            <a:prstGeom prst="rect">
+              <a:avLst/>
+            </a:prstGeom>
+          </p:spPr>
+        </p:pic>
+      </p:grpSp>
     </p:spTree>
     <p:extLst>
       <p:ext uri="{BB962C8B-B14F-4D97-AF65-F5344CB8AC3E}">
-        <p14:creationId xmlns:p14="http://schemas.microsoft.com/office/powerpoint/2010/main" val="3335962958"/>
+        <p14:creationId xmlns:p14="http://schemas.microsoft.com/office/powerpoint/2010/main" val="1663024317"/>
       </p:ext>
     </p:extLst>
   </p:cSld>
@@ -15560,7 +17997,7 @@
 </p:sld>
 </file>
 
-<file path=ppt/slides/slide5.xml><?xml version="1.0" encoding="utf-8"?>
+<file path=ppt/slides/slide6.xml><?xml version="1.0" encoding="utf-8"?>
 <p:sld xmlns:a="http://schemas.openxmlformats.org/drawingml/2006/main" xmlns:r="http://schemas.openxmlformats.org/officeDocument/2006/relationships" xmlns:p="http://schemas.openxmlformats.org/presentationml/2006/main">
   <p:cSld>
     <p:spTree>
@@ -15704,7 +18141,7 @@
           <a:p>
             <a:fld id="{6D95AE55-B5F4-483D-AEFF-E8059F5502F5}" type="slidenum">
               <a:rPr lang="en-US" smtClean="0"/>
-              <a:t>5</a:t>
+              <a:t>6</a:t>
             </a:fld>
             <a:endParaRPr lang="en-US"/>
           </a:p>
@@ -17123,7 +19560,7 @@
 </p:sld>
 </file>
 
-<file path=ppt/slides/slide6.xml><?xml version="1.0" encoding="utf-8"?>
+<file path=ppt/slides/slide7.xml><?xml version="1.0" encoding="utf-8"?>
 <p:sld xmlns:a="http://schemas.openxmlformats.org/drawingml/2006/main" xmlns:r="http://schemas.openxmlformats.org/officeDocument/2006/relationships" xmlns:p="http://schemas.openxmlformats.org/presentationml/2006/main">
   <p:cSld>
     <p:spTree>
@@ -17280,7 +19717,7 @@
           <a:p>
             <a:fld id="{6D95AE55-B5F4-483D-AEFF-E8059F5502F5}" type="slidenum">
               <a:rPr lang="en-US" smtClean="0"/>
-              <a:t>6</a:t>
+              <a:t>7</a:t>
             </a:fld>
             <a:endParaRPr lang="en-US"/>
           </a:p>
@@ -17703,7 +20140,7 @@
 </p:sld>
 </file>
 
-<file path=ppt/slides/slide7.xml><?xml version="1.0" encoding="utf-8"?>
+<file path=ppt/slides/slide8.xml><?xml version="1.0" encoding="utf-8"?>
 <p:sld xmlns:a="http://schemas.openxmlformats.org/drawingml/2006/main" xmlns:r="http://schemas.openxmlformats.org/officeDocument/2006/relationships" xmlns:p="http://schemas.openxmlformats.org/presentationml/2006/main">
   <p:cSld>
     <p:spTree>
@@ -17771,7 +20208,7 @@
           <a:p>
             <a:fld id="{6D95AE55-B5F4-483D-AEFF-E8059F5502F5}" type="slidenum">
               <a:rPr lang="en-US" smtClean="0"/>
-              <a:t>7</a:t>
+              <a:t>8</a:t>
             </a:fld>
             <a:endParaRPr lang="en-US"/>
           </a:p>
@@ -18401,7 +20838,7 @@
 </p:sld>
 </file>
 
-<file path=ppt/slides/slide8.xml><?xml version="1.0" encoding="utf-8"?>
+<file path=ppt/slides/slide9.xml><?xml version="1.0" encoding="utf-8"?>
 <p:sld xmlns:a="http://schemas.openxmlformats.org/drawingml/2006/main" xmlns:r="http://schemas.openxmlformats.org/officeDocument/2006/relationships" xmlns:p="http://schemas.openxmlformats.org/presentationml/2006/main">
   <p:cSld>
     <p:spTree>
@@ -19413,96 +21850,6 @@
       </p:par>
     </p:tnLst>
   </p:timing>
-</p:sld>
-</file>
-
-<file path=ppt/slides/slide9.xml><?xml version="1.0" encoding="utf-8"?>
-<p:sld xmlns:a="http://schemas.openxmlformats.org/drawingml/2006/main" xmlns:r="http://schemas.openxmlformats.org/officeDocument/2006/relationships" xmlns:p="http://schemas.openxmlformats.org/presentationml/2006/main">
-  <p:cSld>
-    <p:spTree>
-      <p:nvGrpSpPr>
-        <p:cNvPr id="1" name=""/>
-        <p:cNvGrpSpPr/>
-        <p:nvPr/>
-      </p:nvGrpSpPr>
-      <p:grpSpPr>
-        <a:xfrm>
-          <a:off x="0" y="0"/>
-          <a:ext cx="0" cy="0"/>
-          <a:chOff x="0" y="0"/>
-          <a:chExt cx="0" cy="0"/>
-        </a:xfrm>
-      </p:grpSpPr>
-      <p:sp>
-        <p:nvSpPr>
-          <p:cNvPr id="2" name="Title 1">
-            <a:extLst>
-              <a:ext uri="{FF2B5EF4-FFF2-40B4-BE49-F238E27FC236}">
-                <a16:creationId xmlns:a16="http://schemas.microsoft.com/office/drawing/2014/main" id="{ACD980A7-0204-9CD9-DCFC-61FE609FD2F7}"/>
-              </a:ext>
-            </a:extLst>
-          </p:cNvPr>
-          <p:cNvSpPr>
-            <a:spLocks noGrp="1"/>
-          </p:cNvSpPr>
-          <p:nvPr>
-            <p:ph type="title"/>
-          </p:nvPr>
-        </p:nvSpPr>
-        <p:spPr/>
-        <p:txBody>
-          <a:bodyPr/>
-          <a:lstStyle/>
-          <a:p>
-            <a:endParaRPr lang="en-US"/>
-          </a:p>
-        </p:txBody>
-      </p:sp>
-      <p:pic>
-        <p:nvPicPr>
-          <p:cNvPr id="5" name="Content Placeholder 4" descr="A cartoon character with a yellow background&#10;&#10;Description automatically generated">
-            <a:extLst>
-              <a:ext uri="{FF2B5EF4-FFF2-40B4-BE49-F238E27FC236}">
-                <a16:creationId xmlns:a16="http://schemas.microsoft.com/office/drawing/2014/main" id="{F9E65229-512E-C113-6DD1-939F9FBC6A1F}"/>
-              </a:ext>
-            </a:extLst>
-          </p:cNvPr>
-          <p:cNvPicPr>
-            <a:picLocks noGrp="1" noChangeAspect="1"/>
-          </p:cNvPicPr>
-          <p:nvPr>
-            <p:ph idx="1"/>
-          </p:nvPr>
-        </p:nvPicPr>
-        <p:blipFill>
-          <a:blip r:embed="rId3">
-            <a:extLst>
-              <a:ext uri="{28A0092B-C50C-407E-A947-70E740481C1C}">
-                <a14:useLocalDpi xmlns:a14="http://schemas.microsoft.com/office/drawing/2010/main" val="0"/>
-              </a:ext>
-            </a:extLst>
-          </a:blip>
-          <a:stretch>
-            <a:fillRect/>
-          </a:stretch>
-        </p:blipFill>
-        <p:spPr>
-          <a:xfrm>
-            <a:off x="2748817" y="1825625"/>
-            <a:ext cx="6694366" cy="4351338"/>
-          </a:xfrm>
-        </p:spPr>
-      </p:pic>
-    </p:spTree>
-    <p:extLst>
-      <p:ext uri="{BB962C8B-B14F-4D97-AF65-F5344CB8AC3E}">
-        <p14:creationId xmlns:p14="http://schemas.microsoft.com/office/powerpoint/2010/main" val="2635761389"/>
-      </p:ext>
-    </p:extLst>
-  </p:cSld>
-  <p:clrMapOvr>
-    <a:masterClrMapping/>
-  </p:clrMapOvr>
 </p:sld>
 </file>
 

</xml_diff>

<commit_message>
script 6 cleanup housekeeping and other minor touch ups
</commit_message>
<xml_diff>
--- a/presentations/1 - Welcome and motivation.pptx
+++ b/presentations/1 - Welcome and motivation.pptx
@@ -240,7 +240,7 @@
           <a:p>
             <a:fld id="{EC387D8F-AD3F-4F1D-953F-F6D09F384E03}" type="datetimeFigureOut">
               <a:rPr lang="en-US" smtClean="0"/>
-              <a:t>12/10/2023</a:t>
+              <a:t>12/11/2023</a:t>
             </a:fld>
             <a:endParaRPr lang="en-US"/>
           </a:p>
@@ -1901,7 +1901,7 @@
           <a:p>
             <a:fld id="{9A69187F-33B1-48D6-A8D1-B3CDAB36B405}" type="datetimeFigureOut">
               <a:rPr lang="en-US" smtClean="0"/>
-              <a:t>12/10/2023</a:t>
+              <a:t>12/11/2023</a:t>
             </a:fld>
             <a:endParaRPr lang="en-US"/>
           </a:p>
@@ -2099,7 +2099,7 @@
           <a:p>
             <a:fld id="{9A69187F-33B1-48D6-A8D1-B3CDAB36B405}" type="datetimeFigureOut">
               <a:rPr lang="en-US" smtClean="0"/>
-              <a:t>12/10/2023</a:t>
+              <a:t>12/11/2023</a:t>
             </a:fld>
             <a:endParaRPr lang="en-US"/>
           </a:p>
@@ -2307,7 +2307,7 @@
           <a:p>
             <a:fld id="{9A69187F-33B1-48D6-A8D1-B3CDAB36B405}" type="datetimeFigureOut">
               <a:rPr lang="en-US" smtClean="0"/>
-              <a:t>12/10/2023</a:t>
+              <a:t>12/11/2023</a:t>
             </a:fld>
             <a:endParaRPr lang="en-US"/>
           </a:p>
@@ -2505,7 +2505,7 @@
           <a:p>
             <a:fld id="{9A69187F-33B1-48D6-A8D1-B3CDAB36B405}" type="datetimeFigureOut">
               <a:rPr lang="en-US" smtClean="0"/>
-              <a:t>12/10/2023</a:t>
+              <a:t>12/11/2023</a:t>
             </a:fld>
             <a:endParaRPr lang="en-US"/>
           </a:p>
@@ -2780,7 +2780,7 @@
           <a:p>
             <a:fld id="{9A69187F-33B1-48D6-A8D1-B3CDAB36B405}" type="datetimeFigureOut">
               <a:rPr lang="en-US" smtClean="0"/>
-              <a:t>12/10/2023</a:t>
+              <a:t>12/11/2023</a:t>
             </a:fld>
             <a:endParaRPr lang="en-US"/>
           </a:p>
@@ -3045,7 +3045,7 @@
           <a:p>
             <a:fld id="{9A69187F-33B1-48D6-A8D1-B3CDAB36B405}" type="datetimeFigureOut">
               <a:rPr lang="en-US" smtClean="0"/>
-              <a:t>12/10/2023</a:t>
+              <a:t>12/11/2023</a:t>
             </a:fld>
             <a:endParaRPr lang="en-US"/>
           </a:p>
@@ -3457,7 +3457,7 @@
           <a:p>
             <a:fld id="{9A69187F-33B1-48D6-A8D1-B3CDAB36B405}" type="datetimeFigureOut">
               <a:rPr lang="en-US" smtClean="0"/>
-              <a:t>12/10/2023</a:t>
+              <a:t>12/11/2023</a:t>
             </a:fld>
             <a:endParaRPr lang="en-US"/>
           </a:p>
@@ -3598,7 +3598,7 @@
           <a:p>
             <a:fld id="{9A69187F-33B1-48D6-A8D1-B3CDAB36B405}" type="datetimeFigureOut">
               <a:rPr lang="en-US" smtClean="0"/>
-              <a:t>12/10/2023</a:t>
+              <a:t>12/11/2023</a:t>
             </a:fld>
             <a:endParaRPr lang="en-US"/>
           </a:p>
@@ -3711,7 +3711,7 @@
           <a:p>
             <a:fld id="{9A69187F-33B1-48D6-A8D1-B3CDAB36B405}" type="datetimeFigureOut">
               <a:rPr lang="en-US" smtClean="0"/>
-              <a:t>12/10/2023</a:t>
+              <a:t>12/11/2023</a:t>
             </a:fld>
             <a:endParaRPr lang="en-US"/>
           </a:p>
@@ -4022,7 +4022,7 @@
           <a:p>
             <a:fld id="{9A69187F-33B1-48D6-A8D1-B3CDAB36B405}" type="datetimeFigureOut">
               <a:rPr lang="en-US" smtClean="0"/>
-              <a:t>12/10/2023</a:t>
+              <a:t>12/11/2023</a:t>
             </a:fld>
             <a:endParaRPr lang="en-US"/>
           </a:p>
@@ -4310,7 +4310,7 @@
           <a:p>
             <a:fld id="{9A69187F-33B1-48D6-A8D1-B3CDAB36B405}" type="datetimeFigureOut">
               <a:rPr lang="en-US" smtClean="0"/>
-              <a:t>12/10/2023</a:t>
+              <a:t>12/11/2023</a:t>
             </a:fld>
             <a:endParaRPr lang="en-US"/>
           </a:p>
@@ -4551,7 +4551,7 @@
           <a:p>
             <a:fld id="{9A69187F-33B1-48D6-A8D1-B3CDAB36B405}" type="datetimeFigureOut">
               <a:rPr lang="en-US" smtClean="0"/>
-              <a:t>12/10/2023</a:t>
+              <a:t>12/11/2023</a:t>
             </a:fld>
             <a:endParaRPr lang="en-US"/>
           </a:p>
@@ -5079,7 +5079,7 @@
           <a:p>
             <a:r>
               <a:rPr lang="en-US" sz="2000" dirty="0"/>
-              <a:t>November 14–15, 2023</a:t>
+              <a:t>December 12–13, 2023</a:t>
             </a:r>
           </a:p>
           <a:p>
@@ -12525,37 +12525,23 @@
         </p:nvSpPr>
         <p:spPr>
           <a:xfrm>
-            <a:off x="1002455" y="3616601"/>
-            <a:ext cx="8514080" cy="2949786"/>
+            <a:off x="643095" y="3616601"/>
+            <a:ext cx="8873440" cy="2949786"/>
           </a:xfrm>
         </p:spPr>
         <p:txBody>
-          <a:bodyPr/>
+          <a:bodyPr>
+            <a:normAutofit/>
+          </a:bodyPr>
           <a:lstStyle/>
-          <a:p>
-            <a:pPr algn="l"/>
-            <a:r>
-              <a:rPr lang="en-US" i="1" dirty="0"/>
-              <a:t>The Virtual Meeting Housekeeping </a:t>
-            </a:r>
-            <a:r>
-              <a:rPr lang="en-US" i="1" dirty="0" err="1"/>
-              <a:t>Slide</a:t>
-            </a:r>
-            <a:r>
-              <a:rPr lang="en-US" i="1" baseline="30000" dirty="0" err="1"/>
-              <a:t>TM</a:t>
-            </a:r>
-            <a:endParaRPr lang="en-US" i="1" baseline="30000" dirty="0"/>
-          </a:p>
           <a:p>
             <a:pPr marL="342900" indent="-342900" algn="l">
               <a:buFont typeface="Arial" panose="020B0604020202020204" pitchFamily="34" charset="0"/>
               <a:buChar char="•"/>
             </a:pPr>
             <a:r>
-              <a:rPr lang="en-US" dirty="0"/>
-              <a:t>Please mute your microphone when you aren’t talking, but</a:t>
+              <a:rPr lang="en-US" sz="2800" dirty="0"/>
+              <a:t>We will be using Teams to chat, share files, take polls, etc.</a:t>
             </a:r>
           </a:p>
           <a:p>
@@ -12564,8 +12550,8 @@
               <a:buChar char="•"/>
             </a:pPr>
             <a:r>
-              <a:rPr lang="en-US" dirty="0"/>
-              <a:t>Please keep your camera on, if you’re comfortable doing so!</a:t>
+              <a:rPr lang="en-US" sz="2800" dirty="0"/>
+              <a:t>HELP US KEEP THIS INTERACTIVE</a:t>
             </a:r>
           </a:p>
           <a:p>
@@ -12574,8 +12560,8 @@
               <a:buChar char="•"/>
             </a:pPr>
             <a:r>
-              <a:rPr lang="en-US" dirty="0"/>
-              <a:t>HELP US KEEP THIS THING INTERACTIVE</a:t>
+              <a:rPr lang="en-US" sz="2800" dirty="0"/>
+              <a:t>Speak up or raise your hand if you want clarification</a:t>
             </a:r>
           </a:p>
           <a:p>
@@ -12584,17 +12570,7 @@
               <a:buChar char="•"/>
             </a:pPr>
             <a:r>
-              <a:rPr lang="en-US" dirty="0"/>
-              <a:t>We will be monitoring the meeting chat, if that’s better for you</a:t>
-            </a:r>
-          </a:p>
-          <a:p>
-            <a:pPr marL="342900" indent="-342900" algn="l">
-              <a:buFont typeface="Arial" panose="020B0604020202020204" pitchFamily="34" charset="0"/>
-              <a:buChar char="•"/>
-            </a:pPr>
-            <a:r>
-              <a:rPr lang="en-US" dirty="0"/>
+              <a:rPr lang="en-US" sz="2800" dirty="0"/>
               <a:t>Please resist the temptation to multitask</a:t>
             </a:r>
           </a:p>
@@ -12671,205 +12647,6 @@
           </a:prstGeom>
         </p:spPr>
       </p:pic>
-      <p:sp>
-        <p:nvSpPr>
-          <p:cNvPr id="7" name="Subtitle 2">
-            <a:extLst>
-              <a:ext uri="{FF2B5EF4-FFF2-40B4-BE49-F238E27FC236}">
-                <a16:creationId xmlns:a16="http://schemas.microsoft.com/office/drawing/2014/main" id="{D1CBF6D2-E801-F105-E1C5-13025732F0C6}"/>
-              </a:ext>
-            </a:extLst>
-          </p:cNvPr>
-          <p:cNvSpPr txBox="1">
-            <a:spLocks/>
-          </p:cNvSpPr>
-          <p:nvPr/>
-        </p:nvSpPr>
-        <p:spPr>
-          <a:xfrm>
-            <a:off x="5559294" y="2475854"/>
-            <a:ext cx="6361773" cy="620473"/>
-          </a:xfrm>
-          <a:prstGeom prst="rect">
-            <a:avLst/>
-          </a:prstGeom>
-        </p:spPr>
-        <p:txBody>
-          <a:bodyPr vert="horz" lIns="91440" tIns="45720" rIns="91440" bIns="45720" rtlCol="0">
-            <a:normAutofit/>
-          </a:bodyPr>
-          <a:lstStyle>
-            <a:lvl1pPr marL="0" indent="0" algn="ctr" defTabSz="914400" rtl="0" eaLnBrk="1" latinLnBrk="0" hangingPunct="1">
-              <a:lnSpc>
-                <a:spcPct val="90000"/>
-              </a:lnSpc>
-              <a:spcBef>
-                <a:spcPts val="1000"/>
-              </a:spcBef>
-              <a:buFont typeface="Arial" panose="020B0604020202020204" pitchFamily="34" charset="0"/>
-              <a:buNone/>
-              <a:defRPr sz="2400" kern="1200">
-                <a:solidFill>
-                  <a:schemeClr val="tx1"/>
-                </a:solidFill>
-                <a:latin typeface="+mn-lt"/>
-                <a:ea typeface="+mn-ea"/>
-                <a:cs typeface="+mn-cs"/>
-              </a:defRPr>
-            </a:lvl1pPr>
-            <a:lvl2pPr marL="457200" indent="0" algn="ctr" defTabSz="914400" rtl="0" eaLnBrk="1" latinLnBrk="0" hangingPunct="1">
-              <a:lnSpc>
-                <a:spcPct val="90000"/>
-              </a:lnSpc>
-              <a:spcBef>
-                <a:spcPts val="500"/>
-              </a:spcBef>
-              <a:buFont typeface="Arial" panose="020B0604020202020204" pitchFamily="34" charset="0"/>
-              <a:buNone/>
-              <a:defRPr sz="2000" kern="1200">
-                <a:solidFill>
-                  <a:schemeClr val="tx1"/>
-                </a:solidFill>
-                <a:latin typeface="+mn-lt"/>
-                <a:ea typeface="+mn-ea"/>
-                <a:cs typeface="+mn-cs"/>
-              </a:defRPr>
-            </a:lvl2pPr>
-            <a:lvl3pPr marL="914400" indent="0" algn="ctr" defTabSz="914400" rtl="0" eaLnBrk="1" latinLnBrk="0" hangingPunct="1">
-              <a:lnSpc>
-                <a:spcPct val="90000"/>
-              </a:lnSpc>
-              <a:spcBef>
-                <a:spcPts val="500"/>
-              </a:spcBef>
-              <a:buFont typeface="Arial" panose="020B0604020202020204" pitchFamily="34" charset="0"/>
-              <a:buNone/>
-              <a:defRPr sz="1800" kern="1200">
-                <a:solidFill>
-                  <a:schemeClr val="tx1"/>
-                </a:solidFill>
-                <a:latin typeface="+mn-lt"/>
-                <a:ea typeface="+mn-ea"/>
-                <a:cs typeface="+mn-cs"/>
-              </a:defRPr>
-            </a:lvl3pPr>
-            <a:lvl4pPr marL="1371600" indent="0" algn="ctr" defTabSz="914400" rtl="0" eaLnBrk="1" latinLnBrk="0" hangingPunct="1">
-              <a:lnSpc>
-                <a:spcPct val="90000"/>
-              </a:lnSpc>
-              <a:spcBef>
-                <a:spcPts val="500"/>
-              </a:spcBef>
-              <a:buFont typeface="Arial" panose="020B0604020202020204" pitchFamily="34" charset="0"/>
-              <a:buNone/>
-              <a:defRPr sz="1600" kern="1200">
-                <a:solidFill>
-                  <a:schemeClr val="tx1"/>
-                </a:solidFill>
-                <a:latin typeface="+mn-lt"/>
-                <a:ea typeface="+mn-ea"/>
-                <a:cs typeface="+mn-cs"/>
-              </a:defRPr>
-            </a:lvl4pPr>
-            <a:lvl5pPr marL="1828800" indent="0" algn="ctr" defTabSz="914400" rtl="0" eaLnBrk="1" latinLnBrk="0" hangingPunct="1">
-              <a:lnSpc>
-                <a:spcPct val="90000"/>
-              </a:lnSpc>
-              <a:spcBef>
-                <a:spcPts val="500"/>
-              </a:spcBef>
-              <a:buFont typeface="Arial" panose="020B0604020202020204" pitchFamily="34" charset="0"/>
-              <a:buNone/>
-              <a:defRPr sz="1600" kern="1200">
-                <a:solidFill>
-                  <a:schemeClr val="tx1"/>
-                </a:solidFill>
-                <a:latin typeface="+mn-lt"/>
-                <a:ea typeface="+mn-ea"/>
-                <a:cs typeface="+mn-cs"/>
-              </a:defRPr>
-            </a:lvl5pPr>
-            <a:lvl6pPr marL="2286000" indent="0" algn="ctr" defTabSz="914400" rtl="0" eaLnBrk="1" latinLnBrk="0" hangingPunct="1">
-              <a:lnSpc>
-                <a:spcPct val="90000"/>
-              </a:lnSpc>
-              <a:spcBef>
-                <a:spcPts val="500"/>
-              </a:spcBef>
-              <a:buFont typeface="Arial" panose="020B0604020202020204" pitchFamily="34" charset="0"/>
-              <a:buNone/>
-              <a:defRPr sz="1600" kern="1200">
-                <a:solidFill>
-                  <a:schemeClr val="tx1"/>
-                </a:solidFill>
-                <a:latin typeface="+mn-lt"/>
-                <a:ea typeface="+mn-ea"/>
-                <a:cs typeface="+mn-cs"/>
-              </a:defRPr>
-            </a:lvl6pPr>
-            <a:lvl7pPr marL="2743200" indent="0" algn="ctr" defTabSz="914400" rtl="0" eaLnBrk="1" latinLnBrk="0" hangingPunct="1">
-              <a:lnSpc>
-                <a:spcPct val="90000"/>
-              </a:lnSpc>
-              <a:spcBef>
-                <a:spcPts val="500"/>
-              </a:spcBef>
-              <a:buFont typeface="Arial" panose="020B0604020202020204" pitchFamily="34" charset="0"/>
-              <a:buNone/>
-              <a:defRPr sz="1600" kern="1200">
-                <a:solidFill>
-                  <a:schemeClr val="tx1"/>
-                </a:solidFill>
-                <a:latin typeface="+mn-lt"/>
-                <a:ea typeface="+mn-ea"/>
-                <a:cs typeface="+mn-cs"/>
-              </a:defRPr>
-            </a:lvl7pPr>
-            <a:lvl8pPr marL="3200400" indent="0" algn="ctr" defTabSz="914400" rtl="0" eaLnBrk="1" latinLnBrk="0" hangingPunct="1">
-              <a:lnSpc>
-                <a:spcPct val="90000"/>
-              </a:lnSpc>
-              <a:spcBef>
-                <a:spcPts val="500"/>
-              </a:spcBef>
-              <a:buFont typeface="Arial" panose="020B0604020202020204" pitchFamily="34" charset="0"/>
-              <a:buNone/>
-              <a:defRPr sz="1600" kern="1200">
-                <a:solidFill>
-                  <a:schemeClr val="tx1"/>
-                </a:solidFill>
-                <a:latin typeface="+mn-lt"/>
-                <a:ea typeface="+mn-ea"/>
-                <a:cs typeface="+mn-cs"/>
-              </a:defRPr>
-            </a:lvl8pPr>
-            <a:lvl9pPr marL="3657600" indent="0" algn="ctr" defTabSz="914400" rtl="0" eaLnBrk="1" latinLnBrk="0" hangingPunct="1">
-              <a:lnSpc>
-                <a:spcPct val="90000"/>
-              </a:lnSpc>
-              <a:spcBef>
-                <a:spcPts val="500"/>
-              </a:spcBef>
-              <a:buFont typeface="Arial" panose="020B0604020202020204" pitchFamily="34" charset="0"/>
-              <a:buNone/>
-              <a:defRPr sz="1600" kern="1200">
-                <a:solidFill>
-                  <a:schemeClr val="tx1"/>
-                </a:solidFill>
-                <a:latin typeface="+mn-lt"/>
-                <a:ea typeface="+mn-ea"/>
-                <a:cs typeface="+mn-cs"/>
-              </a:defRPr>
-            </a:lvl9pPr>
-          </a:lstStyle>
-          <a:p>
-            <a:r>
-              <a:rPr lang="en-US" sz="2800" dirty="0"/>
-              <a:t>(thanks for your flexibility)</a:t>
-            </a:r>
-          </a:p>
-        </p:txBody>
-      </p:sp>
     </p:spTree>
     <p:extLst>
       <p:ext uri="{BB962C8B-B14F-4D97-AF65-F5344CB8AC3E}">
@@ -13164,20 +12941,6 @@
               <a:lnSpc>
                 <a:spcPct val="90000"/>
               </a:lnSpc>
-              <a:spcAft>
-                <a:spcPts val="1800"/>
-              </a:spcAft>
-            </a:pPr>
-            <a:r>
-              <a:rPr lang="en-US" dirty="0"/>
-              <a:t>2020 UAF CFOS Graduate</a:t>
-            </a:r>
-          </a:p>
-          <a:p>
-            <a:pPr algn="ctr">
-              <a:lnSpc>
-                <a:spcPct val="90000"/>
-              </a:lnSpc>
             </a:pPr>
             <a:r>
               <a:rPr lang="en-US" dirty="0"/>
@@ -13331,20 +13094,6 @@
                 <a:latin typeface="+mj-lt"/>
               </a:rPr>
               <a:t>Matt Tyers</a:t>
-            </a:r>
-          </a:p>
-          <a:p>
-            <a:pPr algn="ctr">
-              <a:lnSpc>
-                <a:spcPct val="90000"/>
-              </a:lnSpc>
-              <a:spcAft>
-                <a:spcPts val="1800"/>
-              </a:spcAft>
-            </a:pPr>
-            <a:r>
-              <a:rPr lang="en-US" dirty="0"/>
-              <a:t>2014 Montana State Statistics Graduate</a:t>
             </a:r>
           </a:p>
           <a:p>

</xml_diff>